<commit_message>
Ajoute le prototype et ses limites
</commit_message>
<xml_diff>
--- a/Dossier de Conception.pptx
+++ b/Dossier de Conception.pptx
@@ -10,8 +10,10 @@
     <p:sldId id="258" r:id="rId4"/>
     <p:sldId id="259" r:id="rId5"/>
     <p:sldId id="260" r:id="rId6"/>
-    <p:sldId id="261" r:id="rId7"/>
-    <p:sldId id="262" r:id="rId8"/>
+    <p:sldId id="263" r:id="rId7"/>
+    <p:sldId id="261" r:id="rId8"/>
+    <p:sldId id="264" r:id="rId9"/>
+    <p:sldId id="262" r:id="rId10"/>
   </p:sldIdLst>
   <p:sldSz cx="12192000" cy="6858000"/>
   <p:notesSz cx="6858000" cy="9144000"/>
@@ -110,6 +112,11 @@
       </a:defRPr>
     </a:lvl9pPr>
   </p:defaultTextStyle>
+  <p:extLst>
+    <p:ext uri="{EFAFB233-063F-42B5-8137-9DF3F51BA10A}">
+      <p15:sldGuideLst xmlns:p15="http://schemas.microsoft.com/office/powerpoint/2012/main"/>
+    </p:ext>
+  </p:extLst>
 </p:presentation>
 </file>
 
@@ -615,7 +622,7 @@
           <a:p>
             <a:fld id="{F81637C0-94AD-483C-A163-E4595C514589}" type="datetimeFigureOut">
               <a:rPr lang="en-CA" smtClean="0"/>
-              <a:t>2018-09-14</a:t>
+              <a:t>19/09/2018</a:t>
             </a:fld>
             <a:endParaRPr lang="en-CA"/>
           </a:p>
@@ -916,7 +923,7 @@
           <a:p>
             <a:fld id="{F81637C0-94AD-483C-A163-E4595C514589}" type="datetimeFigureOut">
               <a:rPr lang="en-CA" smtClean="0"/>
-              <a:t>2018-09-14</a:t>
+              <a:t>19/09/2018</a:t>
             </a:fld>
             <a:endParaRPr lang="en-CA"/>
           </a:p>
@@ -1164,7 +1171,7 @@
           <a:p>
             <a:fld id="{F81637C0-94AD-483C-A163-E4595C514589}" type="datetimeFigureOut">
               <a:rPr lang="en-CA" smtClean="0"/>
-              <a:t>2018-09-14</a:t>
+              <a:t>19/09/2018</a:t>
             </a:fld>
             <a:endParaRPr lang="en-CA"/>
           </a:p>
@@ -1704,7 +1711,7 @@
           <a:p>
             <a:fld id="{F81637C0-94AD-483C-A163-E4595C514589}" type="datetimeFigureOut">
               <a:rPr lang="en-CA" smtClean="0"/>
-              <a:t>2018-09-14</a:t>
+              <a:t>19/09/2018</a:t>
             </a:fld>
             <a:endParaRPr lang="en-CA"/>
           </a:p>
@@ -1952,7 +1959,7 @@
           <a:p>
             <a:fld id="{F81637C0-94AD-483C-A163-E4595C514589}" type="datetimeFigureOut">
               <a:rPr lang="en-CA" smtClean="0"/>
-              <a:t>2018-09-14</a:t>
+              <a:t>19/09/2018</a:t>
             </a:fld>
             <a:endParaRPr lang="en-CA"/>
           </a:p>
@@ -2484,7 +2491,7 @@
           <a:p>
             <a:fld id="{F81637C0-94AD-483C-A163-E4595C514589}" type="datetimeFigureOut">
               <a:rPr lang="en-CA" smtClean="0"/>
-              <a:t>2018-09-14</a:t>
+              <a:t>19/09/2018</a:t>
             </a:fld>
             <a:endParaRPr lang="en-CA"/>
           </a:p>
@@ -2781,7 +2788,7 @@
           <a:p>
             <a:fld id="{F81637C0-94AD-483C-A163-E4595C514589}" type="datetimeFigureOut">
               <a:rPr lang="en-CA" smtClean="0"/>
-              <a:t>2018-09-14</a:t>
+              <a:t>19/09/2018</a:t>
             </a:fld>
             <a:endParaRPr lang="en-CA"/>
           </a:p>
@@ -2955,7 +2962,7 @@
           <a:p>
             <a:fld id="{F81637C0-94AD-483C-A163-E4595C514589}" type="datetimeFigureOut">
               <a:rPr lang="en-CA" smtClean="0"/>
-              <a:t>2018-09-14</a:t>
+              <a:t>19/09/2018</a:t>
             </a:fld>
             <a:endParaRPr lang="en-CA"/>
           </a:p>
@@ -3135,7 +3142,7 @@
           <a:p>
             <a:fld id="{F81637C0-94AD-483C-A163-E4595C514589}" type="datetimeFigureOut">
               <a:rPr lang="en-CA" smtClean="0"/>
-              <a:t>2018-09-14</a:t>
+              <a:t>19/09/2018</a:t>
             </a:fld>
             <a:endParaRPr lang="en-CA"/>
           </a:p>
@@ -3351,7 +3358,7 @@
           <a:p>
             <a:fld id="{F81637C0-94AD-483C-A163-E4595C514589}" type="datetimeFigureOut">
               <a:rPr lang="en-CA" smtClean="0"/>
-              <a:t>2018-09-14</a:t>
+              <a:t>19/09/2018</a:t>
             </a:fld>
             <a:endParaRPr lang="en-CA"/>
           </a:p>
@@ -3602,7 +3609,7 @@
           <a:p>
             <a:fld id="{F81637C0-94AD-483C-A163-E4595C514589}" type="datetimeFigureOut">
               <a:rPr lang="en-CA" smtClean="0"/>
-              <a:t>2018-09-14</a:t>
+              <a:t>19/09/2018</a:t>
             </a:fld>
             <a:endParaRPr lang="en-CA"/>
           </a:p>
@@ -3954,7 +3961,7 @@
           <a:p>
             <a:fld id="{F81637C0-94AD-483C-A163-E4595C514589}" type="datetimeFigureOut">
               <a:rPr lang="en-CA" smtClean="0"/>
-              <a:t>2018-09-14</a:t>
+              <a:t>19/09/2018</a:t>
             </a:fld>
             <a:endParaRPr lang="en-CA"/>
           </a:p>
@@ -4446,7 +4453,7 @@
           <a:p>
             <a:fld id="{F81637C0-94AD-483C-A163-E4595C514589}" type="datetimeFigureOut">
               <a:rPr lang="en-CA" smtClean="0"/>
-              <a:t>2018-09-14</a:t>
+              <a:t>19/09/2018</a:t>
             </a:fld>
             <a:endParaRPr lang="en-CA"/>
           </a:p>
@@ -4564,7 +4571,7 @@
           <a:p>
             <a:fld id="{F81637C0-94AD-483C-A163-E4595C514589}" type="datetimeFigureOut">
               <a:rPr lang="en-CA" smtClean="0"/>
-              <a:t>2018-09-14</a:t>
+              <a:t>19/09/2018</a:t>
             </a:fld>
             <a:endParaRPr lang="en-CA"/>
           </a:p>
@@ -4659,7 +4666,7 @@
           <a:p>
             <a:fld id="{F81637C0-94AD-483C-A163-E4595C514589}" type="datetimeFigureOut">
               <a:rPr lang="en-CA" smtClean="0"/>
-              <a:t>2018-09-14</a:t>
+              <a:t>19/09/2018</a:t>
             </a:fld>
             <a:endParaRPr lang="en-CA"/>
           </a:p>
@@ -4942,7 +4949,7 @@
           <a:p>
             <a:fld id="{F81637C0-94AD-483C-A163-E4595C514589}" type="datetimeFigureOut">
               <a:rPr lang="en-CA" smtClean="0"/>
-              <a:t>2018-09-14</a:t>
+              <a:t>19/09/2018</a:t>
             </a:fld>
             <a:endParaRPr lang="en-CA"/>
           </a:p>
@@ -5233,7 +5240,7 @@
           <a:p>
             <a:fld id="{F81637C0-94AD-483C-A163-E4595C514589}" type="datetimeFigureOut">
               <a:rPr lang="en-CA" smtClean="0"/>
-              <a:t>2018-09-14</a:t>
+              <a:t>19/09/2018</a:t>
             </a:fld>
             <a:endParaRPr lang="en-CA"/>
           </a:p>
@@ -5763,7 +5770,7 @@
           <a:p>
             <a:fld id="{F81637C0-94AD-483C-A163-E4595C514589}" type="datetimeFigureOut">
               <a:rPr lang="en-CA" smtClean="0"/>
-              <a:t>2018-09-14</a:t>
+              <a:t>19/09/2018</a:t>
             </a:fld>
             <a:endParaRPr lang="en-CA"/>
           </a:p>
@@ -6790,7 +6797,7 @@
           <p:cNvPr id="2" name="Title 1">
             <a:extLst>
               <a:ext uri="{FF2B5EF4-FFF2-40B4-BE49-F238E27FC236}">
-                <a16:creationId xmlns:a16="http://schemas.microsoft.com/office/drawing/2014/main" id="{9BB66E64-A2B5-4175-8BCB-D4DD5DEC17E4}"/>
+                <a16:creationId xmlns:a16="http://schemas.microsoft.com/office/drawing/2014/main" id="{B5664C5A-D679-4FE0-8CD9-C5C2056C08CE}"/>
               </a:ext>
             </a:extLst>
           </p:cNvPr>
@@ -6815,33 +6822,557 @@
       </p:sp>
       <p:sp>
         <p:nvSpPr>
-          <p:cNvPr id="3" name="Content Placeholder 2">
+          <p:cNvPr id="4" name="Content Placeholder 2">
             <a:extLst>
               <a:ext uri="{FF2B5EF4-FFF2-40B4-BE49-F238E27FC236}">
-                <a16:creationId xmlns:a16="http://schemas.microsoft.com/office/drawing/2014/main" id="{7086AD86-9AFA-4EE6-8B42-67446654F46C}"/>
+                <a16:creationId xmlns:a16="http://schemas.microsoft.com/office/drawing/2014/main" id="{DCDD3B0C-FD44-484B-A378-48A54CFC484C}"/>
               </a:ext>
             </a:extLst>
           </p:cNvPr>
-          <p:cNvSpPr>
+          <p:cNvSpPr txBox="1">
             <a:spLocks noGrp="1"/>
           </p:cNvSpPr>
           <p:nvPr>
             <p:ph idx="1"/>
           </p:nvPr>
         </p:nvSpPr>
-        <p:spPr/>
-        <p:txBody>
-          <a:bodyPr/>
-          <a:lstStyle/>
-          <a:p>
-            <a:endParaRPr lang="en-CA"/>
-          </a:p>
-        </p:txBody>
-      </p:sp>
+        <p:spPr>
+          <a:xfrm>
+            <a:off x="1484313" y="2667000"/>
+            <a:ext cx="10018712" cy="3124200"/>
+          </a:xfrm>
+          <a:prstGeom prst="rect">
+            <a:avLst/>
+          </a:prstGeom>
+        </p:spPr>
+        <p:txBody>
+          <a:bodyPr vert="horz" lIns="91440" tIns="45720" rIns="91440" bIns="45720" rtlCol="0" anchor="ctr">
+            <a:normAutofit/>
+          </a:bodyPr>
+          <a:lstStyle>
+            <a:lvl1pPr marL="285750" indent="-285750" algn="l" defTabSz="457200" rtl="0" eaLnBrk="1" latinLnBrk="0" hangingPunct="1">
+              <a:spcBef>
+                <a:spcPct val="20000"/>
+              </a:spcBef>
+              <a:spcAft>
+                <a:spcPts val="600"/>
+              </a:spcAft>
+              <a:buClr>
+                <a:schemeClr val="accent1">
+                  <a:lumMod val="75000"/>
+                </a:schemeClr>
+              </a:buClr>
+              <a:buSzPct val="145000"/>
+              <a:buFont typeface="Arial"/>
+              <a:buChar char="•"/>
+              <a:defRPr sz="2400" kern="1200" cap="none">
+                <a:solidFill>
+                  <a:schemeClr val="tx1"/>
+                </a:solidFill>
+                <a:effectLst/>
+                <a:latin typeface="+mn-lt"/>
+                <a:ea typeface="+mn-ea"/>
+                <a:cs typeface="+mn-cs"/>
+              </a:defRPr>
+            </a:lvl1pPr>
+            <a:lvl2pPr marL="742950" indent="-285750" algn="l" defTabSz="457200" rtl="0" eaLnBrk="1" latinLnBrk="0" hangingPunct="1">
+              <a:spcBef>
+                <a:spcPct val="20000"/>
+              </a:spcBef>
+              <a:spcAft>
+                <a:spcPts val="600"/>
+              </a:spcAft>
+              <a:buClr>
+                <a:schemeClr val="accent1">
+                  <a:lumMod val="75000"/>
+                </a:schemeClr>
+              </a:buClr>
+              <a:buSzPct val="145000"/>
+              <a:buFont typeface="Arial"/>
+              <a:buChar char="•"/>
+              <a:defRPr sz="2000" kern="1200" cap="none">
+                <a:solidFill>
+                  <a:schemeClr val="tx1"/>
+                </a:solidFill>
+                <a:effectLst/>
+                <a:latin typeface="+mn-lt"/>
+                <a:ea typeface="+mn-ea"/>
+                <a:cs typeface="+mn-cs"/>
+              </a:defRPr>
+            </a:lvl2pPr>
+            <a:lvl3pPr marL="1200150" indent="-285750" algn="l" defTabSz="457200" rtl="0" eaLnBrk="1" latinLnBrk="0" hangingPunct="1">
+              <a:spcBef>
+                <a:spcPct val="20000"/>
+              </a:spcBef>
+              <a:spcAft>
+                <a:spcPts val="600"/>
+              </a:spcAft>
+              <a:buClr>
+                <a:schemeClr val="accent1">
+                  <a:lumMod val="75000"/>
+                </a:schemeClr>
+              </a:buClr>
+              <a:buSzPct val="145000"/>
+              <a:buFont typeface="Arial"/>
+              <a:buChar char="•"/>
+              <a:defRPr sz="1800" kern="1200" cap="none">
+                <a:solidFill>
+                  <a:schemeClr val="tx1"/>
+                </a:solidFill>
+                <a:effectLst/>
+                <a:latin typeface="+mn-lt"/>
+                <a:ea typeface="+mn-ea"/>
+                <a:cs typeface="+mn-cs"/>
+              </a:defRPr>
+            </a:lvl3pPr>
+            <a:lvl4pPr marL="1543050" indent="-171450" algn="l" defTabSz="457200" rtl="0" eaLnBrk="1" latinLnBrk="0" hangingPunct="1">
+              <a:spcBef>
+                <a:spcPct val="20000"/>
+              </a:spcBef>
+              <a:spcAft>
+                <a:spcPts val="600"/>
+              </a:spcAft>
+              <a:buClr>
+                <a:schemeClr val="accent1">
+                  <a:lumMod val="75000"/>
+                </a:schemeClr>
+              </a:buClr>
+              <a:buSzPct val="145000"/>
+              <a:buFont typeface="Arial"/>
+              <a:buChar char="•"/>
+              <a:defRPr sz="1600" kern="1200" cap="none">
+                <a:solidFill>
+                  <a:schemeClr val="tx1"/>
+                </a:solidFill>
+                <a:effectLst/>
+                <a:latin typeface="+mn-lt"/>
+                <a:ea typeface="+mn-ea"/>
+                <a:cs typeface="+mn-cs"/>
+              </a:defRPr>
+            </a:lvl4pPr>
+            <a:lvl5pPr marL="2000250" indent="-171450" algn="l" defTabSz="457200" rtl="0" eaLnBrk="1" latinLnBrk="0" hangingPunct="1">
+              <a:spcBef>
+                <a:spcPct val="20000"/>
+              </a:spcBef>
+              <a:spcAft>
+                <a:spcPts val="600"/>
+              </a:spcAft>
+              <a:buClr>
+                <a:schemeClr val="accent1">
+                  <a:lumMod val="75000"/>
+                </a:schemeClr>
+              </a:buClr>
+              <a:buSzPct val="145000"/>
+              <a:buFont typeface="Arial"/>
+              <a:buChar char="•"/>
+              <a:defRPr sz="1400" kern="1200" cap="none">
+                <a:solidFill>
+                  <a:schemeClr val="tx1"/>
+                </a:solidFill>
+                <a:effectLst/>
+                <a:latin typeface="+mn-lt"/>
+                <a:ea typeface="+mn-ea"/>
+                <a:cs typeface="+mn-cs"/>
+              </a:defRPr>
+            </a:lvl5pPr>
+            <a:lvl6pPr marL="2514600" indent="-228600" algn="l" defTabSz="457200" rtl="0" eaLnBrk="1" latinLnBrk="0" hangingPunct="1">
+              <a:spcBef>
+                <a:spcPct val="20000"/>
+              </a:spcBef>
+              <a:spcAft>
+                <a:spcPts val="600"/>
+              </a:spcAft>
+              <a:buClr>
+                <a:schemeClr val="accent1">
+                  <a:lumMod val="75000"/>
+                </a:schemeClr>
+              </a:buClr>
+              <a:buSzPct val="145000"/>
+              <a:buFont typeface="Arial"/>
+              <a:buChar char="•"/>
+              <a:defRPr sz="1400" kern="1200" cap="none">
+                <a:solidFill>
+                  <a:schemeClr val="tx1"/>
+                </a:solidFill>
+                <a:effectLst/>
+                <a:latin typeface="+mn-lt"/>
+                <a:ea typeface="+mn-ea"/>
+                <a:cs typeface="+mn-cs"/>
+              </a:defRPr>
+            </a:lvl6pPr>
+            <a:lvl7pPr marL="2971800" indent="-228600" algn="l" defTabSz="457200" rtl="0" eaLnBrk="1" latinLnBrk="0" hangingPunct="1">
+              <a:spcBef>
+                <a:spcPct val="20000"/>
+              </a:spcBef>
+              <a:spcAft>
+                <a:spcPts val="600"/>
+              </a:spcAft>
+              <a:buClr>
+                <a:schemeClr val="accent1">
+                  <a:lumMod val="75000"/>
+                </a:schemeClr>
+              </a:buClr>
+              <a:buSzPct val="145000"/>
+              <a:buFont typeface="Arial"/>
+              <a:buChar char="•"/>
+              <a:defRPr sz="1400" kern="1200" cap="none">
+                <a:solidFill>
+                  <a:schemeClr val="tx1"/>
+                </a:solidFill>
+                <a:effectLst/>
+                <a:latin typeface="+mn-lt"/>
+                <a:ea typeface="+mn-ea"/>
+                <a:cs typeface="+mn-cs"/>
+              </a:defRPr>
+            </a:lvl7pPr>
+            <a:lvl8pPr marL="3429000" indent="-228600" algn="l" defTabSz="457200" rtl="0" eaLnBrk="1" latinLnBrk="0" hangingPunct="1">
+              <a:spcBef>
+                <a:spcPct val="20000"/>
+              </a:spcBef>
+              <a:spcAft>
+                <a:spcPts val="600"/>
+              </a:spcAft>
+              <a:buClr>
+                <a:schemeClr val="accent1">
+                  <a:lumMod val="75000"/>
+                </a:schemeClr>
+              </a:buClr>
+              <a:buSzPct val="145000"/>
+              <a:buFont typeface="Arial"/>
+              <a:buChar char="•"/>
+              <a:defRPr sz="1400" kern="1200" cap="none">
+                <a:solidFill>
+                  <a:schemeClr val="tx1"/>
+                </a:solidFill>
+                <a:effectLst/>
+                <a:latin typeface="+mn-lt"/>
+                <a:ea typeface="+mn-ea"/>
+                <a:cs typeface="+mn-cs"/>
+              </a:defRPr>
+            </a:lvl8pPr>
+            <a:lvl9pPr marL="3886200" indent="-228600" algn="l" defTabSz="457200" rtl="0" eaLnBrk="1" latinLnBrk="0" hangingPunct="1">
+              <a:spcBef>
+                <a:spcPct val="20000"/>
+              </a:spcBef>
+              <a:spcAft>
+                <a:spcPts val="600"/>
+              </a:spcAft>
+              <a:buClr>
+                <a:schemeClr val="accent1">
+                  <a:lumMod val="75000"/>
+                </a:schemeClr>
+              </a:buClr>
+              <a:buSzPct val="145000"/>
+              <a:buFont typeface="Arial"/>
+              <a:buChar char="•"/>
+              <a:defRPr sz="1400" kern="1200" cap="none">
+                <a:solidFill>
+                  <a:schemeClr val="tx1"/>
+                </a:solidFill>
+                <a:effectLst/>
+                <a:latin typeface="+mn-lt"/>
+                <a:ea typeface="+mn-ea"/>
+                <a:cs typeface="+mn-cs"/>
+              </a:defRPr>
+            </a:lvl9pPr>
+          </a:lstStyle>
+          <a:p>
+            <a:r>
+              <a:rPr lang="en-CA" dirty="0" err="1"/>
+              <a:t>Capteurs</a:t>
+            </a:r>
+            <a:r>
+              <a:rPr lang="en-CA" dirty="0"/>
+              <a:t> et </a:t>
+            </a:r>
+            <a:r>
+              <a:rPr lang="en-CA" dirty="0" err="1"/>
+              <a:t>actuateur</a:t>
+            </a:r>
+            <a:r>
+              <a:rPr lang="en-CA" dirty="0"/>
+              <a:t> de la </a:t>
+            </a:r>
+            <a:r>
+              <a:rPr lang="en-CA" dirty="0" err="1"/>
+              <a:t>ruche</a:t>
+            </a:r>
+            <a:endParaRPr lang="en-CA" dirty="0"/>
+          </a:p>
+          <a:p>
+            <a:pPr lvl="1"/>
+            <a:r>
+              <a:rPr lang="en-CA" dirty="0" err="1"/>
+              <a:t>Température</a:t>
+            </a:r>
+            <a:endParaRPr lang="en-CA" dirty="0"/>
+          </a:p>
+          <a:p>
+            <a:pPr lvl="1"/>
+            <a:r>
+              <a:rPr lang="en-CA" dirty="0" err="1"/>
+              <a:t>Chauffage</a:t>
+            </a:r>
+            <a:endParaRPr lang="en-CA" dirty="0"/>
+          </a:p>
+          <a:p>
+            <a:pPr lvl="1"/>
+            <a:r>
+              <a:rPr lang="en-CA" dirty="0" err="1"/>
+              <a:t>Poids</a:t>
+            </a:r>
+            <a:endParaRPr lang="en-CA" dirty="0"/>
+          </a:p>
+          <a:p>
+            <a:pPr lvl="1"/>
+            <a:r>
+              <a:rPr lang="en-CA" dirty="0" err="1"/>
+              <a:t>Mouvement</a:t>
+            </a:r>
+            <a:r>
+              <a:rPr lang="en-CA" dirty="0"/>
+              <a:t> / </a:t>
+            </a:r>
+            <a:r>
+              <a:rPr lang="en-CA" dirty="0" err="1"/>
+              <a:t>proximité</a:t>
+            </a:r>
+            <a:endParaRPr lang="en-CA" dirty="0"/>
+          </a:p>
+          <a:p>
+            <a:pPr lvl="1"/>
+            <a:endParaRPr lang="en-CA" dirty="0"/>
+          </a:p>
+        </p:txBody>
+      </p:sp>
+      <p:pic>
+        <p:nvPicPr>
+          <p:cNvPr id="6" name="Picture 5">
+            <a:extLst>
+              <a:ext uri="{FF2B5EF4-FFF2-40B4-BE49-F238E27FC236}">
+                <a16:creationId xmlns:a16="http://schemas.microsoft.com/office/drawing/2014/main" id="{B759E024-1864-4A66-8EF0-779F3BB9CA81}"/>
+              </a:ext>
+            </a:extLst>
+          </p:cNvPr>
+          <p:cNvPicPr>
+            <a:picLocks noChangeAspect="1"/>
+          </p:cNvPicPr>
+          <p:nvPr/>
+        </p:nvPicPr>
+        <p:blipFill>
+          <a:blip r:embed="rId2">
+            <a:extLst>
+              <a:ext uri="{28A0092B-C50C-407E-A947-70E740481C1C}">
+                <a14:useLocalDpi xmlns:a14="http://schemas.microsoft.com/office/drawing/2010/main" val="0"/>
+              </a:ext>
+            </a:extLst>
+          </a:blip>
+          <a:stretch>
+            <a:fillRect/>
+          </a:stretch>
+        </p:blipFill>
+        <p:spPr>
+          <a:xfrm>
+            <a:off x="6537469" y="2596392"/>
+            <a:ext cx="3124200" cy="3124200"/>
+          </a:xfrm>
+          <a:prstGeom prst="rect">
+            <a:avLst/>
+          </a:prstGeom>
+        </p:spPr>
+      </p:pic>
+      <p:pic>
+        <p:nvPicPr>
+          <p:cNvPr id="1026" name="Picture 2" descr="Image result for heating icon">
+            <a:extLst>
+              <a:ext uri="{FF2B5EF4-FFF2-40B4-BE49-F238E27FC236}">
+                <a16:creationId xmlns:a16="http://schemas.microsoft.com/office/drawing/2014/main" id="{79F7D4D1-90FF-41D0-AF64-F14E901CFF43}"/>
+              </a:ext>
+            </a:extLst>
+          </p:cNvPr>
+          <p:cNvPicPr>
+            <a:picLocks noChangeAspect="1" noChangeArrowheads="1"/>
+          </p:cNvPicPr>
+          <p:nvPr/>
+        </p:nvPicPr>
+        <p:blipFill>
+          <a:blip r:embed="rId3">
+            <a:extLst>
+              <a:ext uri="{28A0092B-C50C-407E-A947-70E740481C1C}">
+                <a14:useLocalDpi xmlns:a14="http://schemas.microsoft.com/office/drawing/2010/main" val="0"/>
+              </a:ext>
+            </a:extLst>
+          </a:blip>
+          <a:srcRect/>
+          <a:stretch>
+            <a:fillRect/>
+          </a:stretch>
+        </p:blipFill>
+        <p:spPr bwMode="auto">
+          <a:xfrm>
+            <a:off x="6084111" y="4347243"/>
+            <a:ext cx="1672558" cy="1672558"/>
+          </a:xfrm>
+          <a:prstGeom prst="rect">
+            <a:avLst/>
+          </a:prstGeom>
+          <a:noFill/>
+          <a:extLst>
+            <a:ext uri="{909E8E84-426E-40DD-AFC4-6F175D3DCCD1}">
+              <a14:hiddenFill xmlns:a14="http://schemas.microsoft.com/office/drawing/2010/main">
+                <a:solidFill>
+                  <a:srgbClr val="FFFFFF"/>
+                </a:solidFill>
+              </a14:hiddenFill>
+            </a:ext>
+          </a:extLst>
+        </p:spPr>
+      </p:pic>
+      <p:pic>
+        <p:nvPicPr>
+          <p:cNvPr id="1030" name="Picture 6" descr="Image result for heating icon">
+            <a:extLst>
+              <a:ext uri="{FF2B5EF4-FFF2-40B4-BE49-F238E27FC236}">
+                <a16:creationId xmlns:a16="http://schemas.microsoft.com/office/drawing/2014/main" id="{839259F7-5BC1-4B9D-83F6-CBBE50263232}"/>
+              </a:ext>
+            </a:extLst>
+          </p:cNvPr>
+          <p:cNvPicPr>
+            <a:picLocks noChangeAspect="1" noChangeArrowheads="1"/>
+          </p:cNvPicPr>
+          <p:nvPr/>
+        </p:nvPicPr>
+        <p:blipFill>
+          <a:blip r:embed="rId4">
+            <a:extLst>
+              <a:ext uri="{28A0092B-C50C-407E-A947-70E740481C1C}">
+                <a14:useLocalDpi xmlns:a14="http://schemas.microsoft.com/office/drawing/2010/main" val="0"/>
+              </a:ext>
+            </a:extLst>
+          </a:blip>
+          <a:srcRect/>
+          <a:stretch>
+            <a:fillRect/>
+          </a:stretch>
+        </p:blipFill>
+        <p:spPr bwMode="auto">
+          <a:xfrm>
+            <a:off x="7149166" y="4311242"/>
+            <a:ext cx="1900806" cy="1900806"/>
+          </a:xfrm>
+          <a:prstGeom prst="rect">
+            <a:avLst/>
+          </a:prstGeom>
+          <a:noFill/>
+          <a:extLst>
+            <a:ext uri="{909E8E84-426E-40DD-AFC4-6F175D3DCCD1}">
+              <a14:hiddenFill xmlns:a14="http://schemas.microsoft.com/office/drawing/2010/main">
+                <a:solidFill>
+                  <a:srgbClr val="FFFFFF"/>
+                </a:solidFill>
+              </a14:hiddenFill>
+            </a:ext>
+          </a:extLst>
+        </p:spPr>
+      </p:pic>
+      <p:pic>
+        <p:nvPicPr>
+          <p:cNvPr id="1032" name="Picture 8" descr="Image result for sensor icon">
+            <a:extLst>
+              <a:ext uri="{FF2B5EF4-FFF2-40B4-BE49-F238E27FC236}">
+                <a16:creationId xmlns:a16="http://schemas.microsoft.com/office/drawing/2014/main" id="{880D080C-0C4C-4849-A3DA-088FF3603512}"/>
+              </a:ext>
+            </a:extLst>
+          </p:cNvPr>
+          <p:cNvPicPr>
+            <a:picLocks noChangeAspect="1" noChangeArrowheads="1"/>
+          </p:cNvPicPr>
+          <p:nvPr/>
+        </p:nvPicPr>
+        <p:blipFill>
+          <a:blip r:embed="rId5">
+            <a:extLst>
+              <a:ext uri="{28A0092B-C50C-407E-A947-70E740481C1C}">
+                <a14:useLocalDpi xmlns:a14="http://schemas.microsoft.com/office/drawing/2010/main" val="0"/>
+              </a:ext>
+            </a:extLst>
+          </a:blip>
+          <a:srcRect/>
+          <a:stretch>
+            <a:fillRect/>
+          </a:stretch>
+        </p:blipFill>
+        <p:spPr bwMode="auto">
+          <a:xfrm>
+            <a:off x="8679081" y="2706848"/>
+            <a:ext cx="1905000" cy="1905000"/>
+          </a:xfrm>
+          <a:prstGeom prst="rect">
+            <a:avLst/>
+          </a:prstGeom>
+          <a:noFill/>
+          <a:extLst>
+            <a:ext uri="{909E8E84-426E-40DD-AFC4-6F175D3DCCD1}">
+              <a14:hiddenFill xmlns:a14="http://schemas.microsoft.com/office/drawing/2010/main">
+                <a:solidFill>
+                  <a:srgbClr val="FFFFFF"/>
+                </a:solidFill>
+              </a14:hiddenFill>
+            </a:ext>
+          </a:extLst>
+        </p:spPr>
+      </p:pic>
+      <p:pic>
+        <p:nvPicPr>
+          <p:cNvPr id="1034" name="Picture 10" descr="Image result for danger icon">
+            <a:extLst>
+              <a:ext uri="{FF2B5EF4-FFF2-40B4-BE49-F238E27FC236}">
+                <a16:creationId xmlns:a16="http://schemas.microsoft.com/office/drawing/2014/main" id="{7A512B9D-2B4C-4987-A478-1A177087C247}"/>
+              </a:ext>
+            </a:extLst>
+          </p:cNvPr>
+          <p:cNvPicPr>
+            <a:picLocks noChangeAspect="1" noChangeArrowheads="1"/>
+          </p:cNvPicPr>
+          <p:nvPr/>
+        </p:nvPicPr>
+        <p:blipFill>
+          <a:blip r:embed="rId6">
+            <a:extLst>
+              <a:ext uri="{28A0092B-C50C-407E-A947-70E740481C1C}">
+                <a14:useLocalDpi xmlns:a14="http://schemas.microsoft.com/office/drawing/2010/main" val="0"/>
+              </a:ext>
+            </a:extLst>
+          </a:blip>
+          <a:srcRect/>
+          <a:stretch>
+            <a:fillRect/>
+          </a:stretch>
+        </p:blipFill>
+        <p:spPr bwMode="auto">
+          <a:xfrm>
+            <a:off x="10745568" y="3253705"/>
+            <a:ext cx="811286" cy="811286"/>
+          </a:xfrm>
+          <a:prstGeom prst="rect">
+            <a:avLst/>
+          </a:prstGeom>
+          <a:noFill/>
+          <a:extLst>
+            <a:ext uri="{909E8E84-426E-40DD-AFC4-6F175D3DCCD1}">
+              <a14:hiddenFill xmlns:a14="http://schemas.microsoft.com/office/drawing/2010/main">
+                <a:solidFill>
+                  <a:srgbClr val="FFFFFF"/>
+                </a:solidFill>
+              </a14:hiddenFill>
+            </a:ext>
+          </a:extLst>
+        </p:spPr>
+      </p:pic>
     </p:spTree>
     <p:extLst>
       <p:ext uri="{BB962C8B-B14F-4D97-AF65-F5344CB8AC3E}">
-        <p14:creationId xmlns:p14="http://schemas.microsoft.com/office/powerpoint/2010/main" val="3908016617"/>
+        <p14:creationId xmlns:p14="http://schemas.microsoft.com/office/powerpoint/2010/main" val="3896285338"/>
       </p:ext>
     </p:extLst>
   </p:cSld>
@@ -6873,6 +7404,530 @@
           <p:cNvPr id="2" name="Title 1">
             <a:extLst>
               <a:ext uri="{FF2B5EF4-FFF2-40B4-BE49-F238E27FC236}">
+                <a16:creationId xmlns:a16="http://schemas.microsoft.com/office/drawing/2014/main" id="{9BB66E64-A2B5-4175-8BCB-D4DD5DEC17E4}"/>
+              </a:ext>
+            </a:extLst>
+          </p:cNvPr>
+          <p:cNvSpPr>
+            <a:spLocks noGrp="1"/>
+          </p:cNvSpPr>
+          <p:nvPr>
+            <p:ph type="title"/>
+          </p:nvPr>
+        </p:nvSpPr>
+        <p:spPr/>
+        <p:txBody>
+          <a:bodyPr/>
+          <a:lstStyle/>
+          <a:p>
+            <a:r>
+              <a:rPr lang="en-CA" dirty="0"/>
+              <a:t>Prototype/prevue de concept de S6</a:t>
+            </a:r>
+          </a:p>
+        </p:txBody>
+      </p:sp>
+      <p:sp>
+        <p:nvSpPr>
+          <p:cNvPr id="3" name="Content Placeholder 2">
+            <a:extLst>
+              <a:ext uri="{FF2B5EF4-FFF2-40B4-BE49-F238E27FC236}">
+                <a16:creationId xmlns:a16="http://schemas.microsoft.com/office/drawing/2014/main" id="{7086AD86-9AFA-4EE6-8B42-67446654F46C}"/>
+              </a:ext>
+            </a:extLst>
+          </p:cNvPr>
+          <p:cNvSpPr>
+            <a:spLocks noGrp="1"/>
+          </p:cNvSpPr>
+          <p:nvPr>
+            <p:ph idx="1"/>
+          </p:nvPr>
+        </p:nvSpPr>
+        <p:spPr>
+          <a:xfrm>
+            <a:off x="1484310" y="2229853"/>
+            <a:ext cx="5445879" cy="3942347"/>
+          </a:xfrm>
+        </p:spPr>
+        <p:txBody>
+          <a:bodyPr>
+            <a:normAutofit/>
+          </a:bodyPr>
+          <a:lstStyle/>
+          <a:p>
+            <a:pPr marL="0" indent="0">
+              <a:buNone/>
+            </a:pPr>
+            <a:r>
+              <a:rPr lang="en-CA" dirty="0" err="1"/>
+              <a:t>Sytèmes</a:t>
+            </a:r>
+            <a:r>
+              <a:rPr lang="en-CA" dirty="0"/>
+              <a:t> </a:t>
+            </a:r>
+            <a:r>
+              <a:rPr lang="en-CA" dirty="0" err="1"/>
+              <a:t>implémentés</a:t>
+            </a:r>
+            <a:r>
+              <a:rPr lang="en-CA" dirty="0"/>
+              <a:t> dans le prototype:</a:t>
+            </a:r>
+          </a:p>
+          <a:p>
+            <a:r>
+              <a:rPr lang="en-CA" dirty="0" err="1"/>
+              <a:t>Chaîne</a:t>
+            </a:r>
+            <a:r>
+              <a:rPr lang="en-CA" dirty="0"/>
+              <a:t> RF</a:t>
+            </a:r>
+          </a:p>
+          <a:p>
+            <a:pPr lvl="1"/>
+            <a:r>
+              <a:rPr lang="en-CA" dirty="0" err="1"/>
+              <a:t>Filtres</a:t>
+            </a:r>
+            <a:r>
+              <a:rPr lang="en-CA" dirty="0"/>
+              <a:t>, </a:t>
+            </a:r>
+            <a:r>
+              <a:rPr lang="en-CA" dirty="0" err="1"/>
+              <a:t>amplificateurs,mélangeurs</a:t>
+            </a:r>
+            <a:r>
+              <a:rPr lang="en-CA" dirty="0"/>
+              <a:t>, PLL</a:t>
+            </a:r>
+          </a:p>
+          <a:p>
+            <a:pPr lvl="1"/>
+            <a:r>
+              <a:rPr lang="en-CA" dirty="0" err="1"/>
+              <a:t>Antenne</a:t>
+            </a:r>
+            <a:r>
+              <a:rPr lang="en-CA" dirty="0"/>
+              <a:t> (fixe et libre)</a:t>
+            </a:r>
+          </a:p>
+          <a:p>
+            <a:r>
+              <a:rPr lang="en-CA" dirty="0"/>
+              <a:t>Interface </a:t>
+            </a:r>
+            <a:r>
+              <a:rPr lang="en-CA" dirty="0" err="1"/>
+              <a:t>utilisateur</a:t>
+            </a:r>
+            <a:endParaRPr lang="en-CA" dirty="0"/>
+          </a:p>
+          <a:p>
+            <a:pPr lvl="1"/>
+            <a:endParaRPr lang="en-CA" dirty="0"/>
+          </a:p>
+        </p:txBody>
+      </p:sp>
+      <p:pic>
+        <p:nvPicPr>
+          <p:cNvPr id="2050" name="Picture 2" descr="Related image">
+            <a:extLst>
+              <a:ext uri="{FF2B5EF4-FFF2-40B4-BE49-F238E27FC236}">
+                <a16:creationId xmlns:a16="http://schemas.microsoft.com/office/drawing/2014/main" id="{1F614A51-9FFC-4A53-964A-5F32D9F1AE41}"/>
+              </a:ext>
+            </a:extLst>
+          </p:cNvPr>
+          <p:cNvPicPr>
+            <a:picLocks noChangeAspect="1" noChangeArrowheads="1"/>
+          </p:cNvPicPr>
+          <p:nvPr/>
+        </p:nvPicPr>
+        <p:blipFill>
+          <a:blip r:embed="rId2">
+            <a:extLst>
+              <a:ext uri="{28A0092B-C50C-407E-A947-70E740481C1C}">
+                <a14:useLocalDpi xmlns:a14="http://schemas.microsoft.com/office/drawing/2010/main" val="0"/>
+              </a:ext>
+            </a:extLst>
+          </a:blip>
+          <a:srcRect/>
+          <a:stretch>
+            <a:fillRect/>
+          </a:stretch>
+        </p:blipFill>
+        <p:spPr bwMode="auto">
+          <a:xfrm>
+            <a:off x="4958482" y="4701330"/>
+            <a:ext cx="1535185" cy="1535185"/>
+          </a:xfrm>
+          <a:prstGeom prst="rect">
+            <a:avLst/>
+          </a:prstGeom>
+          <a:noFill/>
+          <a:extLst>
+            <a:ext uri="{909E8E84-426E-40DD-AFC4-6F175D3DCCD1}">
+              <a14:hiddenFill xmlns:a14="http://schemas.microsoft.com/office/drawing/2010/main">
+                <a:solidFill>
+                  <a:srgbClr val="FFFFFF"/>
+                </a:solidFill>
+              </a14:hiddenFill>
+            </a:ext>
+          </a:extLst>
+        </p:spPr>
+      </p:pic>
+      <p:pic>
+        <p:nvPicPr>
+          <p:cNvPr id="2052" name="Picture 4" descr="Image result for transmitter icon">
+            <a:extLst>
+              <a:ext uri="{FF2B5EF4-FFF2-40B4-BE49-F238E27FC236}">
+                <a16:creationId xmlns:a16="http://schemas.microsoft.com/office/drawing/2014/main" id="{126167CE-16D6-4237-9F65-C237950B66C4}"/>
+              </a:ext>
+            </a:extLst>
+          </p:cNvPr>
+          <p:cNvPicPr>
+            <a:picLocks noChangeAspect="1" noChangeArrowheads="1"/>
+          </p:cNvPicPr>
+          <p:nvPr/>
+        </p:nvPicPr>
+        <p:blipFill>
+          <a:blip r:embed="rId3">
+            <a:extLst>
+              <a:ext uri="{28A0092B-C50C-407E-A947-70E740481C1C}">
+                <a14:useLocalDpi xmlns:a14="http://schemas.microsoft.com/office/drawing/2010/main" val="0"/>
+              </a:ext>
+            </a:extLst>
+          </a:blip>
+          <a:srcRect/>
+          <a:stretch>
+            <a:fillRect/>
+          </a:stretch>
+        </p:blipFill>
+        <p:spPr bwMode="auto">
+          <a:xfrm>
+            <a:off x="6623789" y="4848835"/>
+            <a:ext cx="1049323" cy="1049323"/>
+          </a:xfrm>
+          <a:prstGeom prst="rect">
+            <a:avLst/>
+          </a:prstGeom>
+          <a:noFill/>
+          <a:extLst>
+            <a:ext uri="{909E8E84-426E-40DD-AFC4-6F175D3DCCD1}">
+              <a14:hiddenFill xmlns:a14="http://schemas.microsoft.com/office/drawing/2010/main">
+                <a:solidFill>
+                  <a:srgbClr val="FFFFFF"/>
+                </a:solidFill>
+              </a14:hiddenFill>
+            </a:ext>
+          </a:extLst>
+        </p:spPr>
+      </p:pic>
+      <p:pic>
+        <p:nvPicPr>
+          <p:cNvPr id="7" name="Picture 6">
+            <a:extLst>
+              <a:ext uri="{FF2B5EF4-FFF2-40B4-BE49-F238E27FC236}">
+                <a16:creationId xmlns:a16="http://schemas.microsoft.com/office/drawing/2014/main" id="{FCD69E67-67C0-4207-8881-F93FB3721C13}"/>
+              </a:ext>
+            </a:extLst>
+          </p:cNvPr>
+          <p:cNvPicPr>
+            <a:picLocks noChangeAspect="1"/>
+          </p:cNvPicPr>
+          <p:nvPr/>
+        </p:nvPicPr>
+        <p:blipFill>
+          <a:blip r:embed="rId4">
+            <a:extLst>
+              <a:ext uri="{28A0092B-C50C-407E-A947-70E740481C1C}">
+                <a14:useLocalDpi xmlns:a14="http://schemas.microsoft.com/office/drawing/2010/main" val="0"/>
+              </a:ext>
+            </a:extLst>
+          </a:blip>
+          <a:stretch>
+            <a:fillRect/>
+          </a:stretch>
+        </p:blipFill>
+        <p:spPr>
+          <a:xfrm>
+            <a:off x="9767231" y="2600588"/>
+            <a:ext cx="1146037" cy="1146037"/>
+          </a:xfrm>
+          <a:prstGeom prst="rect">
+            <a:avLst/>
+          </a:prstGeom>
+        </p:spPr>
+      </p:pic>
+      <p:pic>
+        <p:nvPicPr>
+          <p:cNvPr id="8" name="Picture 4" descr="Image result for transmitter icon">
+            <a:extLst>
+              <a:ext uri="{FF2B5EF4-FFF2-40B4-BE49-F238E27FC236}">
+                <a16:creationId xmlns:a16="http://schemas.microsoft.com/office/drawing/2014/main" id="{4ECD129A-41FE-4292-8DC5-CA49D6236CB0}"/>
+              </a:ext>
+            </a:extLst>
+          </p:cNvPr>
+          <p:cNvPicPr>
+            <a:picLocks noChangeAspect="1" noChangeArrowheads="1"/>
+          </p:cNvPicPr>
+          <p:nvPr/>
+        </p:nvPicPr>
+        <p:blipFill>
+          <a:blip r:embed="rId3">
+            <a:extLst>
+              <a:ext uri="{28A0092B-C50C-407E-A947-70E740481C1C}">
+                <a14:useLocalDpi xmlns:a14="http://schemas.microsoft.com/office/drawing/2010/main" val="0"/>
+              </a:ext>
+            </a:extLst>
+          </a:blip>
+          <a:srcRect/>
+          <a:stretch>
+            <a:fillRect/>
+          </a:stretch>
+        </p:blipFill>
+        <p:spPr bwMode="auto">
+          <a:xfrm>
+            <a:off x="8761325" y="2520541"/>
+            <a:ext cx="1049323" cy="1049323"/>
+          </a:xfrm>
+          <a:prstGeom prst="rect">
+            <a:avLst/>
+          </a:prstGeom>
+          <a:noFill/>
+          <a:extLst>
+            <a:ext uri="{909E8E84-426E-40DD-AFC4-6F175D3DCCD1}">
+              <a14:hiddenFill xmlns:a14="http://schemas.microsoft.com/office/drawing/2010/main">
+                <a:solidFill>
+                  <a:srgbClr val="FFFFFF"/>
+                </a:solidFill>
+              </a14:hiddenFill>
+            </a:ext>
+          </a:extLst>
+        </p:spPr>
+      </p:pic>
+    </p:spTree>
+    <p:extLst>
+      <p:ext uri="{BB962C8B-B14F-4D97-AF65-F5344CB8AC3E}">
+        <p14:creationId xmlns:p14="http://schemas.microsoft.com/office/powerpoint/2010/main" val="3908016617"/>
+      </p:ext>
+    </p:extLst>
+  </p:cSld>
+  <p:clrMapOvr>
+    <a:masterClrMapping/>
+  </p:clrMapOvr>
+</p:sld>
+</file>
+
+<file path=ppt/slides/slide8.xml><?xml version="1.0" encoding="utf-8"?>
+<p:sld xmlns:a="http://schemas.openxmlformats.org/drawingml/2006/main" xmlns:r="http://schemas.openxmlformats.org/officeDocument/2006/relationships" xmlns:p="http://schemas.openxmlformats.org/presentationml/2006/main">
+  <p:cSld>
+    <p:spTree>
+      <p:nvGrpSpPr>
+        <p:cNvPr id="1" name=""/>
+        <p:cNvGrpSpPr/>
+        <p:nvPr/>
+      </p:nvGrpSpPr>
+      <p:grpSpPr>
+        <a:xfrm>
+          <a:off x="0" y="0"/>
+          <a:ext cx="0" cy="0"/>
+          <a:chOff x="0" y="0"/>
+          <a:chExt cx="0" cy="0"/>
+        </a:xfrm>
+      </p:grpSpPr>
+      <p:sp>
+        <p:nvSpPr>
+          <p:cNvPr id="2" name="Title 1">
+            <a:extLst>
+              <a:ext uri="{FF2B5EF4-FFF2-40B4-BE49-F238E27FC236}">
+                <a16:creationId xmlns:a16="http://schemas.microsoft.com/office/drawing/2014/main" id="{047326C3-7A2A-44FE-8485-1E7D1EB18A52}"/>
+              </a:ext>
+            </a:extLst>
+          </p:cNvPr>
+          <p:cNvSpPr>
+            <a:spLocks noGrp="1"/>
+          </p:cNvSpPr>
+          <p:nvPr>
+            <p:ph type="title"/>
+          </p:nvPr>
+        </p:nvSpPr>
+        <p:spPr/>
+        <p:txBody>
+          <a:bodyPr/>
+          <a:lstStyle/>
+          <a:p>
+            <a:r>
+              <a:rPr lang="en-CA" dirty="0"/>
+              <a:t>Prototype/prevue de concept de S6</a:t>
+            </a:r>
+          </a:p>
+        </p:txBody>
+      </p:sp>
+      <p:sp>
+        <p:nvSpPr>
+          <p:cNvPr id="3" name="Content Placeholder 2">
+            <a:extLst>
+              <a:ext uri="{FF2B5EF4-FFF2-40B4-BE49-F238E27FC236}">
+                <a16:creationId xmlns:a16="http://schemas.microsoft.com/office/drawing/2014/main" id="{D2F1472F-27BE-426C-A2BA-76BA5073940E}"/>
+              </a:ext>
+            </a:extLst>
+          </p:cNvPr>
+          <p:cNvSpPr>
+            <a:spLocks noGrp="1"/>
+          </p:cNvSpPr>
+          <p:nvPr>
+            <p:ph idx="1"/>
+          </p:nvPr>
+        </p:nvSpPr>
+        <p:spPr/>
+        <p:txBody>
+          <a:bodyPr/>
+          <a:lstStyle/>
+          <a:p>
+            <a:pPr marL="0" indent="0">
+              <a:buNone/>
+            </a:pPr>
+            <a:r>
+              <a:rPr lang="en-CA" dirty="0"/>
+              <a:t>Limitations du prototype</a:t>
+            </a:r>
+          </a:p>
+          <a:p>
+            <a:r>
+              <a:rPr lang="en-CA" dirty="0"/>
+              <a:t>Source </a:t>
+            </a:r>
+            <a:r>
+              <a:rPr lang="en-CA" dirty="0" err="1"/>
+              <a:t>d’alimentation</a:t>
+            </a:r>
+            <a:endParaRPr lang="en-CA" dirty="0"/>
+          </a:p>
+          <a:p>
+            <a:r>
+              <a:rPr lang="en-CA" dirty="0"/>
+              <a:t>Tests sur insects </a:t>
+            </a:r>
+            <a:r>
+              <a:rPr lang="en-CA" dirty="0" err="1"/>
+              <a:t>vivants</a:t>
+            </a:r>
+            <a:endParaRPr lang="en-CA" dirty="0"/>
+          </a:p>
+          <a:p>
+            <a:r>
+              <a:rPr lang="en-CA" dirty="0" err="1"/>
+              <a:t>Indicateurs</a:t>
+            </a:r>
+            <a:r>
+              <a:rPr lang="en-CA" dirty="0"/>
+              <a:t> </a:t>
+            </a:r>
+            <a:r>
+              <a:rPr lang="en-CA" dirty="0" err="1"/>
+              <a:t>chimiques</a:t>
+            </a:r>
+            <a:endParaRPr lang="en-CA" dirty="0"/>
+          </a:p>
+          <a:p>
+            <a:r>
+              <a:rPr lang="en-CA" dirty="0" err="1"/>
+              <a:t>Réseautage</a:t>
+            </a:r>
+            <a:r>
+              <a:rPr lang="en-CA" dirty="0"/>
+              <a:t> de </a:t>
+            </a:r>
+            <a:r>
+              <a:rPr lang="en-CA" dirty="0" err="1"/>
+              <a:t>ruche</a:t>
+            </a:r>
+            <a:r>
+              <a:rPr lang="en-CA" dirty="0"/>
+              <a:t> à </a:t>
+            </a:r>
+            <a:r>
+              <a:rPr lang="en-CA" dirty="0" err="1"/>
+              <a:t>ruche</a:t>
+            </a:r>
+            <a:endParaRPr lang="en-CA" dirty="0"/>
+          </a:p>
+          <a:p>
+            <a:r>
+              <a:rPr lang="en-CA" dirty="0"/>
+              <a:t>Interface </a:t>
+            </a:r>
+            <a:r>
+              <a:rPr lang="en-CA" dirty="0" err="1"/>
+              <a:t>avancée</a:t>
+            </a:r>
+            <a:r>
+              <a:rPr lang="en-CA" dirty="0"/>
+              <a:t> et gestion de </a:t>
+            </a:r>
+            <a:r>
+              <a:rPr lang="en-CA" dirty="0" err="1"/>
+              <a:t>ruches</a:t>
+            </a:r>
+            <a:r>
+              <a:rPr lang="en-CA" dirty="0"/>
+              <a:t> à </a:t>
+            </a:r>
+            <a:r>
+              <a:rPr lang="en-CA" dirty="0" err="1"/>
+              <a:t>grande</a:t>
+            </a:r>
+            <a:r>
+              <a:rPr lang="en-CA" dirty="0"/>
+              <a:t> </a:t>
+            </a:r>
+            <a:r>
+              <a:rPr lang="en-CA" dirty="0" err="1"/>
+              <a:t>échelle</a:t>
+            </a:r>
+            <a:endParaRPr lang="en-CA" dirty="0"/>
+          </a:p>
+        </p:txBody>
+      </p:sp>
+    </p:spTree>
+    <p:extLst>
+      <p:ext uri="{BB962C8B-B14F-4D97-AF65-F5344CB8AC3E}">
+        <p14:creationId xmlns:p14="http://schemas.microsoft.com/office/powerpoint/2010/main" val="967102364"/>
+      </p:ext>
+    </p:extLst>
+  </p:cSld>
+  <p:clrMapOvr>
+    <a:masterClrMapping/>
+  </p:clrMapOvr>
+</p:sld>
+</file>
+
+<file path=ppt/slides/slide9.xml><?xml version="1.0" encoding="utf-8"?>
+<p:sld xmlns:a="http://schemas.openxmlformats.org/drawingml/2006/main" xmlns:r="http://schemas.openxmlformats.org/officeDocument/2006/relationships" xmlns:p="http://schemas.openxmlformats.org/presentationml/2006/main">
+  <p:cSld>
+    <p:spTree>
+      <p:nvGrpSpPr>
+        <p:cNvPr id="1" name=""/>
+        <p:cNvGrpSpPr/>
+        <p:nvPr/>
+      </p:nvGrpSpPr>
+      <p:grpSpPr>
+        <a:xfrm>
+          <a:off x="0" y="0"/>
+          <a:ext cx="0" cy="0"/>
+          <a:chOff x="0" y="0"/>
+          <a:chExt cx="0" cy="0"/>
+        </a:xfrm>
+      </p:grpSpPr>
+      <p:sp>
+        <p:nvSpPr>
+          <p:cNvPr id="2" name="Title 1">
+            <a:extLst>
+              <a:ext uri="{FF2B5EF4-FFF2-40B4-BE49-F238E27FC236}">
                 <a16:creationId xmlns:a16="http://schemas.microsoft.com/office/drawing/2014/main" id="{4E803E53-33F4-4918-9D2A-3756F2D666B5}"/>
               </a:ext>
             </a:extLst>
@@ -6926,7 +7981,7 @@
           <a:bodyPr/>
           <a:lstStyle/>
           <a:p>
-            <a:endParaRPr lang="en-CA"/>
+            <a:endParaRPr lang="en-CA" dirty="0"/>
           </a:p>
         </p:txBody>
       </p:sp>

</xml_diff>

<commit_message>
PT-25 Ajout de la section Architecture Globale
</commit_message>
<xml_diff>
--- a/Dossier de Conception.pptx
+++ b/Dossier de Conception.pptx
@@ -8,12 +8,16 @@
     <p:sldId id="256" r:id="rId2"/>
     <p:sldId id="257" r:id="rId3"/>
     <p:sldId id="258" r:id="rId4"/>
-    <p:sldId id="259" r:id="rId5"/>
-    <p:sldId id="260" r:id="rId6"/>
-    <p:sldId id="263" r:id="rId7"/>
-    <p:sldId id="261" r:id="rId8"/>
-    <p:sldId id="264" r:id="rId9"/>
-    <p:sldId id="262" r:id="rId10"/>
+    <p:sldId id="265" r:id="rId5"/>
+    <p:sldId id="266" r:id="rId6"/>
+    <p:sldId id="267" r:id="rId7"/>
+    <p:sldId id="268" r:id="rId8"/>
+    <p:sldId id="269" r:id="rId9"/>
+    <p:sldId id="260" r:id="rId10"/>
+    <p:sldId id="263" r:id="rId11"/>
+    <p:sldId id="261" r:id="rId12"/>
+    <p:sldId id="264" r:id="rId13"/>
+    <p:sldId id="262" r:id="rId14"/>
   </p:sldIdLst>
   <p:sldSz cx="12192000" cy="6858000"/>
   <p:notesSz cx="6858000" cy="9144000"/>
@@ -622,7 +626,7 @@
           <a:p>
             <a:fld id="{F81637C0-94AD-483C-A163-E4595C514589}" type="datetimeFigureOut">
               <a:rPr lang="en-CA" smtClean="0"/>
-              <a:t>19/09/2018</a:t>
+              <a:t>2018-09-19</a:t>
             </a:fld>
             <a:endParaRPr lang="en-CA"/>
           </a:p>
@@ -923,7 +927,7 @@
           <a:p>
             <a:fld id="{F81637C0-94AD-483C-A163-E4595C514589}" type="datetimeFigureOut">
               <a:rPr lang="en-CA" smtClean="0"/>
-              <a:t>19/09/2018</a:t>
+              <a:t>2018-09-19</a:t>
             </a:fld>
             <a:endParaRPr lang="en-CA"/>
           </a:p>
@@ -1171,7 +1175,7 @@
           <a:p>
             <a:fld id="{F81637C0-94AD-483C-A163-E4595C514589}" type="datetimeFigureOut">
               <a:rPr lang="en-CA" smtClean="0"/>
-              <a:t>19/09/2018</a:t>
+              <a:t>2018-09-19</a:t>
             </a:fld>
             <a:endParaRPr lang="en-CA"/>
           </a:p>
@@ -1711,7 +1715,7 @@
           <a:p>
             <a:fld id="{F81637C0-94AD-483C-A163-E4595C514589}" type="datetimeFigureOut">
               <a:rPr lang="en-CA" smtClean="0"/>
-              <a:t>19/09/2018</a:t>
+              <a:t>2018-09-19</a:t>
             </a:fld>
             <a:endParaRPr lang="en-CA"/>
           </a:p>
@@ -1959,7 +1963,7 @@
           <a:p>
             <a:fld id="{F81637C0-94AD-483C-A163-E4595C514589}" type="datetimeFigureOut">
               <a:rPr lang="en-CA" smtClean="0"/>
-              <a:t>19/09/2018</a:t>
+              <a:t>2018-09-19</a:t>
             </a:fld>
             <a:endParaRPr lang="en-CA"/>
           </a:p>
@@ -2491,7 +2495,7 @@
           <a:p>
             <a:fld id="{F81637C0-94AD-483C-A163-E4595C514589}" type="datetimeFigureOut">
               <a:rPr lang="en-CA" smtClean="0"/>
-              <a:t>19/09/2018</a:t>
+              <a:t>2018-09-19</a:t>
             </a:fld>
             <a:endParaRPr lang="en-CA"/>
           </a:p>
@@ -2788,7 +2792,7 @@
           <a:p>
             <a:fld id="{F81637C0-94AD-483C-A163-E4595C514589}" type="datetimeFigureOut">
               <a:rPr lang="en-CA" smtClean="0"/>
-              <a:t>19/09/2018</a:t>
+              <a:t>2018-09-19</a:t>
             </a:fld>
             <a:endParaRPr lang="en-CA"/>
           </a:p>
@@ -2962,7 +2966,7 @@
           <a:p>
             <a:fld id="{F81637C0-94AD-483C-A163-E4595C514589}" type="datetimeFigureOut">
               <a:rPr lang="en-CA" smtClean="0"/>
-              <a:t>19/09/2018</a:t>
+              <a:t>2018-09-19</a:t>
             </a:fld>
             <a:endParaRPr lang="en-CA"/>
           </a:p>
@@ -3142,7 +3146,7 @@
           <a:p>
             <a:fld id="{F81637C0-94AD-483C-A163-E4595C514589}" type="datetimeFigureOut">
               <a:rPr lang="en-CA" smtClean="0"/>
-              <a:t>19/09/2018</a:t>
+              <a:t>2018-09-19</a:t>
             </a:fld>
             <a:endParaRPr lang="en-CA"/>
           </a:p>
@@ -3358,7 +3362,7 @@
           <a:p>
             <a:fld id="{F81637C0-94AD-483C-A163-E4595C514589}" type="datetimeFigureOut">
               <a:rPr lang="en-CA" smtClean="0"/>
-              <a:t>19/09/2018</a:t>
+              <a:t>2018-09-19</a:t>
             </a:fld>
             <a:endParaRPr lang="en-CA"/>
           </a:p>
@@ -3609,7 +3613,7 @@
           <a:p>
             <a:fld id="{F81637C0-94AD-483C-A163-E4595C514589}" type="datetimeFigureOut">
               <a:rPr lang="en-CA" smtClean="0"/>
-              <a:t>19/09/2018</a:t>
+              <a:t>2018-09-19</a:t>
             </a:fld>
             <a:endParaRPr lang="en-CA"/>
           </a:p>
@@ -3961,7 +3965,7 @@
           <a:p>
             <a:fld id="{F81637C0-94AD-483C-A163-E4595C514589}" type="datetimeFigureOut">
               <a:rPr lang="en-CA" smtClean="0"/>
-              <a:t>19/09/2018</a:t>
+              <a:t>2018-09-19</a:t>
             </a:fld>
             <a:endParaRPr lang="en-CA"/>
           </a:p>
@@ -4453,7 +4457,7 @@
           <a:p>
             <a:fld id="{F81637C0-94AD-483C-A163-E4595C514589}" type="datetimeFigureOut">
               <a:rPr lang="en-CA" smtClean="0"/>
-              <a:t>19/09/2018</a:t>
+              <a:t>2018-09-19</a:t>
             </a:fld>
             <a:endParaRPr lang="en-CA"/>
           </a:p>
@@ -4571,7 +4575,7 @@
           <a:p>
             <a:fld id="{F81637C0-94AD-483C-A163-E4595C514589}" type="datetimeFigureOut">
               <a:rPr lang="en-CA" smtClean="0"/>
-              <a:t>19/09/2018</a:t>
+              <a:t>2018-09-19</a:t>
             </a:fld>
             <a:endParaRPr lang="en-CA"/>
           </a:p>
@@ -4666,7 +4670,7 @@
           <a:p>
             <a:fld id="{F81637C0-94AD-483C-A163-E4595C514589}" type="datetimeFigureOut">
               <a:rPr lang="en-CA" smtClean="0"/>
-              <a:t>19/09/2018</a:t>
+              <a:t>2018-09-19</a:t>
             </a:fld>
             <a:endParaRPr lang="en-CA"/>
           </a:p>
@@ -4949,7 +4953,7 @@
           <a:p>
             <a:fld id="{F81637C0-94AD-483C-A163-E4595C514589}" type="datetimeFigureOut">
               <a:rPr lang="en-CA" smtClean="0"/>
-              <a:t>19/09/2018</a:t>
+              <a:t>2018-09-19</a:t>
             </a:fld>
             <a:endParaRPr lang="en-CA"/>
           </a:p>
@@ -5240,7 +5244,7 @@
           <a:p>
             <a:fld id="{F81637C0-94AD-483C-A163-E4595C514589}" type="datetimeFigureOut">
               <a:rPr lang="en-CA" smtClean="0"/>
-              <a:t>19/09/2018</a:t>
+              <a:t>2018-09-19</a:t>
             </a:fld>
             <a:endParaRPr lang="en-CA"/>
           </a:p>
@@ -5770,7 +5774,7 @@
           <a:p>
             <a:fld id="{F81637C0-94AD-483C-A163-E4595C514589}" type="datetimeFigureOut">
               <a:rPr lang="en-CA" smtClean="0"/>
-              <a:t>19/09/2018</a:t>
+              <a:t>2018-09-19</a:t>
             </a:fld>
             <a:endParaRPr lang="en-CA"/>
           </a:p>
@@ -6392,390 +6396,7 @@
 </p:sld>
 </file>
 
-<file path=ppt/slides/slide2.xml><?xml version="1.0" encoding="utf-8"?>
-<p:sld xmlns:a="http://schemas.openxmlformats.org/drawingml/2006/main" xmlns:r="http://schemas.openxmlformats.org/officeDocument/2006/relationships" xmlns:p="http://schemas.openxmlformats.org/presentationml/2006/main">
-  <p:cSld>
-    <p:spTree>
-      <p:nvGrpSpPr>
-        <p:cNvPr id="1" name=""/>
-        <p:cNvGrpSpPr/>
-        <p:nvPr/>
-      </p:nvGrpSpPr>
-      <p:grpSpPr>
-        <a:xfrm>
-          <a:off x="0" y="0"/>
-          <a:ext cx="0" cy="0"/>
-          <a:chOff x="0" y="0"/>
-          <a:chExt cx="0" cy="0"/>
-        </a:xfrm>
-      </p:grpSpPr>
-      <p:sp>
-        <p:nvSpPr>
-          <p:cNvPr id="2" name="Title 1">
-            <a:extLst>
-              <a:ext uri="{FF2B5EF4-FFF2-40B4-BE49-F238E27FC236}">
-                <a16:creationId xmlns:a16="http://schemas.microsoft.com/office/drawing/2014/main" id="{95A4B020-4078-42AE-9D8B-DD88078B584A}"/>
-              </a:ext>
-            </a:extLst>
-          </p:cNvPr>
-          <p:cNvSpPr>
-            <a:spLocks noGrp="1"/>
-          </p:cNvSpPr>
-          <p:nvPr>
-            <p:ph type="title"/>
-          </p:nvPr>
-        </p:nvSpPr>
-        <p:spPr/>
-        <p:txBody>
-          <a:bodyPr/>
-          <a:lstStyle/>
-          <a:p>
-            <a:r>
-              <a:rPr lang="en-CA" dirty="0"/>
-              <a:t>Justification du </a:t>
-            </a:r>
-            <a:r>
-              <a:rPr lang="en-CA" dirty="0" err="1"/>
-              <a:t>besoin</a:t>
-            </a:r>
-            <a:r>
-              <a:rPr lang="en-CA" dirty="0"/>
-              <a:t>, </a:t>
-            </a:r>
-            <a:r>
-              <a:rPr lang="en-CA" dirty="0" err="1"/>
-              <a:t>contexte</a:t>
-            </a:r>
-            <a:r>
-              <a:rPr lang="en-CA" dirty="0"/>
-              <a:t> du </a:t>
-            </a:r>
-            <a:r>
-              <a:rPr lang="en-CA" dirty="0" err="1"/>
-              <a:t>projet</a:t>
-            </a:r>
-            <a:r>
-              <a:rPr lang="en-CA" dirty="0"/>
-              <a:t> et du </a:t>
-            </a:r>
-            <a:r>
-              <a:rPr lang="en-CA" dirty="0" err="1"/>
-              <a:t>marché</a:t>
-            </a:r>
-            <a:endParaRPr lang="en-CA" dirty="0"/>
-          </a:p>
-        </p:txBody>
-      </p:sp>
-      <p:sp>
-        <p:nvSpPr>
-          <p:cNvPr id="3" name="Content Placeholder 2">
-            <a:extLst>
-              <a:ext uri="{FF2B5EF4-FFF2-40B4-BE49-F238E27FC236}">
-                <a16:creationId xmlns:a16="http://schemas.microsoft.com/office/drawing/2014/main" id="{163954D6-EF9A-4BE0-8664-F71C1CE7E468}"/>
-              </a:ext>
-            </a:extLst>
-          </p:cNvPr>
-          <p:cNvSpPr>
-            <a:spLocks noGrp="1"/>
-          </p:cNvSpPr>
-          <p:nvPr>
-            <p:ph idx="1"/>
-          </p:nvPr>
-        </p:nvSpPr>
-        <p:spPr/>
-        <p:txBody>
-          <a:bodyPr/>
-          <a:lstStyle/>
-          <a:p>
-            <a:endParaRPr lang="en-CA"/>
-          </a:p>
-        </p:txBody>
-      </p:sp>
-    </p:spTree>
-    <p:extLst>
-      <p:ext uri="{BB962C8B-B14F-4D97-AF65-F5344CB8AC3E}">
-        <p14:creationId xmlns:p14="http://schemas.microsoft.com/office/powerpoint/2010/main" val="3338256800"/>
-      </p:ext>
-    </p:extLst>
-  </p:cSld>
-  <p:clrMapOvr>
-    <a:masterClrMapping/>
-  </p:clrMapOvr>
-</p:sld>
-</file>
-
-<file path=ppt/slides/slide3.xml><?xml version="1.0" encoding="utf-8"?>
-<p:sld xmlns:a="http://schemas.openxmlformats.org/drawingml/2006/main" xmlns:r="http://schemas.openxmlformats.org/officeDocument/2006/relationships" xmlns:p="http://schemas.openxmlformats.org/presentationml/2006/main">
-  <p:cSld>
-    <p:spTree>
-      <p:nvGrpSpPr>
-        <p:cNvPr id="1" name=""/>
-        <p:cNvGrpSpPr/>
-        <p:nvPr/>
-      </p:nvGrpSpPr>
-      <p:grpSpPr>
-        <a:xfrm>
-          <a:off x="0" y="0"/>
-          <a:ext cx="0" cy="0"/>
-          <a:chOff x="0" y="0"/>
-          <a:chExt cx="0" cy="0"/>
-        </a:xfrm>
-      </p:grpSpPr>
-      <p:sp>
-        <p:nvSpPr>
-          <p:cNvPr id="2" name="Title 1">
-            <a:extLst>
-              <a:ext uri="{FF2B5EF4-FFF2-40B4-BE49-F238E27FC236}">
-                <a16:creationId xmlns:a16="http://schemas.microsoft.com/office/drawing/2014/main" id="{A10EAD33-323D-42BD-8C20-8BB8D0E4C2A0}"/>
-              </a:ext>
-            </a:extLst>
-          </p:cNvPr>
-          <p:cNvSpPr>
-            <a:spLocks noGrp="1"/>
-          </p:cNvSpPr>
-          <p:nvPr>
-            <p:ph type="title"/>
-          </p:nvPr>
-        </p:nvSpPr>
-        <p:spPr/>
-        <p:txBody>
-          <a:bodyPr/>
-          <a:lstStyle/>
-          <a:p>
-            <a:r>
-              <a:rPr lang="en-CA" dirty="0"/>
-              <a:t>Cahier de charges </a:t>
-            </a:r>
-            <a:r>
-              <a:rPr lang="en-CA" dirty="0" err="1"/>
-              <a:t>fonctionnelles</a:t>
-            </a:r>
-            <a:endParaRPr lang="en-CA" dirty="0"/>
-          </a:p>
-        </p:txBody>
-      </p:sp>
-      <p:sp>
-        <p:nvSpPr>
-          <p:cNvPr id="3" name="Content Placeholder 2">
-            <a:extLst>
-              <a:ext uri="{FF2B5EF4-FFF2-40B4-BE49-F238E27FC236}">
-                <a16:creationId xmlns:a16="http://schemas.microsoft.com/office/drawing/2014/main" id="{9741DD70-9E04-47B7-AEAC-7EF6A01F0568}"/>
-              </a:ext>
-            </a:extLst>
-          </p:cNvPr>
-          <p:cNvSpPr>
-            <a:spLocks noGrp="1"/>
-          </p:cNvSpPr>
-          <p:nvPr>
-            <p:ph idx="1"/>
-          </p:nvPr>
-        </p:nvSpPr>
-        <p:spPr/>
-        <p:txBody>
-          <a:bodyPr/>
-          <a:lstStyle/>
-          <a:p>
-            <a:endParaRPr lang="en-CA"/>
-          </a:p>
-        </p:txBody>
-      </p:sp>
-    </p:spTree>
-    <p:extLst>
-      <p:ext uri="{BB962C8B-B14F-4D97-AF65-F5344CB8AC3E}">
-        <p14:creationId xmlns:p14="http://schemas.microsoft.com/office/powerpoint/2010/main" val="3365343362"/>
-      </p:ext>
-    </p:extLst>
-  </p:cSld>
-  <p:clrMapOvr>
-    <a:masterClrMapping/>
-  </p:clrMapOvr>
-</p:sld>
-</file>
-
-<file path=ppt/slides/slide4.xml><?xml version="1.0" encoding="utf-8"?>
-<p:sld xmlns:a="http://schemas.openxmlformats.org/drawingml/2006/main" xmlns:r="http://schemas.openxmlformats.org/officeDocument/2006/relationships" xmlns:p="http://schemas.openxmlformats.org/presentationml/2006/main">
-  <p:cSld>
-    <p:spTree>
-      <p:nvGrpSpPr>
-        <p:cNvPr id="1" name=""/>
-        <p:cNvGrpSpPr/>
-        <p:nvPr/>
-      </p:nvGrpSpPr>
-      <p:grpSpPr>
-        <a:xfrm>
-          <a:off x="0" y="0"/>
-          <a:ext cx="0" cy="0"/>
-          <a:chOff x="0" y="0"/>
-          <a:chExt cx="0" cy="0"/>
-        </a:xfrm>
-      </p:grpSpPr>
-      <p:sp>
-        <p:nvSpPr>
-          <p:cNvPr id="2" name="Title 1">
-            <a:extLst>
-              <a:ext uri="{FF2B5EF4-FFF2-40B4-BE49-F238E27FC236}">
-                <a16:creationId xmlns:a16="http://schemas.microsoft.com/office/drawing/2014/main" id="{57AE6C2F-E93C-4A13-BFBF-2291D335938B}"/>
-              </a:ext>
-            </a:extLst>
-          </p:cNvPr>
-          <p:cNvSpPr>
-            <a:spLocks noGrp="1"/>
-          </p:cNvSpPr>
-          <p:nvPr>
-            <p:ph type="title"/>
-          </p:nvPr>
-        </p:nvSpPr>
-        <p:spPr/>
-        <p:txBody>
-          <a:bodyPr/>
-          <a:lstStyle/>
-          <a:p>
-            <a:r>
-              <a:rPr lang="en-CA" dirty="0"/>
-              <a:t>Architecture </a:t>
-            </a:r>
-            <a:r>
-              <a:rPr lang="en-CA" dirty="0" err="1"/>
-              <a:t>globale</a:t>
-            </a:r>
-            <a:endParaRPr lang="en-CA" dirty="0"/>
-          </a:p>
-        </p:txBody>
-      </p:sp>
-      <p:sp>
-        <p:nvSpPr>
-          <p:cNvPr id="3" name="Content Placeholder 2">
-            <a:extLst>
-              <a:ext uri="{FF2B5EF4-FFF2-40B4-BE49-F238E27FC236}">
-                <a16:creationId xmlns:a16="http://schemas.microsoft.com/office/drawing/2014/main" id="{6CA5ECC3-FA59-4861-92B0-635B00BF048A}"/>
-              </a:ext>
-            </a:extLst>
-          </p:cNvPr>
-          <p:cNvSpPr>
-            <a:spLocks noGrp="1"/>
-          </p:cNvSpPr>
-          <p:nvPr>
-            <p:ph idx="1"/>
-          </p:nvPr>
-        </p:nvSpPr>
-        <p:spPr/>
-        <p:txBody>
-          <a:bodyPr/>
-          <a:lstStyle/>
-          <a:p>
-            <a:endParaRPr lang="en-CA"/>
-          </a:p>
-        </p:txBody>
-      </p:sp>
-    </p:spTree>
-    <p:extLst>
-      <p:ext uri="{BB962C8B-B14F-4D97-AF65-F5344CB8AC3E}">
-        <p14:creationId xmlns:p14="http://schemas.microsoft.com/office/powerpoint/2010/main" val="2779209610"/>
-      </p:ext>
-    </p:extLst>
-  </p:cSld>
-  <p:clrMapOvr>
-    <a:masterClrMapping/>
-  </p:clrMapOvr>
-</p:sld>
-</file>
-
-<file path=ppt/slides/slide5.xml><?xml version="1.0" encoding="utf-8"?>
-<p:sld xmlns:a="http://schemas.openxmlformats.org/drawingml/2006/main" xmlns:r="http://schemas.openxmlformats.org/officeDocument/2006/relationships" xmlns:p="http://schemas.openxmlformats.org/presentationml/2006/main">
-  <p:cSld>
-    <p:spTree>
-      <p:nvGrpSpPr>
-        <p:cNvPr id="1" name=""/>
-        <p:cNvGrpSpPr/>
-        <p:nvPr/>
-      </p:nvGrpSpPr>
-      <p:grpSpPr>
-        <a:xfrm>
-          <a:off x="0" y="0"/>
-          <a:ext cx="0" cy="0"/>
-          <a:chOff x="0" y="0"/>
-          <a:chExt cx="0" cy="0"/>
-        </a:xfrm>
-      </p:grpSpPr>
-      <p:sp>
-        <p:nvSpPr>
-          <p:cNvPr id="2" name="Title 1">
-            <a:extLst>
-              <a:ext uri="{FF2B5EF4-FFF2-40B4-BE49-F238E27FC236}">
-                <a16:creationId xmlns:a16="http://schemas.microsoft.com/office/drawing/2014/main" id="{9381268A-48C6-4A90-B60F-BAEE9120674D}"/>
-              </a:ext>
-            </a:extLst>
-          </p:cNvPr>
-          <p:cNvSpPr>
-            <a:spLocks noGrp="1"/>
-          </p:cNvSpPr>
-          <p:nvPr>
-            <p:ph type="title"/>
-          </p:nvPr>
-        </p:nvSpPr>
-        <p:spPr/>
-        <p:txBody>
-          <a:bodyPr/>
-          <a:lstStyle/>
-          <a:p>
-            <a:r>
-              <a:rPr lang="en-CA" dirty="0" err="1"/>
-              <a:t>Requis</a:t>
-            </a:r>
-            <a:r>
-              <a:rPr lang="en-CA" dirty="0"/>
-              <a:t> au </a:t>
-            </a:r>
-            <a:r>
-              <a:rPr lang="en-CA" dirty="0" err="1"/>
-              <a:t>niveau</a:t>
-            </a:r>
-            <a:r>
-              <a:rPr lang="en-CA" dirty="0"/>
-              <a:t> RF</a:t>
-            </a:r>
-          </a:p>
-        </p:txBody>
-      </p:sp>
-      <p:sp>
-        <p:nvSpPr>
-          <p:cNvPr id="3" name="Content Placeholder 2">
-            <a:extLst>
-              <a:ext uri="{FF2B5EF4-FFF2-40B4-BE49-F238E27FC236}">
-                <a16:creationId xmlns:a16="http://schemas.microsoft.com/office/drawing/2014/main" id="{17427B92-1811-464E-801C-5EE29A5B8D36}"/>
-              </a:ext>
-            </a:extLst>
-          </p:cNvPr>
-          <p:cNvSpPr>
-            <a:spLocks noGrp="1"/>
-          </p:cNvSpPr>
-          <p:nvPr>
-            <p:ph idx="1"/>
-          </p:nvPr>
-        </p:nvSpPr>
-        <p:spPr/>
-        <p:txBody>
-          <a:bodyPr/>
-          <a:lstStyle/>
-          <a:p>
-            <a:endParaRPr lang="en-CA"/>
-          </a:p>
-        </p:txBody>
-      </p:sp>
-    </p:spTree>
-    <p:extLst>
-      <p:ext uri="{BB962C8B-B14F-4D97-AF65-F5344CB8AC3E}">
-        <p14:creationId xmlns:p14="http://schemas.microsoft.com/office/powerpoint/2010/main" val="464286854"/>
-      </p:ext>
-    </p:extLst>
-  </p:cSld>
-  <p:clrMapOvr>
-    <a:masterClrMapping/>
-  </p:clrMapOvr>
-</p:sld>
-</file>
-
-<file path=ppt/slides/slide6.xml><?xml version="1.0" encoding="utf-8"?>
+<file path=ppt/slides/slide10.xml><?xml version="1.0" encoding="utf-8"?>
 <p:sld xmlns:a="http://schemas.openxmlformats.org/drawingml/2006/main" xmlns:r="http://schemas.openxmlformats.org/officeDocument/2006/relationships" xmlns:p="http://schemas.openxmlformats.org/presentationml/2006/main">
   <p:cSld>
     <p:spTree>
@@ -7382,7 +7003,7 @@
 </p:sld>
 </file>
 
-<file path=ppt/slides/slide7.xml><?xml version="1.0" encoding="utf-8"?>
+<file path=ppt/slides/slide11.xml><?xml version="1.0" encoding="utf-8"?>
 <p:sld xmlns:a="http://schemas.openxmlformats.org/drawingml/2006/main" xmlns:r="http://schemas.openxmlformats.org/officeDocument/2006/relationships" xmlns:p="http://schemas.openxmlformats.org/presentationml/2006/main">
   <p:cSld>
     <p:spTree>
@@ -7722,6 +7343,1347 @@
 </p:sld>
 </file>
 
+<file path=ppt/slides/slide12.xml><?xml version="1.0" encoding="utf-8"?>
+<p:sld xmlns:a="http://schemas.openxmlformats.org/drawingml/2006/main" xmlns:r="http://schemas.openxmlformats.org/officeDocument/2006/relationships" xmlns:p="http://schemas.openxmlformats.org/presentationml/2006/main">
+  <p:cSld>
+    <p:spTree>
+      <p:nvGrpSpPr>
+        <p:cNvPr id="1" name=""/>
+        <p:cNvGrpSpPr/>
+        <p:nvPr/>
+      </p:nvGrpSpPr>
+      <p:grpSpPr>
+        <a:xfrm>
+          <a:off x="0" y="0"/>
+          <a:ext cx="0" cy="0"/>
+          <a:chOff x="0" y="0"/>
+          <a:chExt cx="0" cy="0"/>
+        </a:xfrm>
+      </p:grpSpPr>
+      <p:sp>
+        <p:nvSpPr>
+          <p:cNvPr id="2" name="Title 1">
+            <a:extLst>
+              <a:ext uri="{FF2B5EF4-FFF2-40B4-BE49-F238E27FC236}">
+                <a16:creationId xmlns:a16="http://schemas.microsoft.com/office/drawing/2014/main" id="{047326C3-7A2A-44FE-8485-1E7D1EB18A52}"/>
+              </a:ext>
+            </a:extLst>
+          </p:cNvPr>
+          <p:cNvSpPr>
+            <a:spLocks noGrp="1"/>
+          </p:cNvSpPr>
+          <p:nvPr>
+            <p:ph type="title"/>
+          </p:nvPr>
+        </p:nvSpPr>
+        <p:spPr/>
+        <p:txBody>
+          <a:bodyPr/>
+          <a:lstStyle/>
+          <a:p>
+            <a:r>
+              <a:rPr lang="en-CA" dirty="0"/>
+              <a:t>Prototype/prevue de concept de S6</a:t>
+            </a:r>
+          </a:p>
+        </p:txBody>
+      </p:sp>
+      <p:sp>
+        <p:nvSpPr>
+          <p:cNvPr id="3" name="Content Placeholder 2">
+            <a:extLst>
+              <a:ext uri="{FF2B5EF4-FFF2-40B4-BE49-F238E27FC236}">
+                <a16:creationId xmlns:a16="http://schemas.microsoft.com/office/drawing/2014/main" id="{D2F1472F-27BE-426C-A2BA-76BA5073940E}"/>
+              </a:ext>
+            </a:extLst>
+          </p:cNvPr>
+          <p:cNvSpPr>
+            <a:spLocks noGrp="1"/>
+          </p:cNvSpPr>
+          <p:nvPr>
+            <p:ph idx="1"/>
+          </p:nvPr>
+        </p:nvSpPr>
+        <p:spPr/>
+        <p:txBody>
+          <a:bodyPr/>
+          <a:lstStyle/>
+          <a:p>
+            <a:pPr marL="0" indent="0">
+              <a:buNone/>
+            </a:pPr>
+            <a:r>
+              <a:rPr lang="en-CA" dirty="0"/>
+              <a:t>Limitations du prototype</a:t>
+            </a:r>
+          </a:p>
+          <a:p>
+            <a:r>
+              <a:rPr lang="en-CA" dirty="0"/>
+              <a:t>Source </a:t>
+            </a:r>
+            <a:r>
+              <a:rPr lang="en-CA" dirty="0" err="1"/>
+              <a:t>d’alimentation</a:t>
+            </a:r>
+            <a:endParaRPr lang="en-CA" dirty="0"/>
+          </a:p>
+          <a:p>
+            <a:r>
+              <a:rPr lang="en-CA" dirty="0"/>
+              <a:t>Tests sur insects </a:t>
+            </a:r>
+            <a:r>
+              <a:rPr lang="en-CA" dirty="0" err="1"/>
+              <a:t>vivants</a:t>
+            </a:r>
+            <a:endParaRPr lang="en-CA" dirty="0"/>
+          </a:p>
+          <a:p>
+            <a:r>
+              <a:rPr lang="en-CA" dirty="0" err="1"/>
+              <a:t>Indicateurs</a:t>
+            </a:r>
+            <a:r>
+              <a:rPr lang="en-CA" dirty="0"/>
+              <a:t> </a:t>
+            </a:r>
+            <a:r>
+              <a:rPr lang="en-CA" dirty="0" err="1"/>
+              <a:t>chimiques</a:t>
+            </a:r>
+            <a:endParaRPr lang="en-CA" dirty="0"/>
+          </a:p>
+          <a:p>
+            <a:r>
+              <a:rPr lang="en-CA" dirty="0" err="1"/>
+              <a:t>Réseautage</a:t>
+            </a:r>
+            <a:r>
+              <a:rPr lang="en-CA" dirty="0"/>
+              <a:t> de </a:t>
+            </a:r>
+            <a:r>
+              <a:rPr lang="en-CA" dirty="0" err="1"/>
+              <a:t>ruche</a:t>
+            </a:r>
+            <a:r>
+              <a:rPr lang="en-CA" dirty="0"/>
+              <a:t> à </a:t>
+            </a:r>
+            <a:r>
+              <a:rPr lang="en-CA" dirty="0" err="1"/>
+              <a:t>ruche</a:t>
+            </a:r>
+            <a:endParaRPr lang="en-CA" dirty="0"/>
+          </a:p>
+          <a:p>
+            <a:r>
+              <a:rPr lang="en-CA" dirty="0"/>
+              <a:t>Interface </a:t>
+            </a:r>
+            <a:r>
+              <a:rPr lang="en-CA" dirty="0" err="1"/>
+              <a:t>avancée</a:t>
+            </a:r>
+            <a:r>
+              <a:rPr lang="en-CA" dirty="0"/>
+              <a:t> et gestion de </a:t>
+            </a:r>
+            <a:r>
+              <a:rPr lang="en-CA" dirty="0" err="1"/>
+              <a:t>ruches</a:t>
+            </a:r>
+            <a:r>
+              <a:rPr lang="en-CA" dirty="0"/>
+              <a:t> à </a:t>
+            </a:r>
+            <a:r>
+              <a:rPr lang="en-CA" dirty="0" err="1"/>
+              <a:t>grande</a:t>
+            </a:r>
+            <a:r>
+              <a:rPr lang="en-CA" dirty="0"/>
+              <a:t> </a:t>
+            </a:r>
+            <a:r>
+              <a:rPr lang="en-CA" dirty="0" err="1"/>
+              <a:t>échelle</a:t>
+            </a:r>
+            <a:endParaRPr lang="en-CA" dirty="0"/>
+          </a:p>
+        </p:txBody>
+      </p:sp>
+    </p:spTree>
+    <p:extLst>
+      <p:ext uri="{BB962C8B-B14F-4D97-AF65-F5344CB8AC3E}">
+        <p14:creationId xmlns:p14="http://schemas.microsoft.com/office/powerpoint/2010/main" val="967102364"/>
+      </p:ext>
+    </p:extLst>
+  </p:cSld>
+  <p:clrMapOvr>
+    <a:masterClrMapping/>
+  </p:clrMapOvr>
+</p:sld>
+</file>
+
+<file path=ppt/slides/slide13.xml><?xml version="1.0" encoding="utf-8"?>
+<p:sld xmlns:a="http://schemas.openxmlformats.org/drawingml/2006/main" xmlns:r="http://schemas.openxmlformats.org/officeDocument/2006/relationships" xmlns:p="http://schemas.openxmlformats.org/presentationml/2006/main">
+  <p:cSld>
+    <p:spTree>
+      <p:nvGrpSpPr>
+        <p:cNvPr id="1" name=""/>
+        <p:cNvGrpSpPr/>
+        <p:nvPr/>
+      </p:nvGrpSpPr>
+      <p:grpSpPr>
+        <a:xfrm>
+          <a:off x="0" y="0"/>
+          <a:ext cx="0" cy="0"/>
+          <a:chOff x="0" y="0"/>
+          <a:chExt cx="0" cy="0"/>
+        </a:xfrm>
+      </p:grpSpPr>
+      <p:sp>
+        <p:nvSpPr>
+          <p:cNvPr id="2" name="Title 1">
+            <a:extLst>
+              <a:ext uri="{FF2B5EF4-FFF2-40B4-BE49-F238E27FC236}">
+                <a16:creationId xmlns:a16="http://schemas.microsoft.com/office/drawing/2014/main" id="{4E803E53-33F4-4918-9D2A-3756F2D666B5}"/>
+              </a:ext>
+            </a:extLst>
+          </p:cNvPr>
+          <p:cNvSpPr>
+            <a:spLocks noGrp="1"/>
+          </p:cNvSpPr>
+          <p:nvPr>
+            <p:ph type="title"/>
+          </p:nvPr>
+        </p:nvSpPr>
+        <p:spPr/>
+        <p:txBody>
+          <a:bodyPr/>
+          <a:lstStyle/>
+          <a:p>
+            <a:r>
+              <a:rPr lang="en-CA" dirty="0" err="1"/>
+              <a:t>Outils</a:t>
+            </a:r>
+            <a:r>
+              <a:rPr lang="en-CA" dirty="0"/>
+              <a:t> de </a:t>
+            </a:r>
+            <a:r>
+              <a:rPr lang="en-CA" dirty="0" err="1"/>
+              <a:t>gestion</a:t>
+            </a:r>
+            <a:endParaRPr lang="en-CA" dirty="0"/>
+          </a:p>
+        </p:txBody>
+      </p:sp>
+      <p:sp>
+        <p:nvSpPr>
+          <p:cNvPr id="3" name="Content Placeholder 2">
+            <a:extLst>
+              <a:ext uri="{FF2B5EF4-FFF2-40B4-BE49-F238E27FC236}">
+                <a16:creationId xmlns:a16="http://schemas.microsoft.com/office/drawing/2014/main" id="{60344793-CA0C-4409-81BA-47C205B02C33}"/>
+              </a:ext>
+            </a:extLst>
+          </p:cNvPr>
+          <p:cNvSpPr>
+            <a:spLocks noGrp="1"/>
+          </p:cNvSpPr>
+          <p:nvPr>
+            <p:ph idx="1"/>
+          </p:nvPr>
+        </p:nvSpPr>
+        <p:spPr/>
+        <p:txBody>
+          <a:bodyPr/>
+          <a:lstStyle/>
+          <a:p>
+            <a:endParaRPr lang="en-CA" dirty="0"/>
+          </a:p>
+        </p:txBody>
+      </p:sp>
+    </p:spTree>
+    <p:extLst>
+      <p:ext uri="{BB962C8B-B14F-4D97-AF65-F5344CB8AC3E}">
+        <p14:creationId xmlns:p14="http://schemas.microsoft.com/office/powerpoint/2010/main" val="3593040669"/>
+      </p:ext>
+    </p:extLst>
+  </p:cSld>
+  <p:clrMapOvr>
+    <a:masterClrMapping/>
+  </p:clrMapOvr>
+</p:sld>
+</file>
+
+<file path=ppt/slides/slide2.xml><?xml version="1.0" encoding="utf-8"?>
+<p:sld xmlns:a="http://schemas.openxmlformats.org/drawingml/2006/main" xmlns:r="http://schemas.openxmlformats.org/officeDocument/2006/relationships" xmlns:p="http://schemas.openxmlformats.org/presentationml/2006/main">
+  <p:cSld>
+    <p:spTree>
+      <p:nvGrpSpPr>
+        <p:cNvPr id="1" name=""/>
+        <p:cNvGrpSpPr/>
+        <p:nvPr/>
+      </p:nvGrpSpPr>
+      <p:grpSpPr>
+        <a:xfrm>
+          <a:off x="0" y="0"/>
+          <a:ext cx="0" cy="0"/>
+          <a:chOff x="0" y="0"/>
+          <a:chExt cx="0" cy="0"/>
+        </a:xfrm>
+      </p:grpSpPr>
+      <p:sp>
+        <p:nvSpPr>
+          <p:cNvPr id="2" name="Title 1">
+            <a:extLst>
+              <a:ext uri="{FF2B5EF4-FFF2-40B4-BE49-F238E27FC236}">
+                <a16:creationId xmlns:a16="http://schemas.microsoft.com/office/drawing/2014/main" id="{95A4B020-4078-42AE-9D8B-DD88078B584A}"/>
+              </a:ext>
+            </a:extLst>
+          </p:cNvPr>
+          <p:cNvSpPr>
+            <a:spLocks noGrp="1"/>
+          </p:cNvSpPr>
+          <p:nvPr>
+            <p:ph type="title"/>
+          </p:nvPr>
+        </p:nvSpPr>
+        <p:spPr/>
+        <p:txBody>
+          <a:bodyPr/>
+          <a:lstStyle/>
+          <a:p>
+            <a:r>
+              <a:rPr lang="en-CA" dirty="0"/>
+              <a:t>Justification du </a:t>
+            </a:r>
+            <a:r>
+              <a:rPr lang="en-CA" dirty="0" err="1"/>
+              <a:t>besoin</a:t>
+            </a:r>
+            <a:r>
+              <a:rPr lang="en-CA" dirty="0"/>
+              <a:t>, </a:t>
+            </a:r>
+            <a:r>
+              <a:rPr lang="en-CA" dirty="0" err="1"/>
+              <a:t>contexte</a:t>
+            </a:r>
+            <a:r>
+              <a:rPr lang="en-CA" dirty="0"/>
+              <a:t> du </a:t>
+            </a:r>
+            <a:r>
+              <a:rPr lang="en-CA" dirty="0" err="1"/>
+              <a:t>projet</a:t>
+            </a:r>
+            <a:r>
+              <a:rPr lang="en-CA" dirty="0"/>
+              <a:t> et du </a:t>
+            </a:r>
+            <a:r>
+              <a:rPr lang="en-CA" dirty="0" err="1"/>
+              <a:t>marché</a:t>
+            </a:r>
+            <a:endParaRPr lang="en-CA" dirty="0"/>
+          </a:p>
+        </p:txBody>
+      </p:sp>
+      <p:sp>
+        <p:nvSpPr>
+          <p:cNvPr id="3" name="Content Placeholder 2">
+            <a:extLst>
+              <a:ext uri="{FF2B5EF4-FFF2-40B4-BE49-F238E27FC236}">
+                <a16:creationId xmlns:a16="http://schemas.microsoft.com/office/drawing/2014/main" id="{163954D6-EF9A-4BE0-8664-F71C1CE7E468}"/>
+              </a:ext>
+            </a:extLst>
+          </p:cNvPr>
+          <p:cNvSpPr>
+            <a:spLocks noGrp="1"/>
+          </p:cNvSpPr>
+          <p:nvPr>
+            <p:ph idx="1"/>
+          </p:nvPr>
+        </p:nvSpPr>
+        <p:spPr/>
+        <p:txBody>
+          <a:bodyPr/>
+          <a:lstStyle/>
+          <a:p>
+            <a:endParaRPr lang="en-CA"/>
+          </a:p>
+        </p:txBody>
+      </p:sp>
+    </p:spTree>
+    <p:extLst>
+      <p:ext uri="{BB962C8B-B14F-4D97-AF65-F5344CB8AC3E}">
+        <p14:creationId xmlns:p14="http://schemas.microsoft.com/office/powerpoint/2010/main" val="3338256800"/>
+      </p:ext>
+    </p:extLst>
+  </p:cSld>
+  <p:clrMapOvr>
+    <a:masterClrMapping/>
+  </p:clrMapOvr>
+</p:sld>
+</file>
+
+<file path=ppt/slides/slide3.xml><?xml version="1.0" encoding="utf-8"?>
+<p:sld xmlns:a="http://schemas.openxmlformats.org/drawingml/2006/main" xmlns:r="http://schemas.openxmlformats.org/officeDocument/2006/relationships" xmlns:p="http://schemas.openxmlformats.org/presentationml/2006/main">
+  <p:cSld>
+    <p:spTree>
+      <p:nvGrpSpPr>
+        <p:cNvPr id="1" name=""/>
+        <p:cNvGrpSpPr/>
+        <p:nvPr/>
+      </p:nvGrpSpPr>
+      <p:grpSpPr>
+        <a:xfrm>
+          <a:off x="0" y="0"/>
+          <a:ext cx="0" cy="0"/>
+          <a:chOff x="0" y="0"/>
+          <a:chExt cx="0" cy="0"/>
+        </a:xfrm>
+      </p:grpSpPr>
+      <p:sp>
+        <p:nvSpPr>
+          <p:cNvPr id="2" name="Title 1">
+            <a:extLst>
+              <a:ext uri="{FF2B5EF4-FFF2-40B4-BE49-F238E27FC236}">
+                <a16:creationId xmlns:a16="http://schemas.microsoft.com/office/drawing/2014/main" id="{A10EAD33-323D-42BD-8C20-8BB8D0E4C2A0}"/>
+              </a:ext>
+            </a:extLst>
+          </p:cNvPr>
+          <p:cNvSpPr>
+            <a:spLocks noGrp="1"/>
+          </p:cNvSpPr>
+          <p:nvPr>
+            <p:ph type="title"/>
+          </p:nvPr>
+        </p:nvSpPr>
+        <p:spPr/>
+        <p:txBody>
+          <a:bodyPr/>
+          <a:lstStyle/>
+          <a:p>
+            <a:r>
+              <a:rPr lang="en-CA" dirty="0"/>
+              <a:t>Cahier de charges </a:t>
+            </a:r>
+            <a:r>
+              <a:rPr lang="en-CA" dirty="0" err="1"/>
+              <a:t>fonctionnelles</a:t>
+            </a:r>
+            <a:endParaRPr lang="en-CA" dirty="0"/>
+          </a:p>
+        </p:txBody>
+      </p:sp>
+      <p:sp>
+        <p:nvSpPr>
+          <p:cNvPr id="3" name="Content Placeholder 2">
+            <a:extLst>
+              <a:ext uri="{FF2B5EF4-FFF2-40B4-BE49-F238E27FC236}">
+                <a16:creationId xmlns:a16="http://schemas.microsoft.com/office/drawing/2014/main" id="{9741DD70-9E04-47B7-AEAC-7EF6A01F0568}"/>
+              </a:ext>
+            </a:extLst>
+          </p:cNvPr>
+          <p:cNvSpPr>
+            <a:spLocks noGrp="1"/>
+          </p:cNvSpPr>
+          <p:nvPr>
+            <p:ph idx="1"/>
+          </p:nvPr>
+        </p:nvSpPr>
+        <p:spPr/>
+        <p:txBody>
+          <a:bodyPr/>
+          <a:lstStyle/>
+          <a:p>
+            <a:endParaRPr lang="en-CA"/>
+          </a:p>
+        </p:txBody>
+      </p:sp>
+    </p:spTree>
+    <p:extLst>
+      <p:ext uri="{BB962C8B-B14F-4D97-AF65-F5344CB8AC3E}">
+        <p14:creationId xmlns:p14="http://schemas.microsoft.com/office/powerpoint/2010/main" val="3365343362"/>
+      </p:ext>
+    </p:extLst>
+  </p:cSld>
+  <p:clrMapOvr>
+    <a:masterClrMapping/>
+  </p:clrMapOvr>
+</p:sld>
+</file>
+
+<file path=ppt/slides/slide4.xml><?xml version="1.0" encoding="utf-8"?>
+<p:sld xmlns:a="http://schemas.openxmlformats.org/drawingml/2006/main" xmlns:r="http://schemas.openxmlformats.org/officeDocument/2006/relationships" xmlns:p="http://schemas.openxmlformats.org/presentationml/2006/main">
+  <p:cSld>
+    <p:spTree>
+      <p:nvGrpSpPr>
+        <p:cNvPr id="1" name=""/>
+        <p:cNvGrpSpPr/>
+        <p:nvPr/>
+      </p:nvGrpSpPr>
+      <p:grpSpPr>
+        <a:xfrm>
+          <a:off x="0" y="0"/>
+          <a:ext cx="0" cy="0"/>
+          <a:chOff x="0" y="0"/>
+          <a:chExt cx="0" cy="0"/>
+        </a:xfrm>
+      </p:grpSpPr>
+      <p:sp>
+        <p:nvSpPr>
+          <p:cNvPr id="2" name="Title 1">
+            <a:extLst>
+              <a:ext uri="{FF2B5EF4-FFF2-40B4-BE49-F238E27FC236}">
+                <a16:creationId xmlns:a16="http://schemas.microsoft.com/office/drawing/2014/main" id="{57AE6C2F-E93C-4A13-BFBF-2291D335938B}"/>
+              </a:ext>
+            </a:extLst>
+          </p:cNvPr>
+          <p:cNvSpPr>
+            <a:spLocks noGrp="1"/>
+          </p:cNvSpPr>
+          <p:nvPr>
+            <p:ph type="title"/>
+          </p:nvPr>
+        </p:nvSpPr>
+        <p:spPr>
+          <a:xfrm>
+            <a:off x="1484309" y="0"/>
+            <a:ext cx="10018713" cy="1752599"/>
+          </a:xfrm>
+        </p:spPr>
+        <p:txBody>
+          <a:bodyPr/>
+          <a:lstStyle/>
+          <a:p>
+            <a:r>
+              <a:rPr lang="en-CA" dirty="0"/>
+              <a:t>Architecture </a:t>
+            </a:r>
+            <a:r>
+              <a:rPr lang="en-CA" dirty="0" err="1"/>
+              <a:t>globale</a:t>
+            </a:r>
+            <a:endParaRPr lang="en-CA" dirty="0"/>
+          </a:p>
+        </p:txBody>
+      </p:sp>
+      <p:pic>
+        <p:nvPicPr>
+          <p:cNvPr id="4" name="Picture 3">
+            <a:extLst>
+              <a:ext uri="{FF2B5EF4-FFF2-40B4-BE49-F238E27FC236}">
+                <a16:creationId xmlns:a16="http://schemas.microsoft.com/office/drawing/2014/main" id="{54FD1A81-4AFB-4561-97FF-38A60570CA28}"/>
+              </a:ext>
+            </a:extLst>
+          </p:cNvPr>
+          <p:cNvPicPr>
+            <a:picLocks noChangeAspect="1"/>
+          </p:cNvPicPr>
+          <p:nvPr/>
+        </p:nvPicPr>
+        <p:blipFill>
+          <a:blip r:embed="rId2">
+            <a:extLst>
+              <a:ext uri="{28A0092B-C50C-407E-A947-70E740481C1C}">
+                <a14:useLocalDpi xmlns:a14="http://schemas.microsoft.com/office/drawing/2010/main" val="0"/>
+              </a:ext>
+            </a:extLst>
+          </a:blip>
+          <a:stretch>
+            <a:fillRect/>
+          </a:stretch>
+        </p:blipFill>
+        <p:spPr>
+          <a:xfrm>
+            <a:off x="1123950" y="1403944"/>
+            <a:ext cx="9944100" cy="5233066"/>
+          </a:xfrm>
+          <a:prstGeom prst="rect">
+            <a:avLst/>
+          </a:prstGeom>
+        </p:spPr>
+      </p:pic>
+    </p:spTree>
+    <p:extLst>
+      <p:ext uri="{BB962C8B-B14F-4D97-AF65-F5344CB8AC3E}">
+        <p14:creationId xmlns:p14="http://schemas.microsoft.com/office/powerpoint/2010/main" val="2653828309"/>
+      </p:ext>
+    </p:extLst>
+  </p:cSld>
+  <p:clrMapOvr>
+    <a:masterClrMapping/>
+  </p:clrMapOvr>
+</p:sld>
+</file>
+
+<file path=ppt/slides/slide5.xml><?xml version="1.0" encoding="utf-8"?>
+<p:sld xmlns:a="http://schemas.openxmlformats.org/drawingml/2006/main" xmlns:r="http://schemas.openxmlformats.org/officeDocument/2006/relationships" xmlns:p="http://schemas.openxmlformats.org/presentationml/2006/main">
+  <p:cSld>
+    <p:spTree>
+      <p:nvGrpSpPr>
+        <p:cNvPr id="1" name=""/>
+        <p:cNvGrpSpPr/>
+        <p:nvPr/>
+      </p:nvGrpSpPr>
+      <p:grpSpPr>
+        <a:xfrm>
+          <a:off x="0" y="0"/>
+          <a:ext cx="0" cy="0"/>
+          <a:chOff x="0" y="0"/>
+          <a:chExt cx="0" cy="0"/>
+        </a:xfrm>
+      </p:grpSpPr>
+      <p:sp>
+        <p:nvSpPr>
+          <p:cNvPr id="2" name="Title 1">
+            <a:extLst>
+              <a:ext uri="{FF2B5EF4-FFF2-40B4-BE49-F238E27FC236}">
+                <a16:creationId xmlns:a16="http://schemas.microsoft.com/office/drawing/2014/main" id="{57AE6C2F-E93C-4A13-BFBF-2291D335938B}"/>
+              </a:ext>
+            </a:extLst>
+          </p:cNvPr>
+          <p:cNvSpPr>
+            <a:spLocks noGrp="1"/>
+          </p:cNvSpPr>
+          <p:nvPr>
+            <p:ph type="title"/>
+          </p:nvPr>
+        </p:nvSpPr>
+        <p:spPr>
+          <a:xfrm>
+            <a:off x="1484309" y="0"/>
+            <a:ext cx="10018713" cy="1752599"/>
+          </a:xfrm>
+        </p:spPr>
+        <p:txBody>
+          <a:bodyPr/>
+          <a:lstStyle/>
+          <a:p>
+            <a:r>
+              <a:rPr lang="en-CA" dirty="0"/>
+              <a:t>Architecture </a:t>
+            </a:r>
+            <a:r>
+              <a:rPr lang="en-CA" dirty="0" err="1"/>
+              <a:t>globale</a:t>
+            </a:r>
+            <a:endParaRPr lang="en-CA" dirty="0"/>
+          </a:p>
+        </p:txBody>
+      </p:sp>
+      <p:pic>
+        <p:nvPicPr>
+          <p:cNvPr id="5" name="Picture 4">
+            <a:extLst>
+              <a:ext uri="{FF2B5EF4-FFF2-40B4-BE49-F238E27FC236}">
+                <a16:creationId xmlns:a16="http://schemas.microsoft.com/office/drawing/2014/main" id="{25479432-C2CC-4627-8075-6676E9C505D5}"/>
+              </a:ext>
+            </a:extLst>
+          </p:cNvPr>
+          <p:cNvPicPr>
+            <a:picLocks noChangeAspect="1"/>
+          </p:cNvPicPr>
+          <p:nvPr/>
+        </p:nvPicPr>
+        <p:blipFill>
+          <a:blip r:embed="rId2">
+            <a:extLst>
+              <a:ext uri="{28A0092B-C50C-407E-A947-70E740481C1C}">
+                <a14:useLocalDpi xmlns:a14="http://schemas.microsoft.com/office/drawing/2010/main" val="0"/>
+              </a:ext>
+            </a:extLst>
+          </a:blip>
+          <a:stretch>
+            <a:fillRect/>
+          </a:stretch>
+        </p:blipFill>
+        <p:spPr>
+          <a:xfrm>
+            <a:off x="2986977" y="1323975"/>
+            <a:ext cx="7013376" cy="5200649"/>
+          </a:xfrm>
+          <a:prstGeom prst="rect">
+            <a:avLst/>
+          </a:prstGeom>
+        </p:spPr>
+      </p:pic>
+    </p:spTree>
+    <p:extLst>
+      <p:ext uri="{BB962C8B-B14F-4D97-AF65-F5344CB8AC3E}">
+        <p14:creationId xmlns:p14="http://schemas.microsoft.com/office/powerpoint/2010/main" val="2762366332"/>
+      </p:ext>
+    </p:extLst>
+  </p:cSld>
+  <p:clrMapOvr>
+    <a:masterClrMapping/>
+  </p:clrMapOvr>
+</p:sld>
+</file>
+
+<file path=ppt/slides/slide6.xml><?xml version="1.0" encoding="utf-8"?>
+<p:sld xmlns:a="http://schemas.openxmlformats.org/drawingml/2006/main" xmlns:r="http://schemas.openxmlformats.org/officeDocument/2006/relationships" xmlns:p="http://schemas.openxmlformats.org/presentationml/2006/main">
+  <p:cSld>
+    <p:spTree>
+      <p:nvGrpSpPr>
+        <p:cNvPr id="1" name=""/>
+        <p:cNvGrpSpPr/>
+        <p:nvPr/>
+      </p:nvGrpSpPr>
+      <p:grpSpPr>
+        <a:xfrm>
+          <a:off x="0" y="0"/>
+          <a:ext cx="0" cy="0"/>
+          <a:chOff x="0" y="0"/>
+          <a:chExt cx="0" cy="0"/>
+        </a:xfrm>
+      </p:grpSpPr>
+      <p:sp>
+        <p:nvSpPr>
+          <p:cNvPr id="2" name="Title 1">
+            <a:extLst>
+              <a:ext uri="{FF2B5EF4-FFF2-40B4-BE49-F238E27FC236}">
+                <a16:creationId xmlns:a16="http://schemas.microsoft.com/office/drawing/2014/main" id="{57AE6C2F-E93C-4A13-BFBF-2291D335938B}"/>
+              </a:ext>
+            </a:extLst>
+          </p:cNvPr>
+          <p:cNvSpPr>
+            <a:spLocks noGrp="1"/>
+          </p:cNvSpPr>
+          <p:nvPr>
+            <p:ph type="title"/>
+          </p:nvPr>
+        </p:nvSpPr>
+        <p:spPr>
+          <a:xfrm>
+            <a:off x="1484309" y="0"/>
+            <a:ext cx="10018713" cy="1752599"/>
+          </a:xfrm>
+        </p:spPr>
+        <p:txBody>
+          <a:bodyPr/>
+          <a:lstStyle/>
+          <a:p>
+            <a:r>
+              <a:rPr lang="en-CA" dirty="0"/>
+              <a:t>Architecture </a:t>
+            </a:r>
+            <a:r>
+              <a:rPr lang="en-CA" dirty="0" err="1"/>
+              <a:t>globale</a:t>
+            </a:r>
+            <a:endParaRPr lang="en-CA" dirty="0"/>
+          </a:p>
+        </p:txBody>
+      </p:sp>
+      <p:sp>
+        <p:nvSpPr>
+          <p:cNvPr id="4" name="Content Placeholder 2">
+            <a:extLst>
+              <a:ext uri="{FF2B5EF4-FFF2-40B4-BE49-F238E27FC236}">
+                <a16:creationId xmlns:a16="http://schemas.microsoft.com/office/drawing/2014/main" id="{0B4A7325-9DB0-46E8-89B3-80B528F4E836}"/>
+              </a:ext>
+            </a:extLst>
+          </p:cNvPr>
+          <p:cNvSpPr>
+            <a:spLocks noGrp="1"/>
+          </p:cNvSpPr>
+          <p:nvPr>
+            <p:ph idx="1"/>
+          </p:nvPr>
+        </p:nvSpPr>
+        <p:spPr>
+          <a:xfrm>
+            <a:off x="1484310" y="1752599"/>
+            <a:ext cx="10018713" cy="4038601"/>
+          </a:xfrm>
+        </p:spPr>
+        <p:txBody>
+          <a:bodyPr/>
+          <a:lstStyle/>
+          <a:p>
+            <a:r>
+              <a:rPr lang="en-CA" dirty="0"/>
+              <a:t>Communication sans-fil entre le </a:t>
+            </a:r>
+            <a:r>
+              <a:rPr lang="en-CA" dirty="0" err="1"/>
+              <a:t>système</a:t>
+            </a:r>
+            <a:r>
+              <a:rPr lang="en-CA" dirty="0"/>
+              <a:t> central et la </a:t>
+            </a:r>
+            <a:r>
+              <a:rPr lang="en-CA" dirty="0" err="1"/>
+              <a:t>ruche</a:t>
+            </a:r>
+            <a:endParaRPr lang="en-CA" dirty="0"/>
+          </a:p>
+          <a:p>
+            <a:endParaRPr lang="en-CA" dirty="0"/>
+          </a:p>
+          <a:p>
+            <a:r>
+              <a:rPr lang="en-CA" dirty="0" err="1"/>
+              <a:t>Capteurs</a:t>
+            </a:r>
+            <a:r>
+              <a:rPr lang="en-CA" dirty="0"/>
+              <a:t> </a:t>
+            </a:r>
+            <a:r>
+              <a:rPr lang="en-CA" dirty="0" err="1"/>
+              <a:t>permettent</a:t>
+            </a:r>
+            <a:r>
+              <a:rPr lang="en-CA" dirty="0"/>
+              <a:t> de </a:t>
+            </a:r>
+            <a:r>
+              <a:rPr lang="en-CA" dirty="0" err="1"/>
+              <a:t>connaître</a:t>
+            </a:r>
+            <a:r>
+              <a:rPr lang="en-CA" dirty="0"/>
+              <a:t> </a:t>
+            </a:r>
+            <a:r>
+              <a:rPr lang="en-CA" dirty="0" err="1"/>
+              <a:t>l’état</a:t>
+            </a:r>
+            <a:r>
+              <a:rPr lang="en-CA" dirty="0"/>
+              <a:t> de la </a:t>
+            </a:r>
+            <a:r>
+              <a:rPr lang="en-CA" dirty="0" err="1"/>
+              <a:t>ruche</a:t>
+            </a:r>
+            <a:endParaRPr lang="en-CA" dirty="0"/>
+          </a:p>
+          <a:p>
+            <a:endParaRPr lang="en-CA" dirty="0"/>
+          </a:p>
+          <a:p>
+            <a:r>
+              <a:rPr lang="en-CA" dirty="0" err="1"/>
+              <a:t>Système</a:t>
+            </a:r>
+            <a:r>
+              <a:rPr lang="en-CA" dirty="0"/>
+              <a:t> central analyse </a:t>
+            </a:r>
+            <a:r>
+              <a:rPr lang="en-CA" dirty="0" err="1"/>
+              <a:t>l’information</a:t>
+            </a:r>
+            <a:r>
+              <a:rPr lang="en-CA" dirty="0"/>
+              <a:t> des </a:t>
+            </a:r>
+            <a:r>
+              <a:rPr lang="en-CA" dirty="0" err="1"/>
+              <a:t>capteurs</a:t>
+            </a:r>
+            <a:r>
+              <a:rPr lang="en-CA" dirty="0"/>
+              <a:t> et </a:t>
+            </a:r>
+            <a:r>
+              <a:rPr lang="en-CA" dirty="0" err="1"/>
+              <a:t>envoie</a:t>
+            </a:r>
+            <a:r>
+              <a:rPr lang="en-CA" dirty="0"/>
+              <a:t> </a:t>
+            </a:r>
+            <a:r>
+              <a:rPr lang="en-CA" dirty="0" err="1"/>
+              <a:t>une</a:t>
+            </a:r>
+            <a:r>
+              <a:rPr lang="en-CA" dirty="0"/>
+              <a:t> </a:t>
+            </a:r>
+            <a:r>
+              <a:rPr lang="en-CA" dirty="0" err="1"/>
+              <a:t>commande</a:t>
+            </a:r>
+            <a:r>
+              <a:rPr lang="en-CA" dirty="0"/>
+              <a:t> </a:t>
+            </a:r>
+            <a:r>
+              <a:rPr lang="en-CA" dirty="0" err="1"/>
+              <a:t>si</a:t>
+            </a:r>
+            <a:r>
+              <a:rPr lang="en-CA" dirty="0"/>
+              <a:t> </a:t>
+            </a:r>
+            <a:r>
+              <a:rPr lang="en-CA" dirty="0" err="1"/>
+              <a:t>nécessaire</a:t>
+            </a:r>
+            <a:endParaRPr lang="en-CA" dirty="0"/>
+          </a:p>
+          <a:p>
+            <a:endParaRPr lang="en-CA" dirty="0"/>
+          </a:p>
+        </p:txBody>
+      </p:sp>
+    </p:spTree>
+    <p:extLst>
+      <p:ext uri="{BB962C8B-B14F-4D97-AF65-F5344CB8AC3E}">
+        <p14:creationId xmlns:p14="http://schemas.microsoft.com/office/powerpoint/2010/main" val="986008905"/>
+      </p:ext>
+    </p:extLst>
+  </p:cSld>
+  <p:clrMapOvr>
+    <a:masterClrMapping/>
+  </p:clrMapOvr>
+</p:sld>
+</file>
+
+<file path=ppt/slides/slide7.xml><?xml version="1.0" encoding="utf-8"?>
+<p:sld xmlns:a="http://schemas.openxmlformats.org/drawingml/2006/main" xmlns:r="http://schemas.openxmlformats.org/officeDocument/2006/relationships" xmlns:p="http://schemas.openxmlformats.org/presentationml/2006/main">
+  <p:cSld>
+    <p:spTree>
+      <p:nvGrpSpPr>
+        <p:cNvPr id="1" name=""/>
+        <p:cNvGrpSpPr/>
+        <p:nvPr/>
+      </p:nvGrpSpPr>
+      <p:grpSpPr>
+        <a:xfrm>
+          <a:off x="0" y="0"/>
+          <a:ext cx="0" cy="0"/>
+          <a:chOff x="0" y="0"/>
+          <a:chExt cx="0" cy="0"/>
+        </a:xfrm>
+      </p:grpSpPr>
+      <p:sp>
+        <p:nvSpPr>
+          <p:cNvPr id="2" name="Title 1">
+            <a:extLst>
+              <a:ext uri="{FF2B5EF4-FFF2-40B4-BE49-F238E27FC236}">
+                <a16:creationId xmlns:a16="http://schemas.microsoft.com/office/drawing/2014/main" id="{57AE6C2F-E93C-4A13-BFBF-2291D335938B}"/>
+              </a:ext>
+            </a:extLst>
+          </p:cNvPr>
+          <p:cNvSpPr>
+            <a:spLocks noGrp="1"/>
+          </p:cNvSpPr>
+          <p:nvPr>
+            <p:ph type="title"/>
+          </p:nvPr>
+        </p:nvSpPr>
+        <p:spPr>
+          <a:xfrm>
+            <a:off x="1484309" y="0"/>
+            <a:ext cx="10018713" cy="1752599"/>
+          </a:xfrm>
+        </p:spPr>
+        <p:txBody>
+          <a:bodyPr/>
+          <a:lstStyle/>
+          <a:p>
+            <a:r>
+              <a:rPr lang="en-CA" dirty="0"/>
+              <a:t>Architecture </a:t>
+            </a:r>
+            <a:r>
+              <a:rPr lang="en-CA" dirty="0" err="1"/>
+              <a:t>globale</a:t>
+            </a:r>
+            <a:endParaRPr lang="en-CA" dirty="0"/>
+          </a:p>
+        </p:txBody>
+      </p:sp>
+      <p:graphicFrame>
+        <p:nvGraphicFramePr>
+          <p:cNvPr id="5" name="Table 4">
+            <a:extLst>
+              <a:ext uri="{FF2B5EF4-FFF2-40B4-BE49-F238E27FC236}">
+                <a16:creationId xmlns:a16="http://schemas.microsoft.com/office/drawing/2014/main" id="{DA087B87-A4E2-424C-A303-D175DDBD92E0}"/>
+              </a:ext>
+            </a:extLst>
+          </p:cNvPr>
+          <p:cNvGraphicFramePr>
+            <a:graphicFrameLocks noGrp="1"/>
+          </p:cNvGraphicFramePr>
+          <p:nvPr>
+            <p:extLst/>
+          </p:nvPr>
+        </p:nvGraphicFramePr>
+        <p:xfrm>
+          <a:off x="1653442" y="1452685"/>
+          <a:ext cx="8885116" cy="3601355"/>
+        </p:xfrm>
+        <a:graphic>
+          <a:graphicData uri="http://schemas.openxmlformats.org/drawingml/2006/table">
+            <a:tbl>
+              <a:tblPr firstRow="1" bandRow="1">
+                <a:tableStyleId>{5C22544A-7EE6-4342-B048-85BDC9FD1C3A}</a:tableStyleId>
+              </a:tblPr>
+              <a:tblGrid>
+                <a:gridCol w="4442558">
+                  <a:extLst>
+                    <a:ext uri="{9D8B030D-6E8A-4147-A177-3AD203B41FA5}">
+                      <a16:colId xmlns:a16="http://schemas.microsoft.com/office/drawing/2014/main" val="2474516255"/>
+                    </a:ext>
+                  </a:extLst>
+                </a:gridCol>
+                <a:gridCol w="4442558">
+                  <a:extLst>
+                    <a:ext uri="{9D8B030D-6E8A-4147-A177-3AD203B41FA5}">
+                      <a16:colId xmlns:a16="http://schemas.microsoft.com/office/drawing/2014/main" val="2917661861"/>
+                    </a:ext>
+                  </a:extLst>
+                </a:gridCol>
+              </a:tblGrid>
+              <a:tr h="549604">
+                <a:tc>
+                  <a:txBody>
+                    <a:bodyPr/>
+                    <a:lstStyle/>
+                    <a:p>
+                      <a:r>
+                        <a:rPr lang="en-CA" dirty="0" err="1"/>
+                        <a:t>Capteur</a:t>
+                      </a:r>
+                      <a:endParaRPr lang="en-CA" dirty="0"/>
+                    </a:p>
+                  </a:txBody>
+                  <a:tcPr/>
+                </a:tc>
+                <a:tc>
+                  <a:txBody>
+                    <a:bodyPr/>
+                    <a:lstStyle/>
+                    <a:p>
+                      <a:r>
+                        <a:rPr lang="en-CA" dirty="0" err="1"/>
+                        <a:t>Caractéristiques</a:t>
+                      </a:r>
+                      <a:endParaRPr lang="en-CA" dirty="0"/>
+                    </a:p>
+                  </a:txBody>
+                  <a:tcPr/>
+                </a:tc>
+                <a:extLst>
+                  <a:ext uri="{0D108BD9-81ED-4DB2-BD59-A6C34878D82A}">
+                    <a16:rowId xmlns:a16="http://schemas.microsoft.com/office/drawing/2014/main" val="2317750631"/>
+                  </a:ext>
+                </a:extLst>
+              </a:tr>
+              <a:tr h="948631">
+                <a:tc>
+                  <a:txBody>
+                    <a:bodyPr/>
+                    <a:lstStyle/>
+                    <a:p>
+                      <a:r>
+                        <a:rPr lang="en-CA" dirty="0" err="1"/>
+                        <a:t>Température</a:t>
+                      </a:r>
+                      <a:r>
+                        <a:rPr lang="en-CA" dirty="0"/>
+                        <a:t> (</a:t>
+                      </a:r>
+                      <a:r>
+                        <a:rPr lang="en-CA" dirty="0" err="1"/>
+                        <a:t>série</a:t>
+                      </a:r>
+                      <a:r>
+                        <a:rPr lang="en-CA" dirty="0"/>
+                        <a:t> S5855A_E)</a:t>
+                      </a:r>
+                    </a:p>
+                  </a:txBody>
+                  <a:tcPr/>
+                </a:tc>
+                <a:tc>
+                  <a:txBody>
+                    <a:bodyPr/>
+                    <a:lstStyle/>
+                    <a:p>
+                      <a:r>
+                        <a:rPr lang="en-CA" dirty="0"/>
+                        <a:t>-</a:t>
+                      </a:r>
+                      <a:r>
+                        <a:rPr lang="en-CA" dirty="0" err="1"/>
+                        <a:t>Couvre</a:t>
+                      </a:r>
+                      <a:r>
+                        <a:rPr lang="en-CA" dirty="0"/>
+                        <a:t> les </a:t>
+                      </a:r>
+                      <a:r>
+                        <a:rPr lang="en-CA" dirty="0" err="1"/>
+                        <a:t>températures</a:t>
+                      </a:r>
+                      <a:r>
+                        <a:rPr lang="en-CA" dirty="0"/>
+                        <a:t> du Québec</a:t>
+                      </a:r>
+                    </a:p>
+                    <a:p>
+                      <a:r>
+                        <a:rPr lang="en-CA" dirty="0"/>
+                        <a:t>-</a:t>
+                      </a:r>
+                      <a:r>
+                        <a:rPr lang="en-CA" dirty="0" err="1"/>
+                        <a:t>Consomme</a:t>
+                      </a:r>
+                      <a:r>
+                        <a:rPr lang="en-CA" dirty="0"/>
+                        <a:t> </a:t>
+                      </a:r>
+                      <a:r>
+                        <a:rPr lang="en-CA" dirty="0" err="1"/>
+                        <a:t>peu</a:t>
+                      </a:r>
+                      <a:r>
+                        <a:rPr lang="en-CA" dirty="0"/>
+                        <a:t> pour </a:t>
+                      </a:r>
+                      <a:r>
+                        <a:rPr lang="en-CA" dirty="0" err="1"/>
+                        <a:t>opération</a:t>
+                      </a:r>
+                      <a:endParaRPr lang="en-CA" dirty="0"/>
+                    </a:p>
+                    <a:p>
+                      <a:r>
+                        <a:rPr lang="en-CA" dirty="0"/>
+                        <a:t>-Sortie PWM</a:t>
+                      </a:r>
+                    </a:p>
+                  </a:txBody>
+                  <a:tcPr/>
+                </a:tc>
+                <a:extLst>
+                  <a:ext uri="{0D108BD9-81ED-4DB2-BD59-A6C34878D82A}">
+                    <a16:rowId xmlns:a16="http://schemas.microsoft.com/office/drawing/2014/main" val="1527509176"/>
+                  </a:ext>
+                </a:extLst>
+              </a:tr>
+              <a:tr h="1355187">
+                <a:tc>
+                  <a:txBody>
+                    <a:bodyPr/>
+                    <a:lstStyle/>
+                    <a:p>
+                      <a:r>
+                        <a:rPr lang="en-CA" dirty="0"/>
+                        <a:t>Force (</a:t>
+                      </a:r>
+                      <a:r>
+                        <a:rPr lang="en-CA" dirty="0" err="1"/>
+                        <a:t>série</a:t>
+                      </a:r>
+                      <a:r>
+                        <a:rPr lang="en-CA" dirty="0"/>
+                        <a:t> FC22)</a:t>
+                      </a:r>
+                    </a:p>
+                  </a:txBody>
+                  <a:tcPr/>
+                </a:tc>
+                <a:tc>
+                  <a:txBody>
+                    <a:bodyPr/>
+                    <a:lstStyle/>
+                    <a:p>
+                      <a:r>
+                        <a:rPr lang="en-CA" dirty="0"/>
+                        <a:t>-</a:t>
+                      </a:r>
+                      <a:r>
+                        <a:rPr lang="en-CA" dirty="0" err="1"/>
+                        <a:t>Couvre</a:t>
+                      </a:r>
+                      <a:r>
+                        <a:rPr lang="en-CA" dirty="0"/>
+                        <a:t> le </a:t>
+                      </a:r>
+                      <a:r>
+                        <a:rPr lang="en-CA" dirty="0" err="1"/>
+                        <a:t>poids</a:t>
+                      </a:r>
+                      <a:r>
+                        <a:rPr lang="en-CA" dirty="0"/>
+                        <a:t> </a:t>
+                      </a:r>
+                      <a:r>
+                        <a:rPr lang="en-CA" dirty="0" err="1"/>
+                        <a:t>d’une</a:t>
+                      </a:r>
+                      <a:r>
+                        <a:rPr lang="en-CA" dirty="0"/>
+                        <a:t> </a:t>
+                      </a:r>
+                      <a:r>
+                        <a:rPr lang="en-CA" dirty="0" err="1"/>
+                        <a:t>ruche</a:t>
+                      </a:r>
+                      <a:endParaRPr lang="en-CA" dirty="0"/>
+                    </a:p>
+                    <a:p>
+                      <a:r>
+                        <a:rPr lang="en-CA" dirty="0"/>
+                        <a:t>-</a:t>
+                      </a:r>
+                      <a:r>
+                        <a:rPr lang="en-CA" dirty="0" err="1"/>
+                        <a:t>Fonctionne</a:t>
+                      </a:r>
+                      <a:r>
+                        <a:rPr lang="en-CA" dirty="0"/>
+                        <a:t> </a:t>
+                      </a:r>
+                      <a:r>
+                        <a:rPr lang="en-CA" dirty="0" err="1"/>
+                        <a:t>dans</a:t>
+                      </a:r>
+                      <a:r>
+                        <a:rPr lang="en-CA" dirty="0"/>
+                        <a:t> les temperatures du Québec</a:t>
+                      </a:r>
+                    </a:p>
+                    <a:p>
+                      <a:r>
+                        <a:rPr lang="en-CA" dirty="0"/>
+                        <a:t>-Sortie </a:t>
+                      </a:r>
+                      <a:r>
+                        <a:rPr lang="en-CA" dirty="0" err="1"/>
+                        <a:t>analogique</a:t>
+                      </a:r>
+                      <a:r>
+                        <a:rPr lang="en-CA" dirty="0"/>
+                        <a:t> avec </a:t>
+                      </a:r>
+                      <a:r>
+                        <a:rPr lang="en-CA" dirty="0" err="1"/>
+                        <a:t>pont</a:t>
+                      </a:r>
+                      <a:r>
+                        <a:rPr lang="en-CA" dirty="0"/>
+                        <a:t> de </a:t>
+                      </a:r>
+                      <a:r>
+                        <a:rPr lang="en-CA" dirty="0" err="1"/>
+                        <a:t>wheatstone</a:t>
+                      </a:r>
+                      <a:r>
+                        <a:rPr lang="en-CA" dirty="0"/>
+                        <a:t> (4 ports </a:t>
+                      </a:r>
+                      <a:r>
+                        <a:rPr lang="en-CA" dirty="0" err="1"/>
+                        <a:t>nécessaires</a:t>
+                      </a:r>
+                      <a:r>
+                        <a:rPr lang="en-CA" dirty="0"/>
+                        <a:t>)</a:t>
+                      </a:r>
+                    </a:p>
+                  </a:txBody>
+                  <a:tcPr/>
+                </a:tc>
+                <a:extLst>
+                  <a:ext uri="{0D108BD9-81ED-4DB2-BD59-A6C34878D82A}">
+                    <a16:rowId xmlns:a16="http://schemas.microsoft.com/office/drawing/2014/main" val="3165022307"/>
+                  </a:ext>
+                </a:extLst>
+              </a:tr>
+              <a:tr h="549604">
+                <a:tc>
+                  <a:txBody>
+                    <a:bodyPr/>
+                    <a:lstStyle/>
+                    <a:p>
+                      <a:r>
+                        <a:rPr lang="en-CA" dirty="0"/>
+                        <a:t>Position </a:t>
+                      </a:r>
+                      <a:r>
+                        <a:rPr lang="en-CA" b="0" dirty="0"/>
+                        <a:t>(</a:t>
+                      </a:r>
+                      <a:r>
+                        <a:rPr lang="en-CA" sz="1800" b="0" i="0" kern="1200" dirty="0">
+                          <a:solidFill>
+                            <a:schemeClr val="dk1"/>
+                          </a:solidFill>
+                          <a:effectLst/>
+                          <a:latin typeface="+mn-lt"/>
+                          <a:ea typeface="+mn-ea"/>
+                          <a:cs typeface="+mn-cs"/>
+                        </a:rPr>
+                        <a:t>RB-Fee-67</a:t>
+                      </a:r>
+                      <a:r>
+                        <a:rPr lang="en-CA" b="0" dirty="0"/>
+                        <a:t>)</a:t>
+                      </a:r>
+                    </a:p>
+                  </a:txBody>
+                  <a:tcPr/>
+                </a:tc>
+                <a:tc>
+                  <a:txBody>
+                    <a:bodyPr/>
+                    <a:lstStyle/>
+                    <a:p>
+                      <a:r>
+                        <a:rPr lang="en-CA" dirty="0"/>
+                        <a:t>-Communique via UART </a:t>
+                      </a:r>
+                    </a:p>
+                    <a:p>
+                      <a:r>
+                        <a:rPr lang="en-CA" dirty="0"/>
+                        <a:t>-Alimentation entre 2.75 et 3.6V</a:t>
+                      </a:r>
+                    </a:p>
+                  </a:txBody>
+                  <a:tcPr/>
+                </a:tc>
+                <a:extLst>
+                  <a:ext uri="{0D108BD9-81ED-4DB2-BD59-A6C34878D82A}">
+                    <a16:rowId xmlns:a16="http://schemas.microsoft.com/office/drawing/2014/main" val="1334639137"/>
+                  </a:ext>
+                </a:extLst>
+              </a:tr>
+            </a:tbl>
+          </a:graphicData>
+        </a:graphic>
+      </p:graphicFrame>
+    </p:spTree>
+    <p:extLst>
+      <p:ext uri="{BB962C8B-B14F-4D97-AF65-F5344CB8AC3E}">
+        <p14:creationId xmlns:p14="http://schemas.microsoft.com/office/powerpoint/2010/main" val="1776989636"/>
+      </p:ext>
+    </p:extLst>
+  </p:cSld>
+  <p:clrMapOvr>
+    <a:masterClrMapping/>
+  </p:clrMapOvr>
+</p:sld>
+</file>
+
 <file path=ppt/slides/slide8.xml><?xml version="1.0" encoding="utf-8"?>
 <p:sld xmlns:a="http://schemas.openxmlformats.org/drawingml/2006/main" xmlns:r="http://schemas.openxmlformats.org/officeDocument/2006/relationships" xmlns:p="http://schemas.openxmlformats.org/presentationml/2006/main">
   <p:cSld>
@@ -7744,7 +8706,7 @@
           <p:cNvPr id="2" name="Title 1">
             <a:extLst>
               <a:ext uri="{FF2B5EF4-FFF2-40B4-BE49-F238E27FC236}">
-                <a16:creationId xmlns:a16="http://schemas.microsoft.com/office/drawing/2014/main" id="{047326C3-7A2A-44FE-8485-1E7D1EB18A52}"/>
+                <a16:creationId xmlns:a16="http://schemas.microsoft.com/office/drawing/2014/main" id="{57AE6C2F-E93C-4A13-BFBF-2291D335938B}"/>
               </a:ext>
             </a:extLst>
           </p:cNvPr>
@@ -7755,24 +8717,34 @@
             <p:ph type="title"/>
           </p:nvPr>
         </p:nvSpPr>
-        <p:spPr/>
+        <p:spPr>
+          <a:xfrm>
+            <a:off x="1484309" y="0"/>
+            <a:ext cx="10018713" cy="1752599"/>
+          </a:xfrm>
+        </p:spPr>
         <p:txBody>
           <a:bodyPr/>
           <a:lstStyle/>
           <a:p>
             <a:r>
               <a:rPr lang="en-CA" dirty="0"/>
-              <a:t>Prototype/prevue de concept de S6</a:t>
-            </a:r>
-          </a:p>
-        </p:txBody>
-      </p:sp>
-      <p:sp>
-        <p:nvSpPr>
-          <p:cNvPr id="3" name="Content Placeholder 2">
+              <a:t>Architecture </a:t>
+            </a:r>
+            <a:r>
+              <a:rPr lang="en-CA" dirty="0" err="1"/>
+              <a:t>globale</a:t>
+            </a:r>
+            <a:endParaRPr lang="en-CA" dirty="0"/>
+          </a:p>
+        </p:txBody>
+      </p:sp>
+      <p:sp>
+        <p:nvSpPr>
+          <p:cNvPr id="4" name="Content Placeholder 2">
             <a:extLst>
               <a:ext uri="{FF2B5EF4-FFF2-40B4-BE49-F238E27FC236}">
-                <a16:creationId xmlns:a16="http://schemas.microsoft.com/office/drawing/2014/main" id="{D2F1472F-27BE-426C-A2BA-76BA5073940E}"/>
+                <a16:creationId xmlns:a16="http://schemas.microsoft.com/office/drawing/2014/main" id="{0B4A7325-9DB0-46E8-89B3-80B528F4E836}"/>
               </a:ext>
             </a:extLst>
           </p:cNvPr>
@@ -7783,120 +8755,71 @@
             <p:ph idx="1"/>
           </p:nvPr>
         </p:nvSpPr>
-        <p:spPr/>
+        <p:spPr>
+          <a:xfrm>
+            <a:off x="1484308" y="1559168"/>
+            <a:ext cx="10018713" cy="3628294"/>
+          </a:xfrm>
+        </p:spPr>
         <p:txBody>
           <a:bodyPr/>
           <a:lstStyle/>
           <a:p>
+            <a:r>
+              <a:rPr lang="fr-CA" dirty="0"/>
+              <a:t>Ruche alimentée par une batterie, donc gestion de l’énergie importante</a:t>
+            </a:r>
+          </a:p>
+          <a:p>
+            <a:r>
+              <a:rPr lang="fr-CA" dirty="0"/>
+              <a:t>Batterie à 3.6V et 3000 mAh</a:t>
+            </a:r>
+          </a:p>
+          <a:p>
+            <a:r>
+              <a:rPr lang="fr-CA" dirty="0"/>
+              <a:t>Puissance requise d’opération:  </a:t>
+            </a:r>
+          </a:p>
+          <a:p>
             <a:pPr marL="0" indent="0">
               <a:buNone/>
             </a:pPr>
             <a:r>
-              <a:rPr lang="en-CA" dirty="0"/>
-              <a:t>Limitations du prototype</a:t>
-            </a:r>
-          </a:p>
-          <a:p>
-            <a:r>
-              <a:rPr lang="en-CA" dirty="0"/>
-              <a:t>Source </a:t>
-            </a:r>
-            <a:r>
-              <a:rPr lang="en-CA" dirty="0" err="1"/>
-              <a:t>d’alimentation</a:t>
-            </a:r>
-            <a:endParaRPr lang="en-CA" dirty="0"/>
-          </a:p>
-          <a:p>
-            <a:r>
-              <a:rPr lang="en-CA" dirty="0"/>
-              <a:t>Tests sur insects </a:t>
-            </a:r>
-            <a:r>
-              <a:rPr lang="en-CA" dirty="0" err="1"/>
-              <a:t>vivants</a:t>
-            </a:r>
-            <a:endParaRPr lang="en-CA" dirty="0"/>
-          </a:p>
-          <a:p>
-            <a:r>
-              <a:rPr lang="en-CA" dirty="0" err="1"/>
-              <a:t>Indicateurs</a:t>
-            </a:r>
-            <a:r>
-              <a:rPr lang="en-CA" dirty="0"/>
-              <a:t> </a:t>
-            </a:r>
-            <a:r>
-              <a:rPr lang="en-CA" dirty="0" err="1"/>
-              <a:t>chimiques</a:t>
-            </a:r>
-            <a:endParaRPr lang="en-CA" dirty="0"/>
-          </a:p>
-          <a:p>
-            <a:r>
-              <a:rPr lang="en-CA" dirty="0" err="1"/>
-              <a:t>Réseautage</a:t>
-            </a:r>
-            <a:r>
-              <a:rPr lang="en-CA" dirty="0"/>
-              <a:t> de </a:t>
-            </a:r>
-            <a:r>
-              <a:rPr lang="en-CA" dirty="0" err="1"/>
-              <a:t>ruche</a:t>
-            </a:r>
-            <a:r>
-              <a:rPr lang="en-CA" dirty="0"/>
-              <a:t> à </a:t>
-            </a:r>
-            <a:r>
-              <a:rPr lang="en-CA" dirty="0" err="1"/>
-              <a:t>ruche</a:t>
-            </a:r>
-            <a:endParaRPr lang="en-CA" dirty="0"/>
-          </a:p>
-          <a:p>
-            <a:r>
-              <a:rPr lang="en-CA" dirty="0"/>
-              <a:t>Interface </a:t>
-            </a:r>
-            <a:r>
-              <a:rPr lang="en-CA" dirty="0" err="1"/>
-              <a:t>avancée</a:t>
-            </a:r>
-            <a:r>
-              <a:rPr lang="en-CA" dirty="0"/>
-              <a:t> et gestion de </a:t>
-            </a:r>
-            <a:r>
-              <a:rPr lang="en-CA" dirty="0" err="1"/>
-              <a:t>ruches</a:t>
-            </a:r>
-            <a:r>
-              <a:rPr lang="en-CA" dirty="0"/>
-              <a:t> à </a:t>
-            </a:r>
-            <a:r>
-              <a:rPr lang="en-CA" dirty="0" err="1"/>
-              <a:t>grande</a:t>
-            </a:r>
-            <a:r>
-              <a:rPr lang="en-CA" dirty="0"/>
-              <a:t> </a:t>
-            </a:r>
-            <a:r>
-              <a:rPr lang="en-CA" dirty="0" err="1"/>
-              <a:t>échelle</a:t>
-            </a:r>
-            <a:endParaRPr lang="en-CA" dirty="0"/>
+              <a:rPr lang="fr-CA" dirty="0"/>
+              <a:t> 				Temp + </a:t>
+            </a:r>
+            <a:r>
+              <a:rPr lang="fr-CA" dirty="0" err="1"/>
+              <a:t>L.Cell</a:t>
+            </a:r>
+            <a:r>
+              <a:rPr lang="fr-CA" dirty="0"/>
+              <a:t> + GPS + Micro. = Total</a:t>
+            </a:r>
+          </a:p>
+          <a:p>
+            <a:pPr marL="0" indent="0">
+              <a:buNone/>
+            </a:pPr>
+            <a:r>
+              <a:rPr lang="fr-CA" dirty="0"/>
+              <a:t>				0.2mW + 12mW + 12mW + 68.4mW = 92.6mW ≈ 100mW</a:t>
+            </a:r>
+          </a:p>
+          <a:p>
+            <a:r>
+              <a:rPr lang="fr-CA" dirty="0"/>
+              <a:t>Donc avec une seule batterie, le microcontrôleur peut rester actif à pleine capacité pendant environ 115 heures.</a:t>
+            </a:r>
           </a:p>
         </p:txBody>
       </p:sp>
     </p:spTree>
     <p:extLst>
       <p:ext uri="{BB962C8B-B14F-4D97-AF65-F5344CB8AC3E}">
-        <p14:creationId xmlns:p14="http://schemas.microsoft.com/office/powerpoint/2010/main" val="967102364"/>
+        <p14:creationId xmlns:p14="http://schemas.microsoft.com/office/powerpoint/2010/main" val="1915502978"/>
       </p:ext>
     </p:extLst>
   </p:cSld>
@@ -7928,7 +8851,7 @@
           <p:cNvPr id="2" name="Title 1">
             <a:extLst>
               <a:ext uri="{FF2B5EF4-FFF2-40B4-BE49-F238E27FC236}">
-                <a16:creationId xmlns:a16="http://schemas.microsoft.com/office/drawing/2014/main" id="{4E803E53-33F4-4918-9D2A-3756F2D666B5}"/>
+                <a16:creationId xmlns:a16="http://schemas.microsoft.com/office/drawing/2014/main" id="{9381268A-48C6-4A90-B60F-BAEE9120674D}"/>
               </a:ext>
             </a:extLst>
           </p:cNvPr>
@@ -7946,17 +8869,20 @@
           <a:p>
             <a:r>
               <a:rPr lang="en-CA" dirty="0" err="1"/>
-              <a:t>Outils</a:t>
+              <a:t>Requis</a:t>
             </a:r>
             <a:r>
               <a:rPr lang="en-CA" dirty="0"/>
-              <a:t> de </a:t>
+              <a:t> au </a:t>
             </a:r>
             <a:r>
               <a:rPr lang="en-CA" dirty="0" err="1"/>
-              <a:t>gestion</a:t>
-            </a:r>
-            <a:endParaRPr lang="en-CA" dirty="0"/>
+              <a:t>niveau</a:t>
+            </a:r>
+            <a:r>
+              <a:rPr lang="en-CA" dirty="0"/>
+              <a:t> RF</a:t>
+            </a:r>
           </a:p>
         </p:txBody>
       </p:sp>
@@ -7965,7 +8891,7 @@
           <p:cNvPr id="3" name="Content Placeholder 2">
             <a:extLst>
               <a:ext uri="{FF2B5EF4-FFF2-40B4-BE49-F238E27FC236}">
-                <a16:creationId xmlns:a16="http://schemas.microsoft.com/office/drawing/2014/main" id="{60344793-CA0C-4409-81BA-47C205B02C33}"/>
+                <a16:creationId xmlns:a16="http://schemas.microsoft.com/office/drawing/2014/main" id="{17427B92-1811-464E-801C-5EE29A5B8D36}"/>
               </a:ext>
             </a:extLst>
           </p:cNvPr>
@@ -7981,14 +8907,14 @@
           <a:bodyPr/>
           <a:lstStyle/>
           <a:p>
-            <a:endParaRPr lang="en-CA" dirty="0"/>
+            <a:endParaRPr lang="en-CA"/>
           </a:p>
         </p:txBody>
       </p:sp>
     </p:spTree>
     <p:extLst>
       <p:ext uri="{BB962C8B-B14F-4D97-AF65-F5344CB8AC3E}">
-        <p14:creationId xmlns:p14="http://schemas.microsoft.com/office/powerpoint/2010/main" val="3593040669"/>
+        <p14:creationId xmlns:p14="http://schemas.microsoft.com/office/powerpoint/2010/main" val="464286854"/>
       </p:ext>
     </p:extLst>
   </p:cSld>

</xml_diff>

<commit_message>
Ajout distance de communication
</commit_message>
<xml_diff>
--- a/Dossier de Conception.pptx
+++ b/Dossier de Conception.pptx
@@ -10,10 +10,11 @@
     <p:sldId id="258" r:id="rId4"/>
     <p:sldId id="259" r:id="rId5"/>
     <p:sldId id="260" r:id="rId6"/>
-    <p:sldId id="263" r:id="rId7"/>
-    <p:sldId id="261" r:id="rId8"/>
-    <p:sldId id="264" r:id="rId9"/>
-    <p:sldId id="262" r:id="rId10"/>
+    <p:sldId id="265" r:id="rId7"/>
+    <p:sldId id="263" r:id="rId8"/>
+    <p:sldId id="261" r:id="rId9"/>
+    <p:sldId id="264" r:id="rId10"/>
+    <p:sldId id="262" r:id="rId11"/>
   </p:sldIdLst>
   <p:sldSz cx="12192000" cy="6858000"/>
   <p:notesSz cx="6858000" cy="9144000"/>
@@ -622,7 +623,7 @@
           <a:p>
             <a:fld id="{F81637C0-94AD-483C-A163-E4595C514589}" type="datetimeFigureOut">
               <a:rPr lang="en-CA" smtClean="0"/>
-              <a:t>19/09/2018</a:t>
+              <a:t>2018-09-19</a:t>
             </a:fld>
             <a:endParaRPr lang="en-CA"/>
           </a:p>
@@ -669,7 +670,7 @@
           <a:p>
             <a:fld id="{5651D7FC-DF07-4DDA-A65D-263378C9ADA7}" type="slidenum">
               <a:rPr lang="en-CA" smtClean="0"/>
-              <a:t>‹#›</a:t>
+              <a:t>‹N°›</a:t>
             </a:fld>
             <a:endParaRPr lang="en-CA"/>
           </a:p>
@@ -923,7 +924,7 @@
           <a:p>
             <a:fld id="{F81637C0-94AD-483C-A163-E4595C514589}" type="datetimeFigureOut">
               <a:rPr lang="en-CA" smtClean="0"/>
-              <a:t>19/09/2018</a:t>
+              <a:t>2018-09-19</a:t>
             </a:fld>
             <a:endParaRPr lang="en-CA"/>
           </a:p>
@@ -965,7 +966,7 @@
           <a:p>
             <a:fld id="{5651D7FC-DF07-4DDA-A65D-263378C9ADA7}" type="slidenum">
               <a:rPr lang="en-CA" smtClean="0"/>
-              <a:t>‹#›</a:t>
+              <a:t>‹N°›</a:t>
             </a:fld>
             <a:endParaRPr lang="en-CA"/>
           </a:p>
@@ -1171,7 +1172,7 @@
           <a:p>
             <a:fld id="{F81637C0-94AD-483C-A163-E4595C514589}" type="datetimeFigureOut">
               <a:rPr lang="en-CA" smtClean="0"/>
-              <a:t>19/09/2018</a:t>
+              <a:t>2018-09-19</a:t>
             </a:fld>
             <a:endParaRPr lang="en-CA"/>
           </a:p>
@@ -1213,7 +1214,7 @@
           <a:p>
             <a:fld id="{5651D7FC-DF07-4DDA-A65D-263378C9ADA7}" type="slidenum">
               <a:rPr lang="en-CA" smtClean="0"/>
-              <a:t>‹#›</a:t>
+              <a:t>‹N°›</a:t>
             </a:fld>
             <a:endParaRPr lang="en-CA"/>
           </a:p>
@@ -1711,7 +1712,7 @@
           <a:p>
             <a:fld id="{F81637C0-94AD-483C-A163-E4595C514589}" type="datetimeFigureOut">
               <a:rPr lang="en-CA" smtClean="0"/>
-              <a:t>19/09/2018</a:t>
+              <a:t>2018-09-19</a:t>
             </a:fld>
             <a:endParaRPr lang="en-CA"/>
           </a:p>
@@ -1753,7 +1754,7 @@
           <a:p>
             <a:fld id="{5651D7FC-DF07-4DDA-A65D-263378C9ADA7}" type="slidenum">
               <a:rPr lang="en-CA" smtClean="0"/>
-              <a:t>‹#›</a:t>
+              <a:t>‹N°›</a:t>
             </a:fld>
             <a:endParaRPr lang="en-CA"/>
           </a:p>
@@ -1959,7 +1960,7 @@
           <a:p>
             <a:fld id="{F81637C0-94AD-483C-A163-E4595C514589}" type="datetimeFigureOut">
               <a:rPr lang="en-CA" smtClean="0"/>
-              <a:t>19/09/2018</a:t>
+              <a:t>2018-09-19</a:t>
             </a:fld>
             <a:endParaRPr lang="en-CA"/>
           </a:p>
@@ -2001,7 +2002,7 @@
           <a:p>
             <a:fld id="{5651D7FC-DF07-4DDA-A65D-263378C9ADA7}" type="slidenum">
               <a:rPr lang="en-CA" smtClean="0"/>
-              <a:t>‹#›</a:t>
+              <a:t>‹N°›</a:t>
             </a:fld>
             <a:endParaRPr lang="en-CA"/>
           </a:p>
@@ -2491,7 +2492,7 @@
           <a:p>
             <a:fld id="{F81637C0-94AD-483C-A163-E4595C514589}" type="datetimeFigureOut">
               <a:rPr lang="en-CA" smtClean="0"/>
-              <a:t>19/09/2018</a:t>
+              <a:t>2018-09-19</a:t>
             </a:fld>
             <a:endParaRPr lang="en-CA"/>
           </a:p>
@@ -2533,7 +2534,7 @@
           <a:p>
             <a:fld id="{5651D7FC-DF07-4DDA-A65D-263378C9ADA7}" type="slidenum">
               <a:rPr lang="en-CA" smtClean="0"/>
-              <a:t>‹#›</a:t>
+              <a:t>‹N°›</a:t>
             </a:fld>
             <a:endParaRPr lang="en-CA"/>
           </a:p>
@@ -2788,7 +2789,7 @@
           <a:p>
             <a:fld id="{F81637C0-94AD-483C-A163-E4595C514589}" type="datetimeFigureOut">
               <a:rPr lang="en-CA" smtClean="0"/>
-              <a:t>19/09/2018</a:t>
+              <a:t>2018-09-19</a:t>
             </a:fld>
             <a:endParaRPr lang="en-CA"/>
           </a:p>
@@ -2830,7 +2831,7 @@
           <a:p>
             <a:fld id="{5651D7FC-DF07-4DDA-A65D-263378C9ADA7}" type="slidenum">
               <a:rPr lang="en-CA" smtClean="0"/>
-              <a:t>‹#›</a:t>
+              <a:t>‹N°›</a:t>
             </a:fld>
             <a:endParaRPr lang="en-CA"/>
           </a:p>
@@ -2962,7 +2963,7 @@
           <a:p>
             <a:fld id="{F81637C0-94AD-483C-A163-E4595C514589}" type="datetimeFigureOut">
               <a:rPr lang="en-CA" smtClean="0"/>
-              <a:t>19/09/2018</a:t>
+              <a:t>2018-09-19</a:t>
             </a:fld>
             <a:endParaRPr lang="en-CA"/>
           </a:p>
@@ -3004,7 +3005,7 @@
           <a:p>
             <a:fld id="{5651D7FC-DF07-4DDA-A65D-263378C9ADA7}" type="slidenum">
               <a:rPr lang="en-CA" smtClean="0"/>
-              <a:t>‹#›</a:t>
+              <a:t>‹N°›</a:t>
             </a:fld>
             <a:endParaRPr lang="en-CA"/>
           </a:p>
@@ -3142,7 +3143,7 @@
           <a:p>
             <a:fld id="{F81637C0-94AD-483C-A163-E4595C514589}" type="datetimeFigureOut">
               <a:rPr lang="en-CA" smtClean="0"/>
-              <a:t>19/09/2018</a:t>
+              <a:t>2018-09-19</a:t>
             </a:fld>
             <a:endParaRPr lang="en-CA"/>
           </a:p>
@@ -3184,7 +3185,7 @@
           <a:p>
             <a:fld id="{5651D7FC-DF07-4DDA-A65D-263378C9ADA7}" type="slidenum">
               <a:rPr lang="en-CA" smtClean="0"/>
-              <a:t>‹#›</a:t>
+              <a:t>‹N°›</a:t>
             </a:fld>
             <a:endParaRPr lang="en-CA"/>
           </a:p>
@@ -3358,7 +3359,7 @@
           <a:p>
             <a:fld id="{F81637C0-94AD-483C-A163-E4595C514589}" type="datetimeFigureOut">
               <a:rPr lang="en-CA" smtClean="0"/>
-              <a:t>19/09/2018</a:t>
+              <a:t>2018-09-19</a:t>
             </a:fld>
             <a:endParaRPr lang="en-CA"/>
           </a:p>
@@ -3405,7 +3406,7 @@
           <a:p>
             <a:fld id="{5651D7FC-DF07-4DDA-A65D-263378C9ADA7}" type="slidenum">
               <a:rPr lang="en-CA" smtClean="0"/>
-              <a:t>‹#›</a:t>
+              <a:t>‹N°›</a:t>
             </a:fld>
             <a:endParaRPr lang="en-CA"/>
           </a:p>
@@ -3609,7 +3610,7 @@
           <a:p>
             <a:fld id="{F81637C0-94AD-483C-A163-E4595C514589}" type="datetimeFigureOut">
               <a:rPr lang="en-CA" smtClean="0"/>
-              <a:t>19/09/2018</a:t>
+              <a:t>2018-09-19</a:t>
             </a:fld>
             <a:endParaRPr lang="en-CA"/>
           </a:p>
@@ -3651,7 +3652,7 @@
           <a:p>
             <a:fld id="{5651D7FC-DF07-4DDA-A65D-263378C9ADA7}" type="slidenum">
               <a:rPr lang="en-CA" smtClean="0"/>
-              <a:t>‹#›</a:t>
+              <a:t>‹N°›</a:t>
             </a:fld>
             <a:endParaRPr lang="en-CA"/>
           </a:p>
@@ -3961,7 +3962,7 @@
           <a:p>
             <a:fld id="{F81637C0-94AD-483C-A163-E4595C514589}" type="datetimeFigureOut">
               <a:rPr lang="en-CA" smtClean="0"/>
-              <a:t>19/09/2018</a:t>
+              <a:t>2018-09-19</a:t>
             </a:fld>
             <a:endParaRPr lang="en-CA"/>
           </a:p>
@@ -4003,7 +4004,7 @@
           <a:p>
             <a:fld id="{5651D7FC-DF07-4DDA-A65D-263378C9ADA7}" type="slidenum">
               <a:rPr lang="en-CA" smtClean="0"/>
-              <a:t>‹#›</a:t>
+              <a:t>‹N°›</a:t>
             </a:fld>
             <a:endParaRPr lang="en-CA"/>
           </a:p>
@@ -4453,7 +4454,7 @@
           <a:p>
             <a:fld id="{F81637C0-94AD-483C-A163-E4595C514589}" type="datetimeFigureOut">
               <a:rPr lang="en-CA" smtClean="0"/>
-              <a:t>19/09/2018</a:t>
+              <a:t>2018-09-19</a:t>
             </a:fld>
             <a:endParaRPr lang="en-CA"/>
           </a:p>
@@ -4495,7 +4496,7 @@
           <a:p>
             <a:fld id="{5651D7FC-DF07-4DDA-A65D-263378C9ADA7}" type="slidenum">
               <a:rPr lang="en-CA" smtClean="0"/>
-              <a:t>‹#›</a:t>
+              <a:t>‹N°›</a:t>
             </a:fld>
             <a:endParaRPr lang="en-CA"/>
           </a:p>
@@ -4571,7 +4572,7 @@
           <a:p>
             <a:fld id="{F81637C0-94AD-483C-A163-E4595C514589}" type="datetimeFigureOut">
               <a:rPr lang="en-CA" smtClean="0"/>
-              <a:t>19/09/2018</a:t>
+              <a:t>2018-09-19</a:t>
             </a:fld>
             <a:endParaRPr lang="en-CA"/>
           </a:p>
@@ -4613,7 +4614,7 @@
           <a:p>
             <a:fld id="{5651D7FC-DF07-4DDA-A65D-263378C9ADA7}" type="slidenum">
               <a:rPr lang="en-CA" smtClean="0"/>
-              <a:t>‹#›</a:t>
+              <a:t>‹N°›</a:t>
             </a:fld>
             <a:endParaRPr lang="en-CA"/>
           </a:p>
@@ -4666,7 +4667,7 @@
           <a:p>
             <a:fld id="{F81637C0-94AD-483C-A163-E4595C514589}" type="datetimeFigureOut">
               <a:rPr lang="en-CA" smtClean="0"/>
-              <a:t>19/09/2018</a:t>
+              <a:t>2018-09-19</a:t>
             </a:fld>
             <a:endParaRPr lang="en-CA"/>
           </a:p>
@@ -4708,7 +4709,7 @@
           <a:p>
             <a:fld id="{5651D7FC-DF07-4DDA-A65D-263378C9ADA7}" type="slidenum">
               <a:rPr lang="en-CA" smtClean="0"/>
-              <a:t>‹#›</a:t>
+              <a:t>‹N°›</a:t>
             </a:fld>
             <a:endParaRPr lang="en-CA"/>
           </a:p>
@@ -4949,7 +4950,7 @@
           <a:p>
             <a:fld id="{F81637C0-94AD-483C-A163-E4595C514589}" type="datetimeFigureOut">
               <a:rPr lang="en-CA" smtClean="0"/>
-              <a:t>19/09/2018</a:t>
+              <a:t>2018-09-19</a:t>
             </a:fld>
             <a:endParaRPr lang="en-CA"/>
           </a:p>
@@ -4991,7 +4992,7 @@
           <a:p>
             <a:fld id="{5651D7FC-DF07-4DDA-A65D-263378C9ADA7}" type="slidenum">
               <a:rPr lang="en-CA" smtClean="0"/>
-              <a:t>‹#›</a:t>
+              <a:t>‹N°›</a:t>
             </a:fld>
             <a:endParaRPr lang="en-CA"/>
           </a:p>
@@ -5240,7 +5241,7 @@
           <a:p>
             <a:fld id="{F81637C0-94AD-483C-A163-E4595C514589}" type="datetimeFigureOut">
               <a:rPr lang="en-CA" smtClean="0"/>
-              <a:t>19/09/2018</a:t>
+              <a:t>2018-09-19</a:t>
             </a:fld>
             <a:endParaRPr lang="en-CA"/>
           </a:p>
@@ -5282,7 +5283,7 @@
           <a:p>
             <a:fld id="{5651D7FC-DF07-4DDA-A65D-263378C9ADA7}" type="slidenum">
               <a:rPr lang="en-CA" smtClean="0"/>
-              <a:t>‹#›</a:t>
+              <a:t>‹N°›</a:t>
             </a:fld>
             <a:endParaRPr lang="en-CA"/>
           </a:p>
@@ -5770,7 +5771,7 @@
           <a:p>
             <a:fld id="{F81637C0-94AD-483C-A163-E4595C514589}" type="datetimeFigureOut">
               <a:rPr lang="en-CA" smtClean="0"/>
-              <a:t>19/09/2018</a:t>
+              <a:t>2018-09-19</a:t>
             </a:fld>
             <a:endParaRPr lang="en-CA"/>
           </a:p>
@@ -5848,7 +5849,7 @@
           <a:p>
             <a:fld id="{5651D7FC-DF07-4DDA-A65D-263378C9ADA7}" type="slidenum">
               <a:rPr lang="en-CA" smtClean="0"/>
-              <a:t>‹#›</a:t>
+              <a:t>‹N°›</a:t>
             </a:fld>
             <a:endParaRPr lang="en-CA"/>
           </a:p>
@@ -6392,6 +6393,98 @@
 </p:sld>
 </file>
 
+<file path=ppt/slides/slide10.xml><?xml version="1.0" encoding="utf-8"?>
+<p:sld xmlns:a="http://schemas.openxmlformats.org/drawingml/2006/main" xmlns:r="http://schemas.openxmlformats.org/officeDocument/2006/relationships" xmlns:p="http://schemas.openxmlformats.org/presentationml/2006/main">
+  <p:cSld>
+    <p:spTree>
+      <p:nvGrpSpPr>
+        <p:cNvPr id="1" name=""/>
+        <p:cNvGrpSpPr/>
+        <p:nvPr/>
+      </p:nvGrpSpPr>
+      <p:grpSpPr>
+        <a:xfrm>
+          <a:off x="0" y="0"/>
+          <a:ext cx="0" cy="0"/>
+          <a:chOff x="0" y="0"/>
+          <a:chExt cx="0" cy="0"/>
+        </a:xfrm>
+      </p:grpSpPr>
+      <p:sp>
+        <p:nvSpPr>
+          <p:cNvPr id="2" name="Title 1">
+            <a:extLst>
+              <a:ext uri="{FF2B5EF4-FFF2-40B4-BE49-F238E27FC236}">
+                <a16:creationId xmlns:a16="http://schemas.microsoft.com/office/drawing/2014/main" id="{4E803E53-33F4-4918-9D2A-3756F2D666B5}"/>
+              </a:ext>
+            </a:extLst>
+          </p:cNvPr>
+          <p:cNvSpPr>
+            <a:spLocks noGrp="1"/>
+          </p:cNvSpPr>
+          <p:nvPr>
+            <p:ph type="title"/>
+          </p:nvPr>
+        </p:nvSpPr>
+        <p:spPr/>
+        <p:txBody>
+          <a:bodyPr/>
+          <a:lstStyle/>
+          <a:p>
+            <a:r>
+              <a:rPr lang="en-CA" dirty="0" err="1"/>
+              <a:t>Outils</a:t>
+            </a:r>
+            <a:r>
+              <a:rPr lang="en-CA" dirty="0"/>
+              <a:t> de </a:t>
+            </a:r>
+            <a:r>
+              <a:rPr lang="en-CA" dirty="0" err="1"/>
+              <a:t>gestion</a:t>
+            </a:r>
+            <a:endParaRPr lang="en-CA" dirty="0"/>
+          </a:p>
+        </p:txBody>
+      </p:sp>
+      <p:sp>
+        <p:nvSpPr>
+          <p:cNvPr id="3" name="Content Placeholder 2">
+            <a:extLst>
+              <a:ext uri="{FF2B5EF4-FFF2-40B4-BE49-F238E27FC236}">
+                <a16:creationId xmlns:a16="http://schemas.microsoft.com/office/drawing/2014/main" id="{60344793-CA0C-4409-81BA-47C205B02C33}"/>
+              </a:ext>
+            </a:extLst>
+          </p:cNvPr>
+          <p:cNvSpPr>
+            <a:spLocks noGrp="1"/>
+          </p:cNvSpPr>
+          <p:nvPr>
+            <p:ph idx="1"/>
+          </p:nvPr>
+        </p:nvSpPr>
+        <p:spPr/>
+        <p:txBody>
+          <a:bodyPr/>
+          <a:lstStyle/>
+          <a:p>
+            <a:endParaRPr lang="en-CA" dirty="0"/>
+          </a:p>
+        </p:txBody>
+      </p:sp>
+    </p:spTree>
+    <p:extLst>
+      <p:ext uri="{BB962C8B-B14F-4D97-AF65-F5344CB8AC3E}">
+        <p14:creationId xmlns:p14="http://schemas.microsoft.com/office/powerpoint/2010/main" val="3593040669"/>
+      </p:ext>
+    </p:extLst>
+  </p:cSld>
+  <p:clrMapOvr>
+    <a:masterClrMapping/>
+  </p:clrMapOvr>
+</p:sld>
+</file>
+
 <file path=ppt/slides/slide2.xml><?xml version="1.0" encoding="utf-8"?>
 <p:sld xmlns:a="http://schemas.openxmlformats.org/drawingml/2006/main" xmlns:r="http://schemas.openxmlformats.org/officeDocument/2006/relationships" xmlns:p="http://schemas.openxmlformats.org/presentationml/2006/main">
   <p:cSld>
@@ -6758,7 +6851,17 @@
           <a:bodyPr/>
           <a:lstStyle/>
           <a:p>
-            <a:endParaRPr lang="en-CA"/>
+            <a:r>
+              <a:rPr lang="fr-CA" dirty="0" smtClean="0"/>
+              <a:t>MAPAQ: minimum 15 mètres de distances avec les routes publiques</a:t>
+            </a:r>
+          </a:p>
+          <a:p>
+            <a:r>
+              <a:rPr lang="fr-CA" dirty="0" smtClean="0"/>
+              <a:t>2006 taille moyenne fermes canadiennes : 728 acres soit environ 3 km2 donc une distance environ de 1,7-3km</a:t>
+            </a:r>
+            <a:endParaRPr lang="fr-CA" dirty="0"/>
           </a:p>
         </p:txBody>
       </p:sp>
@@ -6797,6 +6900,167 @@
           <p:cNvPr id="2" name="Title 1">
             <a:extLst>
               <a:ext uri="{FF2B5EF4-FFF2-40B4-BE49-F238E27FC236}">
+                <a16:creationId xmlns:a16="http://schemas.microsoft.com/office/drawing/2014/main" id="{9381268A-48C6-4A90-B60F-BAEE9120674D}"/>
+              </a:ext>
+            </a:extLst>
+          </p:cNvPr>
+          <p:cNvSpPr>
+            <a:spLocks noGrp="1"/>
+          </p:cNvSpPr>
+          <p:nvPr>
+            <p:ph type="title"/>
+          </p:nvPr>
+        </p:nvSpPr>
+        <p:spPr/>
+        <p:txBody>
+          <a:bodyPr/>
+          <a:lstStyle/>
+          <a:p>
+            <a:r>
+              <a:rPr lang="en-CA" dirty="0" err="1"/>
+              <a:t>Requis</a:t>
+            </a:r>
+            <a:r>
+              <a:rPr lang="en-CA" dirty="0"/>
+              <a:t> au </a:t>
+            </a:r>
+            <a:r>
+              <a:rPr lang="en-CA" dirty="0" err="1"/>
+              <a:t>niveau</a:t>
+            </a:r>
+            <a:r>
+              <a:rPr lang="en-CA" dirty="0"/>
+              <a:t> RF</a:t>
+            </a:r>
+          </a:p>
+        </p:txBody>
+      </p:sp>
+      <p:sp>
+        <p:nvSpPr>
+          <p:cNvPr id="3" name="Content Placeholder 2">
+            <a:extLst>
+              <a:ext uri="{FF2B5EF4-FFF2-40B4-BE49-F238E27FC236}">
+                <a16:creationId xmlns:a16="http://schemas.microsoft.com/office/drawing/2014/main" id="{17427B92-1811-464E-801C-5EE29A5B8D36}"/>
+              </a:ext>
+            </a:extLst>
+          </p:cNvPr>
+          <p:cNvSpPr>
+            <a:spLocks noGrp="1"/>
+          </p:cNvSpPr>
+          <p:nvPr>
+            <p:ph idx="1"/>
+          </p:nvPr>
+        </p:nvSpPr>
+        <p:spPr/>
+        <p:txBody>
+          <a:bodyPr/>
+          <a:lstStyle/>
+          <a:p>
+            <a:r>
+              <a:rPr lang="en-CA" dirty="0" smtClean="0"/>
+              <a:t>Minimum 15m</a:t>
+            </a:r>
+          </a:p>
+          <a:p>
+            <a:r>
+              <a:rPr lang="en-CA" dirty="0" smtClean="0"/>
+              <a:t>2006 </a:t>
+            </a:r>
+            <a:r>
+              <a:rPr lang="en-CA" dirty="0" err="1" smtClean="0"/>
+              <a:t>taille</a:t>
+            </a:r>
+            <a:r>
+              <a:rPr lang="en-CA" dirty="0" smtClean="0"/>
+              <a:t> </a:t>
+            </a:r>
+            <a:r>
+              <a:rPr lang="en-CA" dirty="0" err="1" smtClean="0"/>
+              <a:t>moyenne</a:t>
+            </a:r>
+            <a:r>
+              <a:rPr lang="en-CA" dirty="0" smtClean="0"/>
+              <a:t> </a:t>
+            </a:r>
+            <a:r>
+              <a:rPr lang="en-CA" dirty="0" err="1" smtClean="0"/>
+              <a:t>fermes</a:t>
+            </a:r>
+            <a:r>
+              <a:rPr lang="en-CA" dirty="0" smtClean="0"/>
+              <a:t> </a:t>
+            </a:r>
+            <a:r>
+              <a:rPr lang="en-CA" dirty="0" err="1" smtClean="0"/>
+              <a:t>canadiennes</a:t>
+            </a:r>
+            <a:r>
+              <a:rPr lang="en-CA" dirty="0" smtClean="0"/>
+              <a:t> : 728 acres </a:t>
+            </a:r>
+            <a:r>
+              <a:rPr lang="en-CA" dirty="0" err="1" smtClean="0"/>
+              <a:t>soit</a:t>
+            </a:r>
+            <a:r>
+              <a:rPr lang="en-CA" dirty="0" smtClean="0"/>
+              <a:t> environ 3 km2 </a:t>
+            </a:r>
+            <a:r>
+              <a:rPr lang="en-CA" dirty="0" err="1" smtClean="0"/>
+              <a:t>donc</a:t>
+            </a:r>
+            <a:r>
+              <a:rPr lang="en-CA" dirty="0" smtClean="0"/>
+              <a:t> </a:t>
+            </a:r>
+            <a:r>
+              <a:rPr lang="en-CA" dirty="0" err="1" smtClean="0"/>
+              <a:t>une</a:t>
+            </a:r>
+            <a:r>
+              <a:rPr lang="en-CA" dirty="0" smtClean="0"/>
+              <a:t> distance environ de 1,7-3km</a:t>
+            </a:r>
+            <a:endParaRPr lang="en-CA" dirty="0"/>
+          </a:p>
+        </p:txBody>
+      </p:sp>
+    </p:spTree>
+    <p:extLst>
+      <p:ext uri="{BB962C8B-B14F-4D97-AF65-F5344CB8AC3E}">
+        <p14:creationId xmlns:p14="http://schemas.microsoft.com/office/powerpoint/2010/main" val="400948369"/>
+      </p:ext>
+    </p:extLst>
+  </p:cSld>
+  <p:clrMapOvr>
+    <a:masterClrMapping/>
+  </p:clrMapOvr>
+</p:sld>
+</file>
+
+<file path=ppt/slides/slide7.xml><?xml version="1.0" encoding="utf-8"?>
+<p:sld xmlns:a="http://schemas.openxmlformats.org/drawingml/2006/main" xmlns:r="http://schemas.openxmlformats.org/officeDocument/2006/relationships" xmlns:p="http://schemas.openxmlformats.org/presentationml/2006/main">
+  <p:cSld>
+    <p:spTree>
+      <p:nvGrpSpPr>
+        <p:cNvPr id="1" name=""/>
+        <p:cNvGrpSpPr/>
+        <p:nvPr/>
+      </p:nvGrpSpPr>
+      <p:grpSpPr>
+        <a:xfrm>
+          <a:off x="0" y="0"/>
+          <a:ext cx="0" cy="0"/>
+          <a:chOff x="0" y="0"/>
+          <a:chExt cx="0" cy="0"/>
+        </a:xfrm>
+      </p:grpSpPr>
+      <p:sp>
+        <p:nvSpPr>
+          <p:cNvPr id="2" name="Title 1">
+            <a:extLst>
+              <a:ext uri="{FF2B5EF4-FFF2-40B4-BE49-F238E27FC236}">
                 <a16:creationId xmlns:a16="http://schemas.microsoft.com/office/drawing/2014/main" id="{B5664C5A-D679-4FE0-8CD9-C5C2056C08CE}"/>
               </a:ext>
             </a:extLst>
@@ -7160,7 +7424,7 @@
           <p:nvPr/>
         </p:nvPicPr>
         <p:blipFill>
-          <a:blip r:embed="rId2">
+          <a:blip r:embed="rId2" cstate="hqprint">
             <a:extLst>
               <a:ext uri="{28A0092B-C50C-407E-A947-70E740481C1C}">
                 <a14:useLocalDpi xmlns:a14="http://schemas.microsoft.com/office/drawing/2010/main" val="0"/>
@@ -7382,7 +7646,7 @@
 </p:sld>
 </file>
 
-<file path=ppt/slides/slide7.xml><?xml version="1.0" encoding="utf-8"?>
+<file path=ppt/slides/slide8.xml><?xml version="1.0" encoding="utf-8"?>
 <p:sld xmlns:a="http://schemas.openxmlformats.org/drawingml/2006/main" xmlns:r="http://schemas.openxmlformats.org/officeDocument/2006/relationships" xmlns:p="http://schemas.openxmlformats.org/presentationml/2006/main">
   <p:cSld>
     <p:spTree>
@@ -7641,7 +7905,7 @@
           <p:nvPr/>
         </p:nvPicPr>
         <p:blipFill>
-          <a:blip r:embed="rId4">
+          <a:blip r:embed="rId4" cstate="hqprint">
             <a:extLst>
               <a:ext uri="{28A0092B-C50C-407E-A947-70E740481C1C}">
                 <a14:useLocalDpi xmlns:a14="http://schemas.microsoft.com/office/drawing/2010/main" val="0"/>
@@ -7722,190 +7986,6 @@
 </p:sld>
 </file>
 
-<file path=ppt/slides/slide8.xml><?xml version="1.0" encoding="utf-8"?>
-<p:sld xmlns:a="http://schemas.openxmlformats.org/drawingml/2006/main" xmlns:r="http://schemas.openxmlformats.org/officeDocument/2006/relationships" xmlns:p="http://schemas.openxmlformats.org/presentationml/2006/main">
-  <p:cSld>
-    <p:spTree>
-      <p:nvGrpSpPr>
-        <p:cNvPr id="1" name=""/>
-        <p:cNvGrpSpPr/>
-        <p:nvPr/>
-      </p:nvGrpSpPr>
-      <p:grpSpPr>
-        <a:xfrm>
-          <a:off x="0" y="0"/>
-          <a:ext cx="0" cy="0"/>
-          <a:chOff x="0" y="0"/>
-          <a:chExt cx="0" cy="0"/>
-        </a:xfrm>
-      </p:grpSpPr>
-      <p:sp>
-        <p:nvSpPr>
-          <p:cNvPr id="2" name="Title 1">
-            <a:extLst>
-              <a:ext uri="{FF2B5EF4-FFF2-40B4-BE49-F238E27FC236}">
-                <a16:creationId xmlns:a16="http://schemas.microsoft.com/office/drawing/2014/main" id="{047326C3-7A2A-44FE-8485-1E7D1EB18A52}"/>
-              </a:ext>
-            </a:extLst>
-          </p:cNvPr>
-          <p:cNvSpPr>
-            <a:spLocks noGrp="1"/>
-          </p:cNvSpPr>
-          <p:nvPr>
-            <p:ph type="title"/>
-          </p:nvPr>
-        </p:nvSpPr>
-        <p:spPr/>
-        <p:txBody>
-          <a:bodyPr/>
-          <a:lstStyle/>
-          <a:p>
-            <a:r>
-              <a:rPr lang="en-CA" dirty="0"/>
-              <a:t>Prototype/prevue de concept de S6</a:t>
-            </a:r>
-          </a:p>
-        </p:txBody>
-      </p:sp>
-      <p:sp>
-        <p:nvSpPr>
-          <p:cNvPr id="3" name="Content Placeholder 2">
-            <a:extLst>
-              <a:ext uri="{FF2B5EF4-FFF2-40B4-BE49-F238E27FC236}">
-                <a16:creationId xmlns:a16="http://schemas.microsoft.com/office/drawing/2014/main" id="{D2F1472F-27BE-426C-A2BA-76BA5073940E}"/>
-              </a:ext>
-            </a:extLst>
-          </p:cNvPr>
-          <p:cNvSpPr>
-            <a:spLocks noGrp="1"/>
-          </p:cNvSpPr>
-          <p:nvPr>
-            <p:ph idx="1"/>
-          </p:nvPr>
-        </p:nvSpPr>
-        <p:spPr/>
-        <p:txBody>
-          <a:bodyPr/>
-          <a:lstStyle/>
-          <a:p>
-            <a:pPr marL="0" indent="0">
-              <a:buNone/>
-            </a:pPr>
-            <a:r>
-              <a:rPr lang="en-CA" dirty="0"/>
-              <a:t>Limitations du prototype</a:t>
-            </a:r>
-          </a:p>
-          <a:p>
-            <a:r>
-              <a:rPr lang="en-CA" dirty="0"/>
-              <a:t>Source </a:t>
-            </a:r>
-            <a:r>
-              <a:rPr lang="en-CA" dirty="0" err="1"/>
-              <a:t>d’alimentation</a:t>
-            </a:r>
-            <a:endParaRPr lang="en-CA" dirty="0"/>
-          </a:p>
-          <a:p>
-            <a:r>
-              <a:rPr lang="en-CA" dirty="0"/>
-              <a:t>Tests sur insects </a:t>
-            </a:r>
-            <a:r>
-              <a:rPr lang="en-CA" dirty="0" err="1"/>
-              <a:t>vivants</a:t>
-            </a:r>
-            <a:endParaRPr lang="en-CA" dirty="0"/>
-          </a:p>
-          <a:p>
-            <a:r>
-              <a:rPr lang="en-CA" dirty="0" err="1"/>
-              <a:t>Indicateurs</a:t>
-            </a:r>
-            <a:r>
-              <a:rPr lang="en-CA" dirty="0"/>
-              <a:t> </a:t>
-            </a:r>
-            <a:r>
-              <a:rPr lang="en-CA" dirty="0" err="1"/>
-              <a:t>chimiques</a:t>
-            </a:r>
-            <a:endParaRPr lang="en-CA" dirty="0"/>
-          </a:p>
-          <a:p>
-            <a:r>
-              <a:rPr lang="en-CA" dirty="0" err="1"/>
-              <a:t>Réseautage</a:t>
-            </a:r>
-            <a:r>
-              <a:rPr lang="en-CA" dirty="0"/>
-              <a:t> de </a:t>
-            </a:r>
-            <a:r>
-              <a:rPr lang="en-CA" dirty="0" err="1"/>
-              <a:t>ruche</a:t>
-            </a:r>
-            <a:r>
-              <a:rPr lang="en-CA" dirty="0"/>
-              <a:t> à </a:t>
-            </a:r>
-            <a:r>
-              <a:rPr lang="en-CA" dirty="0" err="1"/>
-              <a:t>ruche</a:t>
-            </a:r>
-            <a:endParaRPr lang="en-CA" dirty="0"/>
-          </a:p>
-          <a:p>
-            <a:r>
-              <a:rPr lang="en-CA" dirty="0"/>
-              <a:t>Interface </a:t>
-            </a:r>
-            <a:r>
-              <a:rPr lang="en-CA" dirty="0" err="1"/>
-              <a:t>avancée</a:t>
-            </a:r>
-            <a:r>
-              <a:rPr lang="en-CA" dirty="0"/>
-              <a:t> et gestion de </a:t>
-            </a:r>
-            <a:r>
-              <a:rPr lang="en-CA" dirty="0" err="1"/>
-              <a:t>ruches</a:t>
-            </a:r>
-            <a:r>
-              <a:rPr lang="en-CA" dirty="0"/>
-              <a:t> à </a:t>
-            </a:r>
-            <a:r>
-              <a:rPr lang="en-CA" dirty="0" err="1"/>
-              <a:t>grande</a:t>
-            </a:r>
-            <a:r>
-              <a:rPr lang="en-CA" dirty="0"/>
-              <a:t> </a:t>
-            </a:r>
-            <a:r>
-              <a:rPr lang="en-CA" dirty="0" err="1"/>
-              <a:t>échelle</a:t>
-            </a:r>
-            <a:endParaRPr lang="en-CA" dirty="0"/>
-          </a:p>
-        </p:txBody>
-      </p:sp>
-    </p:spTree>
-    <p:extLst>
-      <p:ext uri="{BB962C8B-B14F-4D97-AF65-F5344CB8AC3E}">
-        <p14:creationId xmlns:p14="http://schemas.microsoft.com/office/powerpoint/2010/main" val="967102364"/>
-      </p:ext>
-    </p:extLst>
-  </p:cSld>
-  <p:clrMapOvr>
-    <a:masterClrMapping/>
-  </p:clrMapOvr>
-</p:sld>
-</file>
-
 <file path=ppt/slides/slide9.xml><?xml version="1.0" encoding="utf-8"?>
 <p:sld xmlns:a="http://schemas.openxmlformats.org/drawingml/2006/main" xmlns:r="http://schemas.openxmlformats.org/officeDocument/2006/relationships" xmlns:p="http://schemas.openxmlformats.org/presentationml/2006/main">
   <p:cSld>
@@ -7928,7 +8008,7 @@
           <p:cNvPr id="2" name="Title 1">
             <a:extLst>
               <a:ext uri="{FF2B5EF4-FFF2-40B4-BE49-F238E27FC236}">
-                <a16:creationId xmlns:a16="http://schemas.microsoft.com/office/drawing/2014/main" id="{4E803E53-33F4-4918-9D2A-3756F2D666B5}"/>
+                <a16:creationId xmlns:a16="http://schemas.microsoft.com/office/drawing/2014/main" id="{047326C3-7A2A-44FE-8485-1E7D1EB18A52}"/>
               </a:ext>
             </a:extLst>
           </p:cNvPr>
@@ -7945,18 +8025,9 @@
           <a:lstStyle/>
           <a:p>
             <a:r>
-              <a:rPr lang="en-CA" dirty="0" err="1"/>
-              <a:t>Outils</a:t>
-            </a:r>
-            <a:r>
               <a:rPr lang="en-CA" dirty="0"/>
-              <a:t> de </a:t>
-            </a:r>
-            <a:r>
-              <a:rPr lang="en-CA" dirty="0" err="1"/>
-              <a:t>gestion</a:t>
-            </a:r>
-            <a:endParaRPr lang="en-CA" dirty="0"/>
+              <a:t>Prototype/prevue de concept de S6</a:t>
+            </a:r>
           </a:p>
         </p:txBody>
       </p:sp>
@@ -7965,7 +8036,7 @@
           <p:cNvPr id="3" name="Content Placeholder 2">
             <a:extLst>
               <a:ext uri="{FF2B5EF4-FFF2-40B4-BE49-F238E27FC236}">
-                <a16:creationId xmlns:a16="http://schemas.microsoft.com/office/drawing/2014/main" id="{60344793-CA0C-4409-81BA-47C205B02C33}"/>
+                <a16:creationId xmlns:a16="http://schemas.microsoft.com/office/drawing/2014/main" id="{D2F1472F-27BE-426C-A2BA-76BA5073940E}"/>
               </a:ext>
             </a:extLst>
           </p:cNvPr>
@@ -7981,6 +8052,107 @@
           <a:bodyPr/>
           <a:lstStyle/>
           <a:p>
+            <a:pPr marL="0" indent="0">
+              <a:buNone/>
+            </a:pPr>
+            <a:r>
+              <a:rPr lang="en-CA" dirty="0"/>
+              <a:t>Limitations du prototype</a:t>
+            </a:r>
+          </a:p>
+          <a:p>
+            <a:r>
+              <a:rPr lang="en-CA" dirty="0"/>
+              <a:t>Source </a:t>
+            </a:r>
+            <a:r>
+              <a:rPr lang="en-CA" dirty="0" err="1"/>
+              <a:t>d’alimentation</a:t>
+            </a:r>
+            <a:endParaRPr lang="en-CA" dirty="0"/>
+          </a:p>
+          <a:p>
+            <a:r>
+              <a:rPr lang="en-CA" dirty="0"/>
+              <a:t>Tests sur insects </a:t>
+            </a:r>
+            <a:r>
+              <a:rPr lang="en-CA" dirty="0" err="1"/>
+              <a:t>vivants</a:t>
+            </a:r>
+            <a:endParaRPr lang="en-CA" dirty="0"/>
+          </a:p>
+          <a:p>
+            <a:r>
+              <a:rPr lang="en-CA" dirty="0" err="1"/>
+              <a:t>Indicateurs</a:t>
+            </a:r>
+            <a:r>
+              <a:rPr lang="en-CA" dirty="0"/>
+              <a:t> </a:t>
+            </a:r>
+            <a:r>
+              <a:rPr lang="en-CA" dirty="0" err="1"/>
+              <a:t>chimiques</a:t>
+            </a:r>
+            <a:endParaRPr lang="en-CA" dirty="0"/>
+          </a:p>
+          <a:p>
+            <a:r>
+              <a:rPr lang="en-CA" dirty="0" err="1"/>
+              <a:t>Réseautage</a:t>
+            </a:r>
+            <a:r>
+              <a:rPr lang="en-CA" dirty="0"/>
+              <a:t> de </a:t>
+            </a:r>
+            <a:r>
+              <a:rPr lang="en-CA" dirty="0" err="1"/>
+              <a:t>ruche</a:t>
+            </a:r>
+            <a:r>
+              <a:rPr lang="en-CA" dirty="0"/>
+              <a:t> à </a:t>
+            </a:r>
+            <a:r>
+              <a:rPr lang="en-CA" dirty="0" err="1"/>
+              <a:t>ruche</a:t>
+            </a:r>
+            <a:endParaRPr lang="en-CA" dirty="0"/>
+          </a:p>
+          <a:p>
+            <a:r>
+              <a:rPr lang="en-CA" dirty="0"/>
+              <a:t>Interface </a:t>
+            </a:r>
+            <a:r>
+              <a:rPr lang="en-CA" dirty="0" err="1"/>
+              <a:t>avancée</a:t>
+            </a:r>
+            <a:r>
+              <a:rPr lang="en-CA" dirty="0"/>
+              <a:t> et gestion de </a:t>
+            </a:r>
+            <a:r>
+              <a:rPr lang="en-CA" dirty="0" err="1"/>
+              <a:t>ruches</a:t>
+            </a:r>
+            <a:r>
+              <a:rPr lang="en-CA" dirty="0"/>
+              <a:t> à </a:t>
+            </a:r>
+            <a:r>
+              <a:rPr lang="en-CA" dirty="0" err="1"/>
+              <a:t>grande</a:t>
+            </a:r>
+            <a:r>
+              <a:rPr lang="en-CA" dirty="0"/>
+              <a:t> </a:t>
+            </a:r>
+            <a:r>
+              <a:rPr lang="en-CA" dirty="0" err="1"/>
+              <a:t>échelle</a:t>
+            </a:r>
             <a:endParaRPr lang="en-CA" dirty="0"/>
           </a:p>
         </p:txBody>
@@ -7988,7 +8160,7 @@
     </p:spTree>
     <p:extLst>
       <p:ext uri="{BB962C8B-B14F-4D97-AF65-F5344CB8AC3E}">
-        <p14:creationId xmlns:p14="http://schemas.microsoft.com/office/powerpoint/2010/main" val="3593040669"/>
+        <p14:creationId xmlns:p14="http://schemas.microsoft.com/office/powerpoint/2010/main" val="967102364"/>
       </p:ext>
     </p:extLst>
   </p:cSld>

</xml_diff>

<commit_message>
Ajout partie requis RF
</commit_message>
<xml_diff>
--- a/Dossier de Conception.pptx
+++ b/Dossier de Conception.pptx
@@ -8,13 +8,18 @@
     <p:sldId id="256" r:id="rId2"/>
     <p:sldId id="257" r:id="rId3"/>
     <p:sldId id="258" r:id="rId4"/>
-    <p:sldId id="259" r:id="rId5"/>
-    <p:sldId id="260" r:id="rId6"/>
-    <p:sldId id="265" r:id="rId7"/>
-    <p:sldId id="263" r:id="rId8"/>
-    <p:sldId id="261" r:id="rId9"/>
-    <p:sldId id="264" r:id="rId10"/>
-    <p:sldId id="262" r:id="rId11"/>
+    <p:sldId id="265" r:id="rId5"/>
+    <p:sldId id="266" r:id="rId6"/>
+    <p:sldId id="267" r:id="rId7"/>
+    <p:sldId id="268" r:id="rId8"/>
+    <p:sldId id="269" r:id="rId9"/>
+    <p:sldId id="270" r:id="rId10"/>
+    <p:sldId id="260" r:id="rId11"/>
+    <p:sldId id="271" r:id="rId12"/>
+    <p:sldId id="263" r:id="rId13"/>
+    <p:sldId id="261" r:id="rId14"/>
+    <p:sldId id="264" r:id="rId15"/>
+    <p:sldId id="262" r:id="rId16"/>
   </p:sldIdLst>
   <p:sldSz cx="12192000" cy="6858000"/>
   <p:notesSz cx="6858000" cy="9144000"/>
@@ -6415,7 +6420,7 @@
           <p:cNvPr id="2" name="Title 1">
             <a:extLst>
               <a:ext uri="{FF2B5EF4-FFF2-40B4-BE49-F238E27FC236}">
-                <a16:creationId xmlns:a16="http://schemas.microsoft.com/office/drawing/2014/main" id="{4E803E53-33F4-4918-9D2A-3756F2D666B5}"/>
+                <a16:creationId xmlns:a16="http://schemas.microsoft.com/office/drawing/2014/main" id="{9381268A-48C6-4A90-B60F-BAEE9120674D}"/>
               </a:ext>
             </a:extLst>
           </p:cNvPr>
@@ -6433,17 +6438,20 @@
           <a:p>
             <a:r>
               <a:rPr lang="en-CA" dirty="0" err="1"/>
-              <a:t>Outils</a:t>
+              <a:t>Requis</a:t>
             </a:r>
             <a:r>
               <a:rPr lang="en-CA" dirty="0"/>
-              <a:t> de </a:t>
+              <a:t> au </a:t>
             </a:r>
             <a:r>
               <a:rPr lang="en-CA" dirty="0" err="1"/>
-              <a:t>gestion</a:t>
-            </a:r>
-            <a:endParaRPr lang="en-CA" dirty="0"/>
+              <a:t>niveau</a:t>
+            </a:r>
+            <a:r>
+              <a:rPr lang="en-CA" dirty="0"/>
+              <a:t> RF</a:t>
+            </a:r>
           </a:p>
         </p:txBody>
       </p:sp>
@@ -6452,7 +6460,7 @@
           <p:cNvPr id="3" name="Content Placeholder 2">
             <a:extLst>
               <a:ext uri="{FF2B5EF4-FFF2-40B4-BE49-F238E27FC236}">
-                <a16:creationId xmlns:a16="http://schemas.microsoft.com/office/drawing/2014/main" id="{60344793-CA0C-4409-81BA-47C205B02C33}"/>
+                <a16:creationId xmlns:a16="http://schemas.microsoft.com/office/drawing/2014/main" id="{17427B92-1811-464E-801C-5EE29A5B8D36}"/>
               </a:ext>
             </a:extLst>
           </p:cNvPr>
@@ -6468,14 +6476,46 @@
           <a:bodyPr/>
           <a:lstStyle/>
           <a:p>
-            <a:endParaRPr lang="en-CA" dirty="0"/>
+            <a:r>
+              <a:rPr lang="fr-CA" dirty="0" smtClean="0"/>
+              <a:t>Demande de données à </a:t>
+            </a:r>
+            <a:r>
+              <a:rPr lang="fr-CA" dirty="0"/>
+              <a:t>chaque minutes</a:t>
+            </a:r>
+            <a:r>
+              <a:rPr lang="fr-CA" dirty="0" smtClean="0"/>
+              <a:t>: Température/</a:t>
+            </a:r>
+            <a:r>
+              <a:rPr lang="fr-CA" dirty="0" err="1" smtClean="0"/>
+              <a:t>poid</a:t>
+            </a:r>
+            <a:endParaRPr lang="fr-CA" dirty="0" smtClean="0"/>
+          </a:p>
+          <a:p>
+            <a:r>
+              <a:rPr lang="fr-CA" dirty="0" smtClean="0"/>
+              <a:t>Envoie des données GPS sur demande</a:t>
+            </a:r>
+          </a:p>
+          <a:p>
+            <a:r>
+              <a:rPr lang="fr-CA" dirty="0" smtClean="0"/>
+              <a:t>Bande de fréquence utilisée: 2.4GHz</a:t>
+            </a:r>
+            <a:endParaRPr lang="fr-CA" dirty="0" smtClean="0"/>
+          </a:p>
+          <a:p>
+            <a:endParaRPr lang="fr-CA" dirty="0"/>
           </a:p>
         </p:txBody>
       </p:sp>
     </p:spTree>
     <p:extLst>
       <p:ext uri="{BB962C8B-B14F-4D97-AF65-F5344CB8AC3E}">
-        <p14:creationId xmlns:p14="http://schemas.microsoft.com/office/powerpoint/2010/main" val="3593040669"/>
+        <p14:creationId xmlns:p14="http://schemas.microsoft.com/office/powerpoint/2010/main" val="464286854"/>
       </p:ext>
     </p:extLst>
   </p:cSld>
@@ -6485,7 +6525,7 @@
 </p:sld>
 </file>
 
-<file path=ppt/slides/slide2.xml><?xml version="1.0" encoding="utf-8"?>
+<file path=ppt/slides/slide11.xml><?xml version="1.0" encoding="utf-8"?>
 <p:sld xmlns:a="http://schemas.openxmlformats.org/drawingml/2006/main" xmlns:r="http://schemas.openxmlformats.org/officeDocument/2006/relationships" xmlns:p="http://schemas.openxmlformats.org/presentationml/2006/main">
   <p:cSld>
     <p:spTree>
@@ -6507,7 +6547,7 @@
           <p:cNvPr id="2" name="Title 1">
             <a:extLst>
               <a:ext uri="{FF2B5EF4-FFF2-40B4-BE49-F238E27FC236}">
-                <a16:creationId xmlns:a16="http://schemas.microsoft.com/office/drawing/2014/main" id="{95A4B020-4078-42AE-9D8B-DD88078B584A}"/>
+                <a16:creationId xmlns:a16="http://schemas.microsoft.com/office/drawing/2014/main" id="{9381268A-48C6-4A90-B60F-BAEE9120674D}"/>
               </a:ext>
             </a:extLst>
           </p:cNvPr>
@@ -6524,38 +6564,21 @@
           <a:lstStyle/>
           <a:p>
             <a:r>
+              <a:rPr lang="en-CA" dirty="0" err="1"/>
+              <a:t>Requis</a:t>
+            </a:r>
+            <a:r>
               <a:rPr lang="en-CA" dirty="0"/>
-              <a:t>Justification du </a:t>
+              <a:t> au </a:t>
             </a:r>
             <a:r>
               <a:rPr lang="en-CA" dirty="0" err="1"/>
-              <a:t>besoin</a:t>
+              <a:t>niveau</a:t>
             </a:r>
             <a:r>
               <a:rPr lang="en-CA" dirty="0"/>
-              <a:t>, </a:t>
-            </a:r>
-            <a:r>
-              <a:rPr lang="en-CA" dirty="0" err="1"/>
-              <a:t>contexte</a:t>
-            </a:r>
-            <a:r>
-              <a:rPr lang="en-CA" dirty="0"/>
-              <a:t> du </a:t>
-            </a:r>
-            <a:r>
-              <a:rPr lang="en-CA" dirty="0" err="1"/>
-              <a:t>projet</a:t>
-            </a:r>
-            <a:r>
-              <a:rPr lang="en-CA" dirty="0"/>
-              <a:t> et du </a:t>
-            </a:r>
-            <a:r>
-              <a:rPr lang="en-CA" dirty="0" err="1"/>
-              <a:t>marché</a:t>
-            </a:r>
-            <a:endParaRPr lang="en-CA" dirty="0"/>
+              <a:t> RF</a:t>
+            </a:r>
           </a:p>
         </p:txBody>
       </p:sp>
@@ -6564,7 +6587,7 @@
           <p:cNvPr id="3" name="Content Placeholder 2">
             <a:extLst>
               <a:ext uri="{FF2B5EF4-FFF2-40B4-BE49-F238E27FC236}">
-                <a16:creationId xmlns:a16="http://schemas.microsoft.com/office/drawing/2014/main" id="{163954D6-EF9A-4BE0-8664-F71C1CE7E468}"/>
+                <a16:creationId xmlns:a16="http://schemas.microsoft.com/office/drawing/2014/main" id="{17427B92-1811-464E-801C-5EE29A5B8D36}"/>
               </a:ext>
             </a:extLst>
           </p:cNvPr>
@@ -6580,14 +6603,45 @@
           <a:bodyPr/>
           <a:lstStyle/>
           <a:p>
-            <a:endParaRPr lang="en-CA"/>
+            <a:pPr marL="0" indent="0">
+              <a:buNone/>
+            </a:pPr>
+            <a:r>
+              <a:rPr lang="fr-CA" u="sng" dirty="0" smtClean="0"/>
+              <a:t>Criticité</a:t>
+            </a:r>
+          </a:p>
+          <a:p>
+            <a:r>
+              <a:rPr lang="fr-CA" dirty="0" smtClean="0"/>
+              <a:t>Température: Moyenne</a:t>
+            </a:r>
+          </a:p>
+          <a:p>
+            <a:r>
+              <a:rPr lang="fr-CA" dirty="0" err="1" smtClean="0"/>
+              <a:t>Poid</a:t>
+            </a:r>
+            <a:r>
+              <a:rPr lang="fr-CA" dirty="0" smtClean="0"/>
+              <a:t>: Faible</a:t>
+            </a:r>
+          </a:p>
+          <a:p>
+            <a:r>
+              <a:rPr lang="fr-CA" dirty="0" smtClean="0"/>
+              <a:t>Données GPS: Faible</a:t>
+            </a:r>
+          </a:p>
+          <a:p>
+            <a:endParaRPr lang="fr-CA" dirty="0"/>
           </a:p>
         </p:txBody>
       </p:sp>
     </p:spTree>
     <p:extLst>
       <p:ext uri="{BB962C8B-B14F-4D97-AF65-F5344CB8AC3E}">
-        <p14:creationId xmlns:p14="http://schemas.microsoft.com/office/powerpoint/2010/main" val="3338256800"/>
+        <p14:creationId xmlns:p14="http://schemas.microsoft.com/office/powerpoint/2010/main" val="1477495607"/>
       </p:ext>
     </p:extLst>
   </p:cSld>
@@ -6597,449 +6651,7 @@
 </p:sld>
 </file>
 
-<file path=ppt/slides/slide3.xml><?xml version="1.0" encoding="utf-8"?>
-<p:sld xmlns:a="http://schemas.openxmlformats.org/drawingml/2006/main" xmlns:r="http://schemas.openxmlformats.org/officeDocument/2006/relationships" xmlns:p="http://schemas.openxmlformats.org/presentationml/2006/main">
-  <p:cSld>
-    <p:spTree>
-      <p:nvGrpSpPr>
-        <p:cNvPr id="1" name=""/>
-        <p:cNvGrpSpPr/>
-        <p:nvPr/>
-      </p:nvGrpSpPr>
-      <p:grpSpPr>
-        <a:xfrm>
-          <a:off x="0" y="0"/>
-          <a:ext cx="0" cy="0"/>
-          <a:chOff x="0" y="0"/>
-          <a:chExt cx="0" cy="0"/>
-        </a:xfrm>
-      </p:grpSpPr>
-      <p:sp>
-        <p:nvSpPr>
-          <p:cNvPr id="2" name="Title 1">
-            <a:extLst>
-              <a:ext uri="{FF2B5EF4-FFF2-40B4-BE49-F238E27FC236}">
-                <a16:creationId xmlns:a16="http://schemas.microsoft.com/office/drawing/2014/main" id="{A10EAD33-323D-42BD-8C20-8BB8D0E4C2A0}"/>
-              </a:ext>
-            </a:extLst>
-          </p:cNvPr>
-          <p:cNvSpPr>
-            <a:spLocks noGrp="1"/>
-          </p:cNvSpPr>
-          <p:nvPr>
-            <p:ph type="title"/>
-          </p:nvPr>
-        </p:nvSpPr>
-        <p:spPr/>
-        <p:txBody>
-          <a:bodyPr/>
-          <a:lstStyle/>
-          <a:p>
-            <a:r>
-              <a:rPr lang="en-CA" dirty="0"/>
-              <a:t>Cahier de charges </a:t>
-            </a:r>
-            <a:r>
-              <a:rPr lang="en-CA" dirty="0" err="1"/>
-              <a:t>fonctionnelles</a:t>
-            </a:r>
-            <a:endParaRPr lang="en-CA" dirty="0"/>
-          </a:p>
-        </p:txBody>
-      </p:sp>
-      <p:sp>
-        <p:nvSpPr>
-          <p:cNvPr id="3" name="Content Placeholder 2">
-            <a:extLst>
-              <a:ext uri="{FF2B5EF4-FFF2-40B4-BE49-F238E27FC236}">
-                <a16:creationId xmlns:a16="http://schemas.microsoft.com/office/drawing/2014/main" id="{9741DD70-9E04-47B7-AEAC-7EF6A01F0568}"/>
-              </a:ext>
-            </a:extLst>
-          </p:cNvPr>
-          <p:cNvSpPr>
-            <a:spLocks noGrp="1"/>
-          </p:cNvSpPr>
-          <p:nvPr>
-            <p:ph idx="1"/>
-          </p:nvPr>
-        </p:nvSpPr>
-        <p:spPr/>
-        <p:txBody>
-          <a:bodyPr/>
-          <a:lstStyle/>
-          <a:p>
-            <a:endParaRPr lang="en-CA"/>
-          </a:p>
-        </p:txBody>
-      </p:sp>
-    </p:spTree>
-    <p:extLst>
-      <p:ext uri="{BB962C8B-B14F-4D97-AF65-F5344CB8AC3E}">
-        <p14:creationId xmlns:p14="http://schemas.microsoft.com/office/powerpoint/2010/main" val="3365343362"/>
-      </p:ext>
-    </p:extLst>
-  </p:cSld>
-  <p:clrMapOvr>
-    <a:masterClrMapping/>
-  </p:clrMapOvr>
-</p:sld>
-</file>
-
-<file path=ppt/slides/slide4.xml><?xml version="1.0" encoding="utf-8"?>
-<p:sld xmlns:a="http://schemas.openxmlformats.org/drawingml/2006/main" xmlns:r="http://schemas.openxmlformats.org/officeDocument/2006/relationships" xmlns:p="http://schemas.openxmlformats.org/presentationml/2006/main">
-  <p:cSld>
-    <p:spTree>
-      <p:nvGrpSpPr>
-        <p:cNvPr id="1" name=""/>
-        <p:cNvGrpSpPr/>
-        <p:nvPr/>
-      </p:nvGrpSpPr>
-      <p:grpSpPr>
-        <a:xfrm>
-          <a:off x="0" y="0"/>
-          <a:ext cx="0" cy="0"/>
-          <a:chOff x="0" y="0"/>
-          <a:chExt cx="0" cy="0"/>
-        </a:xfrm>
-      </p:grpSpPr>
-      <p:sp>
-        <p:nvSpPr>
-          <p:cNvPr id="2" name="Title 1">
-            <a:extLst>
-              <a:ext uri="{FF2B5EF4-FFF2-40B4-BE49-F238E27FC236}">
-                <a16:creationId xmlns:a16="http://schemas.microsoft.com/office/drawing/2014/main" id="{57AE6C2F-E93C-4A13-BFBF-2291D335938B}"/>
-              </a:ext>
-            </a:extLst>
-          </p:cNvPr>
-          <p:cNvSpPr>
-            <a:spLocks noGrp="1"/>
-          </p:cNvSpPr>
-          <p:nvPr>
-            <p:ph type="title"/>
-          </p:nvPr>
-        </p:nvSpPr>
-        <p:spPr/>
-        <p:txBody>
-          <a:bodyPr/>
-          <a:lstStyle/>
-          <a:p>
-            <a:r>
-              <a:rPr lang="en-CA" dirty="0"/>
-              <a:t>Architecture </a:t>
-            </a:r>
-            <a:r>
-              <a:rPr lang="en-CA" dirty="0" err="1"/>
-              <a:t>globale</a:t>
-            </a:r>
-            <a:endParaRPr lang="en-CA" dirty="0"/>
-          </a:p>
-        </p:txBody>
-      </p:sp>
-      <p:sp>
-        <p:nvSpPr>
-          <p:cNvPr id="3" name="Content Placeholder 2">
-            <a:extLst>
-              <a:ext uri="{FF2B5EF4-FFF2-40B4-BE49-F238E27FC236}">
-                <a16:creationId xmlns:a16="http://schemas.microsoft.com/office/drawing/2014/main" id="{6CA5ECC3-FA59-4861-92B0-635B00BF048A}"/>
-              </a:ext>
-            </a:extLst>
-          </p:cNvPr>
-          <p:cNvSpPr>
-            <a:spLocks noGrp="1"/>
-          </p:cNvSpPr>
-          <p:nvPr>
-            <p:ph idx="1"/>
-          </p:nvPr>
-        </p:nvSpPr>
-        <p:spPr/>
-        <p:txBody>
-          <a:bodyPr/>
-          <a:lstStyle/>
-          <a:p>
-            <a:endParaRPr lang="en-CA"/>
-          </a:p>
-        </p:txBody>
-      </p:sp>
-    </p:spTree>
-    <p:extLst>
-      <p:ext uri="{BB962C8B-B14F-4D97-AF65-F5344CB8AC3E}">
-        <p14:creationId xmlns:p14="http://schemas.microsoft.com/office/powerpoint/2010/main" val="2779209610"/>
-      </p:ext>
-    </p:extLst>
-  </p:cSld>
-  <p:clrMapOvr>
-    <a:masterClrMapping/>
-  </p:clrMapOvr>
-</p:sld>
-</file>
-
-<file path=ppt/slides/slide5.xml><?xml version="1.0" encoding="utf-8"?>
-<p:sld xmlns:a="http://schemas.openxmlformats.org/drawingml/2006/main" xmlns:r="http://schemas.openxmlformats.org/officeDocument/2006/relationships" xmlns:p="http://schemas.openxmlformats.org/presentationml/2006/main">
-  <p:cSld>
-    <p:spTree>
-      <p:nvGrpSpPr>
-        <p:cNvPr id="1" name=""/>
-        <p:cNvGrpSpPr/>
-        <p:nvPr/>
-      </p:nvGrpSpPr>
-      <p:grpSpPr>
-        <a:xfrm>
-          <a:off x="0" y="0"/>
-          <a:ext cx="0" cy="0"/>
-          <a:chOff x="0" y="0"/>
-          <a:chExt cx="0" cy="0"/>
-        </a:xfrm>
-      </p:grpSpPr>
-      <p:sp>
-        <p:nvSpPr>
-          <p:cNvPr id="2" name="Title 1">
-            <a:extLst>
-              <a:ext uri="{FF2B5EF4-FFF2-40B4-BE49-F238E27FC236}">
-                <a16:creationId xmlns:a16="http://schemas.microsoft.com/office/drawing/2014/main" id="{9381268A-48C6-4A90-B60F-BAEE9120674D}"/>
-              </a:ext>
-            </a:extLst>
-          </p:cNvPr>
-          <p:cNvSpPr>
-            <a:spLocks noGrp="1"/>
-          </p:cNvSpPr>
-          <p:nvPr>
-            <p:ph type="title"/>
-          </p:nvPr>
-        </p:nvSpPr>
-        <p:spPr/>
-        <p:txBody>
-          <a:bodyPr/>
-          <a:lstStyle/>
-          <a:p>
-            <a:r>
-              <a:rPr lang="en-CA" dirty="0" err="1"/>
-              <a:t>Requis</a:t>
-            </a:r>
-            <a:r>
-              <a:rPr lang="en-CA" dirty="0"/>
-              <a:t> au </a:t>
-            </a:r>
-            <a:r>
-              <a:rPr lang="en-CA" dirty="0" err="1"/>
-              <a:t>niveau</a:t>
-            </a:r>
-            <a:r>
-              <a:rPr lang="en-CA" dirty="0"/>
-              <a:t> RF</a:t>
-            </a:r>
-          </a:p>
-        </p:txBody>
-      </p:sp>
-      <p:sp>
-        <p:nvSpPr>
-          <p:cNvPr id="3" name="Content Placeholder 2">
-            <a:extLst>
-              <a:ext uri="{FF2B5EF4-FFF2-40B4-BE49-F238E27FC236}">
-                <a16:creationId xmlns:a16="http://schemas.microsoft.com/office/drawing/2014/main" id="{17427B92-1811-464E-801C-5EE29A5B8D36}"/>
-              </a:ext>
-            </a:extLst>
-          </p:cNvPr>
-          <p:cNvSpPr>
-            <a:spLocks noGrp="1"/>
-          </p:cNvSpPr>
-          <p:nvPr>
-            <p:ph idx="1"/>
-          </p:nvPr>
-        </p:nvSpPr>
-        <p:spPr/>
-        <p:txBody>
-          <a:bodyPr/>
-          <a:lstStyle/>
-          <a:p>
-            <a:r>
-              <a:rPr lang="fr-CA" dirty="0" smtClean="0"/>
-              <a:t>MAPAQ: minimum 15 mètres de distances avec les routes publiques</a:t>
-            </a:r>
-          </a:p>
-          <a:p>
-            <a:r>
-              <a:rPr lang="fr-CA" dirty="0" smtClean="0"/>
-              <a:t>2006 taille moyenne fermes canadiennes : 728 acres soit environ 3 km2 donc une distance environ de 1,7-3km</a:t>
-            </a:r>
-            <a:endParaRPr lang="fr-CA" dirty="0"/>
-          </a:p>
-        </p:txBody>
-      </p:sp>
-    </p:spTree>
-    <p:extLst>
-      <p:ext uri="{BB962C8B-B14F-4D97-AF65-F5344CB8AC3E}">
-        <p14:creationId xmlns:p14="http://schemas.microsoft.com/office/powerpoint/2010/main" val="464286854"/>
-      </p:ext>
-    </p:extLst>
-  </p:cSld>
-  <p:clrMapOvr>
-    <a:masterClrMapping/>
-  </p:clrMapOvr>
-</p:sld>
-</file>
-
-<file path=ppt/slides/slide6.xml><?xml version="1.0" encoding="utf-8"?>
-<p:sld xmlns:a="http://schemas.openxmlformats.org/drawingml/2006/main" xmlns:r="http://schemas.openxmlformats.org/officeDocument/2006/relationships" xmlns:p="http://schemas.openxmlformats.org/presentationml/2006/main">
-  <p:cSld>
-    <p:spTree>
-      <p:nvGrpSpPr>
-        <p:cNvPr id="1" name=""/>
-        <p:cNvGrpSpPr/>
-        <p:nvPr/>
-      </p:nvGrpSpPr>
-      <p:grpSpPr>
-        <a:xfrm>
-          <a:off x="0" y="0"/>
-          <a:ext cx="0" cy="0"/>
-          <a:chOff x="0" y="0"/>
-          <a:chExt cx="0" cy="0"/>
-        </a:xfrm>
-      </p:grpSpPr>
-      <p:sp>
-        <p:nvSpPr>
-          <p:cNvPr id="2" name="Title 1">
-            <a:extLst>
-              <a:ext uri="{FF2B5EF4-FFF2-40B4-BE49-F238E27FC236}">
-                <a16:creationId xmlns:a16="http://schemas.microsoft.com/office/drawing/2014/main" id="{9381268A-48C6-4A90-B60F-BAEE9120674D}"/>
-              </a:ext>
-            </a:extLst>
-          </p:cNvPr>
-          <p:cNvSpPr>
-            <a:spLocks noGrp="1"/>
-          </p:cNvSpPr>
-          <p:nvPr>
-            <p:ph type="title"/>
-          </p:nvPr>
-        </p:nvSpPr>
-        <p:spPr/>
-        <p:txBody>
-          <a:bodyPr/>
-          <a:lstStyle/>
-          <a:p>
-            <a:r>
-              <a:rPr lang="en-CA" dirty="0" err="1"/>
-              <a:t>Requis</a:t>
-            </a:r>
-            <a:r>
-              <a:rPr lang="en-CA" dirty="0"/>
-              <a:t> au </a:t>
-            </a:r>
-            <a:r>
-              <a:rPr lang="en-CA" dirty="0" err="1"/>
-              <a:t>niveau</a:t>
-            </a:r>
-            <a:r>
-              <a:rPr lang="en-CA" dirty="0"/>
-              <a:t> RF</a:t>
-            </a:r>
-          </a:p>
-        </p:txBody>
-      </p:sp>
-      <p:sp>
-        <p:nvSpPr>
-          <p:cNvPr id="3" name="Content Placeholder 2">
-            <a:extLst>
-              <a:ext uri="{FF2B5EF4-FFF2-40B4-BE49-F238E27FC236}">
-                <a16:creationId xmlns:a16="http://schemas.microsoft.com/office/drawing/2014/main" id="{17427B92-1811-464E-801C-5EE29A5B8D36}"/>
-              </a:ext>
-            </a:extLst>
-          </p:cNvPr>
-          <p:cNvSpPr>
-            <a:spLocks noGrp="1"/>
-          </p:cNvSpPr>
-          <p:nvPr>
-            <p:ph idx="1"/>
-          </p:nvPr>
-        </p:nvSpPr>
-        <p:spPr/>
-        <p:txBody>
-          <a:bodyPr/>
-          <a:lstStyle/>
-          <a:p>
-            <a:r>
-              <a:rPr lang="en-CA" dirty="0" smtClean="0"/>
-              <a:t>Minimum 15m</a:t>
-            </a:r>
-          </a:p>
-          <a:p>
-            <a:r>
-              <a:rPr lang="en-CA" dirty="0" smtClean="0"/>
-              <a:t>2006 </a:t>
-            </a:r>
-            <a:r>
-              <a:rPr lang="en-CA" dirty="0" err="1" smtClean="0"/>
-              <a:t>taille</a:t>
-            </a:r>
-            <a:r>
-              <a:rPr lang="en-CA" dirty="0" smtClean="0"/>
-              <a:t> </a:t>
-            </a:r>
-            <a:r>
-              <a:rPr lang="en-CA" dirty="0" err="1" smtClean="0"/>
-              <a:t>moyenne</a:t>
-            </a:r>
-            <a:r>
-              <a:rPr lang="en-CA" dirty="0" smtClean="0"/>
-              <a:t> </a:t>
-            </a:r>
-            <a:r>
-              <a:rPr lang="en-CA" dirty="0" err="1" smtClean="0"/>
-              <a:t>fermes</a:t>
-            </a:r>
-            <a:r>
-              <a:rPr lang="en-CA" dirty="0" smtClean="0"/>
-              <a:t> </a:t>
-            </a:r>
-            <a:r>
-              <a:rPr lang="en-CA" dirty="0" err="1" smtClean="0"/>
-              <a:t>canadiennes</a:t>
-            </a:r>
-            <a:r>
-              <a:rPr lang="en-CA" dirty="0" smtClean="0"/>
-              <a:t> : 728 acres </a:t>
-            </a:r>
-            <a:r>
-              <a:rPr lang="en-CA" dirty="0" err="1" smtClean="0"/>
-              <a:t>soit</a:t>
-            </a:r>
-            <a:r>
-              <a:rPr lang="en-CA" dirty="0" smtClean="0"/>
-              <a:t> environ 3 km2 </a:t>
-            </a:r>
-            <a:r>
-              <a:rPr lang="en-CA" dirty="0" err="1" smtClean="0"/>
-              <a:t>donc</a:t>
-            </a:r>
-            <a:r>
-              <a:rPr lang="en-CA" dirty="0" smtClean="0"/>
-              <a:t> </a:t>
-            </a:r>
-            <a:r>
-              <a:rPr lang="en-CA" dirty="0" err="1" smtClean="0"/>
-              <a:t>une</a:t>
-            </a:r>
-            <a:r>
-              <a:rPr lang="en-CA" dirty="0" smtClean="0"/>
-              <a:t> distance environ de 1,7-3km</a:t>
-            </a:r>
-            <a:endParaRPr lang="en-CA" dirty="0"/>
-          </a:p>
-        </p:txBody>
-      </p:sp>
-    </p:spTree>
-    <p:extLst>
-      <p:ext uri="{BB962C8B-B14F-4D97-AF65-F5344CB8AC3E}">
-        <p14:creationId xmlns:p14="http://schemas.microsoft.com/office/powerpoint/2010/main" val="400948369"/>
-      </p:ext>
-    </p:extLst>
-  </p:cSld>
-  <p:clrMapOvr>
-    <a:masterClrMapping/>
-  </p:clrMapOvr>
-</p:sld>
-</file>
-
-<file path=ppt/slides/slide7.xml><?xml version="1.0" encoding="utf-8"?>
+<file path=ppt/slides/slide12.xml><?xml version="1.0" encoding="utf-8"?>
 <p:sld xmlns:a="http://schemas.openxmlformats.org/drawingml/2006/main" xmlns:r="http://schemas.openxmlformats.org/officeDocument/2006/relationships" xmlns:p="http://schemas.openxmlformats.org/presentationml/2006/main">
   <p:cSld>
     <p:spTree>
@@ -7646,7 +7258,7 @@
 </p:sld>
 </file>
 
-<file path=ppt/slides/slide8.xml><?xml version="1.0" encoding="utf-8"?>
+<file path=ppt/slides/slide13.xml><?xml version="1.0" encoding="utf-8"?>
 <p:sld xmlns:a="http://schemas.openxmlformats.org/drawingml/2006/main" xmlns:r="http://schemas.openxmlformats.org/officeDocument/2006/relationships" xmlns:p="http://schemas.openxmlformats.org/presentationml/2006/main">
   <p:cSld>
     <p:spTree>
@@ -7986,6 +7598,1492 @@
 </p:sld>
 </file>
 
+<file path=ppt/slides/slide14.xml><?xml version="1.0" encoding="utf-8"?>
+<p:sld xmlns:a="http://schemas.openxmlformats.org/drawingml/2006/main" xmlns:r="http://schemas.openxmlformats.org/officeDocument/2006/relationships" xmlns:p="http://schemas.openxmlformats.org/presentationml/2006/main">
+  <p:cSld>
+    <p:spTree>
+      <p:nvGrpSpPr>
+        <p:cNvPr id="1" name=""/>
+        <p:cNvGrpSpPr/>
+        <p:nvPr/>
+      </p:nvGrpSpPr>
+      <p:grpSpPr>
+        <a:xfrm>
+          <a:off x="0" y="0"/>
+          <a:ext cx="0" cy="0"/>
+          <a:chOff x="0" y="0"/>
+          <a:chExt cx="0" cy="0"/>
+        </a:xfrm>
+      </p:grpSpPr>
+      <p:sp>
+        <p:nvSpPr>
+          <p:cNvPr id="2" name="Title 1">
+            <a:extLst>
+              <a:ext uri="{FF2B5EF4-FFF2-40B4-BE49-F238E27FC236}">
+                <a16:creationId xmlns:a16="http://schemas.microsoft.com/office/drawing/2014/main" id="{047326C3-7A2A-44FE-8485-1E7D1EB18A52}"/>
+              </a:ext>
+            </a:extLst>
+          </p:cNvPr>
+          <p:cNvSpPr>
+            <a:spLocks noGrp="1"/>
+          </p:cNvSpPr>
+          <p:nvPr>
+            <p:ph type="title"/>
+          </p:nvPr>
+        </p:nvSpPr>
+        <p:spPr/>
+        <p:txBody>
+          <a:bodyPr/>
+          <a:lstStyle/>
+          <a:p>
+            <a:r>
+              <a:rPr lang="en-CA" dirty="0"/>
+              <a:t>Prototype/prevue de concept de S6</a:t>
+            </a:r>
+          </a:p>
+        </p:txBody>
+      </p:sp>
+      <p:sp>
+        <p:nvSpPr>
+          <p:cNvPr id="3" name="Content Placeholder 2">
+            <a:extLst>
+              <a:ext uri="{FF2B5EF4-FFF2-40B4-BE49-F238E27FC236}">
+                <a16:creationId xmlns:a16="http://schemas.microsoft.com/office/drawing/2014/main" id="{D2F1472F-27BE-426C-A2BA-76BA5073940E}"/>
+              </a:ext>
+            </a:extLst>
+          </p:cNvPr>
+          <p:cNvSpPr>
+            <a:spLocks noGrp="1"/>
+          </p:cNvSpPr>
+          <p:nvPr>
+            <p:ph idx="1"/>
+          </p:nvPr>
+        </p:nvSpPr>
+        <p:spPr/>
+        <p:txBody>
+          <a:bodyPr/>
+          <a:lstStyle/>
+          <a:p>
+            <a:pPr marL="0" indent="0">
+              <a:buNone/>
+            </a:pPr>
+            <a:r>
+              <a:rPr lang="en-CA" dirty="0"/>
+              <a:t>Limitations du prototype</a:t>
+            </a:r>
+          </a:p>
+          <a:p>
+            <a:r>
+              <a:rPr lang="en-CA" dirty="0"/>
+              <a:t>Source </a:t>
+            </a:r>
+            <a:r>
+              <a:rPr lang="en-CA" dirty="0" err="1"/>
+              <a:t>d’alimentation</a:t>
+            </a:r>
+            <a:endParaRPr lang="en-CA" dirty="0"/>
+          </a:p>
+          <a:p>
+            <a:r>
+              <a:rPr lang="en-CA" dirty="0"/>
+              <a:t>Tests sur insects </a:t>
+            </a:r>
+            <a:r>
+              <a:rPr lang="en-CA" dirty="0" err="1"/>
+              <a:t>vivants</a:t>
+            </a:r>
+            <a:endParaRPr lang="en-CA" dirty="0"/>
+          </a:p>
+          <a:p>
+            <a:r>
+              <a:rPr lang="en-CA" dirty="0" err="1"/>
+              <a:t>Indicateurs</a:t>
+            </a:r>
+            <a:r>
+              <a:rPr lang="en-CA" dirty="0"/>
+              <a:t> </a:t>
+            </a:r>
+            <a:r>
+              <a:rPr lang="en-CA" dirty="0" err="1"/>
+              <a:t>chimiques</a:t>
+            </a:r>
+            <a:endParaRPr lang="en-CA" dirty="0"/>
+          </a:p>
+          <a:p>
+            <a:r>
+              <a:rPr lang="en-CA" dirty="0" err="1"/>
+              <a:t>Réseautage</a:t>
+            </a:r>
+            <a:r>
+              <a:rPr lang="en-CA" dirty="0"/>
+              <a:t> de </a:t>
+            </a:r>
+            <a:r>
+              <a:rPr lang="en-CA" dirty="0" err="1"/>
+              <a:t>ruche</a:t>
+            </a:r>
+            <a:r>
+              <a:rPr lang="en-CA" dirty="0"/>
+              <a:t> à </a:t>
+            </a:r>
+            <a:r>
+              <a:rPr lang="en-CA" dirty="0" err="1"/>
+              <a:t>ruche</a:t>
+            </a:r>
+            <a:endParaRPr lang="en-CA" dirty="0"/>
+          </a:p>
+          <a:p>
+            <a:r>
+              <a:rPr lang="en-CA" dirty="0"/>
+              <a:t>Interface </a:t>
+            </a:r>
+            <a:r>
+              <a:rPr lang="en-CA" dirty="0" err="1"/>
+              <a:t>avancée</a:t>
+            </a:r>
+            <a:r>
+              <a:rPr lang="en-CA" dirty="0"/>
+              <a:t> et gestion de </a:t>
+            </a:r>
+            <a:r>
+              <a:rPr lang="en-CA" dirty="0" err="1"/>
+              <a:t>ruches</a:t>
+            </a:r>
+            <a:r>
+              <a:rPr lang="en-CA" dirty="0"/>
+              <a:t> à </a:t>
+            </a:r>
+            <a:r>
+              <a:rPr lang="en-CA" dirty="0" err="1"/>
+              <a:t>grande</a:t>
+            </a:r>
+            <a:r>
+              <a:rPr lang="en-CA" dirty="0"/>
+              <a:t> </a:t>
+            </a:r>
+            <a:r>
+              <a:rPr lang="en-CA" dirty="0" err="1"/>
+              <a:t>échelle</a:t>
+            </a:r>
+            <a:endParaRPr lang="en-CA" dirty="0"/>
+          </a:p>
+        </p:txBody>
+      </p:sp>
+    </p:spTree>
+    <p:extLst>
+      <p:ext uri="{BB962C8B-B14F-4D97-AF65-F5344CB8AC3E}">
+        <p14:creationId xmlns:p14="http://schemas.microsoft.com/office/powerpoint/2010/main" val="967102364"/>
+      </p:ext>
+    </p:extLst>
+  </p:cSld>
+  <p:clrMapOvr>
+    <a:masterClrMapping/>
+  </p:clrMapOvr>
+</p:sld>
+</file>
+
+<file path=ppt/slides/slide15.xml><?xml version="1.0" encoding="utf-8"?>
+<p:sld xmlns:a="http://schemas.openxmlformats.org/drawingml/2006/main" xmlns:r="http://schemas.openxmlformats.org/officeDocument/2006/relationships" xmlns:p="http://schemas.openxmlformats.org/presentationml/2006/main">
+  <p:cSld>
+    <p:spTree>
+      <p:nvGrpSpPr>
+        <p:cNvPr id="1" name=""/>
+        <p:cNvGrpSpPr/>
+        <p:nvPr/>
+      </p:nvGrpSpPr>
+      <p:grpSpPr>
+        <a:xfrm>
+          <a:off x="0" y="0"/>
+          <a:ext cx="0" cy="0"/>
+          <a:chOff x="0" y="0"/>
+          <a:chExt cx="0" cy="0"/>
+        </a:xfrm>
+      </p:grpSpPr>
+      <p:sp>
+        <p:nvSpPr>
+          <p:cNvPr id="2" name="Title 1">
+            <a:extLst>
+              <a:ext uri="{FF2B5EF4-FFF2-40B4-BE49-F238E27FC236}">
+                <a16:creationId xmlns:a16="http://schemas.microsoft.com/office/drawing/2014/main" id="{4E803E53-33F4-4918-9D2A-3756F2D666B5}"/>
+              </a:ext>
+            </a:extLst>
+          </p:cNvPr>
+          <p:cNvSpPr>
+            <a:spLocks noGrp="1"/>
+          </p:cNvSpPr>
+          <p:nvPr>
+            <p:ph type="title"/>
+          </p:nvPr>
+        </p:nvSpPr>
+        <p:spPr/>
+        <p:txBody>
+          <a:bodyPr/>
+          <a:lstStyle/>
+          <a:p>
+            <a:r>
+              <a:rPr lang="en-CA" dirty="0" err="1"/>
+              <a:t>Outils</a:t>
+            </a:r>
+            <a:r>
+              <a:rPr lang="en-CA" dirty="0"/>
+              <a:t> de </a:t>
+            </a:r>
+            <a:r>
+              <a:rPr lang="en-CA" dirty="0" err="1"/>
+              <a:t>gestion</a:t>
+            </a:r>
+            <a:endParaRPr lang="en-CA" dirty="0"/>
+          </a:p>
+        </p:txBody>
+      </p:sp>
+      <p:sp>
+        <p:nvSpPr>
+          <p:cNvPr id="3" name="Content Placeholder 2">
+            <a:extLst>
+              <a:ext uri="{FF2B5EF4-FFF2-40B4-BE49-F238E27FC236}">
+                <a16:creationId xmlns:a16="http://schemas.microsoft.com/office/drawing/2014/main" id="{60344793-CA0C-4409-81BA-47C205B02C33}"/>
+              </a:ext>
+            </a:extLst>
+          </p:cNvPr>
+          <p:cNvSpPr>
+            <a:spLocks noGrp="1"/>
+          </p:cNvSpPr>
+          <p:nvPr>
+            <p:ph idx="1"/>
+          </p:nvPr>
+        </p:nvSpPr>
+        <p:spPr/>
+        <p:txBody>
+          <a:bodyPr/>
+          <a:lstStyle/>
+          <a:p>
+            <a:endParaRPr lang="en-CA" dirty="0"/>
+          </a:p>
+        </p:txBody>
+      </p:sp>
+    </p:spTree>
+    <p:extLst>
+      <p:ext uri="{BB962C8B-B14F-4D97-AF65-F5344CB8AC3E}">
+        <p14:creationId xmlns:p14="http://schemas.microsoft.com/office/powerpoint/2010/main" val="3593040669"/>
+      </p:ext>
+    </p:extLst>
+  </p:cSld>
+  <p:clrMapOvr>
+    <a:masterClrMapping/>
+  </p:clrMapOvr>
+</p:sld>
+</file>
+
+<file path=ppt/slides/slide2.xml><?xml version="1.0" encoding="utf-8"?>
+<p:sld xmlns:a="http://schemas.openxmlformats.org/drawingml/2006/main" xmlns:r="http://schemas.openxmlformats.org/officeDocument/2006/relationships" xmlns:p="http://schemas.openxmlformats.org/presentationml/2006/main">
+  <p:cSld>
+    <p:spTree>
+      <p:nvGrpSpPr>
+        <p:cNvPr id="1" name=""/>
+        <p:cNvGrpSpPr/>
+        <p:nvPr/>
+      </p:nvGrpSpPr>
+      <p:grpSpPr>
+        <a:xfrm>
+          <a:off x="0" y="0"/>
+          <a:ext cx="0" cy="0"/>
+          <a:chOff x="0" y="0"/>
+          <a:chExt cx="0" cy="0"/>
+        </a:xfrm>
+      </p:grpSpPr>
+      <p:sp>
+        <p:nvSpPr>
+          <p:cNvPr id="2" name="Title 1">
+            <a:extLst>
+              <a:ext uri="{FF2B5EF4-FFF2-40B4-BE49-F238E27FC236}">
+                <a16:creationId xmlns:a16="http://schemas.microsoft.com/office/drawing/2014/main" id="{95A4B020-4078-42AE-9D8B-DD88078B584A}"/>
+              </a:ext>
+            </a:extLst>
+          </p:cNvPr>
+          <p:cNvSpPr>
+            <a:spLocks noGrp="1"/>
+          </p:cNvSpPr>
+          <p:nvPr>
+            <p:ph type="title"/>
+          </p:nvPr>
+        </p:nvSpPr>
+        <p:spPr/>
+        <p:txBody>
+          <a:bodyPr/>
+          <a:lstStyle/>
+          <a:p>
+            <a:r>
+              <a:rPr lang="en-CA" dirty="0"/>
+              <a:t>Justification du </a:t>
+            </a:r>
+            <a:r>
+              <a:rPr lang="en-CA" dirty="0" err="1"/>
+              <a:t>besoin</a:t>
+            </a:r>
+            <a:r>
+              <a:rPr lang="en-CA" dirty="0"/>
+              <a:t>, </a:t>
+            </a:r>
+            <a:r>
+              <a:rPr lang="en-CA" dirty="0" err="1"/>
+              <a:t>contexte</a:t>
+            </a:r>
+            <a:r>
+              <a:rPr lang="en-CA" dirty="0"/>
+              <a:t> du </a:t>
+            </a:r>
+            <a:r>
+              <a:rPr lang="en-CA" dirty="0" err="1"/>
+              <a:t>projet</a:t>
+            </a:r>
+            <a:r>
+              <a:rPr lang="en-CA" dirty="0"/>
+              <a:t> et du </a:t>
+            </a:r>
+            <a:r>
+              <a:rPr lang="en-CA" dirty="0" err="1"/>
+              <a:t>marché</a:t>
+            </a:r>
+            <a:endParaRPr lang="en-CA" dirty="0"/>
+          </a:p>
+        </p:txBody>
+      </p:sp>
+      <p:sp>
+        <p:nvSpPr>
+          <p:cNvPr id="3" name="Content Placeholder 2">
+            <a:extLst>
+              <a:ext uri="{FF2B5EF4-FFF2-40B4-BE49-F238E27FC236}">
+                <a16:creationId xmlns:a16="http://schemas.microsoft.com/office/drawing/2014/main" id="{163954D6-EF9A-4BE0-8664-F71C1CE7E468}"/>
+              </a:ext>
+            </a:extLst>
+          </p:cNvPr>
+          <p:cNvSpPr>
+            <a:spLocks noGrp="1"/>
+          </p:cNvSpPr>
+          <p:nvPr>
+            <p:ph idx="1"/>
+          </p:nvPr>
+        </p:nvSpPr>
+        <p:spPr/>
+        <p:txBody>
+          <a:bodyPr/>
+          <a:lstStyle/>
+          <a:p>
+            <a:endParaRPr lang="en-CA"/>
+          </a:p>
+        </p:txBody>
+      </p:sp>
+    </p:spTree>
+    <p:extLst>
+      <p:ext uri="{BB962C8B-B14F-4D97-AF65-F5344CB8AC3E}">
+        <p14:creationId xmlns:p14="http://schemas.microsoft.com/office/powerpoint/2010/main" val="3338256800"/>
+      </p:ext>
+    </p:extLst>
+  </p:cSld>
+  <p:clrMapOvr>
+    <a:masterClrMapping/>
+  </p:clrMapOvr>
+</p:sld>
+</file>
+
+<file path=ppt/slides/slide3.xml><?xml version="1.0" encoding="utf-8"?>
+<p:sld xmlns:a="http://schemas.openxmlformats.org/drawingml/2006/main" xmlns:r="http://schemas.openxmlformats.org/officeDocument/2006/relationships" xmlns:p="http://schemas.openxmlformats.org/presentationml/2006/main">
+  <p:cSld>
+    <p:spTree>
+      <p:nvGrpSpPr>
+        <p:cNvPr id="1" name=""/>
+        <p:cNvGrpSpPr/>
+        <p:nvPr/>
+      </p:nvGrpSpPr>
+      <p:grpSpPr>
+        <a:xfrm>
+          <a:off x="0" y="0"/>
+          <a:ext cx="0" cy="0"/>
+          <a:chOff x="0" y="0"/>
+          <a:chExt cx="0" cy="0"/>
+        </a:xfrm>
+      </p:grpSpPr>
+      <p:sp>
+        <p:nvSpPr>
+          <p:cNvPr id="2" name="Title 1">
+            <a:extLst>
+              <a:ext uri="{FF2B5EF4-FFF2-40B4-BE49-F238E27FC236}">
+                <a16:creationId xmlns:a16="http://schemas.microsoft.com/office/drawing/2014/main" id="{A10EAD33-323D-42BD-8C20-8BB8D0E4C2A0}"/>
+              </a:ext>
+            </a:extLst>
+          </p:cNvPr>
+          <p:cNvSpPr>
+            <a:spLocks noGrp="1"/>
+          </p:cNvSpPr>
+          <p:nvPr>
+            <p:ph type="title"/>
+          </p:nvPr>
+        </p:nvSpPr>
+        <p:spPr/>
+        <p:txBody>
+          <a:bodyPr/>
+          <a:lstStyle/>
+          <a:p>
+            <a:r>
+              <a:rPr lang="en-CA" dirty="0"/>
+              <a:t>Cahier de charges </a:t>
+            </a:r>
+            <a:r>
+              <a:rPr lang="en-CA" dirty="0" err="1"/>
+              <a:t>fonctionnelles</a:t>
+            </a:r>
+            <a:endParaRPr lang="en-CA" dirty="0"/>
+          </a:p>
+        </p:txBody>
+      </p:sp>
+      <p:sp>
+        <p:nvSpPr>
+          <p:cNvPr id="3" name="Content Placeholder 2">
+            <a:extLst>
+              <a:ext uri="{FF2B5EF4-FFF2-40B4-BE49-F238E27FC236}">
+                <a16:creationId xmlns:a16="http://schemas.microsoft.com/office/drawing/2014/main" id="{9741DD70-9E04-47B7-AEAC-7EF6A01F0568}"/>
+              </a:ext>
+            </a:extLst>
+          </p:cNvPr>
+          <p:cNvSpPr>
+            <a:spLocks noGrp="1"/>
+          </p:cNvSpPr>
+          <p:nvPr>
+            <p:ph idx="1"/>
+          </p:nvPr>
+        </p:nvSpPr>
+        <p:spPr/>
+        <p:txBody>
+          <a:bodyPr/>
+          <a:lstStyle/>
+          <a:p>
+            <a:endParaRPr lang="en-CA"/>
+          </a:p>
+        </p:txBody>
+      </p:sp>
+    </p:spTree>
+    <p:extLst>
+      <p:ext uri="{BB962C8B-B14F-4D97-AF65-F5344CB8AC3E}">
+        <p14:creationId xmlns:p14="http://schemas.microsoft.com/office/powerpoint/2010/main" val="3365343362"/>
+      </p:ext>
+    </p:extLst>
+  </p:cSld>
+  <p:clrMapOvr>
+    <a:masterClrMapping/>
+  </p:clrMapOvr>
+</p:sld>
+</file>
+
+<file path=ppt/slides/slide4.xml><?xml version="1.0" encoding="utf-8"?>
+<p:sld xmlns:a="http://schemas.openxmlformats.org/drawingml/2006/main" xmlns:r="http://schemas.openxmlformats.org/officeDocument/2006/relationships" xmlns:p="http://schemas.openxmlformats.org/presentationml/2006/main">
+  <p:cSld>
+    <p:spTree>
+      <p:nvGrpSpPr>
+        <p:cNvPr id="1" name=""/>
+        <p:cNvGrpSpPr/>
+        <p:nvPr/>
+      </p:nvGrpSpPr>
+      <p:grpSpPr>
+        <a:xfrm>
+          <a:off x="0" y="0"/>
+          <a:ext cx="0" cy="0"/>
+          <a:chOff x="0" y="0"/>
+          <a:chExt cx="0" cy="0"/>
+        </a:xfrm>
+      </p:grpSpPr>
+      <p:sp>
+        <p:nvSpPr>
+          <p:cNvPr id="2" name="Title 1">
+            <a:extLst>
+              <a:ext uri="{FF2B5EF4-FFF2-40B4-BE49-F238E27FC236}">
+                <a16:creationId xmlns:a16="http://schemas.microsoft.com/office/drawing/2014/main" id="{57AE6C2F-E93C-4A13-BFBF-2291D335938B}"/>
+              </a:ext>
+            </a:extLst>
+          </p:cNvPr>
+          <p:cNvSpPr>
+            <a:spLocks noGrp="1"/>
+          </p:cNvSpPr>
+          <p:nvPr>
+            <p:ph type="title"/>
+          </p:nvPr>
+        </p:nvSpPr>
+        <p:spPr>
+          <a:xfrm>
+            <a:off x="1484309" y="0"/>
+            <a:ext cx="10018713" cy="1752599"/>
+          </a:xfrm>
+        </p:spPr>
+        <p:txBody>
+          <a:bodyPr/>
+          <a:lstStyle/>
+          <a:p>
+            <a:r>
+              <a:rPr lang="en-CA" dirty="0"/>
+              <a:t>Architecture </a:t>
+            </a:r>
+            <a:r>
+              <a:rPr lang="en-CA" dirty="0" err="1"/>
+              <a:t>globale</a:t>
+            </a:r>
+            <a:endParaRPr lang="en-CA" dirty="0"/>
+          </a:p>
+        </p:txBody>
+      </p:sp>
+      <p:pic>
+        <p:nvPicPr>
+          <p:cNvPr id="4" name="Picture 3">
+            <a:extLst>
+              <a:ext uri="{FF2B5EF4-FFF2-40B4-BE49-F238E27FC236}">
+                <a16:creationId xmlns:a16="http://schemas.microsoft.com/office/drawing/2014/main" id="{54FD1A81-4AFB-4561-97FF-38A60570CA28}"/>
+              </a:ext>
+            </a:extLst>
+          </p:cNvPr>
+          <p:cNvPicPr>
+            <a:picLocks noChangeAspect="1"/>
+          </p:cNvPicPr>
+          <p:nvPr/>
+        </p:nvPicPr>
+        <p:blipFill>
+          <a:blip r:embed="rId2">
+            <a:extLst>
+              <a:ext uri="{28A0092B-C50C-407E-A947-70E740481C1C}">
+                <a14:useLocalDpi xmlns:a14="http://schemas.microsoft.com/office/drawing/2010/main" val="0"/>
+              </a:ext>
+            </a:extLst>
+          </a:blip>
+          <a:stretch>
+            <a:fillRect/>
+          </a:stretch>
+        </p:blipFill>
+        <p:spPr>
+          <a:xfrm>
+            <a:off x="1123950" y="1403944"/>
+            <a:ext cx="9944100" cy="5233066"/>
+          </a:xfrm>
+          <a:prstGeom prst="rect">
+            <a:avLst/>
+          </a:prstGeom>
+        </p:spPr>
+      </p:pic>
+    </p:spTree>
+    <p:extLst>
+      <p:ext uri="{BB962C8B-B14F-4D97-AF65-F5344CB8AC3E}">
+        <p14:creationId xmlns:p14="http://schemas.microsoft.com/office/powerpoint/2010/main" val="2653828309"/>
+      </p:ext>
+    </p:extLst>
+  </p:cSld>
+  <p:clrMapOvr>
+    <a:masterClrMapping/>
+  </p:clrMapOvr>
+</p:sld>
+</file>
+
+<file path=ppt/slides/slide5.xml><?xml version="1.0" encoding="utf-8"?>
+<p:sld xmlns:a="http://schemas.openxmlformats.org/drawingml/2006/main" xmlns:r="http://schemas.openxmlformats.org/officeDocument/2006/relationships" xmlns:p="http://schemas.openxmlformats.org/presentationml/2006/main">
+  <p:cSld>
+    <p:spTree>
+      <p:nvGrpSpPr>
+        <p:cNvPr id="1" name=""/>
+        <p:cNvGrpSpPr/>
+        <p:nvPr/>
+      </p:nvGrpSpPr>
+      <p:grpSpPr>
+        <a:xfrm>
+          <a:off x="0" y="0"/>
+          <a:ext cx="0" cy="0"/>
+          <a:chOff x="0" y="0"/>
+          <a:chExt cx="0" cy="0"/>
+        </a:xfrm>
+      </p:grpSpPr>
+      <p:sp>
+        <p:nvSpPr>
+          <p:cNvPr id="2" name="Title 1">
+            <a:extLst>
+              <a:ext uri="{FF2B5EF4-FFF2-40B4-BE49-F238E27FC236}">
+                <a16:creationId xmlns:a16="http://schemas.microsoft.com/office/drawing/2014/main" id="{57AE6C2F-E93C-4A13-BFBF-2291D335938B}"/>
+              </a:ext>
+            </a:extLst>
+          </p:cNvPr>
+          <p:cNvSpPr>
+            <a:spLocks noGrp="1"/>
+          </p:cNvSpPr>
+          <p:nvPr>
+            <p:ph type="title"/>
+          </p:nvPr>
+        </p:nvSpPr>
+        <p:spPr>
+          <a:xfrm>
+            <a:off x="1484309" y="0"/>
+            <a:ext cx="10018713" cy="1752599"/>
+          </a:xfrm>
+        </p:spPr>
+        <p:txBody>
+          <a:bodyPr/>
+          <a:lstStyle/>
+          <a:p>
+            <a:r>
+              <a:rPr lang="en-CA" dirty="0"/>
+              <a:t>Architecture </a:t>
+            </a:r>
+            <a:r>
+              <a:rPr lang="en-CA" dirty="0" err="1"/>
+              <a:t>globale</a:t>
+            </a:r>
+            <a:endParaRPr lang="en-CA" dirty="0"/>
+          </a:p>
+        </p:txBody>
+      </p:sp>
+      <p:pic>
+        <p:nvPicPr>
+          <p:cNvPr id="5" name="Picture 4">
+            <a:extLst>
+              <a:ext uri="{FF2B5EF4-FFF2-40B4-BE49-F238E27FC236}">
+                <a16:creationId xmlns:a16="http://schemas.microsoft.com/office/drawing/2014/main" id="{25479432-C2CC-4627-8075-6676E9C505D5}"/>
+              </a:ext>
+            </a:extLst>
+          </p:cNvPr>
+          <p:cNvPicPr>
+            <a:picLocks noChangeAspect="1"/>
+          </p:cNvPicPr>
+          <p:nvPr/>
+        </p:nvPicPr>
+        <p:blipFill>
+          <a:blip r:embed="rId2">
+            <a:extLst>
+              <a:ext uri="{28A0092B-C50C-407E-A947-70E740481C1C}">
+                <a14:useLocalDpi xmlns:a14="http://schemas.microsoft.com/office/drawing/2010/main" val="0"/>
+              </a:ext>
+            </a:extLst>
+          </a:blip>
+          <a:stretch>
+            <a:fillRect/>
+          </a:stretch>
+        </p:blipFill>
+        <p:spPr>
+          <a:xfrm>
+            <a:off x="2986977" y="1323975"/>
+            <a:ext cx="7013376" cy="5200649"/>
+          </a:xfrm>
+          <a:prstGeom prst="rect">
+            <a:avLst/>
+          </a:prstGeom>
+        </p:spPr>
+      </p:pic>
+    </p:spTree>
+    <p:extLst>
+      <p:ext uri="{BB962C8B-B14F-4D97-AF65-F5344CB8AC3E}">
+        <p14:creationId xmlns:p14="http://schemas.microsoft.com/office/powerpoint/2010/main" val="2762366332"/>
+      </p:ext>
+    </p:extLst>
+  </p:cSld>
+  <p:clrMapOvr>
+    <a:masterClrMapping/>
+  </p:clrMapOvr>
+</p:sld>
+</file>
+
+<file path=ppt/slides/slide6.xml><?xml version="1.0" encoding="utf-8"?>
+<p:sld xmlns:a="http://schemas.openxmlformats.org/drawingml/2006/main" xmlns:r="http://schemas.openxmlformats.org/officeDocument/2006/relationships" xmlns:p="http://schemas.openxmlformats.org/presentationml/2006/main">
+  <p:cSld>
+    <p:spTree>
+      <p:nvGrpSpPr>
+        <p:cNvPr id="1" name=""/>
+        <p:cNvGrpSpPr/>
+        <p:nvPr/>
+      </p:nvGrpSpPr>
+      <p:grpSpPr>
+        <a:xfrm>
+          <a:off x="0" y="0"/>
+          <a:ext cx="0" cy="0"/>
+          <a:chOff x="0" y="0"/>
+          <a:chExt cx="0" cy="0"/>
+        </a:xfrm>
+      </p:grpSpPr>
+      <p:sp>
+        <p:nvSpPr>
+          <p:cNvPr id="2" name="Title 1">
+            <a:extLst>
+              <a:ext uri="{FF2B5EF4-FFF2-40B4-BE49-F238E27FC236}">
+                <a16:creationId xmlns:a16="http://schemas.microsoft.com/office/drawing/2014/main" id="{57AE6C2F-E93C-4A13-BFBF-2291D335938B}"/>
+              </a:ext>
+            </a:extLst>
+          </p:cNvPr>
+          <p:cNvSpPr>
+            <a:spLocks noGrp="1"/>
+          </p:cNvSpPr>
+          <p:nvPr>
+            <p:ph type="title"/>
+          </p:nvPr>
+        </p:nvSpPr>
+        <p:spPr>
+          <a:xfrm>
+            <a:off x="1484309" y="0"/>
+            <a:ext cx="10018713" cy="1752599"/>
+          </a:xfrm>
+        </p:spPr>
+        <p:txBody>
+          <a:bodyPr/>
+          <a:lstStyle/>
+          <a:p>
+            <a:r>
+              <a:rPr lang="en-CA" dirty="0"/>
+              <a:t>Architecture </a:t>
+            </a:r>
+            <a:r>
+              <a:rPr lang="en-CA" dirty="0" err="1"/>
+              <a:t>globale</a:t>
+            </a:r>
+            <a:endParaRPr lang="en-CA" dirty="0"/>
+          </a:p>
+        </p:txBody>
+      </p:sp>
+      <p:sp>
+        <p:nvSpPr>
+          <p:cNvPr id="4" name="Content Placeholder 2">
+            <a:extLst>
+              <a:ext uri="{FF2B5EF4-FFF2-40B4-BE49-F238E27FC236}">
+                <a16:creationId xmlns:a16="http://schemas.microsoft.com/office/drawing/2014/main" id="{0B4A7325-9DB0-46E8-89B3-80B528F4E836}"/>
+              </a:ext>
+            </a:extLst>
+          </p:cNvPr>
+          <p:cNvSpPr>
+            <a:spLocks noGrp="1"/>
+          </p:cNvSpPr>
+          <p:nvPr>
+            <p:ph idx="1"/>
+          </p:nvPr>
+        </p:nvSpPr>
+        <p:spPr>
+          <a:xfrm>
+            <a:off x="1484310" y="1752599"/>
+            <a:ext cx="10018713" cy="4038601"/>
+          </a:xfrm>
+        </p:spPr>
+        <p:txBody>
+          <a:bodyPr/>
+          <a:lstStyle/>
+          <a:p>
+            <a:r>
+              <a:rPr lang="en-CA" dirty="0"/>
+              <a:t>Communication sans-fil entre le </a:t>
+            </a:r>
+            <a:r>
+              <a:rPr lang="en-CA" dirty="0" err="1"/>
+              <a:t>système</a:t>
+            </a:r>
+            <a:r>
+              <a:rPr lang="en-CA" dirty="0"/>
+              <a:t> central et la </a:t>
+            </a:r>
+            <a:r>
+              <a:rPr lang="en-CA" dirty="0" err="1"/>
+              <a:t>ruche</a:t>
+            </a:r>
+            <a:endParaRPr lang="en-CA" dirty="0"/>
+          </a:p>
+          <a:p>
+            <a:endParaRPr lang="en-CA" dirty="0"/>
+          </a:p>
+          <a:p>
+            <a:r>
+              <a:rPr lang="en-CA" dirty="0" err="1"/>
+              <a:t>Capteurs</a:t>
+            </a:r>
+            <a:r>
+              <a:rPr lang="en-CA" dirty="0"/>
+              <a:t> </a:t>
+            </a:r>
+            <a:r>
+              <a:rPr lang="en-CA" dirty="0" err="1"/>
+              <a:t>permettent</a:t>
+            </a:r>
+            <a:r>
+              <a:rPr lang="en-CA" dirty="0"/>
+              <a:t> de </a:t>
+            </a:r>
+            <a:r>
+              <a:rPr lang="en-CA" dirty="0" err="1"/>
+              <a:t>connaître</a:t>
+            </a:r>
+            <a:r>
+              <a:rPr lang="en-CA" dirty="0"/>
+              <a:t> </a:t>
+            </a:r>
+            <a:r>
+              <a:rPr lang="en-CA" dirty="0" err="1"/>
+              <a:t>l’état</a:t>
+            </a:r>
+            <a:r>
+              <a:rPr lang="en-CA" dirty="0"/>
+              <a:t> de la </a:t>
+            </a:r>
+            <a:r>
+              <a:rPr lang="en-CA" dirty="0" err="1"/>
+              <a:t>ruche</a:t>
+            </a:r>
+            <a:endParaRPr lang="en-CA" dirty="0"/>
+          </a:p>
+          <a:p>
+            <a:endParaRPr lang="en-CA" dirty="0"/>
+          </a:p>
+          <a:p>
+            <a:r>
+              <a:rPr lang="en-CA" dirty="0" err="1"/>
+              <a:t>Système</a:t>
+            </a:r>
+            <a:r>
+              <a:rPr lang="en-CA" dirty="0"/>
+              <a:t> central analyse </a:t>
+            </a:r>
+            <a:r>
+              <a:rPr lang="en-CA" dirty="0" err="1"/>
+              <a:t>l’information</a:t>
+            </a:r>
+            <a:r>
+              <a:rPr lang="en-CA" dirty="0"/>
+              <a:t> des </a:t>
+            </a:r>
+            <a:r>
+              <a:rPr lang="en-CA" dirty="0" err="1"/>
+              <a:t>capteurs</a:t>
+            </a:r>
+            <a:r>
+              <a:rPr lang="en-CA" dirty="0"/>
+              <a:t> et </a:t>
+            </a:r>
+            <a:r>
+              <a:rPr lang="en-CA" dirty="0" err="1"/>
+              <a:t>envoie</a:t>
+            </a:r>
+            <a:r>
+              <a:rPr lang="en-CA" dirty="0"/>
+              <a:t> </a:t>
+            </a:r>
+            <a:r>
+              <a:rPr lang="en-CA" dirty="0" err="1"/>
+              <a:t>une</a:t>
+            </a:r>
+            <a:r>
+              <a:rPr lang="en-CA" dirty="0"/>
+              <a:t> </a:t>
+            </a:r>
+            <a:r>
+              <a:rPr lang="en-CA" dirty="0" err="1"/>
+              <a:t>commande</a:t>
+            </a:r>
+            <a:r>
+              <a:rPr lang="en-CA" dirty="0"/>
+              <a:t> </a:t>
+            </a:r>
+            <a:r>
+              <a:rPr lang="en-CA" dirty="0" err="1"/>
+              <a:t>si</a:t>
+            </a:r>
+            <a:r>
+              <a:rPr lang="en-CA" dirty="0"/>
+              <a:t> </a:t>
+            </a:r>
+            <a:r>
+              <a:rPr lang="en-CA" dirty="0" err="1"/>
+              <a:t>nécessaire</a:t>
+            </a:r>
+            <a:endParaRPr lang="en-CA" dirty="0"/>
+          </a:p>
+          <a:p>
+            <a:endParaRPr lang="en-CA" dirty="0"/>
+          </a:p>
+        </p:txBody>
+      </p:sp>
+    </p:spTree>
+    <p:extLst>
+      <p:ext uri="{BB962C8B-B14F-4D97-AF65-F5344CB8AC3E}">
+        <p14:creationId xmlns:p14="http://schemas.microsoft.com/office/powerpoint/2010/main" val="986008905"/>
+      </p:ext>
+    </p:extLst>
+  </p:cSld>
+  <p:clrMapOvr>
+    <a:masterClrMapping/>
+  </p:clrMapOvr>
+</p:sld>
+</file>
+
+<file path=ppt/slides/slide7.xml><?xml version="1.0" encoding="utf-8"?>
+<p:sld xmlns:a="http://schemas.openxmlformats.org/drawingml/2006/main" xmlns:r="http://schemas.openxmlformats.org/officeDocument/2006/relationships" xmlns:p="http://schemas.openxmlformats.org/presentationml/2006/main">
+  <p:cSld>
+    <p:spTree>
+      <p:nvGrpSpPr>
+        <p:cNvPr id="1" name=""/>
+        <p:cNvGrpSpPr/>
+        <p:nvPr/>
+      </p:nvGrpSpPr>
+      <p:grpSpPr>
+        <a:xfrm>
+          <a:off x="0" y="0"/>
+          <a:ext cx="0" cy="0"/>
+          <a:chOff x="0" y="0"/>
+          <a:chExt cx="0" cy="0"/>
+        </a:xfrm>
+      </p:grpSpPr>
+      <p:sp>
+        <p:nvSpPr>
+          <p:cNvPr id="2" name="Title 1">
+            <a:extLst>
+              <a:ext uri="{FF2B5EF4-FFF2-40B4-BE49-F238E27FC236}">
+                <a16:creationId xmlns:a16="http://schemas.microsoft.com/office/drawing/2014/main" id="{57AE6C2F-E93C-4A13-BFBF-2291D335938B}"/>
+              </a:ext>
+            </a:extLst>
+          </p:cNvPr>
+          <p:cNvSpPr>
+            <a:spLocks noGrp="1"/>
+          </p:cNvSpPr>
+          <p:nvPr>
+            <p:ph type="title"/>
+          </p:nvPr>
+        </p:nvSpPr>
+        <p:spPr>
+          <a:xfrm>
+            <a:off x="1484309" y="0"/>
+            <a:ext cx="10018713" cy="1752599"/>
+          </a:xfrm>
+        </p:spPr>
+        <p:txBody>
+          <a:bodyPr/>
+          <a:lstStyle/>
+          <a:p>
+            <a:r>
+              <a:rPr lang="en-CA" dirty="0"/>
+              <a:t>Architecture </a:t>
+            </a:r>
+            <a:r>
+              <a:rPr lang="en-CA" dirty="0" err="1"/>
+              <a:t>globale</a:t>
+            </a:r>
+            <a:endParaRPr lang="en-CA" dirty="0"/>
+          </a:p>
+        </p:txBody>
+      </p:sp>
+      <p:graphicFrame>
+        <p:nvGraphicFramePr>
+          <p:cNvPr id="5" name="Table 4">
+            <a:extLst>
+              <a:ext uri="{FF2B5EF4-FFF2-40B4-BE49-F238E27FC236}">
+                <a16:creationId xmlns:a16="http://schemas.microsoft.com/office/drawing/2014/main" id="{DA087B87-A4E2-424C-A303-D175DDBD92E0}"/>
+              </a:ext>
+            </a:extLst>
+          </p:cNvPr>
+          <p:cNvGraphicFramePr>
+            <a:graphicFrameLocks noGrp="1"/>
+          </p:cNvGraphicFramePr>
+          <p:nvPr>
+            <p:extLst/>
+          </p:nvPr>
+        </p:nvGraphicFramePr>
+        <p:xfrm>
+          <a:off x="1653442" y="1452685"/>
+          <a:ext cx="8885116" cy="3601355"/>
+        </p:xfrm>
+        <a:graphic>
+          <a:graphicData uri="http://schemas.openxmlformats.org/drawingml/2006/table">
+            <a:tbl>
+              <a:tblPr firstRow="1" bandRow="1">
+                <a:tableStyleId>{5C22544A-7EE6-4342-B048-85BDC9FD1C3A}</a:tableStyleId>
+              </a:tblPr>
+              <a:tblGrid>
+                <a:gridCol w="4442558">
+                  <a:extLst>
+                    <a:ext uri="{9D8B030D-6E8A-4147-A177-3AD203B41FA5}">
+                      <a16:colId xmlns:a16="http://schemas.microsoft.com/office/drawing/2014/main" val="2474516255"/>
+                    </a:ext>
+                  </a:extLst>
+                </a:gridCol>
+                <a:gridCol w="4442558">
+                  <a:extLst>
+                    <a:ext uri="{9D8B030D-6E8A-4147-A177-3AD203B41FA5}">
+                      <a16:colId xmlns:a16="http://schemas.microsoft.com/office/drawing/2014/main" val="2917661861"/>
+                    </a:ext>
+                  </a:extLst>
+                </a:gridCol>
+              </a:tblGrid>
+              <a:tr h="549604">
+                <a:tc>
+                  <a:txBody>
+                    <a:bodyPr/>
+                    <a:lstStyle/>
+                    <a:p>
+                      <a:r>
+                        <a:rPr lang="en-CA" dirty="0" err="1"/>
+                        <a:t>Capteur</a:t>
+                      </a:r>
+                      <a:endParaRPr lang="en-CA" dirty="0"/>
+                    </a:p>
+                  </a:txBody>
+                  <a:tcPr/>
+                </a:tc>
+                <a:tc>
+                  <a:txBody>
+                    <a:bodyPr/>
+                    <a:lstStyle/>
+                    <a:p>
+                      <a:r>
+                        <a:rPr lang="en-CA" dirty="0" err="1"/>
+                        <a:t>Caractéristiques</a:t>
+                      </a:r>
+                      <a:endParaRPr lang="en-CA" dirty="0"/>
+                    </a:p>
+                  </a:txBody>
+                  <a:tcPr/>
+                </a:tc>
+                <a:extLst>
+                  <a:ext uri="{0D108BD9-81ED-4DB2-BD59-A6C34878D82A}">
+                    <a16:rowId xmlns:a16="http://schemas.microsoft.com/office/drawing/2014/main" val="2317750631"/>
+                  </a:ext>
+                </a:extLst>
+              </a:tr>
+              <a:tr h="948631">
+                <a:tc>
+                  <a:txBody>
+                    <a:bodyPr/>
+                    <a:lstStyle/>
+                    <a:p>
+                      <a:r>
+                        <a:rPr lang="en-CA" dirty="0" err="1"/>
+                        <a:t>Température</a:t>
+                      </a:r>
+                      <a:r>
+                        <a:rPr lang="en-CA" dirty="0"/>
+                        <a:t> (</a:t>
+                      </a:r>
+                      <a:r>
+                        <a:rPr lang="en-CA" dirty="0" err="1"/>
+                        <a:t>série</a:t>
+                      </a:r>
+                      <a:r>
+                        <a:rPr lang="en-CA" dirty="0"/>
+                        <a:t> S5855A_E)</a:t>
+                      </a:r>
+                    </a:p>
+                  </a:txBody>
+                  <a:tcPr/>
+                </a:tc>
+                <a:tc>
+                  <a:txBody>
+                    <a:bodyPr/>
+                    <a:lstStyle/>
+                    <a:p>
+                      <a:r>
+                        <a:rPr lang="en-CA" dirty="0"/>
+                        <a:t>-</a:t>
+                      </a:r>
+                      <a:r>
+                        <a:rPr lang="en-CA" dirty="0" err="1"/>
+                        <a:t>Couvre</a:t>
+                      </a:r>
+                      <a:r>
+                        <a:rPr lang="en-CA" dirty="0"/>
+                        <a:t> les </a:t>
+                      </a:r>
+                      <a:r>
+                        <a:rPr lang="en-CA" dirty="0" err="1"/>
+                        <a:t>températures</a:t>
+                      </a:r>
+                      <a:r>
+                        <a:rPr lang="en-CA" dirty="0"/>
+                        <a:t> du Québec</a:t>
+                      </a:r>
+                    </a:p>
+                    <a:p>
+                      <a:r>
+                        <a:rPr lang="en-CA" dirty="0"/>
+                        <a:t>-</a:t>
+                      </a:r>
+                      <a:r>
+                        <a:rPr lang="en-CA" dirty="0" err="1"/>
+                        <a:t>Consomme</a:t>
+                      </a:r>
+                      <a:r>
+                        <a:rPr lang="en-CA" dirty="0"/>
+                        <a:t> </a:t>
+                      </a:r>
+                      <a:r>
+                        <a:rPr lang="en-CA" dirty="0" err="1"/>
+                        <a:t>peu</a:t>
+                      </a:r>
+                      <a:r>
+                        <a:rPr lang="en-CA" dirty="0"/>
+                        <a:t> pour </a:t>
+                      </a:r>
+                      <a:r>
+                        <a:rPr lang="en-CA" dirty="0" err="1"/>
+                        <a:t>opération</a:t>
+                      </a:r>
+                      <a:endParaRPr lang="en-CA" dirty="0"/>
+                    </a:p>
+                    <a:p>
+                      <a:r>
+                        <a:rPr lang="en-CA" dirty="0"/>
+                        <a:t>-Sortie PWM</a:t>
+                      </a:r>
+                    </a:p>
+                  </a:txBody>
+                  <a:tcPr/>
+                </a:tc>
+                <a:extLst>
+                  <a:ext uri="{0D108BD9-81ED-4DB2-BD59-A6C34878D82A}">
+                    <a16:rowId xmlns:a16="http://schemas.microsoft.com/office/drawing/2014/main" val="1527509176"/>
+                  </a:ext>
+                </a:extLst>
+              </a:tr>
+              <a:tr h="1355187">
+                <a:tc>
+                  <a:txBody>
+                    <a:bodyPr/>
+                    <a:lstStyle/>
+                    <a:p>
+                      <a:r>
+                        <a:rPr lang="en-CA" dirty="0"/>
+                        <a:t>Force (</a:t>
+                      </a:r>
+                      <a:r>
+                        <a:rPr lang="en-CA" dirty="0" err="1"/>
+                        <a:t>série</a:t>
+                      </a:r>
+                      <a:r>
+                        <a:rPr lang="en-CA" dirty="0"/>
+                        <a:t> FC22)</a:t>
+                      </a:r>
+                    </a:p>
+                  </a:txBody>
+                  <a:tcPr/>
+                </a:tc>
+                <a:tc>
+                  <a:txBody>
+                    <a:bodyPr/>
+                    <a:lstStyle/>
+                    <a:p>
+                      <a:r>
+                        <a:rPr lang="en-CA" dirty="0"/>
+                        <a:t>-</a:t>
+                      </a:r>
+                      <a:r>
+                        <a:rPr lang="en-CA" dirty="0" err="1"/>
+                        <a:t>Couvre</a:t>
+                      </a:r>
+                      <a:r>
+                        <a:rPr lang="en-CA" dirty="0"/>
+                        <a:t> le </a:t>
+                      </a:r>
+                      <a:r>
+                        <a:rPr lang="en-CA" dirty="0" err="1"/>
+                        <a:t>poids</a:t>
+                      </a:r>
+                      <a:r>
+                        <a:rPr lang="en-CA" dirty="0"/>
+                        <a:t> </a:t>
+                      </a:r>
+                      <a:r>
+                        <a:rPr lang="en-CA" dirty="0" err="1"/>
+                        <a:t>d’une</a:t>
+                      </a:r>
+                      <a:r>
+                        <a:rPr lang="en-CA" dirty="0"/>
+                        <a:t> </a:t>
+                      </a:r>
+                      <a:r>
+                        <a:rPr lang="en-CA" dirty="0" err="1"/>
+                        <a:t>ruche</a:t>
+                      </a:r>
+                      <a:endParaRPr lang="en-CA" dirty="0"/>
+                    </a:p>
+                    <a:p>
+                      <a:r>
+                        <a:rPr lang="en-CA" dirty="0"/>
+                        <a:t>-</a:t>
+                      </a:r>
+                      <a:r>
+                        <a:rPr lang="en-CA" dirty="0" err="1"/>
+                        <a:t>Fonctionne</a:t>
+                      </a:r>
+                      <a:r>
+                        <a:rPr lang="en-CA" dirty="0"/>
+                        <a:t> </a:t>
+                      </a:r>
+                      <a:r>
+                        <a:rPr lang="en-CA" dirty="0" err="1"/>
+                        <a:t>dans</a:t>
+                      </a:r>
+                      <a:r>
+                        <a:rPr lang="en-CA" dirty="0"/>
+                        <a:t> les temperatures du Québec</a:t>
+                      </a:r>
+                    </a:p>
+                    <a:p>
+                      <a:r>
+                        <a:rPr lang="en-CA" dirty="0"/>
+                        <a:t>-Sortie </a:t>
+                      </a:r>
+                      <a:r>
+                        <a:rPr lang="en-CA" dirty="0" err="1"/>
+                        <a:t>analogique</a:t>
+                      </a:r>
+                      <a:r>
+                        <a:rPr lang="en-CA" dirty="0"/>
+                        <a:t> avec </a:t>
+                      </a:r>
+                      <a:r>
+                        <a:rPr lang="en-CA" dirty="0" err="1"/>
+                        <a:t>pont</a:t>
+                      </a:r>
+                      <a:r>
+                        <a:rPr lang="en-CA" dirty="0"/>
+                        <a:t> de </a:t>
+                      </a:r>
+                      <a:r>
+                        <a:rPr lang="en-CA" dirty="0" err="1"/>
+                        <a:t>wheatstone</a:t>
+                      </a:r>
+                      <a:r>
+                        <a:rPr lang="en-CA" dirty="0"/>
+                        <a:t> (4 ports </a:t>
+                      </a:r>
+                      <a:r>
+                        <a:rPr lang="en-CA" dirty="0" err="1"/>
+                        <a:t>nécessaires</a:t>
+                      </a:r>
+                      <a:r>
+                        <a:rPr lang="en-CA" dirty="0"/>
+                        <a:t>)</a:t>
+                      </a:r>
+                    </a:p>
+                  </a:txBody>
+                  <a:tcPr/>
+                </a:tc>
+                <a:extLst>
+                  <a:ext uri="{0D108BD9-81ED-4DB2-BD59-A6C34878D82A}">
+                    <a16:rowId xmlns:a16="http://schemas.microsoft.com/office/drawing/2014/main" val="3165022307"/>
+                  </a:ext>
+                </a:extLst>
+              </a:tr>
+              <a:tr h="549604">
+                <a:tc>
+                  <a:txBody>
+                    <a:bodyPr/>
+                    <a:lstStyle/>
+                    <a:p>
+                      <a:r>
+                        <a:rPr lang="en-CA" dirty="0"/>
+                        <a:t>Position </a:t>
+                      </a:r>
+                      <a:r>
+                        <a:rPr lang="en-CA" b="0" dirty="0"/>
+                        <a:t>(</a:t>
+                      </a:r>
+                      <a:r>
+                        <a:rPr lang="en-CA" sz="1800" b="0" i="0" kern="1200" dirty="0">
+                          <a:solidFill>
+                            <a:schemeClr val="dk1"/>
+                          </a:solidFill>
+                          <a:effectLst/>
+                          <a:latin typeface="+mn-lt"/>
+                          <a:ea typeface="+mn-ea"/>
+                          <a:cs typeface="+mn-cs"/>
+                        </a:rPr>
+                        <a:t>RB-Fee-67</a:t>
+                      </a:r>
+                      <a:r>
+                        <a:rPr lang="en-CA" b="0" dirty="0"/>
+                        <a:t>)</a:t>
+                      </a:r>
+                    </a:p>
+                  </a:txBody>
+                  <a:tcPr/>
+                </a:tc>
+                <a:tc>
+                  <a:txBody>
+                    <a:bodyPr/>
+                    <a:lstStyle/>
+                    <a:p>
+                      <a:r>
+                        <a:rPr lang="en-CA" dirty="0"/>
+                        <a:t>-Communique via UART </a:t>
+                      </a:r>
+                    </a:p>
+                    <a:p>
+                      <a:r>
+                        <a:rPr lang="en-CA" dirty="0"/>
+                        <a:t>-Alimentation entre 2.75 et 3.6V</a:t>
+                      </a:r>
+                    </a:p>
+                  </a:txBody>
+                  <a:tcPr/>
+                </a:tc>
+                <a:extLst>
+                  <a:ext uri="{0D108BD9-81ED-4DB2-BD59-A6C34878D82A}">
+                    <a16:rowId xmlns:a16="http://schemas.microsoft.com/office/drawing/2014/main" val="1334639137"/>
+                  </a:ext>
+                </a:extLst>
+              </a:tr>
+            </a:tbl>
+          </a:graphicData>
+        </a:graphic>
+      </p:graphicFrame>
+    </p:spTree>
+    <p:extLst>
+      <p:ext uri="{BB962C8B-B14F-4D97-AF65-F5344CB8AC3E}">
+        <p14:creationId xmlns:p14="http://schemas.microsoft.com/office/powerpoint/2010/main" val="1776989636"/>
+      </p:ext>
+    </p:extLst>
+  </p:cSld>
+  <p:clrMapOvr>
+    <a:masterClrMapping/>
+  </p:clrMapOvr>
+</p:sld>
+</file>
+
+<file path=ppt/slides/slide8.xml><?xml version="1.0" encoding="utf-8"?>
+<p:sld xmlns:a="http://schemas.openxmlformats.org/drawingml/2006/main" xmlns:r="http://schemas.openxmlformats.org/officeDocument/2006/relationships" xmlns:p="http://schemas.openxmlformats.org/presentationml/2006/main">
+  <p:cSld>
+    <p:spTree>
+      <p:nvGrpSpPr>
+        <p:cNvPr id="1" name=""/>
+        <p:cNvGrpSpPr/>
+        <p:nvPr/>
+      </p:nvGrpSpPr>
+      <p:grpSpPr>
+        <a:xfrm>
+          <a:off x="0" y="0"/>
+          <a:ext cx="0" cy="0"/>
+          <a:chOff x="0" y="0"/>
+          <a:chExt cx="0" cy="0"/>
+        </a:xfrm>
+      </p:grpSpPr>
+      <p:sp>
+        <p:nvSpPr>
+          <p:cNvPr id="2" name="Title 1">
+            <a:extLst>
+              <a:ext uri="{FF2B5EF4-FFF2-40B4-BE49-F238E27FC236}">
+                <a16:creationId xmlns:a16="http://schemas.microsoft.com/office/drawing/2014/main" id="{57AE6C2F-E93C-4A13-BFBF-2291D335938B}"/>
+              </a:ext>
+            </a:extLst>
+          </p:cNvPr>
+          <p:cNvSpPr>
+            <a:spLocks noGrp="1"/>
+          </p:cNvSpPr>
+          <p:nvPr>
+            <p:ph type="title"/>
+          </p:nvPr>
+        </p:nvSpPr>
+        <p:spPr>
+          <a:xfrm>
+            <a:off x="1484309" y="0"/>
+            <a:ext cx="10018713" cy="1752599"/>
+          </a:xfrm>
+        </p:spPr>
+        <p:txBody>
+          <a:bodyPr/>
+          <a:lstStyle/>
+          <a:p>
+            <a:r>
+              <a:rPr lang="en-CA" dirty="0"/>
+              <a:t>Architecture </a:t>
+            </a:r>
+            <a:r>
+              <a:rPr lang="en-CA" dirty="0" err="1"/>
+              <a:t>globale</a:t>
+            </a:r>
+            <a:endParaRPr lang="en-CA" dirty="0"/>
+          </a:p>
+        </p:txBody>
+      </p:sp>
+      <p:sp>
+        <p:nvSpPr>
+          <p:cNvPr id="4" name="Content Placeholder 2">
+            <a:extLst>
+              <a:ext uri="{FF2B5EF4-FFF2-40B4-BE49-F238E27FC236}">
+                <a16:creationId xmlns:a16="http://schemas.microsoft.com/office/drawing/2014/main" id="{0B4A7325-9DB0-46E8-89B3-80B528F4E836}"/>
+              </a:ext>
+            </a:extLst>
+          </p:cNvPr>
+          <p:cNvSpPr>
+            <a:spLocks noGrp="1"/>
+          </p:cNvSpPr>
+          <p:nvPr>
+            <p:ph idx="1"/>
+          </p:nvPr>
+        </p:nvSpPr>
+        <p:spPr>
+          <a:xfrm>
+            <a:off x="1484308" y="1559168"/>
+            <a:ext cx="10018713" cy="3628294"/>
+          </a:xfrm>
+        </p:spPr>
+        <p:txBody>
+          <a:bodyPr/>
+          <a:lstStyle/>
+          <a:p>
+            <a:r>
+              <a:rPr lang="fr-CA" dirty="0"/>
+              <a:t>Ruche alimentée par une batterie, donc gestion de l’énergie importante</a:t>
+            </a:r>
+          </a:p>
+          <a:p>
+            <a:r>
+              <a:rPr lang="fr-CA" dirty="0"/>
+              <a:t>Batterie à 3.6V et 3000 mAh</a:t>
+            </a:r>
+          </a:p>
+          <a:p>
+            <a:r>
+              <a:rPr lang="fr-CA" dirty="0"/>
+              <a:t>Puissance requise d’opération:  </a:t>
+            </a:r>
+          </a:p>
+          <a:p>
+            <a:pPr marL="0" indent="0">
+              <a:buNone/>
+            </a:pPr>
+            <a:r>
+              <a:rPr lang="fr-CA" dirty="0"/>
+              <a:t> 				Temp + </a:t>
+            </a:r>
+            <a:r>
+              <a:rPr lang="fr-CA" dirty="0" err="1"/>
+              <a:t>L.Cell</a:t>
+            </a:r>
+            <a:r>
+              <a:rPr lang="fr-CA" dirty="0"/>
+              <a:t> + GPS + Micro. = Total</a:t>
+            </a:r>
+          </a:p>
+          <a:p>
+            <a:pPr marL="0" indent="0">
+              <a:buNone/>
+            </a:pPr>
+            <a:r>
+              <a:rPr lang="fr-CA" dirty="0"/>
+              <a:t>				0.2mW + 12mW + 12mW + 68.4mW = 92.6mW ≈ 100mW</a:t>
+            </a:r>
+          </a:p>
+          <a:p>
+            <a:r>
+              <a:rPr lang="fr-CA" dirty="0"/>
+              <a:t>Donc avec une seule batterie, le microcontrôleur peut rester actif à pleine capacité pendant environ 115 heures.</a:t>
+            </a:r>
+          </a:p>
+        </p:txBody>
+      </p:sp>
+    </p:spTree>
+    <p:extLst>
+      <p:ext uri="{BB962C8B-B14F-4D97-AF65-F5344CB8AC3E}">
+        <p14:creationId xmlns:p14="http://schemas.microsoft.com/office/powerpoint/2010/main" val="1915502978"/>
+      </p:ext>
+    </p:extLst>
+  </p:cSld>
+  <p:clrMapOvr>
+    <a:masterClrMapping/>
+  </p:clrMapOvr>
+</p:sld>
+</file>
+
 <file path=ppt/slides/slide9.xml><?xml version="1.0" encoding="utf-8"?>
 <p:sld xmlns:a="http://schemas.openxmlformats.org/drawingml/2006/main" xmlns:r="http://schemas.openxmlformats.org/officeDocument/2006/relationships" xmlns:p="http://schemas.openxmlformats.org/presentationml/2006/main">
   <p:cSld>
@@ -8008,7 +9106,7 @@
           <p:cNvPr id="2" name="Title 1">
             <a:extLst>
               <a:ext uri="{FF2B5EF4-FFF2-40B4-BE49-F238E27FC236}">
-                <a16:creationId xmlns:a16="http://schemas.microsoft.com/office/drawing/2014/main" id="{047326C3-7A2A-44FE-8485-1E7D1EB18A52}"/>
+                <a16:creationId xmlns:a16="http://schemas.microsoft.com/office/drawing/2014/main" id="{9381268A-48C6-4A90-B60F-BAEE9120674D}"/>
               </a:ext>
             </a:extLst>
           </p:cNvPr>
@@ -8025,8 +9123,20 @@
           <a:lstStyle/>
           <a:p>
             <a:r>
+              <a:rPr lang="en-CA" dirty="0" err="1"/>
+              <a:t>Requis</a:t>
+            </a:r>
+            <a:r>
               <a:rPr lang="en-CA" dirty="0"/>
-              <a:t>Prototype/prevue de concept de S6</a:t>
+              <a:t> au </a:t>
+            </a:r>
+            <a:r>
+              <a:rPr lang="en-CA" dirty="0" err="1"/>
+              <a:t>niveau</a:t>
+            </a:r>
+            <a:r>
+              <a:rPr lang="en-CA" dirty="0"/>
+              <a:t> RF</a:t>
             </a:r>
           </a:p>
         </p:txBody>
@@ -8036,7 +9146,7 @@
           <p:cNvPr id="3" name="Content Placeholder 2">
             <a:extLst>
               <a:ext uri="{FF2B5EF4-FFF2-40B4-BE49-F238E27FC236}">
-                <a16:creationId xmlns:a16="http://schemas.microsoft.com/office/drawing/2014/main" id="{D2F1472F-27BE-426C-A2BA-76BA5073940E}"/>
+                <a16:creationId xmlns:a16="http://schemas.microsoft.com/office/drawing/2014/main" id="{17427B92-1811-464E-801C-5EE29A5B8D36}"/>
               </a:ext>
             </a:extLst>
           </p:cNvPr>
@@ -8052,115 +9162,50 @@
           <a:bodyPr/>
           <a:lstStyle/>
           <a:p>
-            <a:pPr marL="0" indent="0">
-              <a:buNone/>
-            </a:pPr>
-            <a:r>
-              <a:rPr lang="en-CA" dirty="0"/>
-              <a:t>Limitations du prototype</a:t>
-            </a:r>
-          </a:p>
-          <a:p>
-            <a:r>
-              <a:rPr lang="en-CA" dirty="0"/>
-              <a:t>Source </a:t>
-            </a:r>
-            <a:r>
-              <a:rPr lang="en-CA" dirty="0" err="1"/>
-              <a:t>d’alimentation</a:t>
-            </a:r>
-            <a:endParaRPr lang="en-CA" dirty="0"/>
-          </a:p>
-          <a:p>
-            <a:r>
-              <a:rPr lang="en-CA" dirty="0"/>
-              <a:t>Tests sur insects </a:t>
-            </a:r>
-            <a:r>
-              <a:rPr lang="en-CA" dirty="0" err="1"/>
-              <a:t>vivants</a:t>
-            </a:r>
-            <a:endParaRPr lang="en-CA" dirty="0"/>
-          </a:p>
-          <a:p>
-            <a:r>
-              <a:rPr lang="en-CA" dirty="0" err="1"/>
-              <a:t>Indicateurs</a:t>
-            </a:r>
-            <a:r>
-              <a:rPr lang="en-CA" dirty="0"/>
+            <a:r>
+              <a:rPr lang="fr-CA" b="1" dirty="0" smtClean="0"/>
+              <a:t>MAPAQ:</a:t>
+            </a:r>
+            <a:r>
+              <a:rPr lang="fr-CA" dirty="0" smtClean="0"/>
+              <a:t> Minimum 15 mètres de distances avec les routes publiques</a:t>
+            </a:r>
+          </a:p>
+          <a:p>
+            <a:r>
+              <a:rPr lang="fr-CA" b="1" dirty="0" smtClean="0"/>
+              <a:t>Statistique Canada 2006:</a:t>
+            </a:r>
+            <a:r>
+              <a:rPr lang="fr-CA" dirty="0" smtClean="0"/>
+              <a:t> Taille moyenne fermes canadiennes : 728 acres soit environ 3 km</a:t>
+            </a:r>
+            <a:r>
+              <a:rPr lang="fr-CA" baseline="30000" dirty="0" smtClean="0"/>
+              <a:t>2</a:t>
+            </a:r>
+            <a:r>
+              <a:rPr lang="fr-CA" dirty="0" smtClean="0"/>
               <a:t> </a:t>
             </a:r>
-            <a:r>
-              <a:rPr lang="en-CA" dirty="0" err="1"/>
-              <a:t>chimiques</a:t>
-            </a:r>
-            <a:endParaRPr lang="en-CA" dirty="0"/>
-          </a:p>
-          <a:p>
-            <a:r>
-              <a:rPr lang="en-CA" dirty="0" err="1"/>
-              <a:t>Réseautage</a:t>
-            </a:r>
-            <a:r>
-              <a:rPr lang="en-CA" dirty="0"/>
-              <a:t> de </a:t>
-            </a:r>
-            <a:r>
-              <a:rPr lang="en-CA" dirty="0" err="1"/>
-              <a:t>ruche</a:t>
-            </a:r>
-            <a:r>
-              <a:rPr lang="en-CA" dirty="0"/>
-              <a:t> à </a:t>
-            </a:r>
-            <a:r>
-              <a:rPr lang="en-CA" dirty="0" err="1"/>
-              <a:t>ruche</a:t>
-            </a:r>
-            <a:endParaRPr lang="en-CA" dirty="0"/>
-          </a:p>
-          <a:p>
-            <a:r>
-              <a:rPr lang="en-CA" dirty="0"/>
-              <a:t>Interface </a:t>
-            </a:r>
-            <a:r>
-              <a:rPr lang="en-CA" dirty="0" err="1"/>
-              <a:t>avancée</a:t>
-            </a:r>
-            <a:r>
-              <a:rPr lang="en-CA" dirty="0"/>
-              <a:t> et gestion de </a:t>
-            </a:r>
-            <a:r>
-              <a:rPr lang="en-CA" dirty="0" err="1"/>
-              <a:t>ruches</a:t>
-            </a:r>
-            <a:r>
-              <a:rPr lang="en-CA" dirty="0"/>
-              <a:t> à </a:t>
-            </a:r>
-            <a:r>
-              <a:rPr lang="en-CA" dirty="0" err="1"/>
-              <a:t>grande</a:t>
-            </a:r>
-            <a:r>
-              <a:rPr lang="en-CA" dirty="0"/>
-              <a:t> </a:t>
-            </a:r>
-            <a:r>
-              <a:rPr lang="en-CA" dirty="0" err="1"/>
-              <a:t>échelle</a:t>
-            </a:r>
-            <a:endParaRPr lang="en-CA" dirty="0"/>
+          </a:p>
+          <a:p>
+            <a:r>
+              <a:rPr lang="fr-CA" b="1" dirty="0" smtClean="0"/>
+              <a:t>Agriculture Québec:</a:t>
+            </a:r>
+            <a:r>
+              <a:rPr lang="fr-CA" dirty="0" smtClean="0"/>
+              <a:t> Distance entre les ruchers 3 à 4 kilomètres</a:t>
+            </a:r>
+            <a:endParaRPr lang="fr-CA" b="1" dirty="0"/>
           </a:p>
         </p:txBody>
       </p:sp>
     </p:spTree>
     <p:extLst>
       <p:ext uri="{BB962C8B-B14F-4D97-AF65-F5344CB8AC3E}">
-        <p14:creationId xmlns:p14="http://schemas.microsoft.com/office/powerpoint/2010/main" val="967102364"/>
+        <p14:creationId xmlns:p14="http://schemas.microsoft.com/office/powerpoint/2010/main" val="4263543544"/>
       </p:ext>
     </p:extLst>
   </p:cSld>

</xml_diff>

<commit_message>
PT-25 modifie les capteurs utilises
</commit_message>
<xml_diff>
--- a/Dossier de Conception.pptx
+++ b/Dossier de Conception.pptx
@@ -628,7 +628,7 @@
           <a:p>
             <a:fld id="{F81637C0-94AD-483C-A163-E4595C514589}" type="datetimeFigureOut">
               <a:rPr lang="en-CA" smtClean="0"/>
-              <a:t>2018-09-19</a:t>
+              <a:t>19/09/2018</a:t>
             </a:fld>
             <a:endParaRPr lang="en-CA"/>
           </a:p>
@@ -675,7 +675,7 @@
           <a:p>
             <a:fld id="{5651D7FC-DF07-4DDA-A65D-263378C9ADA7}" type="slidenum">
               <a:rPr lang="en-CA" smtClean="0"/>
-              <a:t>‹N°›</a:t>
+              <a:t>‹#›</a:t>
             </a:fld>
             <a:endParaRPr lang="en-CA"/>
           </a:p>
@@ -929,7 +929,7 @@
           <a:p>
             <a:fld id="{F81637C0-94AD-483C-A163-E4595C514589}" type="datetimeFigureOut">
               <a:rPr lang="en-CA" smtClean="0"/>
-              <a:t>2018-09-19</a:t>
+              <a:t>19/09/2018</a:t>
             </a:fld>
             <a:endParaRPr lang="en-CA"/>
           </a:p>
@@ -971,7 +971,7 @@
           <a:p>
             <a:fld id="{5651D7FC-DF07-4DDA-A65D-263378C9ADA7}" type="slidenum">
               <a:rPr lang="en-CA" smtClean="0"/>
-              <a:t>‹N°›</a:t>
+              <a:t>‹#›</a:t>
             </a:fld>
             <a:endParaRPr lang="en-CA"/>
           </a:p>
@@ -1177,7 +1177,7 @@
           <a:p>
             <a:fld id="{F81637C0-94AD-483C-A163-E4595C514589}" type="datetimeFigureOut">
               <a:rPr lang="en-CA" smtClean="0"/>
-              <a:t>2018-09-19</a:t>
+              <a:t>19/09/2018</a:t>
             </a:fld>
             <a:endParaRPr lang="en-CA"/>
           </a:p>
@@ -1219,7 +1219,7 @@
           <a:p>
             <a:fld id="{5651D7FC-DF07-4DDA-A65D-263378C9ADA7}" type="slidenum">
               <a:rPr lang="en-CA" smtClean="0"/>
-              <a:t>‹N°›</a:t>
+              <a:t>‹#›</a:t>
             </a:fld>
             <a:endParaRPr lang="en-CA"/>
           </a:p>
@@ -1717,7 +1717,7 @@
           <a:p>
             <a:fld id="{F81637C0-94AD-483C-A163-E4595C514589}" type="datetimeFigureOut">
               <a:rPr lang="en-CA" smtClean="0"/>
-              <a:t>2018-09-19</a:t>
+              <a:t>19/09/2018</a:t>
             </a:fld>
             <a:endParaRPr lang="en-CA"/>
           </a:p>
@@ -1759,7 +1759,7 @@
           <a:p>
             <a:fld id="{5651D7FC-DF07-4DDA-A65D-263378C9ADA7}" type="slidenum">
               <a:rPr lang="en-CA" smtClean="0"/>
-              <a:t>‹N°›</a:t>
+              <a:t>‹#›</a:t>
             </a:fld>
             <a:endParaRPr lang="en-CA"/>
           </a:p>
@@ -1965,7 +1965,7 @@
           <a:p>
             <a:fld id="{F81637C0-94AD-483C-A163-E4595C514589}" type="datetimeFigureOut">
               <a:rPr lang="en-CA" smtClean="0"/>
-              <a:t>2018-09-19</a:t>
+              <a:t>19/09/2018</a:t>
             </a:fld>
             <a:endParaRPr lang="en-CA"/>
           </a:p>
@@ -2007,7 +2007,7 @@
           <a:p>
             <a:fld id="{5651D7FC-DF07-4DDA-A65D-263378C9ADA7}" type="slidenum">
               <a:rPr lang="en-CA" smtClean="0"/>
-              <a:t>‹N°›</a:t>
+              <a:t>‹#›</a:t>
             </a:fld>
             <a:endParaRPr lang="en-CA"/>
           </a:p>
@@ -2497,7 +2497,7 @@
           <a:p>
             <a:fld id="{F81637C0-94AD-483C-A163-E4595C514589}" type="datetimeFigureOut">
               <a:rPr lang="en-CA" smtClean="0"/>
-              <a:t>2018-09-19</a:t>
+              <a:t>19/09/2018</a:t>
             </a:fld>
             <a:endParaRPr lang="en-CA"/>
           </a:p>
@@ -2539,7 +2539,7 @@
           <a:p>
             <a:fld id="{5651D7FC-DF07-4DDA-A65D-263378C9ADA7}" type="slidenum">
               <a:rPr lang="en-CA" smtClean="0"/>
-              <a:t>‹N°›</a:t>
+              <a:t>‹#›</a:t>
             </a:fld>
             <a:endParaRPr lang="en-CA"/>
           </a:p>
@@ -2794,7 +2794,7 @@
           <a:p>
             <a:fld id="{F81637C0-94AD-483C-A163-E4595C514589}" type="datetimeFigureOut">
               <a:rPr lang="en-CA" smtClean="0"/>
-              <a:t>2018-09-19</a:t>
+              <a:t>19/09/2018</a:t>
             </a:fld>
             <a:endParaRPr lang="en-CA"/>
           </a:p>
@@ -2836,7 +2836,7 @@
           <a:p>
             <a:fld id="{5651D7FC-DF07-4DDA-A65D-263378C9ADA7}" type="slidenum">
               <a:rPr lang="en-CA" smtClean="0"/>
-              <a:t>‹N°›</a:t>
+              <a:t>‹#›</a:t>
             </a:fld>
             <a:endParaRPr lang="en-CA"/>
           </a:p>
@@ -2968,7 +2968,7 @@
           <a:p>
             <a:fld id="{F81637C0-94AD-483C-A163-E4595C514589}" type="datetimeFigureOut">
               <a:rPr lang="en-CA" smtClean="0"/>
-              <a:t>2018-09-19</a:t>
+              <a:t>19/09/2018</a:t>
             </a:fld>
             <a:endParaRPr lang="en-CA"/>
           </a:p>
@@ -3010,7 +3010,7 @@
           <a:p>
             <a:fld id="{5651D7FC-DF07-4DDA-A65D-263378C9ADA7}" type="slidenum">
               <a:rPr lang="en-CA" smtClean="0"/>
-              <a:t>‹N°›</a:t>
+              <a:t>‹#›</a:t>
             </a:fld>
             <a:endParaRPr lang="en-CA"/>
           </a:p>
@@ -3148,7 +3148,7 @@
           <a:p>
             <a:fld id="{F81637C0-94AD-483C-A163-E4595C514589}" type="datetimeFigureOut">
               <a:rPr lang="en-CA" smtClean="0"/>
-              <a:t>2018-09-19</a:t>
+              <a:t>19/09/2018</a:t>
             </a:fld>
             <a:endParaRPr lang="en-CA"/>
           </a:p>
@@ -3190,7 +3190,7 @@
           <a:p>
             <a:fld id="{5651D7FC-DF07-4DDA-A65D-263378C9ADA7}" type="slidenum">
               <a:rPr lang="en-CA" smtClean="0"/>
-              <a:t>‹N°›</a:t>
+              <a:t>‹#›</a:t>
             </a:fld>
             <a:endParaRPr lang="en-CA"/>
           </a:p>
@@ -3364,7 +3364,7 @@
           <a:p>
             <a:fld id="{F81637C0-94AD-483C-A163-E4595C514589}" type="datetimeFigureOut">
               <a:rPr lang="en-CA" smtClean="0"/>
-              <a:t>2018-09-19</a:t>
+              <a:t>19/09/2018</a:t>
             </a:fld>
             <a:endParaRPr lang="en-CA"/>
           </a:p>
@@ -3411,7 +3411,7 @@
           <a:p>
             <a:fld id="{5651D7FC-DF07-4DDA-A65D-263378C9ADA7}" type="slidenum">
               <a:rPr lang="en-CA" smtClean="0"/>
-              <a:t>‹N°›</a:t>
+              <a:t>‹#›</a:t>
             </a:fld>
             <a:endParaRPr lang="en-CA"/>
           </a:p>
@@ -3615,7 +3615,7 @@
           <a:p>
             <a:fld id="{F81637C0-94AD-483C-A163-E4595C514589}" type="datetimeFigureOut">
               <a:rPr lang="en-CA" smtClean="0"/>
-              <a:t>2018-09-19</a:t>
+              <a:t>19/09/2018</a:t>
             </a:fld>
             <a:endParaRPr lang="en-CA"/>
           </a:p>
@@ -3657,7 +3657,7 @@
           <a:p>
             <a:fld id="{5651D7FC-DF07-4DDA-A65D-263378C9ADA7}" type="slidenum">
               <a:rPr lang="en-CA" smtClean="0"/>
-              <a:t>‹N°›</a:t>
+              <a:t>‹#›</a:t>
             </a:fld>
             <a:endParaRPr lang="en-CA"/>
           </a:p>
@@ -3967,7 +3967,7 @@
           <a:p>
             <a:fld id="{F81637C0-94AD-483C-A163-E4595C514589}" type="datetimeFigureOut">
               <a:rPr lang="en-CA" smtClean="0"/>
-              <a:t>2018-09-19</a:t>
+              <a:t>19/09/2018</a:t>
             </a:fld>
             <a:endParaRPr lang="en-CA"/>
           </a:p>
@@ -4009,7 +4009,7 @@
           <a:p>
             <a:fld id="{5651D7FC-DF07-4DDA-A65D-263378C9ADA7}" type="slidenum">
               <a:rPr lang="en-CA" smtClean="0"/>
-              <a:t>‹N°›</a:t>
+              <a:t>‹#›</a:t>
             </a:fld>
             <a:endParaRPr lang="en-CA"/>
           </a:p>
@@ -4459,7 +4459,7 @@
           <a:p>
             <a:fld id="{F81637C0-94AD-483C-A163-E4595C514589}" type="datetimeFigureOut">
               <a:rPr lang="en-CA" smtClean="0"/>
-              <a:t>2018-09-19</a:t>
+              <a:t>19/09/2018</a:t>
             </a:fld>
             <a:endParaRPr lang="en-CA"/>
           </a:p>
@@ -4501,7 +4501,7 @@
           <a:p>
             <a:fld id="{5651D7FC-DF07-4DDA-A65D-263378C9ADA7}" type="slidenum">
               <a:rPr lang="en-CA" smtClean="0"/>
-              <a:t>‹N°›</a:t>
+              <a:t>‹#›</a:t>
             </a:fld>
             <a:endParaRPr lang="en-CA"/>
           </a:p>
@@ -4577,7 +4577,7 @@
           <a:p>
             <a:fld id="{F81637C0-94AD-483C-A163-E4595C514589}" type="datetimeFigureOut">
               <a:rPr lang="en-CA" smtClean="0"/>
-              <a:t>2018-09-19</a:t>
+              <a:t>19/09/2018</a:t>
             </a:fld>
             <a:endParaRPr lang="en-CA"/>
           </a:p>
@@ -4619,7 +4619,7 @@
           <a:p>
             <a:fld id="{5651D7FC-DF07-4DDA-A65D-263378C9ADA7}" type="slidenum">
               <a:rPr lang="en-CA" smtClean="0"/>
-              <a:t>‹N°›</a:t>
+              <a:t>‹#›</a:t>
             </a:fld>
             <a:endParaRPr lang="en-CA"/>
           </a:p>
@@ -4672,7 +4672,7 @@
           <a:p>
             <a:fld id="{F81637C0-94AD-483C-A163-E4595C514589}" type="datetimeFigureOut">
               <a:rPr lang="en-CA" smtClean="0"/>
-              <a:t>2018-09-19</a:t>
+              <a:t>19/09/2018</a:t>
             </a:fld>
             <a:endParaRPr lang="en-CA"/>
           </a:p>
@@ -4714,7 +4714,7 @@
           <a:p>
             <a:fld id="{5651D7FC-DF07-4DDA-A65D-263378C9ADA7}" type="slidenum">
               <a:rPr lang="en-CA" smtClean="0"/>
-              <a:t>‹N°›</a:t>
+              <a:t>‹#›</a:t>
             </a:fld>
             <a:endParaRPr lang="en-CA"/>
           </a:p>
@@ -4955,7 +4955,7 @@
           <a:p>
             <a:fld id="{F81637C0-94AD-483C-A163-E4595C514589}" type="datetimeFigureOut">
               <a:rPr lang="en-CA" smtClean="0"/>
-              <a:t>2018-09-19</a:t>
+              <a:t>19/09/2018</a:t>
             </a:fld>
             <a:endParaRPr lang="en-CA"/>
           </a:p>
@@ -4997,7 +4997,7 @@
           <a:p>
             <a:fld id="{5651D7FC-DF07-4DDA-A65D-263378C9ADA7}" type="slidenum">
               <a:rPr lang="en-CA" smtClean="0"/>
-              <a:t>‹N°›</a:t>
+              <a:t>‹#›</a:t>
             </a:fld>
             <a:endParaRPr lang="en-CA"/>
           </a:p>
@@ -5246,7 +5246,7 @@
           <a:p>
             <a:fld id="{F81637C0-94AD-483C-A163-E4595C514589}" type="datetimeFigureOut">
               <a:rPr lang="en-CA" smtClean="0"/>
-              <a:t>2018-09-19</a:t>
+              <a:t>19/09/2018</a:t>
             </a:fld>
             <a:endParaRPr lang="en-CA"/>
           </a:p>
@@ -5288,7 +5288,7 @@
           <a:p>
             <a:fld id="{5651D7FC-DF07-4DDA-A65D-263378C9ADA7}" type="slidenum">
               <a:rPr lang="en-CA" smtClean="0"/>
-              <a:t>‹N°›</a:t>
+              <a:t>‹#›</a:t>
             </a:fld>
             <a:endParaRPr lang="en-CA"/>
           </a:p>
@@ -5776,7 +5776,7 @@
           <a:p>
             <a:fld id="{F81637C0-94AD-483C-A163-E4595C514589}" type="datetimeFigureOut">
               <a:rPr lang="en-CA" smtClean="0"/>
-              <a:t>2018-09-19</a:t>
+              <a:t>19/09/2018</a:t>
             </a:fld>
             <a:endParaRPr lang="en-CA"/>
           </a:p>
@@ -5854,7 +5854,7 @@
           <a:p>
             <a:fld id="{5651D7FC-DF07-4DDA-A65D-263378C9ADA7}" type="slidenum">
               <a:rPr lang="en-CA" smtClean="0"/>
-              <a:t>‹N°›</a:t>
+              <a:t>‹#›</a:t>
             </a:fld>
             <a:endParaRPr lang="en-CA"/>
           </a:p>
@@ -6372,15 +6372,15 @@
             </a:r>
             <a:r>
               <a:rPr lang="en-CA" dirty="0"/>
-              <a:t>, Raphael Bouchard, Charles Carignan, 		Édouard </a:t>
+              <a:t>, Raphael Bouchard, Charles Carignan, 		Édouard Denommée, Jeffrey Fisher, Marc-Antoine 		</a:t>
             </a:r>
             <a:r>
               <a:rPr lang="en-CA" dirty="0" err="1"/>
-              <a:t>Dénommée</a:t>
+              <a:t>Houde</a:t>
             </a:r>
             <a:r>
               <a:rPr lang="en-CA" dirty="0"/>
-              <a:t>, Jeffrey Fisher, Marc-Antoine 		Houde 	et Sébastien Courtois</a:t>
+              <a:t> et Sébastien Courtois</a:t>
             </a:r>
           </a:p>
         </p:txBody>
@@ -6477,36 +6477,35 @@
           <a:lstStyle/>
           <a:p>
             <a:r>
-              <a:rPr lang="fr-CA" dirty="0" smtClean="0"/>
+              <a:rPr lang="fr-CA" dirty="0"/>
               <a:t>Demande de données température/</a:t>
             </a:r>
             <a:r>
-              <a:rPr lang="fr-CA" dirty="0" err="1" smtClean="0"/>
+              <a:rPr lang="fr-CA" dirty="0" err="1"/>
               <a:t>poid</a:t>
             </a:r>
             <a:r>
-              <a:rPr lang="fr-CA" dirty="0" smtClean="0"/>
+              <a:rPr lang="fr-CA" dirty="0"/>
               <a:t>: À chaque minute</a:t>
             </a:r>
           </a:p>
           <a:p>
             <a:r>
-              <a:rPr lang="fr-CA" dirty="0" smtClean="0"/>
+              <a:rPr lang="fr-CA" dirty="0"/>
               <a:t>Demande de données GPS: Une fois par jour</a:t>
             </a:r>
           </a:p>
           <a:p>
             <a:r>
-              <a:rPr lang="fr-CA" dirty="0" smtClean="0"/>
+              <a:rPr lang="fr-CA" dirty="0"/>
               <a:t>Demandes manuelles de tout les capteurs</a:t>
             </a:r>
           </a:p>
           <a:p>
             <a:r>
-              <a:rPr lang="fr-CA" dirty="0" smtClean="0"/>
+              <a:rPr lang="fr-CA" dirty="0"/>
               <a:t>Bande de fréquence utilisée: 2,4GHz</a:t>
             </a:r>
-            <a:endParaRPr lang="fr-CA" dirty="0"/>
           </a:p>
         </p:txBody>
       </p:sp>
@@ -6605,60 +6604,60 @@
               <a:buNone/>
             </a:pPr>
             <a:r>
-              <a:rPr lang="en-CA" u="sng" dirty="0" err="1" smtClean="0"/>
+              <a:rPr lang="en-CA" u="sng" dirty="0" err="1"/>
               <a:t>Criticité</a:t>
             </a:r>
             <a:r>
-              <a:rPr lang="en-CA" u="sng" dirty="0" smtClean="0"/>
+              <a:rPr lang="en-CA" u="sng" dirty="0"/>
               <a:t> des </a:t>
             </a:r>
             <a:r>
-              <a:rPr lang="en-CA" u="sng" dirty="0" err="1" smtClean="0"/>
+              <a:rPr lang="en-CA" u="sng" dirty="0" err="1"/>
               <a:t>données</a:t>
             </a:r>
-            <a:endParaRPr lang="en-CA" u="sng" dirty="0" smtClean="0"/>
-          </a:p>
-          <a:p>
-            <a:r>
-              <a:rPr lang="en-CA" dirty="0" err="1" smtClean="0"/>
+            <a:endParaRPr lang="en-CA" u="sng" dirty="0"/>
+          </a:p>
+          <a:p>
+            <a:r>
+              <a:rPr lang="en-CA" dirty="0" err="1"/>
               <a:t>Température</a:t>
             </a:r>
             <a:r>
-              <a:rPr lang="en-CA" dirty="0" smtClean="0"/>
+              <a:rPr lang="en-CA" dirty="0"/>
               <a:t>: </a:t>
             </a:r>
             <a:r>
-              <a:rPr lang="en-CA" dirty="0" err="1" smtClean="0"/>
+              <a:rPr lang="en-CA" dirty="0" err="1"/>
               <a:t>Moyenne</a:t>
             </a:r>
-            <a:endParaRPr lang="en-CA" dirty="0" smtClean="0"/>
-          </a:p>
-          <a:p>
-            <a:r>
-              <a:rPr lang="en-CA" dirty="0" err="1" smtClean="0"/>
+            <a:endParaRPr lang="en-CA" dirty="0"/>
+          </a:p>
+          <a:p>
+            <a:r>
+              <a:rPr lang="en-CA" dirty="0" err="1"/>
               <a:t>Poid</a:t>
             </a:r>
             <a:r>
-              <a:rPr lang="en-CA" dirty="0" smtClean="0"/>
+              <a:rPr lang="en-CA" dirty="0"/>
               <a:t>: </a:t>
             </a:r>
             <a:r>
-              <a:rPr lang="en-CA" dirty="0" err="1" smtClean="0"/>
+              <a:rPr lang="en-CA" dirty="0" err="1"/>
               <a:t>Faible</a:t>
             </a:r>
-            <a:endParaRPr lang="en-CA" dirty="0" smtClean="0"/>
-          </a:p>
-          <a:p>
-            <a:r>
-              <a:rPr lang="en-CA" dirty="0" err="1" smtClean="0"/>
+            <a:endParaRPr lang="en-CA" dirty="0"/>
+          </a:p>
+          <a:p>
+            <a:r>
+              <a:rPr lang="en-CA" dirty="0" err="1"/>
               <a:t>Données</a:t>
             </a:r>
             <a:r>
-              <a:rPr lang="en-CA" dirty="0" smtClean="0"/>
+              <a:rPr lang="en-CA" dirty="0"/>
               <a:t> GPS: </a:t>
             </a:r>
             <a:r>
-              <a:rPr lang="en-CA" dirty="0" err="1" smtClean="0"/>
+              <a:rPr lang="en-CA" dirty="0" err="1"/>
               <a:t>Moyenne</a:t>
             </a:r>
             <a:endParaRPr lang="en-CA" dirty="0"/>
@@ -7014,36 +7013,37 @@
             <a:pPr lvl="1"/>
             <a:r>
               <a:rPr lang="en-CA" dirty="0" err="1"/>
-              <a:t>Chauffage</a:t>
+              <a:t>Poids</a:t>
             </a:r>
             <a:endParaRPr lang="en-CA" dirty="0"/>
           </a:p>
           <a:p>
             <a:pPr lvl="1"/>
             <a:r>
+              <a:rPr lang="en-CA" dirty="0"/>
+              <a:t>Position</a:t>
+            </a:r>
+          </a:p>
+          <a:p>
+            <a:pPr lvl="1"/>
+            <a:r>
               <a:rPr lang="en-CA" dirty="0" err="1"/>
-              <a:t>Poids</a:t>
+              <a:t>Actuateur</a:t>
+            </a:r>
+            <a:r>
+              <a:rPr lang="en-CA" dirty="0"/>
+              <a:t> de </a:t>
+            </a:r>
+            <a:r>
+              <a:rPr lang="en-CA" dirty="0" err="1"/>
+              <a:t>démonstration</a:t>
             </a:r>
             <a:endParaRPr lang="en-CA" dirty="0"/>
           </a:p>
           <a:p>
-            <a:pPr lvl="1"/>
-            <a:r>
-              <a:rPr lang="en-CA" dirty="0" err="1"/>
-              <a:t>Mouvement</a:t>
-            </a:r>
-            <a:r>
-              <a:rPr lang="en-CA" dirty="0"/>
-              <a:t> / </a:t>
-            </a:r>
-            <a:r>
-              <a:rPr lang="en-CA" dirty="0" err="1"/>
-              <a:t>proximité</a:t>
-            </a:r>
-            <a:endParaRPr lang="en-CA" dirty="0"/>
-          </a:p>
-          <a:p>
-            <a:pPr lvl="1"/>
+            <a:pPr marL="457200" lvl="1" indent="0">
+              <a:buNone/>
+            </a:pPr>
             <a:endParaRPr lang="en-CA" dirty="0"/>
           </a:p>
         </p:txBody>
@@ -7076,8 +7076,8 @@
         </p:blipFill>
         <p:spPr>
           <a:xfrm>
-            <a:off x="6537469" y="2596392"/>
-            <a:ext cx="3124200" cy="3124200"/>
+            <a:off x="7884421" y="3228291"/>
+            <a:ext cx="2001618" cy="2001618"/>
           </a:xfrm>
           <a:prstGeom prst="rect">
             <a:avLst/>
@@ -7113,7 +7113,7 @@
         </p:blipFill>
         <p:spPr bwMode="auto">
           <a:xfrm>
-            <a:off x="6084111" y="4347243"/>
+            <a:off x="6713780" y="3409425"/>
             <a:ext cx="1672558" cy="1672558"/>
           </a:xfrm>
           <a:prstGeom prst="rect">
@@ -7133,10 +7133,10 @@
       </p:pic>
       <p:pic>
         <p:nvPicPr>
-          <p:cNvPr id="1030" name="Picture 6" descr="Image result for heating icon">
+          <p:cNvPr id="1028" name="Picture 4" descr="Image result for gps icon">
             <a:extLst>
               <a:ext uri="{FF2B5EF4-FFF2-40B4-BE49-F238E27FC236}">
-                <a16:creationId xmlns:a16="http://schemas.microsoft.com/office/drawing/2014/main" id="{839259F7-5BC1-4B9D-83F6-CBBE50263232}"/>
+                <a16:creationId xmlns:a16="http://schemas.microsoft.com/office/drawing/2014/main" id="{416683A9-9107-49B8-A35C-C145836BEEF6}"/>
               </a:ext>
             </a:extLst>
           </p:cNvPr>
@@ -7160,8 +7160,8 @@
         </p:blipFill>
         <p:spPr bwMode="auto">
           <a:xfrm>
-            <a:off x="7149166" y="4311242"/>
-            <a:ext cx="1900806" cy="1900806"/>
+            <a:off x="9886039" y="2112276"/>
+            <a:ext cx="1297149" cy="1297149"/>
           </a:xfrm>
           <a:prstGeom prst="rect">
             <a:avLst/>
@@ -7180,10 +7180,10 @@
       </p:pic>
       <p:pic>
         <p:nvPicPr>
-          <p:cNvPr id="1032" name="Picture 8" descr="Image result for sensor icon">
+          <p:cNvPr id="5" name="Picture 6" descr="Image result for scale icon">
             <a:extLst>
               <a:ext uri="{FF2B5EF4-FFF2-40B4-BE49-F238E27FC236}">
-                <a16:creationId xmlns:a16="http://schemas.microsoft.com/office/drawing/2014/main" id="{880D080C-0C4C-4849-A3DA-088FF3603512}"/>
+                <a16:creationId xmlns:a16="http://schemas.microsoft.com/office/drawing/2014/main" id="{3126E085-B6C5-4AB5-A61F-6AA9F3959A00}"/>
               </a:ext>
             </a:extLst>
           </p:cNvPr>
@@ -7207,55 +7207,8 @@
         </p:blipFill>
         <p:spPr bwMode="auto">
           <a:xfrm>
-            <a:off x="8679081" y="2706848"/>
-            <a:ext cx="1905000" cy="1905000"/>
-          </a:xfrm>
-          <a:prstGeom prst="rect">
-            <a:avLst/>
-          </a:prstGeom>
-          <a:noFill/>
-          <a:extLst>
-            <a:ext uri="{909E8E84-426E-40DD-AFC4-6F175D3DCCD1}">
-              <a14:hiddenFill xmlns:a14="http://schemas.microsoft.com/office/drawing/2010/main">
-                <a:solidFill>
-                  <a:srgbClr val="FFFFFF"/>
-                </a:solidFill>
-              </a14:hiddenFill>
-            </a:ext>
-          </a:extLst>
-        </p:spPr>
-      </p:pic>
-      <p:pic>
-        <p:nvPicPr>
-          <p:cNvPr id="1034" name="Picture 10" descr="Image result for danger icon">
-            <a:extLst>
-              <a:ext uri="{FF2B5EF4-FFF2-40B4-BE49-F238E27FC236}">
-                <a16:creationId xmlns:a16="http://schemas.microsoft.com/office/drawing/2014/main" id="{7A512B9D-2B4C-4987-A478-1A177087C247}"/>
-              </a:ext>
-            </a:extLst>
-          </p:cNvPr>
-          <p:cNvPicPr>
-            <a:picLocks noChangeAspect="1" noChangeArrowheads="1"/>
-          </p:cNvPicPr>
-          <p:nvPr/>
-        </p:nvPicPr>
-        <p:blipFill>
-          <a:blip r:embed="rId6">
-            <a:extLst>
-              <a:ext uri="{28A0092B-C50C-407E-A947-70E740481C1C}">
-                <a14:useLocalDpi xmlns:a14="http://schemas.microsoft.com/office/drawing/2010/main" val="0"/>
-              </a:ext>
-            </a:extLst>
-          </a:blip>
-          <a:srcRect/>
-          <a:stretch>
-            <a:fillRect/>
-          </a:stretch>
-        </p:blipFill>
-        <p:spPr bwMode="auto">
-          <a:xfrm>
-            <a:off x="10745568" y="3253705"/>
-            <a:ext cx="811286" cy="811286"/>
+            <a:off x="8421124" y="5298348"/>
+            <a:ext cx="928211" cy="928211"/>
           </a:xfrm>
           <a:prstGeom prst="rect">
             <a:avLst/>
@@ -7437,10 +7390,10 @@
       </p:sp>
       <p:pic>
         <p:nvPicPr>
-          <p:cNvPr id="2050" name="Picture 2" descr="Related image">
+          <p:cNvPr id="2052" name="Picture 4" descr="Image result for transmitter icon">
             <a:extLst>
               <a:ext uri="{FF2B5EF4-FFF2-40B4-BE49-F238E27FC236}">
-                <a16:creationId xmlns:a16="http://schemas.microsoft.com/office/drawing/2014/main" id="{1F614A51-9FFC-4A53-964A-5F32D9F1AE41}"/>
+                <a16:creationId xmlns:a16="http://schemas.microsoft.com/office/drawing/2014/main" id="{126167CE-16D6-4237-9F65-C237950B66C4}"/>
               </a:ext>
             </a:extLst>
           </p:cNvPr>
@@ -7464,8 +7417,8 @@
         </p:blipFill>
         <p:spPr bwMode="auto">
           <a:xfrm>
-            <a:off x="4958482" y="4701330"/>
-            <a:ext cx="1535185" cy="1535185"/>
+            <a:off x="6623789" y="4848835"/>
+            <a:ext cx="1049323" cy="1049323"/>
           </a:xfrm>
           <a:prstGeom prst="rect">
             <a:avLst/>
@@ -7484,10 +7437,57 @@
       </p:pic>
       <p:pic>
         <p:nvPicPr>
-          <p:cNvPr id="2052" name="Picture 4" descr="Image result for transmitter icon">
+          <p:cNvPr id="8" name="Picture 4" descr="Image result for transmitter icon">
             <a:extLst>
               <a:ext uri="{FF2B5EF4-FFF2-40B4-BE49-F238E27FC236}">
-                <a16:creationId xmlns:a16="http://schemas.microsoft.com/office/drawing/2014/main" id="{126167CE-16D6-4237-9F65-C237950B66C4}"/>
+                <a16:creationId xmlns:a16="http://schemas.microsoft.com/office/drawing/2014/main" id="{4ECD129A-41FE-4292-8DC5-CA49D6236CB0}"/>
+              </a:ext>
+            </a:extLst>
+          </p:cNvPr>
+          <p:cNvPicPr>
+            <a:picLocks noChangeAspect="1" noChangeArrowheads="1"/>
+          </p:cNvPicPr>
+          <p:nvPr/>
+        </p:nvPicPr>
+        <p:blipFill>
+          <a:blip r:embed="rId2">
+            <a:extLst>
+              <a:ext uri="{28A0092B-C50C-407E-A947-70E740481C1C}">
+                <a14:useLocalDpi xmlns:a14="http://schemas.microsoft.com/office/drawing/2010/main" val="0"/>
+              </a:ext>
+            </a:extLst>
+          </a:blip>
+          <a:srcRect/>
+          <a:stretch>
+            <a:fillRect/>
+          </a:stretch>
+        </p:blipFill>
+        <p:spPr bwMode="auto">
+          <a:xfrm>
+            <a:off x="8761325" y="2520541"/>
+            <a:ext cx="1049323" cy="1049323"/>
+          </a:xfrm>
+          <a:prstGeom prst="rect">
+            <a:avLst/>
+          </a:prstGeom>
+          <a:noFill/>
+          <a:extLst>
+            <a:ext uri="{909E8E84-426E-40DD-AFC4-6F175D3DCCD1}">
+              <a14:hiddenFill xmlns:a14="http://schemas.microsoft.com/office/drawing/2010/main">
+                <a:solidFill>
+                  <a:srgbClr val="FFFFFF"/>
+                </a:solidFill>
+              </a14:hiddenFill>
+            </a:ext>
+          </a:extLst>
+        </p:spPr>
+      </p:pic>
+      <p:pic>
+        <p:nvPicPr>
+          <p:cNvPr id="4" name="Picture 2" descr="Image result for terminal icon">
+            <a:extLst>
+              <a:ext uri="{FF2B5EF4-FFF2-40B4-BE49-F238E27FC236}">
+                <a16:creationId xmlns:a16="http://schemas.microsoft.com/office/drawing/2014/main" id="{15315AC1-A3A7-4DCD-A7DE-F817121B09EA}"/>
               </a:ext>
             </a:extLst>
           </p:cNvPr>
@@ -7511,8 +7511,8 @@
         </p:blipFill>
         <p:spPr bwMode="auto">
           <a:xfrm>
-            <a:off x="6623789" y="4848835"/>
-            <a:ext cx="1049323" cy="1049323"/>
+            <a:off x="7824048" y="5465127"/>
+            <a:ext cx="1049323" cy="1199226"/>
           </a:xfrm>
           <a:prstGeom prst="rect">
             <a:avLst/>
@@ -7531,46 +7531,10 @@
       </p:pic>
       <p:pic>
         <p:nvPicPr>
-          <p:cNvPr id="7" name="Picture 6">
+          <p:cNvPr id="2054" name="Picture 6" descr="Image result for hive icon">
             <a:extLst>
               <a:ext uri="{FF2B5EF4-FFF2-40B4-BE49-F238E27FC236}">
-                <a16:creationId xmlns:a16="http://schemas.microsoft.com/office/drawing/2014/main" id="{FCD69E67-67C0-4207-8881-F93FB3721C13}"/>
-              </a:ext>
-            </a:extLst>
-          </p:cNvPr>
-          <p:cNvPicPr>
-            <a:picLocks noChangeAspect="1"/>
-          </p:cNvPicPr>
-          <p:nvPr/>
-        </p:nvPicPr>
-        <p:blipFill>
-          <a:blip r:embed="rId4" cstate="hqprint">
-            <a:extLst>
-              <a:ext uri="{28A0092B-C50C-407E-A947-70E740481C1C}">
-                <a14:useLocalDpi xmlns:a14="http://schemas.microsoft.com/office/drawing/2010/main" val="0"/>
-              </a:ext>
-            </a:extLst>
-          </a:blip>
-          <a:stretch>
-            <a:fillRect/>
-          </a:stretch>
-        </p:blipFill>
-        <p:spPr>
-          <a:xfrm>
-            <a:off x="9767231" y="2600588"/>
-            <a:ext cx="1146037" cy="1146037"/>
-          </a:xfrm>
-          <a:prstGeom prst="rect">
-            <a:avLst/>
-          </a:prstGeom>
-        </p:spPr>
-      </p:pic>
-      <p:pic>
-        <p:nvPicPr>
-          <p:cNvPr id="8" name="Picture 4" descr="Image result for transmitter icon">
-            <a:extLst>
-              <a:ext uri="{FF2B5EF4-FFF2-40B4-BE49-F238E27FC236}">
-                <a16:creationId xmlns:a16="http://schemas.microsoft.com/office/drawing/2014/main" id="{4ECD129A-41FE-4292-8DC5-CA49D6236CB0}"/>
+                <a16:creationId xmlns:a16="http://schemas.microsoft.com/office/drawing/2014/main" id="{85CEA2AD-D978-442A-93BF-AB42CBAFB506}"/>
               </a:ext>
             </a:extLst>
           </p:cNvPr>
@@ -7580,7 +7544,7 @@
           <p:nvPr/>
         </p:nvPicPr>
         <p:blipFill>
-          <a:blip r:embed="rId3">
+          <a:blip r:embed="rId4">
             <a:extLst>
               <a:ext uri="{28A0092B-C50C-407E-A947-70E740481C1C}">
                 <a14:useLocalDpi xmlns:a14="http://schemas.microsoft.com/office/drawing/2010/main" val="0"/>
@@ -7594,8 +7558,8 @@
         </p:blipFill>
         <p:spPr bwMode="auto">
           <a:xfrm>
-            <a:off x="8761325" y="2520541"/>
-            <a:ext cx="1049323" cy="1049323"/>
+            <a:off x="9958797" y="2296310"/>
+            <a:ext cx="1497783" cy="1497783"/>
           </a:xfrm>
           <a:prstGeom prst="rect">
             <a:avLst/>
@@ -9190,39 +9154,39 @@
           <a:lstStyle/>
           <a:p>
             <a:r>
-              <a:rPr lang="fr-CA" b="1" dirty="0" smtClean="0"/>
+              <a:rPr lang="fr-CA" b="1" dirty="0"/>
               <a:t>MAPAQ:</a:t>
             </a:r>
             <a:r>
-              <a:rPr lang="fr-CA" dirty="0" smtClean="0"/>
+              <a:rPr lang="fr-CA" dirty="0"/>
               <a:t> Minimum 15 mètres de distances avec les routes publiques</a:t>
             </a:r>
           </a:p>
           <a:p>
             <a:r>
-              <a:rPr lang="fr-CA" b="1" dirty="0" smtClean="0"/>
+              <a:rPr lang="fr-CA" b="1" dirty="0"/>
               <a:t>Statistique Canada 2006:</a:t>
             </a:r>
             <a:r>
-              <a:rPr lang="fr-CA" dirty="0" smtClean="0"/>
+              <a:rPr lang="fr-CA" dirty="0"/>
               <a:t> Taille moyenne fermes canadiennes : 728 acres soit environ 3 km</a:t>
             </a:r>
             <a:r>
-              <a:rPr lang="fr-CA" baseline="30000" dirty="0" smtClean="0"/>
+              <a:rPr lang="fr-CA" baseline="30000" dirty="0"/>
               <a:t>2</a:t>
             </a:r>
             <a:r>
-              <a:rPr lang="fr-CA" dirty="0" smtClean="0"/>
+              <a:rPr lang="fr-CA" dirty="0"/>
               <a:t> </a:t>
             </a:r>
           </a:p>
           <a:p>
             <a:r>
-              <a:rPr lang="fr-CA" b="1" dirty="0" smtClean="0"/>
+              <a:rPr lang="fr-CA" b="1" dirty="0"/>
               <a:t>Agriculture Québec:</a:t>
             </a:r>
             <a:r>
-              <a:rPr lang="fr-CA" dirty="0" smtClean="0"/>
+              <a:rPr lang="fr-CA" dirty="0"/>
               <a:t> Distance entre les ruchers 3 à 4 kilomètres</a:t>
             </a:r>
             <a:endParaRPr lang="fr-CA" b="1" dirty="0"/>

</xml_diff>

<commit_message>
PT-25 Ajout de la partie gestion
</commit_message>
<xml_diff>
--- a/Dossier de Conception.pptx
+++ b/Dossier de Conception.pptx
@@ -20,6 +20,8 @@
     <p:sldId id="261" r:id="rId14"/>
     <p:sldId id="264" r:id="rId15"/>
     <p:sldId id="262" r:id="rId16"/>
+    <p:sldId id="272" r:id="rId17"/>
+    <p:sldId id="273" r:id="rId18"/>
   </p:sldIdLst>
   <p:sldSz cx="12192000" cy="6858000"/>
   <p:notesSz cx="6858000" cy="9144000"/>
@@ -628,7 +630,7 @@
           <a:p>
             <a:fld id="{F81637C0-94AD-483C-A163-E4595C514589}" type="datetimeFigureOut">
               <a:rPr lang="en-CA" smtClean="0"/>
-              <a:t>19/09/2018</a:t>
+              <a:t>2018-09-19</a:t>
             </a:fld>
             <a:endParaRPr lang="en-CA"/>
           </a:p>
@@ -675,7 +677,7 @@
           <a:p>
             <a:fld id="{5651D7FC-DF07-4DDA-A65D-263378C9ADA7}" type="slidenum">
               <a:rPr lang="en-CA" smtClean="0"/>
-              <a:t>‹#›</a:t>
+              <a:t>‹N°›</a:t>
             </a:fld>
             <a:endParaRPr lang="en-CA"/>
           </a:p>
@@ -929,7 +931,7 @@
           <a:p>
             <a:fld id="{F81637C0-94AD-483C-A163-E4595C514589}" type="datetimeFigureOut">
               <a:rPr lang="en-CA" smtClean="0"/>
-              <a:t>19/09/2018</a:t>
+              <a:t>2018-09-19</a:t>
             </a:fld>
             <a:endParaRPr lang="en-CA"/>
           </a:p>
@@ -971,7 +973,7 @@
           <a:p>
             <a:fld id="{5651D7FC-DF07-4DDA-A65D-263378C9ADA7}" type="slidenum">
               <a:rPr lang="en-CA" smtClean="0"/>
-              <a:t>‹#›</a:t>
+              <a:t>‹N°›</a:t>
             </a:fld>
             <a:endParaRPr lang="en-CA"/>
           </a:p>
@@ -1177,7 +1179,7 @@
           <a:p>
             <a:fld id="{F81637C0-94AD-483C-A163-E4595C514589}" type="datetimeFigureOut">
               <a:rPr lang="en-CA" smtClean="0"/>
-              <a:t>19/09/2018</a:t>
+              <a:t>2018-09-19</a:t>
             </a:fld>
             <a:endParaRPr lang="en-CA"/>
           </a:p>
@@ -1219,7 +1221,7 @@
           <a:p>
             <a:fld id="{5651D7FC-DF07-4DDA-A65D-263378C9ADA7}" type="slidenum">
               <a:rPr lang="en-CA" smtClean="0"/>
-              <a:t>‹#›</a:t>
+              <a:t>‹N°›</a:t>
             </a:fld>
             <a:endParaRPr lang="en-CA"/>
           </a:p>
@@ -1717,7 +1719,7 @@
           <a:p>
             <a:fld id="{F81637C0-94AD-483C-A163-E4595C514589}" type="datetimeFigureOut">
               <a:rPr lang="en-CA" smtClean="0"/>
-              <a:t>19/09/2018</a:t>
+              <a:t>2018-09-19</a:t>
             </a:fld>
             <a:endParaRPr lang="en-CA"/>
           </a:p>
@@ -1759,7 +1761,7 @@
           <a:p>
             <a:fld id="{5651D7FC-DF07-4DDA-A65D-263378C9ADA7}" type="slidenum">
               <a:rPr lang="en-CA" smtClean="0"/>
-              <a:t>‹#›</a:t>
+              <a:t>‹N°›</a:t>
             </a:fld>
             <a:endParaRPr lang="en-CA"/>
           </a:p>
@@ -1965,7 +1967,7 @@
           <a:p>
             <a:fld id="{F81637C0-94AD-483C-A163-E4595C514589}" type="datetimeFigureOut">
               <a:rPr lang="en-CA" smtClean="0"/>
-              <a:t>19/09/2018</a:t>
+              <a:t>2018-09-19</a:t>
             </a:fld>
             <a:endParaRPr lang="en-CA"/>
           </a:p>
@@ -2007,7 +2009,7 @@
           <a:p>
             <a:fld id="{5651D7FC-DF07-4DDA-A65D-263378C9ADA7}" type="slidenum">
               <a:rPr lang="en-CA" smtClean="0"/>
-              <a:t>‹#›</a:t>
+              <a:t>‹N°›</a:t>
             </a:fld>
             <a:endParaRPr lang="en-CA"/>
           </a:p>
@@ -2497,7 +2499,7 @@
           <a:p>
             <a:fld id="{F81637C0-94AD-483C-A163-E4595C514589}" type="datetimeFigureOut">
               <a:rPr lang="en-CA" smtClean="0"/>
-              <a:t>19/09/2018</a:t>
+              <a:t>2018-09-19</a:t>
             </a:fld>
             <a:endParaRPr lang="en-CA"/>
           </a:p>
@@ -2539,7 +2541,7 @@
           <a:p>
             <a:fld id="{5651D7FC-DF07-4DDA-A65D-263378C9ADA7}" type="slidenum">
               <a:rPr lang="en-CA" smtClean="0"/>
-              <a:t>‹#›</a:t>
+              <a:t>‹N°›</a:t>
             </a:fld>
             <a:endParaRPr lang="en-CA"/>
           </a:p>
@@ -2794,7 +2796,7 @@
           <a:p>
             <a:fld id="{F81637C0-94AD-483C-A163-E4595C514589}" type="datetimeFigureOut">
               <a:rPr lang="en-CA" smtClean="0"/>
-              <a:t>19/09/2018</a:t>
+              <a:t>2018-09-19</a:t>
             </a:fld>
             <a:endParaRPr lang="en-CA"/>
           </a:p>
@@ -2836,7 +2838,7 @@
           <a:p>
             <a:fld id="{5651D7FC-DF07-4DDA-A65D-263378C9ADA7}" type="slidenum">
               <a:rPr lang="en-CA" smtClean="0"/>
-              <a:t>‹#›</a:t>
+              <a:t>‹N°›</a:t>
             </a:fld>
             <a:endParaRPr lang="en-CA"/>
           </a:p>
@@ -2968,7 +2970,7 @@
           <a:p>
             <a:fld id="{F81637C0-94AD-483C-A163-E4595C514589}" type="datetimeFigureOut">
               <a:rPr lang="en-CA" smtClean="0"/>
-              <a:t>19/09/2018</a:t>
+              <a:t>2018-09-19</a:t>
             </a:fld>
             <a:endParaRPr lang="en-CA"/>
           </a:p>
@@ -3010,7 +3012,7 @@
           <a:p>
             <a:fld id="{5651D7FC-DF07-4DDA-A65D-263378C9ADA7}" type="slidenum">
               <a:rPr lang="en-CA" smtClean="0"/>
-              <a:t>‹#›</a:t>
+              <a:t>‹N°›</a:t>
             </a:fld>
             <a:endParaRPr lang="en-CA"/>
           </a:p>
@@ -3148,7 +3150,7 @@
           <a:p>
             <a:fld id="{F81637C0-94AD-483C-A163-E4595C514589}" type="datetimeFigureOut">
               <a:rPr lang="en-CA" smtClean="0"/>
-              <a:t>19/09/2018</a:t>
+              <a:t>2018-09-19</a:t>
             </a:fld>
             <a:endParaRPr lang="en-CA"/>
           </a:p>
@@ -3190,7 +3192,7 @@
           <a:p>
             <a:fld id="{5651D7FC-DF07-4DDA-A65D-263378C9ADA7}" type="slidenum">
               <a:rPr lang="en-CA" smtClean="0"/>
-              <a:t>‹#›</a:t>
+              <a:t>‹N°›</a:t>
             </a:fld>
             <a:endParaRPr lang="en-CA"/>
           </a:p>
@@ -3364,7 +3366,7 @@
           <a:p>
             <a:fld id="{F81637C0-94AD-483C-A163-E4595C514589}" type="datetimeFigureOut">
               <a:rPr lang="en-CA" smtClean="0"/>
-              <a:t>19/09/2018</a:t>
+              <a:t>2018-09-19</a:t>
             </a:fld>
             <a:endParaRPr lang="en-CA"/>
           </a:p>
@@ -3411,7 +3413,7 @@
           <a:p>
             <a:fld id="{5651D7FC-DF07-4DDA-A65D-263378C9ADA7}" type="slidenum">
               <a:rPr lang="en-CA" smtClean="0"/>
-              <a:t>‹#›</a:t>
+              <a:t>‹N°›</a:t>
             </a:fld>
             <a:endParaRPr lang="en-CA"/>
           </a:p>
@@ -3615,7 +3617,7 @@
           <a:p>
             <a:fld id="{F81637C0-94AD-483C-A163-E4595C514589}" type="datetimeFigureOut">
               <a:rPr lang="en-CA" smtClean="0"/>
-              <a:t>19/09/2018</a:t>
+              <a:t>2018-09-19</a:t>
             </a:fld>
             <a:endParaRPr lang="en-CA"/>
           </a:p>
@@ -3657,7 +3659,7 @@
           <a:p>
             <a:fld id="{5651D7FC-DF07-4DDA-A65D-263378C9ADA7}" type="slidenum">
               <a:rPr lang="en-CA" smtClean="0"/>
-              <a:t>‹#›</a:t>
+              <a:t>‹N°›</a:t>
             </a:fld>
             <a:endParaRPr lang="en-CA"/>
           </a:p>
@@ -3967,7 +3969,7 @@
           <a:p>
             <a:fld id="{F81637C0-94AD-483C-A163-E4595C514589}" type="datetimeFigureOut">
               <a:rPr lang="en-CA" smtClean="0"/>
-              <a:t>19/09/2018</a:t>
+              <a:t>2018-09-19</a:t>
             </a:fld>
             <a:endParaRPr lang="en-CA"/>
           </a:p>
@@ -4009,7 +4011,7 @@
           <a:p>
             <a:fld id="{5651D7FC-DF07-4DDA-A65D-263378C9ADA7}" type="slidenum">
               <a:rPr lang="en-CA" smtClean="0"/>
-              <a:t>‹#›</a:t>
+              <a:t>‹N°›</a:t>
             </a:fld>
             <a:endParaRPr lang="en-CA"/>
           </a:p>
@@ -4459,7 +4461,7 @@
           <a:p>
             <a:fld id="{F81637C0-94AD-483C-A163-E4595C514589}" type="datetimeFigureOut">
               <a:rPr lang="en-CA" smtClean="0"/>
-              <a:t>19/09/2018</a:t>
+              <a:t>2018-09-19</a:t>
             </a:fld>
             <a:endParaRPr lang="en-CA"/>
           </a:p>
@@ -4501,7 +4503,7 @@
           <a:p>
             <a:fld id="{5651D7FC-DF07-4DDA-A65D-263378C9ADA7}" type="slidenum">
               <a:rPr lang="en-CA" smtClean="0"/>
-              <a:t>‹#›</a:t>
+              <a:t>‹N°›</a:t>
             </a:fld>
             <a:endParaRPr lang="en-CA"/>
           </a:p>
@@ -4577,7 +4579,7 @@
           <a:p>
             <a:fld id="{F81637C0-94AD-483C-A163-E4595C514589}" type="datetimeFigureOut">
               <a:rPr lang="en-CA" smtClean="0"/>
-              <a:t>19/09/2018</a:t>
+              <a:t>2018-09-19</a:t>
             </a:fld>
             <a:endParaRPr lang="en-CA"/>
           </a:p>
@@ -4619,7 +4621,7 @@
           <a:p>
             <a:fld id="{5651D7FC-DF07-4DDA-A65D-263378C9ADA7}" type="slidenum">
               <a:rPr lang="en-CA" smtClean="0"/>
-              <a:t>‹#›</a:t>
+              <a:t>‹N°›</a:t>
             </a:fld>
             <a:endParaRPr lang="en-CA"/>
           </a:p>
@@ -4672,7 +4674,7 @@
           <a:p>
             <a:fld id="{F81637C0-94AD-483C-A163-E4595C514589}" type="datetimeFigureOut">
               <a:rPr lang="en-CA" smtClean="0"/>
-              <a:t>19/09/2018</a:t>
+              <a:t>2018-09-19</a:t>
             </a:fld>
             <a:endParaRPr lang="en-CA"/>
           </a:p>
@@ -4714,7 +4716,7 @@
           <a:p>
             <a:fld id="{5651D7FC-DF07-4DDA-A65D-263378C9ADA7}" type="slidenum">
               <a:rPr lang="en-CA" smtClean="0"/>
-              <a:t>‹#›</a:t>
+              <a:t>‹N°›</a:t>
             </a:fld>
             <a:endParaRPr lang="en-CA"/>
           </a:p>
@@ -4955,7 +4957,7 @@
           <a:p>
             <a:fld id="{F81637C0-94AD-483C-A163-E4595C514589}" type="datetimeFigureOut">
               <a:rPr lang="en-CA" smtClean="0"/>
-              <a:t>19/09/2018</a:t>
+              <a:t>2018-09-19</a:t>
             </a:fld>
             <a:endParaRPr lang="en-CA"/>
           </a:p>
@@ -4997,7 +4999,7 @@
           <a:p>
             <a:fld id="{5651D7FC-DF07-4DDA-A65D-263378C9ADA7}" type="slidenum">
               <a:rPr lang="en-CA" smtClean="0"/>
-              <a:t>‹#›</a:t>
+              <a:t>‹N°›</a:t>
             </a:fld>
             <a:endParaRPr lang="en-CA"/>
           </a:p>
@@ -5246,7 +5248,7 @@
           <a:p>
             <a:fld id="{F81637C0-94AD-483C-A163-E4595C514589}" type="datetimeFigureOut">
               <a:rPr lang="en-CA" smtClean="0"/>
-              <a:t>19/09/2018</a:t>
+              <a:t>2018-09-19</a:t>
             </a:fld>
             <a:endParaRPr lang="en-CA"/>
           </a:p>
@@ -5288,7 +5290,7 @@
           <a:p>
             <a:fld id="{5651D7FC-DF07-4DDA-A65D-263378C9ADA7}" type="slidenum">
               <a:rPr lang="en-CA" smtClean="0"/>
-              <a:t>‹#›</a:t>
+              <a:t>‹N°›</a:t>
             </a:fld>
             <a:endParaRPr lang="en-CA"/>
           </a:p>
@@ -5776,7 +5778,7 @@
           <a:p>
             <a:fld id="{F81637C0-94AD-483C-A163-E4595C514589}" type="datetimeFigureOut">
               <a:rPr lang="en-CA" smtClean="0"/>
-              <a:t>19/09/2018</a:t>
+              <a:t>2018-09-19</a:t>
             </a:fld>
             <a:endParaRPr lang="en-CA"/>
           </a:p>
@@ -5854,7 +5856,7 @@
           <a:p>
             <a:fld id="{5651D7FC-DF07-4DDA-A65D-263378C9ADA7}" type="slidenum">
               <a:rPr lang="en-CA" smtClean="0"/>
-              <a:t>‹#›</a:t>
+              <a:t>‹N°›</a:t>
             </a:fld>
             <a:endParaRPr lang="en-CA"/>
           </a:p>
@@ -7806,24 +7808,31 @@
             <p:ph type="title"/>
           </p:nvPr>
         </p:nvSpPr>
-        <p:spPr/>
-        <p:txBody>
-          <a:bodyPr/>
+        <p:spPr>
+          <a:xfrm>
+            <a:off x="1484312" y="685800"/>
+            <a:ext cx="5747778" cy="1752599"/>
+          </a:xfrm>
+        </p:spPr>
+        <p:txBody>
+          <a:bodyPr>
+            <a:normAutofit/>
+          </a:bodyPr>
           <a:lstStyle/>
           <a:p>
             <a:r>
-              <a:rPr lang="en-CA" dirty="0" err="1"/>
+              <a:rPr lang="en-CA" sz="2800" b="1" dirty="0" err="1"/>
               <a:t>Outils</a:t>
             </a:r>
             <a:r>
-              <a:rPr lang="en-CA" dirty="0"/>
+              <a:rPr lang="en-CA" sz="2800" b="1" dirty="0"/>
               <a:t> de </a:t>
             </a:r>
             <a:r>
-              <a:rPr lang="en-CA" dirty="0" err="1"/>
+              <a:rPr lang="en-CA" sz="2800" b="1" dirty="0" err="1"/>
               <a:t>gestion</a:t>
             </a:r>
-            <a:endParaRPr lang="en-CA" dirty="0"/>
+            <a:endParaRPr lang="en-CA" sz="2800" b="1" dirty="0"/>
           </a:p>
         </p:txBody>
       </p:sp>
@@ -7843,19 +7852,595 @@
             <p:ph idx="1"/>
           </p:nvPr>
         </p:nvSpPr>
-        <p:spPr/>
-        <p:txBody>
-          <a:bodyPr/>
+        <p:spPr>
+          <a:xfrm>
+            <a:off x="1484312" y="2279634"/>
+            <a:ext cx="5747778" cy="3124201"/>
+          </a:xfrm>
+        </p:spPr>
+        <p:txBody>
+          <a:bodyPr>
+            <a:normAutofit/>
+          </a:bodyPr>
           <a:lstStyle/>
           <a:p>
-            <a:endParaRPr lang="en-CA" dirty="0"/>
-          </a:p>
-        </p:txBody>
-      </p:sp>
+            <a:pPr marL="0" indent="0">
+              <a:buNone/>
+            </a:pPr>
+            <a:r>
+              <a:rPr lang="fr-CA" sz="1600" b="1" dirty="0"/>
+              <a:t>Principaux outils </a:t>
+            </a:r>
+            <a:endParaRPr lang="en-CA" sz="1600" b="1" dirty="0"/>
+          </a:p>
+          <a:p>
+            <a:pPr>
+              <a:buFontTx/>
+              <a:buChar char="-"/>
+            </a:pPr>
+            <a:r>
+              <a:rPr lang="en-CA" sz="1600" u="sng" dirty="0"/>
+              <a:t>Jira</a:t>
+            </a:r>
+          </a:p>
+          <a:p>
+            <a:pPr lvl="1">
+              <a:buFontTx/>
+              <a:buChar char="-"/>
+            </a:pPr>
+            <a:r>
+              <a:rPr lang="en-CA" sz="1400" dirty="0"/>
+              <a:t>Gestion des resources</a:t>
+            </a:r>
+          </a:p>
+          <a:p>
+            <a:pPr lvl="1">
+              <a:buFontTx/>
+              <a:buChar char="-"/>
+            </a:pPr>
+            <a:r>
+              <a:rPr lang="en-CA" sz="1400" dirty="0"/>
+              <a:t>Gestion du temps (Agile)</a:t>
+            </a:r>
+          </a:p>
+          <a:p>
+            <a:pPr lvl="1">
+              <a:buFontTx/>
+              <a:buChar char="-"/>
+            </a:pPr>
+            <a:r>
+              <a:rPr lang="en-CA" sz="1400" dirty="0"/>
+              <a:t>Gestion des </a:t>
+            </a:r>
+            <a:r>
+              <a:rPr lang="en-CA" sz="1400" dirty="0" err="1"/>
+              <a:t>risques</a:t>
+            </a:r>
+            <a:endParaRPr lang="en-CA" sz="1400" dirty="0"/>
+          </a:p>
+          <a:p>
+            <a:pPr lvl="1">
+              <a:buFontTx/>
+              <a:buChar char="-"/>
+            </a:pPr>
+            <a:r>
+              <a:rPr lang="en-CA" sz="1400" dirty="0" err="1"/>
+              <a:t>Traçabilité</a:t>
+            </a:r>
+            <a:r>
+              <a:rPr lang="en-CA" sz="1400" dirty="0"/>
+              <a:t> du travail accompli</a:t>
+            </a:r>
+          </a:p>
+        </p:txBody>
+      </p:sp>
+      <p:pic>
+        <p:nvPicPr>
+          <p:cNvPr id="4" name="Image 3">
+            <a:extLst>
+              <a:ext uri="{FF2B5EF4-FFF2-40B4-BE49-F238E27FC236}">
+                <a16:creationId xmlns:a16="http://schemas.microsoft.com/office/drawing/2014/main" id="{489727B9-B3CA-4D02-BCCD-F8ED5C3F29F8}"/>
+              </a:ext>
+            </a:extLst>
+          </p:cNvPr>
+          <p:cNvPicPr>
+            <a:picLocks noChangeAspect="1"/>
+          </p:cNvPicPr>
+          <p:nvPr/>
+        </p:nvPicPr>
+        <p:blipFill>
+          <a:blip r:embed="rId2"/>
+          <a:stretch>
+            <a:fillRect/>
+          </a:stretch>
+        </p:blipFill>
+        <p:spPr>
+          <a:xfrm>
+            <a:off x="7050847" y="514355"/>
+            <a:ext cx="4447841" cy="2501910"/>
+          </a:xfrm>
+          <a:prstGeom prst="roundRect">
+            <a:avLst>
+              <a:gd name="adj" fmla="val 4380"/>
+            </a:avLst>
+          </a:prstGeom>
+          <a:ln w="38100">
+            <a:gradFill flip="none" rotWithShape="1">
+              <a:gsLst>
+                <a:gs pos="0">
+                  <a:schemeClr val="bg2"/>
+                </a:gs>
+                <a:gs pos="100000">
+                  <a:schemeClr val="bg2">
+                    <a:lumMod val="75000"/>
+                  </a:schemeClr>
+                </a:gs>
+              </a:gsLst>
+              <a:lin ang="5400000" scaled="0"/>
+              <a:tileRect/>
+            </a:gradFill>
+          </a:ln>
+          <a:effectLst>
+            <a:innerShdw blurRad="57150" dist="38100" dir="14460000">
+              <a:srgbClr val="000000">
+                <a:alpha val="70000"/>
+              </a:srgbClr>
+            </a:innerShdw>
+          </a:effectLst>
+        </p:spPr>
+      </p:pic>
+      <p:pic>
+        <p:nvPicPr>
+          <p:cNvPr id="7" name="Image 6">
+            <a:extLst>
+              <a:ext uri="{FF2B5EF4-FFF2-40B4-BE49-F238E27FC236}">
+                <a16:creationId xmlns:a16="http://schemas.microsoft.com/office/drawing/2014/main" id="{75D305B5-8154-4FAE-849A-A2EDF67675E1}"/>
+              </a:ext>
+            </a:extLst>
+          </p:cNvPr>
+          <p:cNvPicPr>
+            <a:picLocks noChangeAspect="1"/>
+          </p:cNvPicPr>
+          <p:nvPr/>
+        </p:nvPicPr>
+        <p:blipFill>
+          <a:blip r:embed="rId3"/>
+          <a:stretch>
+            <a:fillRect/>
+          </a:stretch>
+        </p:blipFill>
+        <p:spPr>
+          <a:xfrm>
+            <a:off x="6903504" y="3841735"/>
+            <a:ext cx="4690525" cy="2204547"/>
+          </a:xfrm>
+          <a:prstGeom prst="roundRect">
+            <a:avLst>
+              <a:gd name="adj" fmla="val 4380"/>
+            </a:avLst>
+          </a:prstGeom>
+          <a:ln w="38100">
+            <a:gradFill flip="none" rotWithShape="1">
+              <a:gsLst>
+                <a:gs pos="0">
+                  <a:schemeClr val="bg2"/>
+                </a:gs>
+                <a:gs pos="100000">
+                  <a:schemeClr val="bg2">
+                    <a:lumMod val="75000"/>
+                  </a:schemeClr>
+                </a:gs>
+              </a:gsLst>
+              <a:lin ang="5400000" scaled="0"/>
+              <a:tileRect/>
+            </a:gradFill>
+          </a:ln>
+          <a:effectLst>
+            <a:innerShdw blurRad="57150" dist="38100" dir="14460000">
+              <a:srgbClr val="000000">
+                <a:alpha val="70000"/>
+              </a:srgbClr>
+            </a:innerShdw>
+          </a:effectLst>
+        </p:spPr>
+      </p:pic>
     </p:spTree>
     <p:extLst>
       <p:ext uri="{BB962C8B-B14F-4D97-AF65-F5344CB8AC3E}">
         <p14:creationId xmlns:p14="http://schemas.microsoft.com/office/powerpoint/2010/main" val="3593040669"/>
+      </p:ext>
+    </p:extLst>
+  </p:cSld>
+  <p:clrMapOvr>
+    <a:masterClrMapping/>
+  </p:clrMapOvr>
+</p:sld>
+</file>
+
+<file path=ppt/slides/slide16.xml><?xml version="1.0" encoding="utf-8"?>
+<p:sld xmlns:a="http://schemas.openxmlformats.org/drawingml/2006/main" xmlns:r="http://schemas.openxmlformats.org/officeDocument/2006/relationships" xmlns:p="http://schemas.openxmlformats.org/presentationml/2006/main">
+  <p:cSld>
+    <p:spTree>
+      <p:nvGrpSpPr>
+        <p:cNvPr id="1" name=""/>
+        <p:cNvGrpSpPr/>
+        <p:nvPr/>
+      </p:nvGrpSpPr>
+      <p:grpSpPr>
+        <a:xfrm>
+          <a:off x="0" y="0"/>
+          <a:ext cx="0" cy="0"/>
+          <a:chOff x="0" y="0"/>
+          <a:chExt cx="0" cy="0"/>
+        </a:xfrm>
+      </p:grpSpPr>
+      <p:sp>
+        <p:nvSpPr>
+          <p:cNvPr id="2" name="Title 1">
+            <a:extLst>
+              <a:ext uri="{FF2B5EF4-FFF2-40B4-BE49-F238E27FC236}">
+                <a16:creationId xmlns:a16="http://schemas.microsoft.com/office/drawing/2014/main" id="{4E803E53-33F4-4918-9D2A-3756F2D666B5}"/>
+              </a:ext>
+            </a:extLst>
+          </p:cNvPr>
+          <p:cNvSpPr>
+            <a:spLocks noGrp="1"/>
+          </p:cNvSpPr>
+          <p:nvPr>
+            <p:ph type="title"/>
+          </p:nvPr>
+        </p:nvSpPr>
+        <p:spPr>
+          <a:xfrm>
+            <a:off x="1484311" y="1081548"/>
+            <a:ext cx="3333495" cy="1504335"/>
+          </a:xfrm>
+        </p:spPr>
+        <p:txBody>
+          <a:bodyPr>
+            <a:normAutofit/>
+          </a:bodyPr>
+          <a:lstStyle/>
+          <a:p>
+            <a:r>
+              <a:rPr lang="en-CA" sz="2400" b="1" dirty="0" err="1"/>
+              <a:t>Outils</a:t>
+            </a:r>
+            <a:r>
+              <a:rPr lang="en-CA" sz="2400" b="1" dirty="0"/>
+              <a:t> de </a:t>
+            </a:r>
+            <a:r>
+              <a:rPr lang="en-CA" sz="2400" b="1" dirty="0" err="1"/>
+              <a:t>gestion</a:t>
+            </a:r>
+            <a:endParaRPr lang="en-CA" sz="2400" b="1" dirty="0"/>
+          </a:p>
+        </p:txBody>
+      </p:sp>
+      <p:sp>
+        <p:nvSpPr>
+          <p:cNvPr id="3" name="Content Placeholder 2">
+            <a:extLst>
+              <a:ext uri="{FF2B5EF4-FFF2-40B4-BE49-F238E27FC236}">
+                <a16:creationId xmlns:a16="http://schemas.microsoft.com/office/drawing/2014/main" id="{60344793-CA0C-4409-81BA-47C205B02C33}"/>
+              </a:ext>
+            </a:extLst>
+          </p:cNvPr>
+          <p:cNvSpPr>
+            <a:spLocks noGrp="1"/>
+          </p:cNvSpPr>
+          <p:nvPr>
+            <p:ph idx="1"/>
+          </p:nvPr>
+        </p:nvSpPr>
+        <p:spPr>
+          <a:xfrm>
+            <a:off x="1484311" y="2666999"/>
+            <a:ext cx="3333496" cy="3124201"/>
+          </a:xfrm>
+        </p:spPr>
+        <p:txBody>
+          <a:bodyPr anchor="t">
+            <a:normAutofit/>
+          </a:bodyPr>
+          <a:lstStyle/>
+          <a:p>
+            <a:pPr marL="0" indent="0">
+              <a:buNone/>
+            </a:pPr>
+            <a:r>
+              <a:rPr lang="fr-CA" sz="1600" b="1" dirty="0"/>
+              <a:t>Principaux outils </a:t>
+            </a:r>
+            <a:endParaRPr lang="en-CA" sz="1600" b="1" dirty="0"/>
+          </a:p>
+          <a:p>
+            <a:pPr>
+              <a:buFontTx/>
+              <a:buChar char="-"/>
+            </a:pPr>
+            <a:r>
+              <a:rPr lang="en-CA" sz="1600" u="sng" dirty="0"/>
+              <a:t>Git</a:t>
+            </a:r>
+          </a:p>
+          <a:p>
+            <a:pPr lvl="1">
+              <a:buFontTx/>
+              <a:buChar char="-"/>
+            </a:pPr>
+            <a:r>
+              <a:rPr lang="en-CA" sz="1600" dirty="0"/>
+              <a:t>Gestion des documents</a:t>
+            </a:r>
+          </a:p>
+          <a:p>
+            <a:pPr lvl="1">
+              <a:buFontTx/>
+              <a:buChar char="-"/>
+            </a:pPr>
+            <a:r>
+              <a:rPr lang="en-CA" sz="1600" dirty="0" err="1"/>
+              <a:t>Traçabilité</a:t>
+            </a:r>
+            <a:r>
+              <a:rPr lang="en-CA" sz="1600" dirty="0"/>
+              <a:t> des versions </a:t>
+            </a:r>
+          </a:p>
+        </p:txBody>
+      </p:sp>
+      <p:pic>
+        <p:nvPicPr>
+          <p:cNvPr id="5" name="Image 4">
+            <a:extLst>
+              <a:ext uri="{FF2B5EF4-FFF2-40B4-BE49-F238E27FC236}">
+                <a16:creationId xmlns:a16="http://schemas.microsoft.com/office/drawing/2014/main" id="{19702EF8-05AD-4A0C-A7F0-38423253AE78}"/>
+              </a:ext>
+            </a:extLst>
+          </p:cNvPr>
+          <p:cNvPicPr>
+            <a:picLocks noChangeAspect="1"/>
+          </p:cNvPicPr>
+          <p:nvPr/>
+        </p:nvPicPr>
+        <p:blipFill>
+          <a:blip r:embed="rId2"/>
+          <a:stretch>
+            <a:fillRect/>
+          </a:stretch>
+        </p:blipFill>
+        <p:spPr>
+          <a:xfrm>
+            <a:off x="5318285" y="1646786"/>
+            <a:ext cx="5881381" cy="3925821"/>
+          </a:xfrm>
+          <a:prstGeom prst="roundRect">
+            <a:avLst>
+              <a:gd name="adj" fmla="val 4380"/>
+            </a:avLst>
+          </a:prstGeom>
+          <a:ln w="38100">
+            <a:gradFill flip="none" rotWithShape="1">
+              <a:gsLst>
+                <a:gs pos="0">
+                  <a:schemeClr val="bg2"/>
+                </a:gs>
+                <a:gs pos="100000">
+                  <a:schemeClr val="bg2">
+                    <a:lumMod val="75000"/>
+                  </a:schemeClr>
+                </a:gs>
+              </a:gsLst>
+              <a:lin ang="5400000" scaled="0"/>
+              <a:tileRect/>
+            </a:gradFill>
+          </a:ln>
+          <a:effectLst>
+            <a:innerShdw blurRad="57150" dist="38100" dir="14460000">
+              <a:srgbClr val="000000">
+                <a:alpha val="70000"/>
+              </a:srgbClr>
+            </a:innerShdw>
+          </a:effectLst>
+        </p:spPr>
+      </p:pic>
+    </p:spTree>
+    <p:extLst>
+      <p:ext uri="{BB962C8B-B14F-4D97-AF65-F5344CB8AC3E}">
+        <p14:creationId xmlns:p14="http://schemas.microsoft.com/office/powerpoint/2010/main" val="2981647490"/>
+      </p:ext>
+    </p:extLst>
+  </p:cSld>
+  <p:clrMapOvr>
+    <a:masterClrMapping/>
+  </p:clrMapOvr>
+</p:sld>
+</file>
+
+<file path=ppt/slides/slide17.xml><?xml version="1.0" encoding="utf-8"?>
+<p:sld xmlns:a="http://schemas.openxmlformats.org/drawingml/2006/main" xmlns:r="http://schemas.openxmlformats.org/officeDocument/2006/relationships" xmlns:p="http://schemas.openxmlformats.org/presentationml/2006/main">
+  <p:cSld>
+    <p:spTree>
+      <p:nvGrpSpPr>
+        <p:cNvPr id="1" name=""/>
+        <p:cNvGrpSpPr/>
+        <p:nvPr/>
+      </p:nvGrpSpPr>
+      <p:grpSpPr>
+        <a:xfrm>
+          <a:off x="0" y="0"/>
+          <a:ext cx="0" cy="0"/>
+          <a:chOff x="0" y="0"/>
+          <a:chExt cx="0" cy="0"/>
+        </a:xfrm>
+      </p:grpSpPr>
+      <p:sp>
+        <p:nvSpPr>
+          <p:cNvPr id="2" name="Title 1">
+            <a:extLst>
+              <a:ext uri="{FF2B5EF4-FFF2-40B4-BE49-F238E27FC236}">
+                <a16:creationId xmlns:a16="http://schemas.microsoft.com/office/drawing/2014/main" id="{4E803E53-33F4-4918-9D2A-3756F2D666B5}"/>
+              </a:ext>
+            </a:extLst>
+          </p:cNvPr>
+          <p:cNvSpPr>
+            <a:spLocks noGrp="1"/>
+          </p:cNvSpPr>
+          <p:nvPr>
+            <p:ph type="title"/>
+          </p:nvPr>
+        </p:nvSpPr>
+        <p:spPr>
+          <a:xfrm>
+            <a:off x="1484311" y="1081548"/>
+            <a:ext cx="3333495" cy="1504335"/>
+          </a:xfrm>
+        </p:spPr>
+        <p:txBody>
+          <a:bodyPr>
+            <a:normAutofit/>
+          </a:bodyPr>
+          <a:lstStyle/>
+          <a:p>
+            <a:r>
+              <a:rPr lang="en-CA" sz="2400" b="1"/>
+              <a:t>Outils de gestion</a:t>
+            </a:r>
+            <a:endParaRPr lang="en-CA" sz="2400" b="1" dirty="0"/>
+          </a:p>
+        </p:txBody>
+      </p:sp>
+      <p:sp>
+        <p:nvSpPr>
+          <p:cNvPr id="3" name="Content Placeholder 2">
+            <a:extLst>
+              <a:ext uri="{FF2B5EF4-FFF2-40B4-BE49-F238E27FC236}">
+                <a16:creationId xmlns:a16="http://schemas.microsoft.com/office/drawing/2014/main" id="{60344793-CA0C-4409-81BA-47C205B02C33}"/>
+              </a:ext>
+            </a:extLst>
+          </p:cNvPr>
+          <p:cNvSpPr>
+            <a:spLocks noGrp="1"/>
+          </p:cNvSpPr>
+          <p:nvPr>
+            <p:ph idx="1"/>
+          </p:nvPr>
+        </p:nvSpPr>
+        <p:spPr>
+          <a:xfrm>
+            <a:off x="1484311" y="2666999"/>
+            <a:ext cx="3333496" cy="3124201"/>
+          </a:xfrm>
+        </p:spPr>
+        <p:txBody>
+          <a:bodyPr anchor="t">
+            <a:normAutofit/>
+          </a:bodyPr>
+          <a:lstStyle/>
+          <a:p>
+            <a:pPr marL="0" indent="0">
+              <a:buNone/>
+            </a:pPr>
+            <a:r>
+              <a:rPr lang="fr-CA" sz="1600" b="1"/>
+              <a:t>Principaux outils </a:t>
+            </a:r>
+            <a:endParaRPr lang="en-CA" sz="1600" b="1"/>
+          </a:p>
+          <a:p>
+            <a:pPr>
+              <a:buFontTx/>
+              <a:buChar char="-"/>
+            </a:pPr>
+            <a:r>
+              <a:rPr lang="en-CA" sz="1600" u="sng"/>
+              <a:t>Slack</a:t>
+            </a:r>
+          </a:p>
+          <a:p>
+            <a:pPr lvl="1">
+              <a:buFontTx/>
+              <a:buChar char="-"/>
+            </a:pPr>
+            <a:r>
+              <a:rPr lang="en-CA" sz="1600"/>
+              <a:t>Communication d’équipe</a:t>
+            </a:r>
+          </a:p>
+          <a:p>
+            <a:pPr lvl="1">
+              <a:buFontTx/>
+              <a:buChar char="-"/>
+            </a:pPr>
+            <a:r>
+              <a:rPr lang="en-CA" sz="1600"/>
+              <a:t>Organisation des reunions </a:t>
+            </a:r>
+            <a:endParaRPr lang="en-CA" sz="1600" dirty="0"/>
+          </a:p>
+        </p:txBody>
+      </p:sp>
+      <p:pic>
+        <p:nvPicPr>
+          <p:cNvPr id="4" name="Image 3">
+            <a:extLst>
+              <a:ext uri="{FF2B5EF4-FFF2-40B4-BE49-F238E27FC236}">
+                <a16:creationId xmlns:a16="http://schemas.microsoft.com/office/drawing/2014/main" id="{1B257132-4E9F-4D77-B3D0-1070238D3CA4}"/>
+              </a:ext>
+            </a:extLst>
+          </p:cNvPr>
+          <p:cNvPicPr>
+            <a:picLocks noChangeAspect="1"/>
+          </p:cNvPicPr>
+          <p:nvPr/>
+        </p:nvPicPr>
+        <p:blipFill>
+          <a:blip r:embed="rId2"/>
+          <a:stretch>
+            <a:fillRect/>
+          </a:stretch>
+        </p:blipFill>
+        <p:spPr>
+          <a:xfrm>
+            <a:off x="5229641" y="1529092"/>
+            <a:ext cx="6602208" cy="3680729"/>
+          </a:xfrm>
+          <a:prstGeom prst="roundRect">
+            <a:avLst>
+              <a:gd name="adj" fmla="val 4380"/>
+            </a:avLst>
+          </a:prstGeom>
+          <a:ln w="38100">
+            <a:gradFill flip="none" rotWithShape="1">
+              <a:gsLst>
+                <a:gs pos="0">
+                  <a:schemeClr val="bg2"/>
+                </a:gs>
+                <a:gs pos="100000">
+                  <a:schemeClr val="bg2">
+                    <a:lumMod val="75000"/>
+                  </a:schemeClr>
+                </a:gs>
+              </a:gsLst>
+              <a:lin ang="5400000" scaled="0"/>
+              <a:tileRect/>
+            </a:gradFill>
+          </a:ln>
+          <a:effectLst>
+            <a:innerShdw blurRad="57150" dist="38100" dir="14460000">
+              <a:srgbClr val="000000">
+                <a:alpha val="70000"/>
+              </a:srgbClr>
+            </a:innerShdw>
+          </a:effectLst>
+        </p:spPr>
+      </p:pic>
+    </p:spTree>
+    <p:extLst>
+      <p:ext uri="{BB962C8B-B14F-4D97-AF65-F5344CB8AC3E}">
+        <p14:creationId xmlns:p14="http://schemas.microsoft.com/office/powerpoint/2010/main" val="2618363116"/>
       </p:ext>
     </p:extLst>
   </p:cSld>

</xml_diff>

<commit_message>
PT-25 Ajout du cahier de charges fonctionnel à la présentation
</commit_message>
<xml_diff>
--- a/Dossier de Conception.pptx
+++ b/Dossier de Conception.pptx
@@ -7,21 +7,22 @@
   <p:sldIdLst>
     <p:sldId id="256" r:id="rId2"/>
     <p:sldId id="257" r:id="rId3"/>
-    <p:sldId id="258" r:id="rId4"/>
-    <p:sldId id="265" r:id="rId5"/>
-    <p:sldId id="266" r:id="rId6"/>
-    <p:sldId id="267" r:id="rId7"/>
-    <p:sldId id="268" r:id="rId8"/>
-    <p:sldId id="269" r:id="rId9"/>
-    <p:sldId id="270" r:id="rId10"/>
-    <p:sldId id="271" r:id="rId11"/>
-    <p:sldId id="260" r:id="rId12"/>
-    <p:sldId id="263" r:id="rId13"/>
-    <p:sldId id="261" r:id="rId14"/>
-    <p:sldId id="264" r:id="rId15"/>
-    <p:sldId id="262" r:id="rId16"/>
-    <p:sldId id="272" r:id="rId17"/>
-    <p:sldId id="273" r:id="rId18"/>
+    <p:sldId id="274" r:id="rId4"/>
+    <p:sldId id="275" r:id="rId5"/>
+    <p:sldId id="265" r:id="rId6"/>
+    <p:sldId id="266" r:id="rId7"/>
+    <p:sldId id="267" r:id="rId8"/>
+    <p:sldId id="268" r:id="rId9"/>
+    <p:sldId id="269" r:id="rId10"/>
+    <p:sldId id="270" r:id="rId11"/>
+    <p:sldId id="271" r:id="rId12"/>
+    <p:sldId id="260" r:id="rId13"/>
+    <p:sldId id="263" r:id="rId14"/>
+    <p:sldId id="261" r:id="rId15"/>
+    <p:sldId id="264" r:id="rId16"/>
+    <p:sldId id="262" r:id="rId17"/>
+    <p:sldId id="272" r:id="rId18"/>
+    <p:sldId id="273" r:id="rId19"/>
   </p:sldIdLst>
   <p:sldSz cx="12192000" cy="6858000"/>
   <p:notesSz cx="6858000" cy="9144000"/>
@@ -677,7 +678,7 @@
           <a:p>
             <a:fld id="{5651D7FC-DF07-4DDA-A65D-263378C9ADA7}" type="slidenum">
               <a:rPr lang="en-CA" smtClean="0"/>
-              <a:t>‹N°›</a:t>
+              <a:t>‹#›</a:t>
             </a:fld>
             <a:endParaRPr lang="en-CA"/>
           </a:p>
@@ -973,7 +974,7 @@
           <a:p>
             <a:fld id="{5651D7FC-DF07-4DDA-A65D-263378C9ADA7}" type="slidenum">
               <a:rPr lang="en-CA" smtClean="0"/>
-              <a:t>‹N°›</a:t>
+              <a:t>‹#›</a:t>
             </a:fld>
             <a:endParaRPr lang="en-CA"/>
           </a:p>
@@ -1221,7 +1222,7 @@
           <a:p>
             <a:fld id="{5651D7FC-DF07-4DDA-A65D-263378C9ADA7}" type="slidenum">
               <a:rPr lang="en-CA" smtClean="0"/>
-              <a:t>‹N°›</a:t>
+              <a:t>‹#›</a:t>
             </a:fld>
             <a:endParaRPr lang="en-CA"/>
           </a:p>
@@ -1761,7 +1762,7 @@
           <a:p>
             <a:fld id="{5651D7FC-DF07-4DDA-A65D-263378C9ADA7}" type="slidenum">
               <a:rPr lang="en-CA" smtClean="0"/>
-              <a:t>‹N°›</a:t>
+              <a:t>‹#›</a:t>
             </a:fld>
             <a:endParaRPr lang="en-CA"/>
           </a:p>
@@ -2009,7 +2010,7 @@
           <a:p>
             <a:fld id="{5651D7FC-DF07-4DDA-A65D-263378C9ADA7}" type="slidenum">
               <a:rPr lang="en-CA" smtClean="0"/>
-              <a:t>‹N°›</a:t>
+              <a:t>‹#›</a:t>
             </a:fld>
             <a:endParaRPr lang="en-CA"/>
           </a:p>
@@ -2541,7 +2542,7 @@
           <a:p>
             <a:fld id="{5651D7FC-DF07-4DDA-A65D-263378C9ADA7}" type="slidenum">
               <a:rPr lang="en-CA" smtClean="0"/>
-              <a:t>‹N°›</a:t>
+              <a:t>‹#›</a:t>
             </a:fld>
             <a:endParaRPr lang="en-CA"/>
           </a:p>
@@ -2838,7 +2839,7 @@
           <a:p>
             <a:fld id="{5651D7FC-DF07-4DDA-A65D-263378C9ADA7}" type="slidenum">
               <a:rPr lang="en-CA" smtClean="0"/>
-              <a:t>‹N°›</a:t>
+              <a:t>‹#›</a:t>
             </a:fld>
             <a:endParaRPr lang="en-CA"/>
           </a:p>
@@ -3012,7 +3013,7 @@
           <a:p>
             <a:fld id="{5651D7FC-DF07-4DDA-A65D-263378C9ADA7}" type="slidenum">
               <a:rPr lang="en-CA" smtClean="0"/>
-              <a:t>‹N°›</a:t>
+              <a:t>‹#›</a:t>
             </a:fld>
             <a:endParaRPr lang="en-CA"/>
           </a:p>
@@ -3192,7 +3193,7 @@
           <a:p>
             <a:fld id="{5651D7FC-DF07-4DDA-A65D-263378C9ADA7}" type="slidenum">
               <a:rPr lang="en-CA" smtClean="0"/>
-              <a:t>‹N°›</a:t>
+              <a:t>‹#›</a:t>
             </a:fld>
             <a:endParaRPr lang="en-CA"/>
           </a:p>
@@ -3413,7 +3414,7 @@
           <a:p>
             <a:fld id="{5651D7FC-DF07-4DDA-A65D-263378C9ADA7}" type="slidenum">
               <a:rPr lang="en-CA" smtClean="0"/>
-              <a:t>‹N°›</a:t>
+              <a:t>‹#›</a:t>
             </a:fld>
             <a:endParaRPr lang="en-CA"/>
           </a:p>
@@ -3659,7 +3660,7 @@
           <a:p>
             <a:fld id="{5651D7FC-DF07-4DDA-A65D-263378C9ADA7}" type="slidenum">
               <a:rPr lang="en-CA" smtClean="0"/>
-              <a:t>‹N°›</a:t>
+              <a:t>‹#›</a:t>
             </a:fld>
             <a:endParaRPr lang="en-CA"/>
           </a:p>
@@ -4011,7 +4012,7 @@
           <a:p>
             <a:fld id="{5651D7FC-DF07-4DDA-A65D-263378C9ADA7}" type="slidenum">
               <a:rPr lang="en-CA" smtClean="0"/>
-              <a:t>‹N°›</a:t>
+              <a:t>‹#›</a:t>
             </a:fld>
             <a:endParaRPr lang="en-CA"/>
           </a:p>
@@ -4503,7 +4504,7 @@
           <a:p>
             <a:fld id="{5651D7FC-DF07-4DDA-A65D-263378C9ADA7}" type="slidenum">
               <a:rPr lang="en-CA" smtClean="0"/>
-              <a:t>‹N°›</a:t>
+              <a:t>‹#›</a:t>
             </a:fld>
             <a:endParaRPr lang="en-CA"/>
           </a:p>
@@ -4621,7 +4622,7 @@
           <a:p>
             <a:fld id="{5651D7FC-DF07-4DDA-A65D-263378C9ADA7}" type="slidenum">
               <a:rPr lang="en-CA" smtClean="0"/>
-              <a:t>‹N°›</a:t>
+              <a:t>‹#›</a:t>
             </a:fld>
             <a:endParaRPr lang="en-CA"/>
           </a:p>
@@ -4716,7 +4717,7 @@
           <a:p>
             <a:fld id="{5651D7FC-DF07-4DDA-A65D-263378C9ADA7}" type="slidenum">
               <a:rPr lang="en-CA" smtClean="0"/>
-              <a:t>‹N°›</a:t>
+              <a:t>‹#›</a:t>
             </a:fld>
             <a:endParaRPr lang="en-CA"/>
           </a:p>
@@ -4999,7 +5000,7 @@
           <a:p>
             <a:fld id="{5651D7FC-DF07-4DDA-A65D-263378C9ADA7}" type="slidenum">
               <a:rPr lang="en-CA" smtClean="0"/>
-              <a:t>‹N°›</a:t>
+              <a:t>‹#›</a:t>
             </a:fld>
             <a:endParaRPr lang="en-CA"/>
           </a:p>
@@ -5290,7 +5291,7 @@
           <a:p>
             <a:fld id="{5651D7FC-DF07-4DDA-A65D-263378C9ADA7}" type="slidenum">
               <a:rPr lang="en-CA" smtClean="0"/>
-              <a:t>‹N°›</a:t>
+              <a:t>‹#›</a:t>
             </a:fld>
             <a:endParaRPr lang="en-CA"/>
           </a:p>
@@ -5856,7 +5857,7 @@
           <a:p>
             <a:fld id="{5651D7FC-DF07-4DDA-A65D-263378C9ADA7}" type="slidenum">
               <a:rPr lang="en-CA" smtClean="0"/>
-              <a:t>‹N°›</a:t>
+              <a:t>‹#›</a:t>
             </a:fld>
             <a:endParaRPr lang="en-CA"/>
           </a:p>
@@ -6479,42 +6480,49 @@
           <a:lstStyle/>
           <a:p>
             <a:r>
+              <a:rPr lang="fr-CA" b="1" dirty="0"/>
+              <a:t>MAPAQ:</a:t>
+            </a:r>
+            <a:r>
               <a:rPr lang="fr-CA" dirty="0"/>
-              <a:t>Demande de données température/</a:t>
-            </a:r>
-            <a:r>
-              <a:rPr lang="fr-CA" dirty="0" err="1"/>
-              <a:t>poid</a:t>
+              <a:t> Minimum 15 mètres de distances avec les routes publiques</a:t>
+            </a:r>
+          </a:p>
+          <a:p>
+            <a:r>
+              <a:rPr lang="fr-CA" b="1" dirty="0"/>
+              <a:t>Statistique Canada 2006:</a:t>
             </a:r>
             <a:r>
               <a:rPr lang="fr-CA" dirty="0"/>
-              <a:t>: À chaque minute</a:t>
-            </a:r>
-          </a:p>
-          <a:p>
+              <a:t> Taille moyenne fermes canadiennes : 728 acres soit environ 3 km</a:t>
+            </a:r>
+            <a:r>
+              <a:rPr lang="fr-CA" baseline="30000" dirty="0"/>
+              <a:t>2</a:t>
+            </a:r>
             <a:r>
               <a:rPr lang="fr-CA" dirty="0"/>
-              <a:t>Demande de données GPS: Une fois par jour</a:t>
-            </a:r>
-          </a:p>
-          <a:p>
+              <a:t> </a:t>
+            </a:r>
+          </a:p>
+          <a:p>
+            <a:r>
+              <a:rPr lang="fr-CA" b="1" dirty="0"/>
+              <a:t>Agriculture Québec:</a:t>
+            </a:r>
             <a:r>
               <a:rPr lang="fr-CA" dirty="0"/>
-              <a:t>Demandes manuelles de tout les capteurs</a:t>
-            </a:r>
-          </a:p>
-          <a:p>
-            <a:r>
-              <a:rPr lang="fr-CA" dirty="0"/>
-              <a:t>Bande de fréquence utilisée: 2,4GHz</a:t>
-            </a:r>
+              <a:t> Distance entre les ruchers 3 à 4 kilomètres</a:t>
+            </a:r>
+            <a:endParaRPr lang="fr-CA" b="1" dirty="0"/>
           </a:p>
         </p:txBody>
       </p:sp>
     </p:spTree>
     <p:extLst>
       <p:ext uri="{BB962C8B-B14F-4D97-AF65-F5344CB8AC3E}">
-        <p14:creationId xmlns:p14="http://schemas.microsoft.com/office/powerpoint/2010/main" val="1401981087"/>
+        <p14:creationId xmlns:p14="http://schemas.microsoft.com/office/powerpoint/2010/main" val="4212196005"/>
       </p:ext>
     </p:extLst>
   </p:cSld>
@@ -6602,6 +6610,130 @@
           <a:bodyPr/>
           <a:lstStyle/>
           <a:p>
+            <a:r>
+              <a:rPr lang="fr-CA" dirty="0"/>
+              <a:t>Demande de données température/</a:t>
+            </a:r>
+            <a:r>
+              <a:rPr lang="fr-CA" dirty="0" err="1"/>
+              <a:t>poid</a:t>
+            </a:r>
+            <a:r>
+              <a:rPr lang="fr-CA" dirty="0"/>
+              <a:t>: À chaque minute</a:t>
+            </a:r>
+          </a:p>
+          <a:p>
+            <a:r>
+              <a:rPr lang="fr-CA" dirty="0"/>
+              <a:t>Demande de données GPS: Une fois par jour</a:t>
+            </a:r>
+          </a:p>
+          <a:p>
+            <a:r>
+              <a:rPr lang="fr-CA" dirty="0"/>
+              <a:t>Demandes manuelles de tout les capteurs</a:t>
+            </a:r>
+          </a:p>
+          <a:p>
+            <a:r>
+              <a:rPr lang="fr-CA" dirty="0"/>
+              <a:t>Bande de fréquence utilisée: 2,4GHz</a:t>
+            </a:r>
+          </a:p>
+        </p:txBody>
+      </p:sp>
+    </p:spTree>
+    <p:extLst>
+      <p:ext uri="{BB962C8B-B14F-4D97-AF65-F5344CB8AC3E}">
+        <p14:creationId xmlns:p14="http://schemas.microsoft.com/office/powerpoint/2010/main" val="1401981087"/>
+      </p:ext>
+    </p:extLst>
+  </p:cSld>
+  <p:clrMapOvr>
+    <a:masterClrMapping/>
+  </p:clrMapOvr>
+</p:sld>
+</file>
+
+<file path=ppt/slides/slide12.xml><?xml version="1.0" encoding="utf-8"?>
+<p:sld xmlns:a="http://schemas.openxmlformats.org/drawingml/2006/main" xmlns:r="http://schemas.openxmlformats.org/officeDocument/2006/relationships" xmlns:p="http://schemas.openxmlformats.org/presentationml/2006/main">
+  <p:cSld>
+    <p:spTree>
+      <p:nvGrpSpPr>
+        <p:cNvPr id="1" name=""/>
+        <p:cNvGrpSpPr/>
+        <p:nvPr/>
+      </p:nvGrpSpPr>
+      <p:grpSpPr>
+        <a:xfrm>
+          <a:off x="0" y="0"/>
+          <a:ext cx="0" cy="0"/>
+          <a:chOff x="0" y="0"/>
+          <a:chExt cx="0" cy="0"/>
+        </a:xfrm>
+      </p:grpSpPr>
+      <p:sp>
+        <p:nvSpPr>
+          <p:cNvPr id="2" name="Title 1">
+            <a:extLst>
+              <a:ext uri="{FF2B5EF4-FFF2-40B4-BE49-F238E27FC236}">
+                <a16:creationId xmlns:a16="http://schemas.microsoft.com/office/drawing/2014/main" id="{9381268A-48C6-4A90-B60F-BAEE9120674D}"/>
+              </a:ext>
+            </a:extLst>
+          </p:cNvPr>
+          <p:cNvSpPr>
+            <a:spLocks noGrp="1"/>
+          </p:cNvSpPr>
+          <p:nvPr>
+            <p:ph type="title"/>
+          </p:nvPr>
+        </p:nvSpPr>
+        <p:spPr/>
+        <p:txBody>
+          <a:bodyPr/>
+          <a:lstStyle/>
+          <a:p>
+            <a:r>
+              <a:rPr lang="en-CA" dirty="0" err="1"/>
+              <a:t>Requis</a:t>
+            </a:r>
+            <a:r>
+              <a:rPr lang="en-CA" dirty="0"/>
+              <a:t> au </a:t>
+            </a:r>
+            <a:r>
+              <a:rPr lang="en-CA" dirty="0" err="1"/>
+              <a:t>niveau</a:t>
+            </a:r>
+            <a:r>
+              <a:rPr lang="en-CA" dirty="0"/>
+              <a:t> RF</a:t>
+            </a:r>
+          </a:p>
+        </p:txBody>
+      </p:sp>
+      <p:sp>
+        <p:nvSpPr>
+          <p:cNvPr id="3" name="Content Placeholder 2">
+            <a:extLst>
+              <a:ext uri="{FF2B5EF4-FFF2-40B4-BE49-F238E27FC236}">
+                <a16:creationId xmlns:a16="http://schemas.microsoft.com/office/drawing/2014/main" id="{17427B92-1811-464E-801C-5EE29A5B8D36}"/>
+              </a:ext>
+            </a:extLst>
+          </p:cNvPr>
+          <p:cNvSpPr>
+            <a:spLocks noGrp="1"/>
+          </p:cNvSpPr>
+          <p:nvPr>
+            <p:ph idx="1"/>
+          </p:nvPr>
+        </p:nvSpPr>
+        <p:spPr/>
+        <p:txBody>
+          <a:bodyPr/>
+          <a:lstStyle/>
+          <a:p>
             <a:pPr marL="0" indent="0">
               <a:buNone/>
             </a:pPr>
@@ -6679,7 +6811,7 @@
 </p:sld>
 </file>
 
-<file path=ppt/slides/slide12.xml><?xml version="1.0" encoding="utf-8"?>
+<file path=ppt/slides/slide13.xml><?xml version="1.0" encoding="utf-8"?>
 <p:sld xmlns:a="http://schemas.openxmlformats.org/drawingml/2006/main" xmlns:r="http://schemas.openxmlformats.org/officeDocument/2006/relationships" xmlns:p="http://schemas.openxmlformats.org/presentationml/2006/main">
   <p:cSld>
     <p:spTree>
@@ -7240,7 +7372,7 @@
 </p:sld>
 </file>
 
-<file path=ppt/slides/slide13.xml><?xml version="1.0" encoding="utf-8"?>
+<file path=ppt/slides/slide14.xml><?xml version="1.0" encoding="utf-8"?>
 <p:sld xmlns:a="http://schemas.openxmlformats.org/drawingml/2006/main" xmlns:r="http://schemas.openxmlformats.org/officeDocument/2006/relationships" xmlns:p="http://schemas.openxmlformats.org/presentationml/2006/main">
   <p:cSld>
     <p:spTree>
@@ -7591,7 +7723,7 @@
 </p:sld>
 </file>
 
-<file path=ppt/slides/slide14.xml><?xml version="1.0" encoding="utf-8"?>
+<file path=ppt/slides/slide15.xml><?xml version="1.0" encoding="utf-8"?>
 <p:sld xmlns:a="http://schemas.openxmlformats.org/drawingml/2006/main" xmlns:r="http://schemas.openxmlformats.org/officeDocument/2006/relationships" xmlns:p="http://schemas.openxmlformats.org/presentationml/2006/main">
   <p:cSld>
     <p:spTree>
@@ -7775,7 +7907,7 @@
 </p:sld>
 </file>
 
-<file path=ppt/slides/slide15.xml><?xml version="1.0" encoding="utf-8"?>
+<file path=ppt/slides/slide16.xml><?xml version="1.0" encoding="utf-8"?>
 <p:sld xmlns:a="http://schemas.openxmlformats.org/drawingml/2006/main" xmlns:r="http://schemas.openxmlformats.org/officeDocument/2006/relationships" xmlns:p="http://schemas.openxmlformats.org/presentationml/2006/main">
   <p:cSld>
     <p:spTree>
@@ -8057,7 +8189,7 @@
 </p:sld>
 </file>
 
-<file path=ppt/slides/slide16.xml><?xml version="1.0" encoding="utf-8"?>
+<file path=ppt/slides/slide17.xml><?xml version="1.0" encoding="utf-8"?>
 <p:sld xmlns:a="http://schemas.openxmlformats.org/drawingml/2006/main" xmlns:r="http://schemas.openxmlformats.org/officeDocument/2006/relationships" xmlns:p="http://schemas.openxmlformats.org/presentationml/2006/main">
   <p:cSld>
     <p:spTree>
@@ -8259,7 +8391,7 @@
 </p:sld>
 </file>
 
-<file path=ppt/slides/slide17.xml><?xml version="1.0" encoding="utf-8"?>
+<file path=ppt/slides/slide18.xml><?xml version="1.0" encoding="utf-8"?>
 <p:sld xmlns:a="http://schemas.openxmlformats.org/drawingml/2006/main" xmlns:r="http://schemas.openxmlformats.org/officeDocument/2006/relationships" xmlns:p="http://schemas.openxmlformats.org/presentationml/2006/main">
   <p:cSld>
     <p:spTree>
@@ -8595,7 +8727,12 @@
             <p:ph type="title"/>
           </p:nvPr>
         </p:nvSpPr>
-        <p:spPr/>
+        <p:spPr>
+          <a:xfrm>
+            <a:off x="1484310" y="203200"/>
+            <a:ext cx="10018713" cy="1752599"/>
+          </a:xfrm>
+        </p:spPr>
         <p:txBody>
           <a:bodyPr/>
           <a:lstStyle/>
@@ -8612,35 +8749,1442 @@
           </a:p>
         </p:txBody>
       </p:sp>
-      <p:sp>
-        <p:nvSpPr>
-          <p:cNvPr id="3" name="Content Placeholder 2">
+      <p:graphicFrame>
+        <p:nvGraphicFramePr>
+          <p:cNvPr id="7" name="Content Placeholder 6">
             <a:extLst>
               <a:ext uri="{FF2B5EF4-FFF2-40B4-BE49-F238E27FC236}">
-                <a16:creationId xmlns:a16="http://schemas.microsoft.com/office/drawing/2014/main" id="{9741DD70-9E04-47B7-AEAC-7EF6A01F0568}"/>
+                <a16:creationId xmlns:a16="http://schemas.microsoft.com/office/drawing/2014/main" id="{C02FD87C-036A-4401-9190-9BA7554E3CE2}"/>
               </a:ext>
             </a:extLst>
           </p:cNvPr>
-          <p:cNvSpPr>
-            <a:spLocks noGrp="1"/>
-          </p:cNvSpPr>
+          <p:cNvGraphicFramePr>
+            <a:graphicFrameLocks noGrp="1"/>
+          </p:cNvGraphicFramePr>
           <p:nvPr>
             <p:ph idx="1"/>
-          </p:nvPr>
-        </p:nvSpPr>
-        <p:spPr/>
-        <p:txBody>
-          <a:bodyPr/>
-          <a:lstStyle/>
-          <a:p>
-            <a:endParaRPr lang="en-CA"/>
-          </a:p>
-        </p:txBody>
-      </p:sp>
+            <p:extLst>
+              <p:ext uri="{D42A27DB-BD31-4B8C-83A1-F6EECF244321}">
+                <p14:modId xmlns:p14="http://schemas.microsoft.com/office/powerpoint/2010/main" val="2070376369"/>
+              </p:ext>
+            </p:extLst>
+          </p:nvPr>
+        </p:nvGraphicFramePr>
+        <p:xfrm>
+          <a:off x="1086643" y="2349500"/>
+          <a:ext cx="10018714" cy="2882900"/>
+        </p:xfrm>
+        <a:graphic>
+          <a:graphicData uri="http://schemas.openxmlformats.org/drawingml/2006/table">
+            <a:tbl>
+              <a:tblPr firstRow="1" firstCol="1" bandRow="1">
+                <a:tableStyleId>{5C22544A-7EE6-4342-B048-85BDC9FD1C3A}</a:tableStyleId>
+              </a:tblPr>
+              <a:tblGrid>
+                <a:gridCol w="943404">
+                  <a:extLst>
+                    <a:ext uri="{9D8B030D-6E8A-4147-A177-3AD203B41FA5}">
+                      <a16:colId xmlns:a16="http://schemas.microsoft.com/office/drawing/2014/main" val="1582538653"/>
+                    </a:ext>
+                  </a:extLst>
+                </a:gridCol>
+                <a:gridCol w="3150392">
+                  <a:extLst>
+                    <a:ext uri="{9D8B030D-6E8A-4147-A177-3AD203B41FA5}">
+                      <a16:colId xmlns:a16="http://schemas.microsoft.com/office/drawing/2014/main" val="1083481781"/>
+                    </a:ext>
+                  </a:extLst>
+                </a:gridCol>
+                <a:gridCol w="1972474">
+                  <a:extLst>
+                    <a:ext uri="{9D8B030D-6E8A-4147-A177-3AD203B41FA5}">
+                      <a16:colId xmlns:a16="http://schemas.microsoft.com/office/drawing/2014/main" val="2655328568"/>
+                    </a:ext>
+                  </a:extLst>
+                </a:gridCol>
+                <a:gridCol w="1670500">
+                  <a:extLst>
+                    <a:ext uri="{9D8B030D-6E8A-4147-A177-3AD203B41FA5}">
+                      <a16:colId xmlns:a16="http://schemas.microsoft.com/office/drawing/2014/main" val="2527597926"/>
+                    </a:ext>
+                  </a:extLst>
+                </a:gridCol>
+                <a:gridCol w="1220748">
+                  <a:extLst>
+                    <a:ext uri="{9D8B030D-6E8A-4147-A177-3AD203B41FA5}">
+                      <a16:colId xmlns:a16="http://schemas.microsoft.com/office/drawing/2014/main" val="1452075064"/>
+                    </a:ext>
+                  </a:extLst>
+                </a:gridCol>
+                <a:gridCol w="1061196">
+                  <a:extLst>
+                    <a:ext uri="{9D8B030D-6E8A-4147-A177-3AD203B41FA5}">
+                      <a16:colId xmlns:a16="http://schemas.microsoft.com/office/drawing/2014/main" val="1749191143"/>
+                    </a:ext>
+                  </a:extLst>
+                </a:gridCol>
+              </a:tblGrid>
+              <a:tr h="368300">
+                <a:tc>
+                  <a:txBody>
+                    <a:bodyPr/>
+                    <a:lstStyle/>
+                    <a:p>
+                      <a:pPr>
+                        <a:lnSpc>
+                          <a:spcPct val="107000"/>
+                        </a:lnSpc>
+                        <a:spcAft>
+                          <a:spcPts val="0"/>
+                        </a:spcAft>
+                      </a:pPr>
+                      <a:r>
+                        <a:rPr lang="en-CA" sz="1000">
+                          <a:effectLst/>
+                        </a:rPr>
+                        <a:t>N˚ d’ordre</a:t>
+                      </a:r>
+                      <a:endParaRPr lang="en-CA" sz="1000">
+                        <a:effectLst/>
+                        <a:latin typeface="Calibri" panose="020F0502020204030204" pitchFamily="34" charset="0"/>
+                        <a:ea typeface="Calibri" panose="020F0502020204030204" pitchFamily="34" charset="0"/>
+                        <a:cs typeface="Times New Roman" panose="02020603050405020304" pitchFamily="18" charset="0"/>
+                      </a:endParaRPr>
+                    </a:p>
+                  </a:txBody>
+                  <a:tcPr marL="60523" marR="60523" marT="0" marB="0"/>
+                </a:tc>
+                <a:tc>
+                  <a:txBody>
+                    <a:bodyPr/>
+                    <a:lstStyle/>
+                    <a:p>
+                      <a:pPr>
+                        <a:lnSpc>
+                          <a:spcPct val="107000"/>
+                        </a:lnSpc>
+                        <a:spcAft>
+                          <a:spcPts val="0"/>
+                        </a:spcAft>
+                      </a:pPr>
+                      <a:r>
+                        <a:rPr lang="en-CA" sz="1000">
+                          <a:effectLst/>
+                        </a:rPr>
+                        <a:t>Désignation</a:t>
+                      </a:r>
+                      <a:endParaRPr lang="en-CA" sz="1000">
+                        <a:effectLst/>
+                        <a:latin typeface="Calibri" panose="020F0502020204030204" pitchFamily="34" charset="0"/>
+                        <a:ea typeface="Calibri" panose="020F0502020204030204" pitchFamily="34" charset="0"/>
+                        <a:cs typeface="Times New Roman" panose="02020603050405020304" pitchFamily="18" charset="0"/>
+                      </a:endParaRPr>
+                    </a:p>
+                  </a:txBody>
+                  <a:tcPr marL="60523" marR="60523" marT="0" marB="0"/>
+                </a:tc>
+                <a:tc>
+                  <a:txBody>
+                    <a:bodyPr/>
+                    <a:lstStyle/>
+                    <a:p>
+                      <a:pPr>
+                        <a:lnSpc>
+                          <a:spcPct val="107000"/>
+                        </a:lnSpc>
+                        <a:spcAft>
+                          <a:spcPts val="0"/>
+                        </a:spcAft>
+                      </a:pPr>
+                      <a:r>
+                        <a:rPr lang="en-CA" sz="1000">
+                          <a:effectLst/>
+                        </a:rPr>
+                        <a:t>Critère</a:t>
+                      </a:r>
+                      <a:endParaRPr lang="en-CA" sz="1000">
+                        <a:effectLst/>
+                        <a:latin typeface="Calibri" panose="020F0502020204030204" pitchFamily="34" charset="0"/>
+                        <a:ea typeface="Calibri" panose="020F0502020204030204" pitchFamily="34" charset="0"/>
+                        <a:cs typeface="Times New Roman" panose="02020603050405020304" pitchFamily="18" charset="0"/>
+                      </a:endParaRPr>
+                    </a:p>
+                  </a:txBody>
+                  <a:tcPr marL="60523" marR="60523" marT="0" marB="0"/>
+                </a:tc>
+                <a:tc>
+                  <a:txBody>
+                    <a:bodyPr/>
+                    <a:lstStyle/>
+                    <a:p>
+                      <a:pPr>
+                        <a:lnSpc>
+                          <a:spcPct val="107000"/>
+                        </a:lnSpc>
+                        <a:spcAft>
+                          <a:spcPts val="0"/>
+                        </a:spcAft>
+                      </a:pPr>
+                      <a:r>
+                        <a:rPr lang="en-CA" sz="1000">
+                          <a:effectLst/>
+                        </a:rPr>
+                        <a:t>Niveau</a:t>
+                      </a:r>
+                      <a:endParaRPr lang="en-CA" sz="1000">
+                        <a:effectLst/>
+                        <a:latin typeface="Calibri" panose="020F0502020204030204" pitchFamily="34" charset="0"/>
+                        <a:ea typeface="Calibri" panose="020F0502020204030204" pitchFamily="34" charset="0"/>
+                        <a:cs typeface="Times New Roman" panose="02020603050405020304" pitchFamily="18" charset="0"/>
+                      </a:endParaRPr>
+                    </a:p>
+                  </a:txBody>
+                  <a:tcPr marL="60523" marR="60523" marT="0" marB="0"/>
+                </a:tc>
+                <a:tc>
+                  <a:txBody>
+                    <a:bodyPr/>
+                    <a:lstStyle/>
+                    <a:p>
+                      <a:pPr>
+                        <a:lnSpc>
+                          <a:spcPct val="107000"/>
+                        </a:lnSpc>
+                        <a:spcAft>
+                          <a:spcPts val="0"/>
+                        </a:spcAft>
+                      </a:pPr>
+                      <a:r>
+                        <a:rPr lang="en-CA" sz="1000">
+                          <a:effectLst/>
+                        </a:rPr>
+                        <a:t>Flexibilité</a:t>
+                      </a:r>
+                      <a:endParaRPr lang="en-CA" sz="1000">
+                        <a:effectLst/>
+                        <a:latin typeface="Calibri" panose="020F0502020204030204" pitchFamily="34" charset="0"/>
+                        <a:ea typeface="Calibri" panose="020F0502020204030204" pitchFamily="34" charset="0"/>
+                        <a:cs typeface="Times New Roman" panose="02020603050405020304" pitchFamily="18" charset="0"/>
+                      </a:endParaRPr>
+                    </a:p>
+                  </a:txBody>
+                  <a:tcPr marL="60523" marR="60523" marT="0" marB="0"/>
+                </a:tc>
+                <a:tc>
+                  <a:txBody>
+                    <a:bodyPr/>
+                    <a:lstStyle/>
+                    <a:p>
+                      <a:pPr>
+                        <a:lnSpc>
+                          <a:spcPct val="107000"/>
+                        </a:lnSpc>
+                        <a:spcAft>
+                          <a:spcPts val="0"/>
+                        </a:spcAft>
+                      </a:pPr>
+                      <a:r>
+                        <a:rPr lang="en-CA" sz="1000" dirty="0" err="1">
+                          <a:effectLst/>
+                        </a:rPr>
+                        <a:t>Classe</a:t>
+                      </a:r>
+                      <a:endParaRPr lang="en-CA" sz="1000" dirty="0">
+                        <a:effectLst/>
+                        <a:latin typeface="Calibri" panose="020F0502020204030204" pitchFamily="34" charset="0"/>
+                        <a:ea typeface="Calibri" panose="020F0502020204030204" pitchFamily="34" charset="0"/>
+                        <a:cs typeface="Times New Roman" panose="02020603050405020304" pitchFamily="18" charset="0"/>
+                      </a:endParaRPr>
+                    </a:p>
+                  </a:txBody>
+                  <a:tcPr marL="60523" marR="60523" marT="0" marB="0"/>
+                </a:tc>
+                <a:extLst>
+                  <a:ext uri="{0D108BD9-81ED-4DB2-BD59-A6C34878D82A}">
+                    <a16:rowId xmlns:a16="http://schemas.microsoft.com/office/drawing/2014/main" val="3247789250"/>
+                  </a:ext>
+                </a:extLst>
+              </a:tr>
+              <a:tr h="406400">
+                <a:tc>
+                  <a:txBody>
+                    <a:bodyPr/>
+                    <a:lstStyle/>
+                    <a:p>
+                      <a:pPr>
+                        <a:lnSpc>
+                          <a:spcPct val="107000"/>
+                        </a:lnSpc>
+                        <a:spcAft>
+                          <a:spcPts val="0"/>
+                        </a:spcAft>
+                      </a:pPr>
+                      <a:r>
+                        <a:rPr lang="en-CA" sz="1000" b="0" dirty="0">
+                          <a:solidFill>
+                            <a:schemeClr val="tx1"/>
+                          </a:solidFill>
+                          <a:effectLst/>
+                        </a:rPr>
+                        <a:t>Fpr1</a:t>
+                      </a:r>
+                    </a:p>
+                    <a:p>
+                      <a:pPr>
+                        <a:lnSpc>
+                          <a:spcPct val="107000"/>
+                        </a:lnSpc>
+                        <a:spcAft>
+                          <a:spcPts val="0"/>
+                        </a:spcAft>
+                      </a:pPr>
+                      <a:r>
+                        <a:rPr lang="en-CA" sz="1000" dirty="0">
+                          <a:effectLst/>
+                        </a:rPr>
+                        <a:t> </a:t>
+                      </a:r>
+                      <a:endParaRPr lang="en-CA" sz="1000" dirty="0">
+                        <a:effectLst/>
+                        <a:latin typeface="Calibri" panose="020F0502020204030204" pitchFamily="34" charset="0"/>
+                        <a:ea typeface="Calibri" panose="020F0502020204030204" pitchFamily="34" charset="0"/>
+                        <a:cs typeface="Times New Roman" panose="02020603050405020304" pitchFamily="18" charset="0"/>
+                      </a:endParaRPr>
+                    </a:p>
+                  </a:txBody>
+                  <a:tcPr marL="60523" marR="60523" marT="0" marB="0">
+                    <a:solidFill>
+                      <a:schemeClr val="accent2">
+                        <a:lumMod val="20000"/>
+                        <a:lumOff val="80000"/>
+                      </a:schemeClr>
+                    </a:solidFill>
+                  </a:tcPr>
+                </a:tc>
+                <a:tc>
+                  <a:txBody>
+                    <a:bodyPr/>
+                    <a:lstStyle/>
+                    <a:p>
+                      <a:pPr>
+                        <a:lnSpc>
+                          <a:spcPct val="107000"/>
+                        </a:lnSpc>
+                        <a:spcAft>
+                          <a:spcPts val="0"/>
+                        </a:spcAft>
+                      </a:pPr>
+                      <a:r>
+                        <a:rPr lang="fr-CA" sz="1000">
+                          <a:effectLst/>
+                        </a:rPr>
+                        <a:t>Interface utilisateur donnant accès aux données lues et permettant le contrôle du chauffage</a:t>
+                      </a:r>
+                      <a:endParaRPr lang="en-CA" sz="1000">
+                        <a:effectLst/>
+                        <a:latin typeface="Calibri" panose="020F0502020204030204" pitchFamily="34" charset="0"/>
+                        <a:ea typeface="Calibri" panose="020F0502020204030204" pitchFamily="34" charset="0"/>
+                        <a:cs typeface="Times New Roman" panose="02020603050405020304" pitchFamily="18" charset="0"/>
+                      </a:endParaRPr>
+                    </a:p>
+                  </a:txBody>
+                  <a:tcPr marL="60523" marR="60523" marT="0" marB="0"/>
+                </a:tc>
+                <a:tc>
+                  <a:txBody>
+                    <a:bodyPr/>
+                    <a:lstStyle/>
+                    <a:p>
+                      <a:pPr>
+                        <a:lnSpc>
+                          <a:spcPct val="107000"/>
+                        </a:lnSpc>
+                        <a:spcAft>
+                          <a:spcPts val="0"/>
+                        </a:spcAft>
+                      </a:pPr>
+                      <a:r>
+                        <a:rPr lang="fr-CA" sz="1000">
+                          <a:effectLst/>
+                        </a:rPr>
+                        <a:t>Affichage lisible et complet</a:t>
+                      </a:r>
+                      <a:endParaRPr lang="en-CA" sz="1000">
+                        <a:effectLst/>
+                        <a:latin typeface="Calibri" panose="020F0502020204030204" pitchFamily="34" charset="0"/>
+                        <a:ea typeface="Calibri" panose="020F0502020204030204" pitchFamily="34" charset="0"/>
+                        <a:cs typeface="Times New Roman" panose="02020603050405020304" pitchFamily="18" charset="0"/>
+                      </a:endParaRPr>
+                    </a:p>
+                  </a:txBody>
+                  <a:tcPr marL="60523" marR="60523" marT="0" marB="0"/>
+                </a:tc>
+                <a:tc>
+                  <a:txBody>
+                    <a:bodyPr/>
+                    <a:lstStyle/>
+                    <a:p>
+                      <a:pPr>
+                        <a:lnSpc>
+                          <a:spcPct val="107000"/>
+                        </a:lnSpc>
+                        <a:spcAft>
+                          <a:spcPts val="0"/>
+                        </a:spcAft>
+                      </a:pPr>
+                      <a:r>
+                        <a:rPr lang="fr-CA" sz="1000">
+                          <a:effectLst/>
+                        </a:rPr>
+                        <a:t>Affichage sur l’écran, contrôle avec souris</a:t>
+                      </a:r>
+                      <a:endParaRPr lang="en-CA" sz="1000">
+                        <a:effectLst/>
+                        <a:latin typeface="Calibri" panose="020F0502020204030204" pitchFamily="34" charset="0"/>
+                        <a:ea typeface="Calibri" panose="020F0502020204030204" pitchFamily="34" charset="0"/>
+                        <a:cs typeface="Times New Roman" panose="02020603050405020304" pitchFamily="18" charset="0"/>
+                      </a:endParaRPr>
+                    </a:p>
+                  </a:txBody>
+                  <a:tcPr marL="60523" marR="60523" marT="0" marB="0"/>
+                </a:tc>
+                <a:tc>
+                  <a:txBody>
+                    <a:bodyPr/>
+                    <a:lstStyle/>
+                    <a:p>
+                      <a:pPr>
+                        <a:lnSpc>
+                          <a:spcPct val="107000"/>
+                        </a:lnSpc>
+                        <a:spcAft>
+                          <a:spcPts val="0"/>
+                        </a:spcAft>
+                      </a:pPr>
+                      <a:r>
+                        <a:rPr lang="fr-CA" sz="1000">
+                          <a:effectLst/>
+                        </a:rPr>
+                        <a:t>-</a:t>
+                      </a:r>
+                      <a:endParaRPr lang="en-CA" sz="1000">
+                        <a:effectLst/>
+                        <a:latin typeface="Calibri" panose="020F0502020204030204" pitchFamily="34" charset="0"/>
+                        <a:ea typeface="Calibri" panose="020F0502020204030204" pitchFamily="34" charset="0"/>
+                        <a:cs typeface="Times New Roman" panose="02020603050405020304" pitchFamily="18" charset="0"/>
+                      </a:endParaRPr>
+                    </a:p>
+                  </a:txBody>
+                  <a:tcPr marL="60523" marR="60523" marT="0" marB="0"/>
+                </a:tc>
+                <a:tc>
+                  <a:txBody>
+                    <a:bodyPr/>
+                    <a:lstStyle/>
+                    <a:p>
+                      <a:pPr>
+                        <a:lnSpc>
+                          <a:spcPct val="107000"/>
+                        </a:lnSpc>
+                        <a:spcAft>
+                          <a:spcPts val="0"/>
+                        </a:spcAft>
+                      </a:pPr>
+                      <a:r>
+                        <a:rPr lang="fr-CA" sz="1000">
+                          <a:effectLst/>
+                        </a:rPr>
+                        <a:t>F0</a:t>
+                      </a:r>
+                      <a:endParaRPr lang="en-CA" sz="1000">
+                        <a:effectLst/>
+                        <a:latin typeface="Calibri" panose="020F0502020204030204" pitchFamily="34" charset="0"/>
+                        <a:ea typeface="Calibri" panose="020F0502020204030204" pitchFamily="34" charset="0"/>
+                        <a:cs typeface="Times New Roman" panose="02020603050405020304" pitchFamily="18" charset="0"/>
+                      </a:endParaRPr>
+                    </a:p>
+                  </a:txBody>
+                  <a:tcPr marL="60523" marR="60523" marT="0" marB="0"/>
+                </a:tc>
+                <a:extLst>
+                  <a:ext uri="{0D108BD9-81ED-4DB2-BD59-A6C34878D82A}">
+                    <a16:rowId xmlns:a16="http://schemas.microsoft.com/office/drawing/2014/main" val="583428781"/>
+                  </a:ext>
+                </a:extLst>
+              </a:tr>
+              <a:tr h="457200">
+                <a:tc>
+                  <a:txBody>
+                    <a:bodyPr/>
+                    <a:lstStyle/>
+                    <a:p>
+                      <a:pPr>
+                        <a:lnSpc>
+                          <a:spcPct val="107000"/>
+                        </a:lnSpc>
+                        <a:spcAft>
+                          <a:spcPts val="0"/>
+                        </a:spcAft>
+                      </a:pPr>
+                      <a:r>
+                        <a:rPr lang="en-CA" sz="1000" b="0" dirty="0">
+                          <a:solidFill>
+                            <a:schemeClr val="tx1"/>
+                          </a:solidFill>
+                          <a:effectLst/>
+                        </a:rPr>
+                        <a:t>Fpr2</a:t>
+                      </a:r>
+                      <a:endParaRPr lang="en-CA" sz="1000" b="0" dirty="0">
+                        <a:solidFill>
+                          <a:schemeClr val="tx1"/>
+                        </a:solidFill>
+                        <a:effectLst/>
+                        <a:latin typeface="Calibri" panose="020F0502020204030204" pitchFamily="34" charset="0"/>
+                        <a:ea typeface="Calibri" panose="020F0502020204030204" pitchFamily="34" charset="0"/>
+                        <a:cs typeface="Times New Roman" panose="02020603050405020304" pitchFamily="18" charset="0"/>
+                      </a:endParaRPr>
+                    </a:p>
+                  </a:txBody>
+                  <a:tcPr marL="60523" marR="60523" marT="0" marB="0">
+                    <a:solidFill>
+                      <a:srgbClr val="FBEEE8"/>
+                    </a:solidFill>
+                  </a:tcPr>
+                </a:tc>
+                <a:tc>
+                  <a:txBody>
+                    <a:bodyPr/>
+                    <a:lstStyle/>
+                    <a:p>
+                      <a:pPr>
+                        <a:lnSpc>
+                          <a:spcPct val="107000"/>
+                        </a:lnSpc>
+                        <a:spcAft>
+                          <a:spcPts val="0"/>
+                        </a:spcAft>
+                      </a:pPr>
+                      <a:r>
+                        <a:rPr lang="fr-CA" sz="1000" dirty="0">
+                          <a:effectLst/>
+                        </a:rPr>
+                        <a:t>Communication sans-fil</a:t>
+                      </a:r>
+                      <a:endParaRPr lang="en-CA" sz="1000" dirty="0">
+                        <a:effectLst/>
+                        <a:latin typeface="Calibri" panose="020F0502020204030204" pitchFamily="34" charset="0"/>
+                        <a:ea typeface="Calibri" panose="020F0502020204030204" pitchFamily="34" charset="0"/>
+                        <a:cs typeface="Times New Roman" panose="02020603050405020304" pitchFamily="18" charset="0"/>
+                      </a:endParaRPr>
+                    </a:p>
+                  </a:txBody>
+                  <a:tcPr marL="60523" marR="60523" marT="0" marB="0">
+                    <a:solidFill>
+                      <a:srgbClr val="FBEEE8"/>
+                    </a:solidFill>
+                  </a:tcPr>
+                </a:tc>
+                <a:tc>
+                  <a:txBody>
+                    <a:bodyPr/>
+                    <a:lstStyle/>
+                    <a:p>
+                      <a:pPr>
+                        <a:lnSpc>
+                          <a:spcPct val="107000"/>
+                        </a:lnSpc>
+                        <a:spcAft>
+                          <a:spcPts val="0"/>
+                        </a:spcAft>
+                      </a:pPr>
+                      <a:r>
+                        <a:rPr lang="fr-CA" sz="1000">
+                          <a:effectLst/>
+                        </a:rPr>
+                        <a:t>Envoie de commandes et réception de réponses</a:t>
+                      </a:r>
+                      <a:endParaRPr lang="en-CA" sz="1000">
+                        <a:effectLst/>
+                        <a:latin typeface="Calibri" panose="020F0502020204030204" pitchFamily="34" charset="0"/>
+                        <a:ea typeface="Calibri" panose="020F0502020204030204" pitchFamily="34" charset="0"/>
+                        <a:cs typeface="Times New Roman" panose="02020603050405020304" pitchFamily="18" charset="0"/>
+                      </a:endParaRPr>
+                    </a:p>
+                  </a:txBody>
+                  <a:tcPr marL="60523" marR="60523" marT="0" marB="0"/>
+                </a:tc>
+                <a:tc>
+                  <a:txBody>
+                    <a:bodyPr/>
+                    <a:lstStyle/>
+                    <a:p>
+                      <a:pPr>
+                        <a:lnSpc>
+                          <a:spcPct val="107000"/>
+                        </a:lnSpc>
+                        <a:spcAft>
+                          <a:spcPts val="0"/>
+                        </a:spcAft>
+                      </a:pPr>
+                      <a:r>
+                        <a:rPr lang="fr-CA" sz="1000">
+                          <a:effectLst/>
+                        </a:rPr>
+                        <a:t>1km de distance</a:t>
+                      </a:r>
+                      <a:endParaRPr lang="en-CA" sz="1000">
+                        <a:effectLst/>
+                        <a:latin typeface="Calibri" panose="020F0502020204030204" pitchFamily="34" charset="0"/>
+                        <a:ea typeface="Calibri" panose="020F0502020204030204" pitchFamily="34" charset="0"/>
+                        <a:cs typeface="Times New Roman" panose="02020603050405020304" pitchFamily="18" charset="0"/>
+                      </a:endParaRPr>
+                    </a:p>
+                  </a:txBody>
+                  <a:tcPr marL="60523" marR="60523" marT="0" marB="0"/>
+                </a:tc>
+                <a:tc>
+                  <a:txBody>
+                    <a:bodyPr/>
+                    <a:lstStyle/>
+                    <a:p>
+                      <a:pPr>
+                        <a:lnSpc>
+                          <a:spcPct val="107000"/>
+                        </a:lnSpc>
+                        <a:spcAft>
+                          <a:spcPts val="0"/>
+                        </a:spcAft>
+                      </a:pPr>
+                      <a:r>
+                        <a:rPr lang="fr-CA" sz="1000">
+                          <a:effectLst/>
+                        </a:rPr>
+                        <a:t>± 50m</a:t>
+                      </a:r>
+                      <a:endParaRPr lang="en-CA" sz="1000">
+                        <a:effectLst/>
+                        <a:latin typeface="Calibri" panose="020F0502020204030204" pitchFamily="34" charset="0"/>
+                        <a:ea typeface="Calibri" panose="020F0502020204030204" pitchFamily="34" charset="0"/>
+                        <a:cs typeface="Times New Roman" panose="02020603050405020304" pitchFamily="18" charset="0"/>
+                      </a:endParaRPr>
+                    </a:p>
+                  </a:txBody>
+                  <a:tcPr marL="60523" marR="60523" marT="0" marB="0"/>
+                </a:tc>
+                <a:tc>
+                  <a:txBody>
+                    <a:bodyPr/>
+                    <a:lstStyle/>
+                    <a:p>
+                      <a:pPr>
+                        <a:lnSpc>
+                          <a:spcPct val="107000"/>
+                        </a:lnSpc>
+                        <a:spcAft>
+                          <a:spcPts val="0"/>
+                        </a:spcAft>
+                      </a:pPr>
+                      <a:r>
+                        <a:rPr lang="fr-CA" sz="1000">
+                          <a:effectLst/>
+                        </a:rPr>
+                        <a:t>F0</a:t>
+                      </a:r>
+                      <a:endParaRPr lang="en-CA" sz="1000">
+                        <a:effectLst/>
+                        <a:latin typeface="Calibri" panose="020F0502020204030204" pitchFamily="34" charset="0"/>
+                        <a:ea typeface="Calibri" panose="020F0502020204030204" pitchFamily="34" charset="0"/>
+                        <a:cs typeface="Times New Roman" panose="02020603050405020304" pitchFamily="18" charset="0"/>
+                      </a:endParaRPr>
+                    </a:p>
+                  </a:txBody>
+                  <a:tcPr marL="60523" marR="60523" marT="0" marB="0"/>
+                </a:tc>
+                <a:extLst>
+                  <a:ext uri="{0D108BD9-81ED-4DB2-BD59-A6C34878D82A}">
+                    <a16:rowId xmlns:a16="http://schemas.microsoft.com/office/drawing/2014/main" val="1468371273"/>
+                  </a:ext>
+                </a:extLst>
+              </a:tr>
+              <a:tr h="444500">
+                <a:tc>
+                  <a:txBody>
+                    <a:bodyPr/>
+                    <a:lstStyle/>
+                    <a:p>
+                      <a:pPr>
+                        <a:lnSpc>
+                          <a:spcPct val="107000"/>
+                        </a:lnSpc>
+                        <a:spcAft>
+                          <a:spcPts val="0"/>
+                        </a:spcAft>
+                      </a:pPr>
+                      <a:r>
+                        <a:rPr lang="fr-CA" sz="1000" b="0" dirty="0">
+                          <a:solidFill>
+                            <a:schemeClr val="tx1"/>
+                          </a:solidFill>
+                          <a:effectLst/>
+                        </a:rPr>
+                        <a:t>Fpr3</a:t>
+                      </a:r>
+                      <a:endParaRPr lang="en-CA" sz="1000" b="0" dirty="0">
+                        <a:solidFill>
+                          <a:schemeClr val="tx1"/>
+                        </a:solidFill>
+                        <a:effectLst/>
+                        <a:latin typeface="Calibri" panose="020F0502020204030204" pitchFamily="34" charset="0"/>
+                        <a:ea typeface="Calibri" panose="020F0502020204030204" pitchFamily="34" charset="0"/>
+                        <a:cs typeface="Times New Roman" panose="02020603050405020304" pitchFamily="18" charset="0"/>
+                      </a:endParaRPr>
+                    </a:p>
+                  </a:txBody>
+                  <a:tcPr marL="60523" marR="60523" marT="0" marB="0">
+                    <a:solidFill>
+                      <a:schemeClr val="accent2">
+                        <a:lumMod val="20000"/>
+                        <a:lumOff val="80000"/>
+                      </a:schemeClr>
+                    </a:solidFill>
+                  </a:tcPr>
+                </a:tc>
+                <a:tc>
+                  <a:txBody>
+                    <a:bodyPr/>
+                    <a:lstStyle/>
+                    <a:p>
+                      <a:pPr>
+                        <a:lnSpc>
+                          <a:spcPct val="107000"/>
+                        </a:lnSpc>
+                        <a:spcAft>
+                          <a:spcPts val="0"/>
+                        </a:spcAft>
+                      </a:pPr>
+                      <a:r>
+                        <a:rPr lang="fr-CA" sz="1000">
+                          <a:effectLst/>
+                        </a:rPr>
+                        <a:t>Autonomie sur batterie assurée par un panneau solaire</a:t>
+                      </a:r>
+                      <a:endParaRPr lang="en-CA" sz="1000">
+                        <a:effectLst/>
+                        <a:latin typeface="Calibri" panose="020F0502020204030204" pitchFamily="34" charset="0"/>
+                        <a:ea typeface="Calibri" panose="020F0502020204030204" pitchFamily="34" charset="0"/>
+                        <a:cs typeface="Times New Roman" panose="02020603050405020304" pitchFamily="18" charset="0"/>
+                      </a:endParaRPr>
+                    </a:p>
+                  </a:txBody>
+                  <a:tcPr marL="60523" marR="60523" marT="0" marB="0"/>
+                </a:tc>
+                <a:tc>
+                  <a:txBody>
+                    <a:bodyPr/>
+                    <a:lstStyle/>
+                    <a:p>
+                      <a:pPr>
+                        <a:lnSpc>
+                          <a:spcPct val="107000"/>
+                        </a:lnSpc>
+                        <a:spcAft>
+                          <a:spcPts val="0"/>
+                        </a:spcAft>
+                      </a:pPr>
+                      <a:r>
+                        <a:rPr lang="fr-CA" sz="1000">
+                          <a:effectLst/>
+                        </a:rPr>
+                        <a:t>Permet le fonctionnement de l’appareil pour une certaine durée</a:t>
+                      </a:r>
+                      <a:endParaRPr lang="en-CA" sz="1000">
+                        <a:effectLst/>
+                        <a:latin typeface="Calibri" panose="020F0502020204030204" pitchFamily="34" charset="0"/>
+                        <a:ea typeface="Calibri" panose="020F0502020204030204" pitchFamily="34" charset="0"/>
+                        <a:cs typeface="Times New Roman" panose="02020603050405020304" pitchFamily="18" charset="0"/>
+                      </a:endParaRPr>
+                    </a:p>
+                  </a:txBody>
+                  <a:tcPr marL="60523" marR="60523" marT="0" marB="0"/>
+                </a:tc>
+                <a:tc>
+                  <a:txBody>
+                    <a:bodyPr/>
+                    <a:lstStyle/>
+                    <a:p>
+                      <a:pPr>
+                        <a:lnSpc>
+                          <a:spcPct val="107000"/>
+                        </a:lnSpc>
+                        <a:spcAft>
+                          <a:spcPts val="0"/>
+                        </a:spcAft>
+                      </a:pPr>
+                      <a:r>
+                        <a:rPr lang="fr-CA" sz="1000">
+                          <a:effectLst/>
+                        </a:rPr>
+                        <a:t>96h d’autonomie</a:t>
+                      </a:r>
+                      <a:endParaRPr lang="en-CA" sz="1000">
+                        <a:effectLst/>
+                        <a:latin typeface="Calibri" panose="020F0502020204030204" pitchFamily="34" charset="0"/>
+                        <a:ea typeface="Calibri" panose="020F0502020204030204" pitchFamily="34" charset="0"/>
+                        <a:cs typeface="Times New Roman" panose="02020603050405020304" pitchFamily="18" charset="0"/>
+                      </a:endParaRPr>
+                    </a:p>
+                  </a:txBody>
+                  <a:tcPr marL="60523" marR="60523" marT="0" marB="0"/>
+                </a:tc>
+                <a:tc>
+                  <a:txBody>
+                    <a:bodyPr/>
+                    <a:lstStyle/>
+                    <a:p>
+                      <a:pPr>
+                        <a:lnSpc>
+                          <a:spcPct val="107000"/>
+                        </a:lnSpc>
+                        <a:spcAft>
+                          <a:spcPts val="0"/>
+                        </a:spcAft>
+                      </a:pPr>
+                      <a:r>
+                        <a:rPr lang="fr-CA" sz="1000">
+                          <a:effectLst/>
+                        </a:rPr>
+                        <a:t>± 12h</a:t>
+                      </a:r>
+                      <a:endParaRPr lang="en-CA" sz="1000">
+                        <a:effectLst/>
+                        <a:latin typeface="Calibri" panose="020F0502020204030204" pitchFamily="34" charset="0"/>
+                        <a:ea typeface="Calibri" panose="020F0502020204030204" pitchFamily="34" charset="0"/>
+                        <a:cs typeface="Times New Roman" panose="02020603050405020304" pitchFamily="18" charset="0"/>
+                      </a:endParaRPr>
+                    </a:p>
+                  </a:txBody>
+                  <a:tcPr marL="60523" marR="60523" marT="0" marB="0"/>
+                </a:tc>
+                <a:tc>
+                  <a:txBody>
+                    <a:bodyPr/>
+                    <a:lstStyle/>
+                    <a:p>
+                      <a:pPr>
+                        <a:lnSpc>
+                          <a:spcPct val="107000"/>
+                        </a:lnSpc>
+                        <a:spcAft>
+                          <a:spcPts val="0"/>
+                        </a:spcAft>
+                      </a:pPr>
+                      <a:r>
+                        <a:rPr lang="fr-CA" sz="1000">
+                          <a:effectLst/>
+                        </a:rPr>
+                        <a:t>F1</a:t>
+                      </a:r>
+                      <a:endParaRPr lang="en-CA" sz="1000">
+                        <a:effectLst/>
+                        <a:latin typeface="Calibri" panose="020F0502020204030204" pitchFamily="34" charset="0"/>
+                        <a:ea typeface="Calibri" panose="020F0502020204030204" pitchFamily="34" charset="0"/>
+                        <a:cs typeface="Times New Roman" panose="02020603050405020304" pitchFamily="18" charset="0"/>
+                      </a:endParaRPr>
+                    </a:p>
+                  </a:txBody>
+                  <a:tcPr marL="60523" marR="60523" marT="0" marB="0"/>
+                </a:tc>
+                <a:extLst>
+                  <a:ext uri="{0D108BD9-81ED-4DB2-BD59-A6C34878D82A}">
+                    <a16:rowId xmlns:a16="http://schemas.microsoft.com/office/drawing/2014/main" val="907397932"/>
+                  </a:ext>
+                </a:extLst>
+              </a:tr>
+              <a:tr h="424046">
+                <a:tc>
+                  <a:txBody>
+                    <a:bodyPr/>
+                    <a:lstStyle/>
+                    <a:p>
+                      <a:pPr>
+                        <a:lnSpc>
+                          <a:spcPct val="107000"/>
+                        </a:lnSpc>
+                        <a:spcAft>
+                          <a:spcPts val="0"/>
+                        </a:spcAft>
+                      </a:pPr>
+                      <a:r>
+                        <a:rPr lang="fr-CA" sz="1000" b="0" dirty="0">
+                          <a:solidFill>
+                            <a:schemeClr val="tx1"/>
+                          </a:solidFill>
+                          <a:effectLst/>
+                        </a:rPr>
+                        <a:t>Fsec1</a:t>
+                      </a:r>
+                      <a:endParaRPr lang="en-CA" sz="1000" b="0" dirty="0">
+                        <a:solidFill>
+                          <a:schemeClr val="tx1"/>
+                        </a:solidFill>
+                        <a:effectLst/>
+                        <a:latin typeface="Calibri" panose="020F0502020204030204" pitchFamily="34" charset="0"/>
+                        <a:ea typeface="Calibri" panose="020F0502020204030204" pitchFamily="34" charset="0"/>
+                        <a:cs typeface="Times New Roman" panose="02020603050405020304" pitchFamily="18" charset="0"/>
+                      </a:endParaRPr>
+                    </a:p>
+                  </a:txBody>
+                  <a:tcPr marL="60523" marR="60523" marT="0" marB="0">
+                    <a:solidFill>
+                      <a:srgbClr val="FBEEE8"/>
+                    </a:solidFill>
+                  </a:tcPr>
+                </a:tc>
+                <a:tc>
+                  <a:txBody>
+                    <a:bodyPr/>
+                    <a:lstStyle/>
+                    <a:p>
+                      <a:pPr>
+                        <a:lnSpc>
+                          <a:spcPct val="107000"/>
+                        </a:lnSpc>
+                        <a:spcAft>
+                          <a:spcPts val="0"/>
+                        </a:spcAft>
+                      </a:pPr>
+                      <a:r>
+                        <a:rPr lang="fr-CA" sz="1000">
+                          <a:effectLst/>
+                        </a:rPr>
+                        <a:t>Contrôle de la température de la ruche</a:t>
+                      </a:r>
+                      <a:endParaRPr lang="en-CA" sz="1000">
+                        <a:effectLst/>
+                        <a:latin typeface="Calibri" panose="020F0502020204030204" pitchFamily="34" charset="0"/>
+                        <a:ea typeface="Calibri" panose="020F0502020204030204" pitchFamily="34" charset="0"/>
+                        <a:cs typeface="Times New Roman" panose="02020603050405020304" pitchFamily="18" charset="0"/>
+                      </a:endParaRPr>
+                    </a:p>
+                  </a:txBody>
+                  <a:tcPr marL="60523" marR="60523" marT="0" marB="0"/>
+                </a:tc>
+                <a:tc>
+                  <a:txBody>
+                    <a:bodyPr/>
+                    <a:lstStyle/>
+                    <a:p>
+                      <a:pPr>
+                        <a:lnSpc>
+                          <a:spcPct val="107000"/>
+                        </a:lnSpc>
+                        <a:spcAft>
+                          <a:spcPts val="0"/>
+                        </a:spcAft>
+                      </a:pPr>
+                      <a:r>
+                        <a:rPr lang="fr-CA" sz="1000">
+                          <a:effectLst/>
+                        </a:rPr>
+                        <a:t>Contrôlable par l’interface</a:t>
+                      </a:r>
+                      <a:endParaRPr lang="en-CA" sz="1000">
+                        <a:effectLst/>
+                        <a:latin typeface="Calibri" panose="020F0502020204030204" pitchFamily="34" charset="0"/>
+                        <a:ea typeface="Calibri" panose="020F0502020204030204" pitchFamily="34" charset="0"/>
+                        <a:cs typeface="Times New Roman" panose="02020603050405020304" pitchFamily="18" charset="0"/>
+                      </a:endParaRPr>
+                    </a:p>
+                  </a:txBody>
+                  <a:tcPr marL="60523" marR="60523" marT="0" marB="0"/>
+                </a:tc>
+                <a:tc>
+                  <a:txBody>
+                    <a:bodyPr/>
+                    <a:lstStyle/>
+                    <a:p>
+                      <a:pPr>
+                        <a:lnSpc>
+                          <a:spcPct val="107000"/>
+                        </a:lnSpc>
+                        <a:spcAft>
+                          <a:spcPts val="0"/>
+                        </a:spcAft>
+                      </a:pPr>
+                      <a:r>
+                        <a:rPr lang="fr-CA" sz="1000">
+                          <a:effectLst/>
+                        </a:rPr>
+                        <a:t>Chauffage jusqu’à 30˚C</a:t>
+                      </a:r>
+                      <a:endParaRPr lang="en-CA" sz="1000">
+                        <a:effectLst/>
+                        <a:latin typeface="Calibri" panose="020F0502020204030204" pitchFamily="34" charset="0"/>
+                        <a:ea typeface="Calibri" panose="020F0502020204030204" pitchFamily="34" charset="0"/>
+                        <a:cs typeface="Times New Roman" panose="02020603050405020304" pitchFamily="18" charset="0"/>
+                      </a:endParaRPr>
+                    </a:p>
+                  </a:txBody>
+                  <a:tcPr marL="60523" marR="60523" marT="0" marB="0"/>
+                </a:tc>
+                <a:tc>
+                  <a:txBody>
+                    <a:bodyPr/>
+                    <a:lstStyle/>
+                    <a:p>
+                      <a:pPr>
+                        <a:lnSpc>
+                          <a:spcPct val="107000"/>
+                        </a:lnSpc>
+                        <a:spcAft>
+                          <a:spcPts val="0"/>
+                        </a:spcAft>
+                      </a:pPr>
+                      <a:r>
+                        <a:rPr lang="fr-CA" sz="1000">
+                          <a:effectLst/>
+                        </a:rPr>
+                        <a:t>± 1˚C</a:t>
+                      </a:r>
+                      <a:endParaRPr lang="en-CA" sz="1000">
+                        <a:effectLst/>
+                        <a:latin typeface="Calibri" panose="020F0502020204030204" pitchFamily="34" charset="0"/>
+                        <a:ea typeface="Calibri" panose="020F0502020204030204" pitchFamily="34" charset="0"/>
+                        <a:cs typeface="Times New Roman" panose="02020603050405020304" pitchFamily="18" charset="0"/>
+                      </a:endParaRPr>
+                    </a:p>
+                  </a:txBody>
+                  <a:tcPr marL="60523" marR="60523" marT="0" marB="0"/>
+                </a:tc>
+                <a:tc>
+                  <a:txBody>
+                    <a:bodyPr/>
+                    <a:lstStyle/>
+                    <a:p>
+                      <a:pPr>
+                        <a:lnSpc>
+                          <a:spcPct val="107000"/>
+                        </a:lnSpc>
+                        <a:spcAft>
+                          <a:spcPts val="0"/>
+                        </a:spcAft>
+                      </a:pPr>
+                      <a:r>
+                        <a:rPr lang="fr-CA" sz="1000">
+                          <a:effectLst/>
+                        </a:rPr>
+                        <a:t>F1</a:t>
+                      </a:r>
+                      <a:endParaRPr lang="en-CA" sz="1000">
+                        <a:effectLst/>
+                        <a:latin typeface="Calibri" panose="020F0502020204030204" pitchFamily="34" charset="0"/>
+                        <a:ea typeface="Calibri" panose="020F0502020204030204" pitchFamily="34" charset="0"/>
+                        <a:cs typeface="Times New Roman" panose="02020603050405020304" pitchFamily="18" charset="0"/>
+                      </a:endParaRPr>
+                    </a:p>
+                  </a:txBody>
+                  <a:tcPr marL="60523" marR="60523" marT="0" marB="0"/>
+                </a:tc>
+                <a:extLst>
+                  <a:ext uri="{0D108BD9-81ED-4DB2-BD59-A6C34878D82A}">
+                    <a16:rowId xmlns:a16="http://schemas.microsoft.com/office/drawing/2014/main" val="893943727"/>
+                  </a:ext>
+                </a:extLst>
+              </a:tr>
+              <a:tr h="452254">
+                <a:tc>
+                  <a:txBody>
+                    <a:bodyPr/>
+                    <a:lstStyle/>
+                    <a:p>
+                      <a:pPr>
+                        <a:lnSpc>
+                          <a:spcPct val="107000"/>
+                        </a:lnSpc>
+                        <a:spcAft>
+                          <a:spcPts val="0"/>
+                        </a:spcAft>
+                      </a:pPr>
+                      <a:r>
+                        <a:rPr lang="fr-CA" sz="1000" b="0" dirty="0">
+                          <a:solidFill>
+                            <a:schemeClr val="tx1"/>
+                          </a:solidFill>
+                          <a:effectLst/>
+                        </a:rPr>
+                        <a:t>Fsec2</a:t>
+                      </a:r>
+                      <a:endParaRPr lang="en-CA" sz="1000" b="0" dirty="0">
+                        <a:solidFill>
+                          <a:schemeClr val="tx1"/>
+                        </a:solidFill>
+                        <a:effectLst/>
+                        <a:latin typeface="Calibri" panose="020F0502020204030204" pitchFamily="34" charset="0"/>
+                        <a:ea typeface="Calibri" panose="020F0502020204030204" pitchFamily="34" charset="0"/>
+                        <a:cs typeface="Times New Roman" panose="02020603050405020304" pitchFamily="18" charset="0"/>
+                      </a:endParaRPr>
+                    </a:p>
+                  </a:txBody>
+                  <a:tcPr marL="60523" marR="60523" marT="0" marB="0">
+                    <a:solidFill>
+                      <a:schemeClr val="accent2">
+                        <a:lumMod val="20000"/>
+                        <a:lumOff val="80000"/>
+                      </a:schemeClr>
+                    </a:solidFill>
+                  </a:tcPr>
+                </a:tc>
+                <a:tc>
+                  <a:txBody>
+                    <a:bodyPr/>
+                    <a:lstStyle/>
+                    <a:p>
+                      <a:pPr>
+                        <a:lnSpc>
+                          <a:spcPct val="107000"/>
+                        </a:lnSpc>
+                        <a:spcAft>
+                          <a:spcPts val="0"/>
+                        </a:spcAft>
+                      </a:pPr>
+                      <a:r>
+                        <a:rPr lang="fr-CA" sz="1000" dirty="0">
+                          <a:effectLst/>
+                        </a:rPr>
+                        <a:t>Lecture de la température interne de la ruche</a:t>
+                      </a:r>
+                      <a:endParaRPr lang="en-CA" sz="1000" dirty="0">
+                        <a:effectLst/>
+                        <a:latin typeface="Calibri" panose="020F0502020204030204" pitchFamily="34" charset="0"/>
+                        <a:ea typeface="Calibri" panose="020F0502020204030204" pitchFamily="34" charset="0"/>
+                        <a:cs typeface="Times New Roman" panose="02020603050405020304" pitchFamily="18" charset="0"/>
+                      </a:endParaRPr>
+                    </a:p>
+                  </a:txBody>
+                  <a:tcPr marL="60523" marR="60523" marT="0" marB="0"/>
+                </a:tc>
+                <a:tc>
+                  <a:txBody>
+                    <a:bodyPr/>
+                    <a:lstStyle/>
+                    <a:p>
+                      <a:pPr>
+                        <a:lnSpc>
+                          <a:spcPct val="107000"/>
+                        </a:lnSpc>
+                        <a:spcAft>
+                          <a:spcPts val="0"/>
+                        </a:spcAft>
+                      </a:pPr>
+                      <a:r>
+                        <a:rPr lang="fr-CA" sz="1000">
+                          <a:effectLst/>
+                        </a:rPr>
+                        <a:t>Affichage de la température sur l’interface</a:t>
+                      </a:r>
+                      <a:endParaRPr lang="en-CA" sz="1000">
+                        <a:effectLst/>
+                        <a:latin typeface="Calibri" panose="020F0502020204030204" pitchFamily="34" charset="0"/>
+                        <a:ea typeface="Calibri" panose="020F0502020204030204" pitchFamily="34" charset="0"/>
+                        <a:cs typeface="Times New Roman" panose="02020603050405020304" pitchFamily="18" charset="0"/>
+                      </a:endParaRPr>
+                    </a:p>
+                  </a:txBody>
+                  <a:tcPr marL="60523" marR="60523" marT="0" marB="0"/>
+                </a:tc>
+                <a:tc>
+                  <a:txBody>
+                    <a:bodyPr/>
+                    <a:lstStyle/>
+                    <a:p>
+                      <a:pPr>
+                        <a:lnSpc>
+                          <a:spcPct val="107000"/>
+                        </a:lnSpc>
+                        <a:spcAft>
+                          <a:spcPts val="0"/>
+                        </a:spcAft>
+                      </a:pPr>
+                      <a:r>
+                        <a:rPr lang="fr-CA" sz="1000">
+                          <a:effectLst/>
+                        </a:rPr>
+                        <a:t>Température entre -40˚C et 40˚C</a:t>
+                      </a:r>
+                      <a:endParaRPr lang="en-CA" sz="1000">
+                        <a:effectLst/>
+                        <a:latin typeface="Calibri" panose="020F0502020204030204" pitchFamily="34" charset="0"/>
+                        <a:ea typeface="Calibri" panose="020F0502020204030204" pitchFamily="34" charset="0"/>
+                        <a:cs typeface="Times New Roman" panose="02020603050405020304" pitchFamily="18" charset="0"/>
+                      </a:endParaRPr>
+                    </a:p>
+                  </a:txBody>
+                  <a:tcPr marL="60523" marR="60523" marT="0" marB="0"/>
+                </a:tc>
+                <a:tc>
+                  <a:txBody>
+                    <a:bodyPr/>
+                    <a:lstStyle/>
+                    <a:p>
+                      <a:pPr>
+                        <a:lnSpc>
+                          <a:spcPct val="107000"/>
+                        </a:lnSpc>
+                        <a:spcAft>
+                          <a:spcPts val="0"/>
+                        </a:spcAft>
+                      </a:pPr>
+                      <a:r>
+                        <a:rPr lang="fr-CA" sz="1000">
+                          <a:effectLst/>
+                        </a:rPr>
+                        <a:t>± 1˚C</a:t>
+                      </a:r>
+                      <a:endParaRPr lang="en-CA" sz="1000">
+                        <a:effectLst/>
+                        <a:latin typeface="Calibri" panose="020F0502020204030204" pitchFamily="34" charset="0"/>
+                        <a:ea typeface="Calibri" panose="020F0502020204030204" pitchFamily="34" charset="0"/>
+                        <a:cs typeface="Times New Roman" panose="02020603050405020304" pitchFamily="18" charset="0"/>
+                      </a:endParaRPr>
+                    </a:p>
+                  </a:txBody>
+                  <a:tcPr marL="60523" marR="60523" marT="0" marB="0"/>
+                </a:tc>
+                <a:tc>
+                  <a:txBody>
+                    <a:bodyPr/>
+                    <a:lstStyle/>
+                    <a:p>
+                      <a:pPr>
+                        <a:lnSpc>
+                          <a:spcPct val="107000"/>
+                        </a:lnSpc>
+                        <a:spcAft>
+                          <a:spcPts val="0"/>
+                        </a:spcAft>
+                      </a:pPr>
+                      <a:r>
+                        <a:rPr lang="fr-CA" sz="1000" dirty="0">
+                          <a:effectLst/>
+                        </a:rPr>
+                        <a:t>F1</a:t>
+                      </a:r>
+                      <a:endParaRPr lang="en-CA" sz="1000" dirty="0">
+                        <a:effectLst/>
+                        <a:latin typeface="Calibri" panose="020F0502020204030204" pitchFamily="34" charset="0"/>
+                        <a:ea typeface="Calibri" panose="020F0502020204030204" pitchFamily="34" charset="0"/>
+                        <a:cs typeface="Times New Roman" panose="02020603050405020304" pitchFamily="18" charset="0"/>
+                      </a:endParaRPr>
+                    </a:p>
+                  </a:txBody>
+                  <a:tcPr marL="60523" marR="60523" marT="0" marB="0"/>
+                </a:tc>
+                <a:extLst>
+                  <a:ext uri="{0D108BD9-81ED-4DB2-BD59-A6C34878D82A}">
+                    <a16:rowId xmlns:a16="http://schemas.microsoft.com/office/drawing/2014/main" val="754273794"/>
+                  </a:ext>
+                </a:extLst>
+              </a:tr>
+              <a:tr h="330200">
+                <a:tc>
+                  <a:txBody>
+                    <a:bodyPr/>
+                    <a:lstStyle/>
+                    <a:p>
+                      <a:pPr>
+                        <a:lnSpc>
+                          <a:spcPct val="107000"/>
+                        </a:lnSpc>
+                        <a:spcAft>
+                          <a:spcPts val="0"/>
+                        </a:spcAft>
+                      </a:pPr>
+                      <a:r>
+                        <a:rPr lang="fr-CA" sz="1000" b="0" dirty="0">
+                          <a:solidFill>
+                            <a:schemeClr val="tx1"/>
+                          </a:solidFill>
+                          <a:effectLst/>
+                        </a:rPr>
+                        <a:t>Fsec3</a:t>
+                      </a:r>
+                      <a:endParaRPr lang="en-CA" sz="1000" b="0" dirty="0">
+                        <a:solidFill>
+                          <a:schemeClr val="tx1"/>
+                        </a:solidFill>
+                        <a:effectLst/>
+                        <a:latin typeface="Calibri" panose="020F0502020204030204" pitchFamily="34" charset="0"/>
+                        <a:ea typeface="Calibri" panose="020F0502020204030204" pitchFamily="34" charset="0"/>
+                        <a:cs typeface="Times New Roman" panose="02020603050405020304" pitchFamily="18" charset="0"/>
+                      </a:endParaRPr>
+                    </a:p>
+                  </a:txBody>
+                  <a:tcPr marL="55065" marR="55065" marT="0" marB="0">
+                    <a:solidFill>
+                      <a:srgbClr val="FBEEE8"/>
+                    </a:solidFill>
+                  </a:tcPr>
+                </a:tc>
+                <a:tc>
+                  <a:txBody>
+                    <a:bodyPr/>
+                    <a:lstStyle/>
+                    <a:p>
+                      <a:pPr>
+                        <a:lnSpc>
+                          <a:spcPct val="107000"/>
+                        </a:lnSpc>
+                        <a:spcAft>
+                          <a:spcPts val="0"/>
+                        </a:spcAft>
+                      </a:pPr>
+                      <a:r>
+                        <a:rPr lang="fr-CA" sz="1000">
+                          <a:effectLst/>
+                        </a:rPr>
+                        <a:t>Lecture du poids de la ruche</a:t>
+                      </a:r>
+                      <a:endParaRPr lang="en-CA" sz="1000">
+                        <a:effectLst/>
+                        <a:latin typeface="Calibri" panose="020F0502020204030204" pitchFamily="34" charset="0"/>
+                        <a:ea typeface="Calibri" panose="020F0502020204030204" pitchFamily="34" charset="0"/>
+                        <a:cs typeface="Times New Roman" panose="02020603050405020304" pitchFamily="18" charset="0"/>
+                      </a:endParaRPr>
+                    </a:p>
+                  </a:txBody>
+                  <a:tcPr marL="55065" marR="55065" marT="0" marB="0"/>
+                </a:tc>
+                <a:tc>
+                  <a:txBody>
+                    <a:bodyPr/>
+                    <a:lstStyle/>
+                    <a:p>
+                      <a:pPr>
+                        <a:lnSpc>
+                          <a:spcPct val="107000"/>
+                        </a:lnSpc>
+                        <a:spcAft>
+                          <a:spcPts val="0"/>
+                        </a:spcAft>
+                      </a:pPr>
+                      <a:r>
+                        <a:rPr lang="fr-CA" sz="1000">
+                          <a:effectLst/>
+                        </a:rPr>
+                        <a:t>Affichage du poids sur l’interface</a:t>
+                      </a:r>
+                      <a:endParaRPr lang="en-CA" sz="1000">
+                        <a:effectLst/>
+                        <a:latin typeface="Calibri" panose="020F0502020204030204" pitchFamily="34" charset="0"/>
+                        <a:ea typeface="Calibri" panose="020F0502020204030204" pitchFamily="34" charset="0"/>
+                        <a:cs typeface="Times New Roman" panose="02020603050405020304" pitchFamily="18" charset="0"/>
+                      </a:endParaRPr>
+                    </a:p>
+                  </a:txBody>
+                  <a:tcPr marL="55065" marR="55065" marT="0" marB="0"/>
+                </a:tc>
+                <a:tc>
+                  <a:txBody>
+                    <a:bodyPr/>
+                    <a:lstStyle/>
+                    <a:p>
+                      <a:pPr>
+                        <a:lnSpc>
+                          <a:spcPct val="107000"/>
+                        </a:lnSpc>
+                        <a:spcAft>
+                          <a:spcPts val="0"/>
+                        </a:spcAft>
+                      </a:pPr>
+                      <a:r>
+                        <a:rPr lang="fr-CA" sz="1000">
+                          <a:effectLst/>
+                        </a:rPr>
+                        <a:t>Poids jusqu’à 45kg</a:t>
+                      </a:r>
+                      <a:endParaRPr lang="en-CA" sz="1000">
+                        <a:effectLst/>
+                        <a:latin typeface="Calibri" panose="020F0502020204030204" pitchFamily="34" charset="0"/>
+                        <a:ea typeface="Calibri" panose="020F0502020204030204" pitchFamily="34" charset="0"/>
+                        <a:cs typeface="Times New Roman" panose="02020603050405020304" pitchFamily="18" charset="0"/>
+                      </a:endParaRPr>
+                    </a:p>
+                  </a:txBody>
+                  <a:tcPr marL="55065" marR="55065" marT="0" marB="0"/>
+                </a:tc>
+                <a:tc>
+                  <a:txBody>
+                    <a:bodyPr/>
+                    <a:lstStyle/>
+                    <a:p>
+                      <a:pPr>
+                        <a:lnSpc>
+                          <a:spcPct val="107000"/>
+                        </a:lnSpc>
+                        <a:spcAft>
+                          <a:spcPts val="0"/>
+                        </a:spcAft>
+                      </a:pPr>
+                      <a:r>
+                        <a:rPr lang="fr-CA" sz="1000">
+                          <a:effectLst/>
+                        </a:rPr>
+                        <a:t>± 1kg</a:t>
+                      </a:r>
+                      <a:endParaRPr lang="en-CA" sz="1000">
+                        <a:effectLst/>
+                        <a:latin typeface="Calibri" panose="020F0502020204030204" pitchFamily="34" charset="0"/>
+                        <a:ea typeface="Calibri" panose="020F0502020204030204" pitchFamily="34" charset="0"/>
+                        <a:cs typeface="Times New Roman" panose="02020603050405020304" pitchFamily="18" charset="0"/>
+                      </a:endParaRPr>
+                    </a:p>
+                  </a:txBody>
+                  <a:tcPr marL="55065" marR="55065" marT="0" marB="0"/>
+                </a:tc>
+                <a:tc>
+                  <a:txBody>
+                    <a:bodyPr/>
+                    <a:lstStyle/>
+                    <a:p>
+                      <a:pPr>
+                        <a:lnSpc>
+                          <a:spcPct val="107000"/>
+                        </a:lnSpc>
+                        <a:spcAft>
+                          <a:spcPts val="0"/>
+                        </a:spcAft>
+                      </a:pPr>
+                      <a:r>
+                        <a:rPr lang="fr-CA" sz="1000" dirty="0">
+                          <a:effectLst/>
+                        </a:rPr>
+                        <a:t>F2</a:t>
+                      </a:r>
+                      <a:endParaRPr lang="en-CA" sz="1000" dirty="0">
+                        <a:effectLst/>
+                        <a:latin typeface="Calibri" panose="020F0502020204030204" pitchFamily="34" charset="0"/>
+                        <a:ea typeface="Calibri" panose="020F0502020204030204" pitchFamily="34" charset="0"/>
+                        <a:cs typeface="Times New Roman" panose="02020603050405020304" pitchFamily="18" charset="0"/>
+                      </a:endParaRPr>
+                    </a:p>
+                  </a:txBody>
+                  <a:tcPr marL="55065" marR="55065" marT="0" marB="0"/>
+                </a:tc>
+                <a:extLst>
+                  <a:ext uri="{0D108BD9-81ED-4DB2-BD59-A6C34878D82A}">
+                    <a16:rowId xmlns:a16="http://schemas.microsoft.com/office/drawing/2014/main" val="3726277403"/>
+                  </a:ext>
+                </a:extLst>
+              </a:tr>
+            </a:tbl>
+          </a:graphicData>
+        </a:graphic>
+      </p:graphicFrame>
     </p:spTree>
     <p:extLst>
       <p:ext uri="{BB962C8B-B14F-4D97-AF65-F5344CB8AC3E}">
-        <p14:creationId xmlns:p14="http://schemas.microsoft.com/office/powerpoint/2010/main" val="3365343362"/>
+        <p14:creationId xmlns:p14="http://schemas.microsoft.com/office/powerpoint/2010/main" val="1728326615"/>
       </p:ext>
     </p:extLst>
   </p:cSld>
@@ -8651,6 +10195,1495 @@
 </file>
 
 <file path=ppt/slides/slide4.xml><?xml version="1.0" encoding="utf-8"?>
+<p:sld xmlns:a="http://schemas.openxmlformats.org/drawingml/2006/main" xmlns:r="http://schemas.openxmlformats.org/officeDocument/2006/relationships" xmlns:p="http://schemas.openxmlformats.org/presentationml/2006/main">
+  <p:cSld>
+    <p:spTree>
+      <p:nvGrpSpPr>
+        <p:cNvPr id="1" name=""/>
+        <p:cNvGrpSpPr/>
+        <p:nvPr/>
+      </p:nvGrpSpPr>
+      <p:grpSpPr>
+        <a:xfrm>
+          <a:off x="0" y="0"/>
+          <a:ext cx="0" cy="0"/>
+          <a:chOff x="0" y="0"/>
+          <a:chExt cx="0" cy="0"/>
+        </a:xfrm>
+      </p:grpSpPr>
+      <p:sp>
+        <p:nvSpPr>
+          <p:cNvPr id="2" name="Title 1">
+            <a:extLst>
+              <a:ext uri="{FF2B5EF4-FFF2-40B4-BE49-F238E27FC236}">
+                <a16:creationId xmlns:a16="http://schemas.microsoft.com/office/drawing/2014/main" id="{A10EAD33-323D-42BD-8C20-8BB8D0E4C2A0}"/>
+              </a:ext>
+            </a:extLst>
+          </p:cNvPr>
+          <p:cNvSpPr>
+            <a:spLocks noGrp="1"/>
+          </p:cNvSpPr>
+          <p:nvPr>
+            <p:ph type="title"/>
+          </p:nvPr>
+        </p:nvSpPr>
+        <p:spPr>
+          <a:xfrm>
+            <a:off x="1484310" y="203200"/>
+            <a:ext cx="10018713" cy="1752599"/>
+          </a:xfrm>
+        </p:spPr>
+        <p:txBody>
+          <a:bodyPr/>
+          <a:lstStyle/>
+          <a:p>
+            <a:r>
+              <a:rPr lang="en-CA" dirty="0"/>
+              <a:t>Cahier de charges </a:t>
+            </a:r>
+            <a:r>
+              <a:rPr lang="en-CA" dirty="0" err="1"/>
+              <a:t>fonctionnelles</a:t>
+            </a:r>
+            <a:endParaRPr lang="en-CA" dirty="0"/>
+          </a:p>
+        </p:txBody>
+      </p:sp>
+      <p:graphicFrame>
+        <p:nvGraphicFramePr>
+          <p:cNvPr id="6" name="Content Placeholder 5">
+            <a:extLst>
+              <a:ext uri="{FF2B5EF4-FFF2-40B4-BE49-F238E27FC236}">
+                <a16:creationId xmlns:a16="http://schemas.microsoft.com/office/drawing/2014/main" id="{B2AF7778-00B4-4BCB-923D-9C03D8E27457}"/>
+              </a:ext>
+            </a:extLst>
+          </p:cNvPr>
+          <p:cNvGraphicFramePr>
+            <a:graphicFrameLocks noGrp="1"/>
+          </p:cNvGraphicFramePr>
+          <p:nvPr>
+            <p:ph idx="1"/>
+            <p:extLst>
+              <p:ext uri="{D42A27DB-BD31-4B8C-83A1-F6EECF244321}">
+                <p14:modId xmlns:p14="http://schemas.microsoft.com/office/powerpoint/2010/main" val="2084339889"/>
+              </p:ext>
+            </p:extLst>
+          </p:nvPr>
+        </p:nvGraphicFramePr>
+        <p:xfrm>
+          <a:off x="981075" y="2400300"/>
+          <a:ext cx="10229849" cy="2882898"/>
+        </p:xfrm>
+        <a:graphic>
+          <a:graphicData uri="http://schemas.openxmlformats.org/drawingml/2006/table">
+            <a:tbl>
+              <a:tblPr firstRow="1" firstCol="1" bandRow="1">
+                <a:tableStyleId>{5C22544A-7EE6-4342-B048-85BDC9FD1C3A}</a:tableStyleId>
+              </a:tblPr>
+              <a:tblGrid>
+                <a:gridCol w="963284">
+                  <a:extLst>
+                    <a:ext uri="{9D8B030D-6E8A-4147-A177-3AD203B41FA5}">
+                      <a16:colId xmlns:a16="http://schemas.microsoft.com/office/drawing/2014/main" val="606725077"/>
+                    </a:ext>
+                  </a:extLst>
+                </a:gridCol>
+                <a:gridCol w="3216784">
+                  <a:extLst>
+                    <a:ext uri="{9D8B030D-6E8A-4147-A177-3AD203B41FA5}">
+                      <a16:colId xmlns:a16="http://schemas.microsoft.com/office/drawing/2014/main" val="1053561630"/>
+                    </a:ext>
+                  </a:extLst>
+                </a:gridCol>
+                <a:gridCol w="2014044">
+                  <a:extLst>
+                    <a:ext uri="{9D8B030D-6E8A-4147-A177-3AD203B41FA5}">
+                      <a16:colId xmlns:a16="http://schemas.microsoft.com/office/drawing/2014/main" val="2742544724"/>
+                    </a:ext>
+                  </a:extLst>
+                </a:gridCol>
+                <a:gridCol w="1705704">
+                  <a:extLst>
+                    <a:ext uri="{9D8B030D-6E8A-4147-A177-3AD203B41FA5}">
+                      <a16:colId xmlns:a16="http://schemas.microsoft.com/office/drawing/2014/main" val="1760182338"/>
+                    </a:ext>
+                  </a:extLst>
+                </a:gridCol>
+                <a:gridCol w="1246475">
+                  <a:extLst>
+                    <a:ext uri="{9D8B030D-6E8A-4147-A177-3AD203B41FA5}">
+                      <a16:colId xmlns:a16="http://schemas.microsoft.com/office/drawing/2014/main" val="1592656044"/>
+                    </a:ext>
+                  </a:extLst>
+                </a:gridCol>
+                <a:gridCol w="1083558">
+                  <a:extLst>
+                    <a:ext uri="{9D8B030D-6E8A-4147-A177-3AD203B41FA5}">
+                      <a16:colId xmlns:a16="http://schemas.microsoft.com/office/drawing/2014/main" val="1067199798"/>
+                    </a:ext>
+                  </a:extLst>
+                </a:gridCol>
+              </a:tblGrid>
+              <a:tr h="401670">
+                <a:tc>
+                  <a:txBody>
+                    <a:bodyPr/>
+                    <a:lstStyle/>
+                    <a:p>
+                      <a:pPr>
+                        <a:lnSpc>
+                          <a:spcPct val="107000"/>
+                        </a:lnSpc>
+                        <a:spcAft>
+                          <a:spcPts val="0"/>
+                        </a:spcAft>
+                      </a:pPr>
+                      <a:r>
+                        <a:rPr lang="en-CA" sz="1000" dirty="0">
+                          <a:effectLst/>
+                        </a:rPr>
+                        <a:t>N˚ </a:t>
+                      </a:r>
+                      <a:r>
+                        <a:rPr lang="en-CA" sz="1000" dirty="0" err="1">
+                          <a:effectLst/>
+                        </a:rPr>
+                        <a:t>d’ordre</a:t>
+                      </a:r>
+                      <a:endParaRPr lang="en-CA" sz="1000" dirty="0">
+                        <a:effectLst/>
+                        <a:latin typeface="Calibri" panose="020F0502020204030204" pitchFamily="34" charset="0"/>
+                        <a:ea typeface="Calibri" panose="020F0502020204030204" pitchFamily="34" charset="0"/>
+                        <a:cs typeface="Times New Roman" panose="02020603050405020304" pitchFamily="18" charset="0"/>
+                      </a:endParaRPr>
+                    </a:p>
+                  </a:txBody>
+                  <a:tcPr marL="60523" marR="60523" marT="0" marB="0"/>
+                </a:tc>
+                <a:tc>
+                  <a:txBody>
+                    <a:bodyPr/>
+                    <a:lstStyle/>
+                    <a:p>
+                      <a:pPr>
+                        <a:lnSpc>
+                          <a:spcPct val="107000"/>
+                        </a:lnSpc>
+                        <a:spcAft>
+                          <a:spcPts val="0"/>
+                        </a:spcAft>
+                      </a:pPr>
+                      <a:r>
+                        <a:rPr lang="en-CA" sz="1000">
+                          <a:effectLst/>
+                        </a:rPr>
+                        <a:t>Désignation</a:t>
+                      </a:r>
+                      <a:endParaRPr lang="en-CA" sz="1000">
+                        <a:effectLst/>
+                        <a:latin typeface="Calibri" panose="020F0502020204030204" pitchFamily="34" charset="0"/>
+                        <a:ea typeface="Calibri" panose="020F0502020204030204" pitchFamily="34" charset="0"/>
+                        <a:cs typeface="Times New Roman" panose="02020603050405020304" pitchFamily="18" charset="0"/>
+                      </a:endParaRPr>
+                    </a:p>
+                  </a:txBody>
+                  <a:tcPr marL="60523" marR="60523" marT="0" marB="0"/>
+                </a:tc>
+                <a:tc>
+                  <a:txBody>
+                    <a:bodyPr/>
+                    <a:lstStyle/>
+                    <a:p>
+                      <a:pPr>
+                        <a:lnSpc>
+                          <a:spcPct val="107000"/>
+                        </a:lnSpc>
+                        <a:spcAft>
+                          <a:spcPts val="0"/>
+                        </a:spcAft>
+                      </a:pPr>
+                      <a:r>
+                        <a:rPr lang="en-CA" sz="1000">
+                          <a:effectLst/>
+                        </a:rPr>
+                        <a:t>Critère</a:t>
+                      </a:r>
+                      <a:endParaRPr lang="en-CA" sz="1000">
+                        <a:effectLst/>
+                        <a:latin typeface="Calibri" panose="020F0502020204030204" pitchFamily="34" charset="0"/>
+                        <a:ea typeface="Calibri" panose="020F0502020204030204" pitchFamily="34" charset="0"/>
+                        <a:cs typeface="Times New Roman" panose="02020603050405020304" pitchFamily="18" charset="0"/>
+                      </a:endParaRPr>
+                    </a:p>
+                  </a:txBody>
+                  <a:tcPr marL="60523" marR="60523" marT="0" marB="0"/>
+                </a:tc>
+                <a:tc>
+                  <a:txBody>
+                    <a:bodyPr/>
+                    <a:lstStyle/>
+                    <a:p>
+                      <a:pPr>
+                        <a:lnSpc>
+                          <a:spcPct val="107000"/>
+                        </a:lnSpc>
+                        <a:spcAft>
+                          <a:spcPts val="0"/>
+                        </a:spcAft>
+                      </a:pPr>
+                      <a:r>
+                        <a:rPr lang="en-CA" sz="1000">
+                          <a:effectLst/>
+                        </a:rPr>
+                        <a:t>Niveau</a:t>
+                      </a:r>
+                      <a:endParaRPr lang="en-CA" sz="1000">
+                        <a:effectLst/>
+                        <a:latin typeface="Calibri" panose="020F0502020204030204" pitchFamily="34" charset="0"/>
+                        <a:ea typeface="Calibri" panose="020F0502020204030204" pitchFamily="34" charset="0"/>
+                        <a:cs typeface="Times New Roman" panose="02020603050405020304" pitchFamily="18" charset="0"/>
+                      </a:endParaRPr>
+                    </a:p>
+                  </a:txBody>
+                  <a:tcPr marL="60523" marR="60523" marT="0" marB="0"/>
+                </a:tc>
+                <a:tc>
+                  <a:txBody>
+                    <a:bodyPr/>
+                    <a:lstStyle/>
+                    <a:p>
+                      <a:pPr>
+                        <a:lnSpc>
+                          <a:spcPct val="107000"/>
+                        </a:lnSpc>
+                        <a:spcAft>
+                          <a:spcPts val="0"/>
+                        </a:spcAft>
+                      </a:pPr>
+                      <a:r>
+                        <a:rPr lang="en-CA" sz="1000">
+                          <a:effectLst/>
+                        </a:rPr>
+                        <a:t>Flexibilité</a:t>
+                      </a:r>
+                      <a:endParaRPr lang="en-CA" sz="1000">
+                        <a:effectLst/>
+                        <a:latin typeface="Calibri" panose="020F0502020204030204" pitchFamily="34" charset="0"/>
+                        <a:ea typeface="Calibri" panose="020F0502020204030204" pitchFamily="34" charset="0"/>
+                        <a:cs typeface="Times New Roman" panose="02020603050405020304" pitchFamily="18" charset="0"/>
+                      </a:endParaRPr>
+                    </a:p>
+                  </a:txBody>
+                  <a:tcPr marL="60523" marR="60523" marT="0" marB="0"/>
+                </a:tc>
+                <a:tc>
+                  <a:txBody>
+                    <a:bodyPr/>
+                    <a:lstStyle/>
+                    <a:p>
+                      <a:pPr>
+                        <a:lnSpc>
+                          <a:spcPct val="107000"/>
+                        </a:lnSpc>
+                        <a:spcAft>
+                          <a:spcPts val="0"/>
+                        </a:spcAft>
+                      </a:pPr>
+                      <a:r>
+                        <a:rPr lang="en-CA" sz="1000" dirty="0" err="1">
+                          <a:effectLst/>
+                        </a:rPr>
+                        <a:t>Classe</a:t>
+                      </a:r>
+                      <a:endParaRPr lang="en-CA" sz="1000" dirty="0">
+                        <a:effectLst/>
+                        <a:latin typeface="Calibri" panose="020F0502020204030204" pitchFamily="34" charset="0"/>
+                        <a:ea typeface="Calibri" panose="020F0502020204030204" pitchFamily="34" charset="0"/>
+                        <a:cs typeface="Times New Roman" panose="02020603050405020304" pitchFamily="18" charset="0"/>
+                      </a:endParaRPr>
+                    </a:p>
+                  </a:txBody>
+                  <a:tcPr marL="60523" marR="60523" marT="0" marB="0"/>
+                </a:tc>
+                <a:extLst>
+                  <a:ext uri="{0D108BD9-81ED-4DB2-BD59-A6C34878D82A}">
+                    <a16:rowId xmlns:a16="http://schemas.microsoft.com/office/drawing/2014/main" val="1185755021"/>
+                  </a:ext>
+                </a:extLst>
+              </a:tr>
+              <a:tr h="436598">
+                <a:tc>
+                  <a:txBody>
+                    <a:bodyPr/>
+                    <a:lstStyle/>
+                    <a:p>
+                      <a:pPr>
+                        <a:lnSpc>
+                          <a:spcPct val="107000"/>
+                        </a:lnSpc>
+                        <a:spcAft>
+                          <a:spcPts val="0"/>
+                        </a:spcAft>
+                      </a:pPr>
+                      <a:r>
+                        <a:rPr lang="fr-CA" sz="1000" b="0" dirty="0">
+                          <a:solidFill>
+                            <a:schemeClr val="tx1"/>
+                          </a:solidFill>
+                          <a:effectLst/>
+                        </a:rPr>
+                        <a:t>Fsec4</a:t>
+                      </a:r>
+                      <a:endParaRPr lang="en-CA" sz="1000" b="0" dirty="0">
+                        <a:solidFill>
+                          <a:schemeClr val="tx1"/>
+                        </a:solidFill>
+                        <a:effectLst/>
+                        <a:latin typeface="Calibri" panose="020F0502020204030204" pitchFamily="34" charset="0"/>
+                        <a:ea typeface="Calibri" panose="020F0502020204030204" pitchFamily="34" charset="0"/>
+                        <a:cs typeface="Times New Roman" panose="02020603050405020304" pitchFamily="18" charset="0"/>
+                      </a:endParaRPr>
+                    </a:p>
+                  </a:txBody>
+                  <a:tcPr marL="55065" marR="55065" marT="0" marB="0">
+                    <a:solidFill>
+                      <a:schemeClr val="accent2">
+                        <a:lumMod val="20000"/>
+                        <a:lumOff val="80000"/>
+                      </a:schemeClr>
+                    </a:solidFill>
+                  </a:tcPr>
+                </a:tc>
+                <a:tc>
+                  <a:txBody>
+                    <a:bodyPr/>
+                    <a:lstStyle/>
+                    <a:p>
+                      <a:pPr>
+                        <a:lnSpc>
+                          <a:spcPct val="107000"/>
+                        </a:lnSpc>
+                        <a:spcAft>
+                          <a:spcPts val="0"/>
+                        </a:spcAft>
+                      </a:pPr>
+                      <a:r>
+                        <a:rPr lang="fr-CA" sz="1000">
+                          <a:effectLst/>
+                        </a:rPr>
+                        <a:t>Positionnement de la ruche par GPS</a:t>
+                      </a:r>
+                      <a:endParaRPr lang="en-CA" sz="1000">
+                        <a:effectLst/>
+                        <a:latin typeface="Calibri" panose="020F0502020204030204" pitchFamily="34" charset="0"/>
+                        <a:ea typeface="Calibri" panose="020F0502020204030204" pitchFamily="34" charset="0"/>
+                        <a:cs typeface="Times New Roman" panose="02020603050405020304" pitchFamily="18" charset="0"/>
+                      </a:endParaRPr>
+                    </a:p>
+                  </a:txBody>
+                  <a:tcPr marL="55065" marR="55065" marT="0" marB="0"/>
+                </a:tc>
+                <a:tc>
+                  <a:txBody>
+                    <a:bodyPr/>
+                    <a:lstStyle/>
+                    <a:p>
+                      <a:pPr>
+                        <a:lnSpc>
+                          <a:spcPct val="107000"/>
+                        </a:lnSpc>
+                        <a:spcAft>
+                          <a:spcPts val="0"/>
+                        </a:spcAft>
+                      </a:pPr>
+                      <a:r>
+                        <a:rPr lang="fr-CA" sz="1000">
+                          <a:effectLst/>
+                        </a:rPr>
+                        <a:t>Affichage de la position sur l’interface</a:t>
+                      </a:r>
+                      <a:endParaRPr lang="en-CA" sz="1000">
+                        <a:effectLst/>
+                        <a:latin typeface="Calibri" panose="020F0502020204030204" pitchFamily="34" charset="0"/>
+                        <a:ea typeface="Calibri" panose="020F0502020204030204" pitchFamily="34" charset="0"/>
+                        <a:cs typeface="Times New Roman" panose="02020603050405020304" pitchFamily="18" charset="0"/>
+                      </a:endParaRPr>
+                    </a:p>
+                  </a:txBody>
+                  <a:tcPr marL="55065" marR="55065" marT="0" marB="0"/>
+                </a:tc>
+                <a:tc>
+                  <a:txBody>
+                    <a:bodyPr/>
+                    <a:lstStyle/>
+                    <a:p>
+                      <a:pPr>
+                        <a:lnSpc>
+                          <a:spcPct val="107000"/>
+                        </a:lnSpc>
+                        <a:spcAft>
+                          <a:spcPts val="0"/>
+                        </a:spcAft>
+                      </a:pPr>
+                      <a:r>
+                        <a:rPr lang="fr-CA" sz="1000">
+                          <a:effectLst/>
+                        </a:rPr>
+                        <a:t>Positionnement en mètres</a:t>
+                      </a:r>
+                      <a:endParaRPr lang="en-CA" sz="1000">
+                        <a:effectLst/>
+                        <a:latin typeface="Calibri" panose="020F0502020204030204" pitchFamily="34" charset="0"/>
+                        <a:ea typeface="Calibri" panose="020F0502020204030204" pitchFamily="34" charset="0"/>
+                        <a:cs typeface="Times New Roman" panose="02020603050405020304" pitchFamily="18" charset="0"/>
+                      </a:endParaRPr>
+                    </a:p>
+                  </a:txBody>
+                  <a:tcPr marL="55065" marR="55065" marT="0" marB="0"/>
+                </a:tc>
+                <a:tc>
+                  <a:txBody>
+                    <a:bodyPr/>
+                    <a:lstStyle/>
+                    <a:p>
+                      <a:pPr>
+                        <a:lnSpc>
+                          <a:spcPct val="107000"/>
+                        </a:lnSpc>
+                        <a:spcAft>
+                          <a:spcPts val="0"/>
+                        </a:spcAft>
+                      </a:pPr>
+                      <a:r>
+                        <a:rPr lang="fr-CA" sz="1000">
+                          <a:effectLst/>
+                        </a:rPr>
+                        <a:t>± 5m</a:t>
+                      </a:r>
+                      <a:endParaRPr lang="en-CA" sz="1000">
+                        <a:effectLst/>
+                        <a:latin typeface="Calibri" panose="020F0502020204030204" pitchFamily="34" charset="0"/>
+                        <a:ea typeface="Calibri" panose="020F0502020204030204" pitchFamily="34" charset="0"/>
+                        <a:cs typeface="Times New Roman" panose="02020603050405020304" pitchFamily="18" charset="0"/>
+                      </a:endParaRPr>
+                    </a:p>
+                  </a:txBody>
+                  <a:tcPr marL="55065" marR="55065" marT="0" marB="0"/>
+                </a:tc>
+                <a:tc>
+                  <a:txBody>
+                    <a:bodyPr/>
+                    <a:lstStyle/>
+                    <a:p>
+                      <a:pPr>
+                        <a:lnSpc>
+                          <a:spcPct val="107000"/>
+                        </a:lnSpc>
+                        <a:spcAft>
+                          <a:spcPts val="0"/>
+                        </a:spcAft>
+                      </a:pPr>
+                      <a:r>
+                        <a:rPr lang="fr-CA" sz="1000" dirty="0">
+                          <a:effectLst/>
+                        </a:rPr>
+                        <a:t>F2</a:t>
+                      </a:r>
+                      <a:endParaRPr lang="en-CA" sz="1000" dirty="0">
+                        <a:effectLst/>
+                        <a:latin typeface="Calibri" panose="020F0502020204030204" pitchFamily="34" charset="0"/>
+                        <a:ea typeface="Calibri" panose="020F0502020204030204" pitchFamily="34" charset="0"/>
+                        <a:cs typeface="Times New Roman" panose="02020603050405020304" pitchFamily="18" charset="0"/>
+                      </a:endParaRPr>
+                    </a:p>
+                  </a:txBody>
+                  <a:tcPr marL="55065" marR="55065" marT="0" marB="0"/>
+                </a:tc>
+                <a:extLst>
+                  <a:ext uri="{0D108BD9-81ED-4DB2-BD59-A6C34878D82A}">
+                    <a16:rowId xmlns:a16="http://schemas.microsoft.com/office/drawing/2014/main" val="2314651234"/>
+                  </a:ext>
+                </a:extLst>
+              </a:tr>
+              <a:tr h="396029">
+                <a:tc>
+                  <a:txBody>
+                    <a:bodyPr/>
+                    <a:lstStyle/>
+                    <a:p>
+                      <a:pPr>
+                        <a:lnSpc>
+                          <a:spcPct val="107000"/>
+                        </a:lnSpc>
+                        <a:spcAft>
+                          <a:spcPts val="0"/>
+                        </a:spcAft>
+                      </a:pPr>
+                      <a:r>
+                        <a:rPr lang="fr-CA" sz="1000" b="0" dirty="0">
+                          <a:solidFill>
+                            <a:schemeClr val="tx1"/>
+                          </a:solidFill>
+                          <a:effectLst/>
+                        </a:rPr>
+                        <a:t>Fsec5</a:t>
+                      </a:r>
+                      <a:endParaRPr lang="en-CA" sz="1000" b="0" dirty="0">
+                        <a:solidFill>
+                          <a:schemeClr val="tx1"/>
+                        </a:solidFill>
+                        <a:effectLst/>
+                        <a:latin typeface="Calibri" panose="020F0502020204030204" pitchFamily="34" charset="0"/>
+                        <a:ea typeface="Calibri" panose="020F0502020204030204" pitchFamily="34" charset="0"/>
+                        <a:cs typeface="Times New Roman" panose="02020603050405020304" pitchFamily="18" charset="0"/>
+                      </a:endParaRPr>
+                    </a:p>
+                  </a:txBody>
+                  <a:tcPr marL="55065" marR="55065" marT="0" marB="0">
+                    <a:solidFill>
+                      <a:srgbClr val="FBEEE8"/>
+                    </a:solidFill>
+                  </a:tcPr>
+                </a:tc>
+                <a:tc>
+                  <a:txBody>
+                    <a:bodyPr/>
+                    <a:lstStyle/>
+                    <a:p>
+                      <a:pPr>
+                        <a:lnSpc>
+                          <a:spcPct val="107000"/>
+                        </a:lnSpc>
+                        <a:spcAft>
+                          <a:spcPts val="0"/>
+                        </a:spcAft>
+                      </a:pPr>
+                      <a:r>
+                        <a:rPr lang="fr-CA" sz="1000">
+                          <a:effectLst/>
+                        </a:rPr>
+                        <a:t>Lecture de l’humidité relative</a:t>
+                      </a:r>
+                      <a:endParaRPr lang="en-CA" sz="1000">
+                        <a:effectLst/>
+                        <a:latin typeface="Calibri" panose="020F0502020204030204" pitchFamily="34" charset="0"/>
+                        <a:ea typeface="Calibri" panose="020F0502020204030204" pitchFamily="34" charset="0"/>
+                        <a:cs typeface="Times New Roman" panose="02020603050405020304" pitchFamily="18" charset="0"/>
+                      </a:endParaRPr>
+                    </a:p>
+                  </a:txBody>
+                  <a:tcPr marL="55065" marR="55065" marT="0" marB="0"/>
+                </a:tc>
+                <a:tc>
+                  <a:txBody>
+                    <a:bodyPr/>
+                    <a:lstStyle/>
+                    <a:p>
+                      <a:pPr>
+                        <a:lnSpc>
+                          <a:spcPct val="107000"/>
+                        </a:lnSpc>
+                        <a:spcAft>
+                          <a:spcPts val="0"/>
+                        </a:spcAft>
+                      </a:pPr>
+                      <a:r>
+                        <a:rPr lang="fr-CA" sz="1000">
+                          <a:effectLst/>
+                        </a:rPr>
+                        <a:t>Affichage de l’humidité sur l’interface</a:t>
+                      </a:r>
+                      <a:endParaRPr lang="en-CA" sz="1000">
+                        <a:effectLst/>
+                        <a:latin typeface="Calibri" panose="020F0502020204030204" pitchFamily="34" charset="0"/>
+                        <a:ea typeface="Calibri" panose="020F0502020204030204" pitchFamily="34" charset="0"/>
+                        <a:cs typeface="Times New Roman" panose="02020603050405020304" pitchFamily="18" charset="0"/>
+                      </a:endParaRPr>
+                    </a:p>
+                  </a:txBody>
+                  <a:tcPr marL="55065" marR="55065" marT="0" marB="0"/>
+                </a:tc>
+                <a:tc>
+                  <a:txBody>
+                    <a:bodyPr/>
+                    <a:lstStyle/>
+                    <a:p>
+                      <a:pPr>
+                        <a:lnSpc>
+                          <a:spcPct val="107000"/>
+                        </a:lnSpc>
+                        <a:spcAft>
+                          <a:spcPts val="0"/>
+                        </a:spcAft>
+                      </a:pPr>
+                      <a:r>
+                        <a:rPr lang="fr-CA" sz="1000">
+                          <a:effectLst/>
+                        </a:rPr>
+                        <a:t>Humidité relative de 0% à 100%</a:t>
+                      </a:r>
+                      <a:endParaRPr lang="en-CA" sz="1000">
+                        <a:effectLst/>
+                        <a:latin typeface="Calibri" panose="020F0502020204030204" pitchFamily="34" charset="0"/>
+                        <a:ea typeface="Calibri" panose="020F0502020204030204" pitchFamily="34" charset="0"/>
+                        <a:cs typeface="Times New Roman" panose="02020603050405020304" pitchFamily="18" charset="0"/>
+                      </a:endParaRPr>
+                    </a:p>
+                  </a:txBody>
+                  <a:tcPr marL="55065" marR="55065" marT="0" marB="0"/>
+                </a:tc>
+                <a:tc>
+                  <a:txBody>
+                    <a:bodyPr/>
+                    <a:lstStyle/>
+                    <a:p>
+                      <a:pPr>
+                        <a:lnSpc>
+                          <a:spcPct val="107000"/>
+                        </a:lnSpc>
+                        <a:spcAft>
+                          <a:spcPts val="0"/>
+                        </a:spcAft>
+                      </a:pPr>
+                      <a:r>
+                        <a:rPr lang="fr-CA" sz="1000">
+                          <a:effectLst/>
+                        </a:rPr>
+                        <a:t>± 5%</a:t>
+                      </a:r>
+                      <a:endParaRPr lang="en-CA" sz="1000">
+                        <a:effectLst/>
+                        <a:latin typeface="Calibri" panose="020F0502020204030204" pitchFamily="34" charset="0"/>
+                        <a:ea typeface="Calibri" panose="020F0502020204030204" pitchFamily="34" charset="0"/>
+                        <a:cs typeface="Times New Roman" panose="02020603050405020304" pitchFamily="18" charset="0"/>
+                      </a:endParaRPr>
+                    </a:p>
+                  </a:txBody>
+                  <a:tcPr marL="55065" marR="55065" marT="0" marB="0"/>
+                </a:tc>
+                <a:tc>
+                  <a:txBody>
+                    <a:bodyPr/>
+                    <a:lstStyle/>
+                    <a:p>
+                      <a:pPr>
+                        <a:lnSpc>
+                          <a:spcPct val="107000"/>
+                        </a:lnSpc>
+                        <a:spcAft>
+                          <a:spcPts val="0"/>
+                        </a:spcAft>
+                      </a:pPr>
+                      <a:r>
+                        <a:rPr lang="fr-CA" sz="1000">
+                          <a:effectLst/>
+                        </a:rPr>
+                        <a:t>F2</a:t>
+                      </a:r>
+                      <a:endParaRPr lang="en-CA" sz="1000">
+                        <a:effectLst/>
+                        <a:latin typeface="Calibri" panose="020F0502020204030204" pitchFamily="34" charset="0"/>
+                        <a:ea typeface="Calibri" panose="020F0502020204030204" pitchFamily="34" charset="0"/>
+                        <a:cs typeface="Times New Roman" panose="02020603050405020304" pitchFamily="18" charset="0"/>
+                      </a:endParaRPr>
+                    </a:p>
+                  </a:txBody>
+                  <a:tcPr marL="55065" marR="55065" marT="0" marB="0"/>
+                </a:tc>
+                <a:extLst>
+                  <a:ext uri="{0D108BD9-81ED-4DB2-BD59-A6C34878D82A}">
+                    <a16:rowId xmlns:a16="http://schemas.microsoft.com/office/drawing/2014/main" val="1978883566"/>
+                  </a:ext>
+                </a:extLst>
+              </a:tr>
+              <a:tr h="432839">
+                <a:tc>
+                  <a:txBody>
+                    <a:bodyPr/>
+                    <a:lstStyle/>
+                    <a:p>
+                      <a:pPr>
+                        <a:lnSpc>
+                          <a:spcPct val="107000"/>
+                        </a:lnSpc>
+                        <a:spcAft>
+                          <a:spcPts val="0"/>
+                        </a:spcAft>
+                      </a:pPr>
+                      <a:r>
+                        <a:rPr lang="fr-CA" sz="1000" b="0" dirty="0">
+                          <a:solidFill>
+                            <a:schemeClr val="tx1"/>
+                          </a:solidFill>
+                          <a:effectLst/>
+                        </a:rPr>
+                        <a:t>Fsec6</a:t>
+                      </a:r>
+                      <a:endParaRPr lang="en-CA" sz="1000" b="0" dirty="0">
+                        <a:solidFill>
+                          <a:schemeClr val="tx1"/>
+                        </a:solidFill>
+                        <a:effectLst/>
+                        <a:latin typeface="Calibri" panose="020F0502020204030204" pitchFamily="34" charset="0"/>
+                        <a:ea typeface="Calibri" panose="020F0502020204030204" pitchFamily="34" charset="0"/>
+                        <a:cs typeface="Times New Roman" panose="02020603050405020304" pitchFamily="18" charset="0"/>
+                      </a:endParaRPr>
+                    </a:p>
+                  </a:txBody>
+                  <a:tcPr marL="55065" marR="55065" marT="0" marB="0">
+                    <a:solidFill>
+                      <a:schemeClr val="accent2">
+                        <a:lumMod val="20000"/>
+                        <a:lumOff val="80000"/>
+                      </a:schemeClr>
+                    </a:solidFill>
+                  </a:tcPr>
+                </a:tc>
+                <a:tc>
+                  <a:txBody>
+                    <a:bodyPr/>
+                    <a:lstStyle/>
+                    <a:p>
+                      <a:pPr>
+                        <a:lnSpc>
+                          <a:spcPct val="107000"/>
+                        </a:lnSpc>
+                        <a:spcAft>
+                          <a:spcPts val="0"/>
+                        </a:spcAft>
+                      </a:pPr>
+                      <a:r>
+                        <a:rPr lang="fr-CA" sz="1000" dirty="0">
+                          <a:effectLst/>
+                        </a:rPr>
+                        <a:t>Lecture de la vitesse du vent</a:t>
+                      </a:r>
+                      <a:endParaRPr lang="en-CA" sz="1000" dirty="0">
+                        <a:effectLst/>
+                        <a:latin typeface="Calibri" panose="020F0502020204030204" pitchFamily="34" charset="0"/>
+                        <a:ea typeface="Calibri" panose="020F0502020204030204" pitchFamily="34" charset="0"/>
+                        <a:cs typeface="Times New Roman" panose="02020603050405020304" pitchFamily="18" charset="0"/>
+                      </a:endParaRPr>
+                    </a:p>
+                  </a:txBody>
+                  <a:tcPr marL="55065" marR="55065" marT="0" marB="0"/>
+                </a:tc>
+                <a:tc>
+                  <a:txBody>
+                    <a:bodyPr/>
+                    <a:lstStyle/>
+                    <a:p>
+                      <a:pPr>
+                        <a:lnSpc>
+                          <a:spcPct val="107000"/>
+                        </a:lnSpc>
+                        <a:spcAft>
+                          <a:spcPts val="0"/>
+                        </a:spcAft>
+                      </a:pPr>
+                      <a:r>
+                        <a:rPr lang="fr-CA" sz="1000">
+                          <a:effectLst/>
+                        </a:rPr>
+                        <a:t>Affichage de la vitesse du vent sur l’interface</a:t>
+                      </a:r>
+                      <a:endParaRPr lang="en-CA" sz="1000">
+                        <a:effectLst/>
+                        <a:latin typeface="Calibri" panose="020F0502020204030204" pitchFamily="34" charset="0"/>
+                        <a:ea typeface="Calibri" panose="020F0502020204030204" pitchFamily="34" charset="0"/>
+                        <a:cs typeface="Times New Roman" panose="02020603050405020304" pitchFamily="18" charset="0"/>
+                      </a:endParaRPr>
+                    </a:p>
+                  </a:txBody>
+                  <a:tcPr marL="55065" marR="55065" marT="0" marB="0"/>
+                </a:tc>
+                <a:tc>
+                  <a:txBody>
+                    <a:bodyPr/>
+                    <a:lstStyle/>
+                    <a:p>
+                      <a:pPr>
+                        <a:lnSpc>
+                          <a:spcPct val="107000"/>
+                        </a:lnSpc>
+                        <a:spcAft>
+                          <a:spcPts val="0"/>
+                        </a:spcAft>
+                      </a:pPr>
+                      <a:r>
+                        <a:rPr lang="fr-CA" sz="1000">
+                          <a:effectLst/>
+                        </a:rPr>
+                        <a:t>Vitesse jusqu’à 45m/s</a:t>
+                      </a:r>
+                      <a:endParaRPr lang="en-CA" sz="1000">
+                        <a:effectLst/>
+                        <a:latin typeface="Calibri" panose="020F0502020204030204" pitchFamily="34" charset="0"/>
+                        <a:ea typeface="Calibri" panose="020F0502020204030204" pitchFamily="34" charset="0"/>
+                        <a:cs typeface="Times New Roman" panose="02020603050405020304" pitchFamily="18" charset="0"/>
+                      </a:endParaRPr>
+                    </a:p>
+                  </a:txBody>
+                  <a:tcPr marL="55065" marR="55065" marT="0" marB="0"/>
+                </a:tc>
+                <a:tc>
+                  <a:txBody>
+                    <a:bodyPr/>
+                    <a:lstStyle/>
+                    <a:p>
+                      <a:pPr>
+                        <a:lnSpc>
+                          <a:spcPct val="107000"/>
+                        </a:lnSpc>
+                        <a:spcAft>
+                          <a:spcPts val="0"/>
+                        </a:spcAft>
+                      </a:pPr>
+                      <a:r>
+                        <a:rPr lang="fr-CA" sz="1000">
+                          <a:effectLst/>
+                        </a:rPr>
+                        <a:t>± 5m/s</a:t>
+                      </a:r>
+                      <a:endParaRPr lang="en-CA" sz="1000">
+                        <a:effectLst/>
+                        <a:latin typeface="Calibri" panose="020F0502020204030204" pitchFamily="34" charset="0"/>
+                        <a:ea typeface="Calibri" panose="020F0502020204030204" pitchFamily="34" charset="0"/>
+                        <a:cs typeface="Times New Roman" panose="02020603050405020304" pitchFamily="18" charset="0"/>
+                      </a:endParaRPr>
+                    </a:p>
+                  </a:txBody>
+                  <a:tcPr marL="55065" marR="55065" marT="0" marB="0"/>
+                </a:tc>
+                <a:tc>
+                  <a:txBody>
+                    <a:bodyPr/>
+                    <a:lstStyle/>
+                    <a:p>
+                      <a:pPr>
+                        <a:lnSpc>
+                          <a:spcPct val="107000"/>
+                        </a:lnSpc>
+                        <a:spcAft>
+                          <a:spcPts val="0"/>
+                        </a:spcAft>
+                      </a:pPr>
+                      <a:r>
+                        <a:rPr lang="fr-CA" sz="1000">
+                          <a:effectLst/>
+                        </a:rPr>
+                        <a:t>F1</a:t>
+                      </a:r>
+                      <a:endParaRPr lang="en-CA" sz="1000">
+                        <a:effectLst/>
+                        <a:latin typeface="Calibri" panose="020F0502020204030204" pitchFamily="34" charset="0"/>
+                        <a:ea typeface="Calibri" panose="020F0502020204030204" pitchFamily="34" charset="0"/>
+                        <a:cs typeface="Times New Roman" panose="02020603050405020304" pitchFamily="18" charset="0"/>
+                      </a:endParaRPr>
+                    </a:p>
+                  </a:txBody>
+                  <a:tcPr marL="55065" marR="55065" marT="0" marB="0"/>
+                </a:tc>
+                <a:extLst>
+                  <a:ext uri="{0D108BD9-81ED-4DB2-BD59-A6C34878D82A}">
+                    <a16:rowId xmlns:a16="http://schemas.microsoft.com/office/drawing/2014/main" val="3912739499"/>
+                  </a:ext>
+                </a:extLst>
+              </a:tr>
+              <a:tr h="418063">
+                <a:tc>
+                  <a:txBody>
+                    <a:bodyPr/>
+                    <a:lstStyle/>
+                    <a:p>
+                      <a:pPr>
+                        <a:lnSpc>
+                          <a:spcPct val="107000"/>
+                        </a:lnSpc>
+                        <a:spcAft>
+                          <a:spcPts val="0"/>
+                        </a:spcAft>
+                      </a:pPr>
+                      <a:r>
+                        <a:rPr lang="fr-CA" sz="1000" b="0" dirty="0">
+                          <a:solidFill>
+                            <a:schemeClr val="tx1"/>
+                          </a:solidFill>
+                          <a:effectLst/>
+                        </a:rPr>
+                        <a:t>Fsec7</a:t>
+                      </a:r>
+                      <a:endParaRPr lang="en-CA" sz="1000" b="0" dirty="0">
+                        <a:solidFill>
+                          <a:schemeClr val="tx1"/>
+                        </a:solidFill>
+                        <a:effectLst/>
+                        <a:latin typeface="Calibri" panose="020F0502020204030204" pitchFamily="34" charset="0"/>
+                        <a:ea typeface="Calibri" panose="020F0502020204030204" pitchFamily="34" charset="0"/>
+                        <a:cs typeface="Times New Roman" panose="02020603050405020304" pitchFamily="18" charset="0"/>
+                      </a:endParaRPr>
+                    </a:p>
+                  </a:txBody>
+                  <a:tcPr marL="55065" marR="55065" marT="0" marB="0">
+                    <a:solidFill>
+                      <a:srgbClr val="FBEEE8"/>
+                    </a:solidFill>
+                  </a:tcPr>
+                </a:tc>
+                <a:tc>
+                  <a:txBody>
+                    <a:bodyPr/>
+                    <a:lstStyle/>
+                    <a:p>
+                      <a:pPr>
+                        <a:lnSpc>
+                          <a:spcPct val="107000"/>
+                        </a:lnSpc>
+                        <a:spcAft>
+                          <a:spcPts val="0"/>
+                        </a:spcAft>
+                      </a:pPr>
+                      <a:r>
+                        <a:rPr lang="fr-CA" sz="1000" dirty="0">
+                          <a:effectLst/>
+                        </a:rPr>
+                        <a:t>Détection de mouvement à proximité de la ruche</a:t>
+                      </a:r>
+                      <a:endParaRPr lang="en-CA" sz="1000" dirty="0">
+                        <a:effectLst/>
+                        <a:latin typeface="Calibri" panose="020F0502020204030204" pitchFamily="34" charset="0"/>
+                        <a:ea typeface="Calibri" panose="020F0502020204030204" pitchFamily="34" charset="0"/>
+                        <a:cs typeface="Times New Roman" panose="02020603050405020304" pitchFamily="18" charset="0"/>
+                      </a:endParaRPr>
+                    </a:p>
+                  </a:txBody>
+                  <a:tcPr marL="55065" marR="55065" marT="0" marB="0"/>
+                </a:tc>
+                <a:tc>
+                  <a:txBody>
+                    <a:bodyPr/>
+                    <a:lstStyle/>
+                    <a:p>
+                      <a:pPr>
+                        <a:lnSpc>
+                          <a:spcPct val="107000"/>
+                        </a:lnSpc>
+                        <a:spcAft>
+                          <a:spcPts val="0"/>
+                        </a:spcAft>
+                      </a:pPr>
+                      <a:r>
+                        <a:rPr lang="fr-CA" sz="1000">
+                          <a:effectLst/>
+                        </a:rPr>
+                        <a:t>Affichage des mouvements détectés sur l’interface</a:t>
+                      </a:r>
+                      <a:endParaRPr lang="en-CA" sz="1000">
+                        <a:effectLst/>
+                        <a:latin typeface="Calibri" panose="020F0502020204030204" pitchFamily="34" charset="0"/>
+                        <a:ea typeface="Calibri" panose="020F0502020204030204" pitchFamily="34" charset="0"/>
+                        <a:cs typeface="Times New Roman" panose="02020603050405020304" pitchFamily="18" charset="0"/>
+                      </a:endParaRPr>
+                    </a:p>
+                  </a:txBody>
+                  <a:tcPr marL="55065" marR="55065" marT="0" marB="0"/>
+                </a:tc>
+                <a:tc>
+                  <a:txBody>
+                    <a:bodyPr/>
+                    <a:lstStyle/>
+                    <a:p>
+                      <a:pPr>
+                        <a:lnSpc>
+                          <a:spcPct val="107000"/>
+                        </a:lnSpc>
+                        <a:spcAft>
+                          <a:spcPts val="0"/>
+                        </a:spcAft>
+                      </a:pPr>
+                      <a:r>
+                        <a:rPr lang="fr-CA" sz="1000">
+                          <a:effectLst/>
+                        </a:rPr>
+                        <a:t>Mouvements détectés</a:t>
+                      </a:r>
+                      <a:endParaRPr lang="en-CA" sz="1000">
+                        <a:effectLst/>
+                        <a:latin typeface="Calibri" panose="020F0502020204030204" pitchFamily="34" charset="0"/>
+                        <a:ea typeface="Calibri" panose="020F0502020204030204" pitchFamily="34" charset="0"/>
+                        <a:cs typeface="Times New Roman" panose="02020603050405020304" pitchFamily="18" charset="0"/>
+                      </a:endParaRPr>
+                    </a:p>
+                  </a:txBody>
+                  <a:tcPr marL="55065" marR="55065" marT="0" marB="0"/>
+                </a:tc>
+                <a:tc>
+                  <a:txBody>
+                    <a:bodyPr/>
+                    <a:lstStyle/>
+                    <a:p>
+                      <a:pPr>
+                        <a:lnSpc>
+                          <a:spcPct val="107000"/>
+                        </a:lnSpc>
+                        <a:spcAft>
+                          <a:spcPts val="0"/>
+                        </a:spcAft>
+                      </a:pPr>
+                      <a:r>
+                        <a:rPr lang="fr-CA" sz="1000">
+                          <a:effectLst/>
+                        </a:rPr>
+                        <a:t>-</a:t>
+                      </a:r>
+                      <a:endParaRPr lang="en-CA" sz="1000">
+                        <a:effectLst/>
+                        <a:latin typeface="Calibri" panose="020F0502020204030204" pitchFamily="34" charset="0"/>
+                        <a:ea typeface="Calibri" panose="020F0502020204030204" pitchFamily="34" charset="0"/>
+                        <a:cs typeface="Times New Roman" panose="02020603050405020304" pitchFamily="18" charset="0"/>
+                      </a:endParaRPr>
+                    </a:p>
+                  </a:txBody>
+                  <a:tcPr marL="55065" marR="55065" marT="0" marB="0"/>
+                </a:tc>
+                <a:tc>
+                  <a:txBody>
+                    <a:bodyPr/>
+                    <a:lstStyle/>
+                    <a:p>
+                      <a:pPr>
+                        <a:lnSpc>
+                          <a:spcPct val="107000"/>
+                        </a:lnSpc>
+                        <a:spcAft>
+                          <a:spcPts val="0"/>
+                        </a:spcAft>
+                      </a:pPr>
+                      <a:r>
+                        <a:rPr lang="fr-CA" sz="1000">
+                          <a:effectLst/>
+                        </a:rPr>
+                        <a:t>F2</a:t>
+                      </a:r>
+                      <a:endParaRPr lang="en-CA" sz="1000">
+                        <a:effectLst/>
+                        <a:latin typeface="Calibri" panose="020F0502020204030204" pitchFamily="34" charset="0"/>
+                        <a:ea typeface="Calibri" panose="020F0502020204030204" pitchFamily="34" charset="0"/>
+                        <a:cs typeface="Times New Roman" panose="02020603050405020304" pitchFamily="18" charset="0"/>
+                      </a:endParaRPr>
+                    </a:p>
+                  </a:txBody>
+                  <a:tcPr marL="55065" marR="55065" marT="0" marB="0"/>
+                </a:tc>
+                <a:extLst>
+                  <a:ext uri="{0D108BD9-81ED-4DB2-BD59-A6C34878D82A}">
+                    <a16:rowId xmlns:a16="http://schemas.microsoft.com/office/drawing/2014/main" val="2901990250"/>
+                  </a:ext>
+                </a:extLst>
+              </a:tr>
+              <a:tr h="386893">
+                <a:tc>
+                  <a:txBody>
+                    <a:bodyPr/>
+                    <a:lstStyle/>
+                    <a:p>
+                      <a:pPr>
+                        <a:lnSpc>
+                          <a:spcPct val="107000"/>
+                        </a:lnSpc>
+                        <a:spcAft>
+                          <a:spcPts val="0"/>
+                        </a:spcAft>
+                      </a:pPr>
+                      <a:r>
+                        <a:rPr lang="fr-CA" sz="1000" b="0" dirty="0">
+                          <a:solidFill>
+                            <a:schemeClr val="tx1"/>
+                          </a:solidFill>
+                          <a:effectLst/>
+                        </a:rPr>
+                        <a:t>Fsec8</a:t>
+                      </a:r>
+                      <a:endParaRPr lang="en-CA" sz="1000" b="0" dirty="0">
+                        <a:solidFill>
+                          <a:schemeClr val="tx1"/>
+                        </a:solidFill>
+                        <a:effectLst/>
+                        <a:latin typeface="Calibri" panose="020F0502020204030204" pitchFamily="34" charset="0"/>
+                        <a:ea typeface="Calibri" panose="020F0502020204030204" pitchFamily="34" charset="0"/>
+                        <a:cs typeface="Times New Roman" panose="02020603050405020304" pitchFamily="18" charset="0"/>
+                      </a:endParaRPr>
+                    </a:p>
+                  </a:txBody>
+                  <a:tcPr marL="55065" marR="55065" marT="0" marB="0">
+                    <a:solidFill>
+                      <a:schemeClr val="accent2">
+                        <a:lumMod val="20000"/>
+                        <a:lumOff val="80000"/>
+                      </a:schemeClr>
+                    </a:solidFill>
+                  </a:tcPr>
+                </a:tc>
+                <a:tc>
+                  <a:txBody>
+                    <a:bodyPr/>
+                    <a:lstStyle/>
+                    <a:p>
+                      <a:pPr>
+                        <a:lnSpc>
+                          <a:spcPct val="107000"/>
+                        </a:lnSpc>
+                        <a:spcAft>
+                          <a:spcPts val="0"/>
+                        </a:spcAft>
+                      </a:pPr>
+                      <a:r>
+                        <a:rPr lang="fr-CA" sz="1000" dirty="0">
+                          <a:effectLst/>
+                        </a:rPr>
+                        <a:t>Détection de sons à proximité de la ruche</a:t>
+                      </a:r>
+                      <a:endParaRPr lang="en-CA" sz="1000" dirty="0">
+                        <a:effectLst/>
+                        <a:latin typeface="Calibri" panose="020F0502020204030204" pitchFamily="34" charset="0"/>
+                        <a:ea typeface="Calibri" panose="020F0502020204030204" pitchFamily="34" charset="0"/>
+                        <a:cs typeface="Times New Roman" panose="02020603050405020304" pitchFamily="18" charset="0"/>
+                      </a:endParaRPr>
+                    </a:p>
+                  </a:txBody>
+                  <a:tcPr marL="55065" marR="55065" marT="0" marB="0"/>
+                </a:tc>
+                <a:tc>
+                  <a:txBody>
+                    <a:bodyPr/>
+                    <a:lstStyle/>
+                    <a:p>
+                      <a:pPr>
+                        <a:lnSpc>
+                          <a:spcPct val="107000"/>
+                        </a:lnSpc>
+                        <a:spcAft>
+                          <a:spcPts val="0"/>
+                        </a:spcAft>
+                      </a:pPr>
+                      <a:r>
+                        <a:rPr lang="fr-CA" sz="1000" dirty="0">
+                          <a:effectLst/>
+                        </a:rPr>
+                        <a:t>Affichage des sons détectés sur l’interface</a:t>
+                      </a:r>
+                      <a:endParaRPr lang="en-CA" sz="1000" dirty="0">
+                        <a:effectLst/>
+                        <a:latin typeface="Calibri" panose="020F0502020204030204" pitchFamily="34" charset="0"/>
+                        <a:ea typeface="Calibri" panose="020F0502020204030204" pitchFamily="34" charset="0"/>
+                        <a:cs typeface="Times New Roman" panose="02020603050405020304" pitchFamily="18" charset="0"/>
+                      </a:endParaRPr>
+                    </a:p>
+                  </a:txBody>
+                  <a:tcPr marL="55065" marR="55065" marT="0" marB="0"/>
+                </a:tc>
+                <a:tc>
+                  <a:txBody>
+                    <a:bodyPr/>
+                    <a:lstStyle/>
+                    <a:p>
+                      <a:pPr>
+                        <a:lnSpc>
+                          <a:spcPct val="107000"/>
+                        </a:lnSpc>
+                        <a:spcAft>
+                          <a:spcPts val="0"/>
+                        </a:spcAft>
+                      </a:pPr>
+                      <a:r>
+                        <a:rPr lang="fr-CA" sz="1000" dirty="0">
+                          <a:effectLst/>
+                        </a:rPr>
+                        <a:t>Sons détectés</a:t>
+                      </a:r>
+                      <a:endParaRPr lang="en-CA" sz="1000" dirty="0">
+                        <a:effectLst/>
+                        <a:latin typeface="Calibri" panose="020F0502020204030204" pitchFamily="34" charset="0"/>
+                        <a:ea typeface="Calibri" panose="020F0502020204030204" pitchFamily="34" charset="0"/>
+                        <a:cs typeface="Times New Roman" panose="02020603050405020304" pitchFamily="18" charset="0"/>
+                      </a:endParaRPr>
+                    </a:p>
+                  </a:txBody>
+                  <a:tcPr marL="55065" marR="55065" marT="0" marB="0"/>
+                </a:tc>
+                <a:tc>
+                  <a:txBody>
+                    <a:bodyPr/>
+                    <a:lstStyle/>
+                    <a:p>
+                      <a:pPr>
+                        <a:lnSpc>
+                          <a:spcPct val="107000"/>
+                        </a:lnSpc>
+                        <a:spcAft>
+                          <a:spcPts val="0"/>
+                        </a:spcAft>
+                      </a:pPr>
+                      <a:r>
+                        <a:rPr lang="fr-CA" sz="1000" dirty="0">
+                          <a:effectLst/>
+                        </a:rPr>
+                        <a:t>-</a:t>
+                      </a:r>
+                      <a:endParaRPr lang="en-CA" sz="1000" dirty="0">
+                        <a:effectLst/>
+                        <a:latin typeface="Calibri" panose="020F0502020204030204" pitchFamily="34" charset="0"/>
+                        <a:ea typeface="Calibri" panose="020F0502020204030204" pitchFamily="34" charset="0"/>
+                        <a:cs typeface="Times New Roman" panose="02020603050405020304" pitchFamily="18" charset="0"/>
+                      </a:endParaRPr>
+                    </a:p>
+                  </a:txBody>
+                  <a:tcPr marL="55065" marR="55065" marT="0" marB="0"/>
+                </a:tc>
+                <a:tc>
+                  <a:txBody>
+                    <a:bodyPr/>
+                    <a:lstStyle/>
+                    <a:p>
+                      <a:pPr>
+                        <a:lnSpc>
+                          <a:spcPct val="107000"/>
+                        </a:lnSpc>
+                        <a:spcAft>
+                          <a:spcPts val="0"/>
+                        </a:spcAft>
+                      </a:pPr>
+                      <a:r>
+                        <a:rPr lang="fr-CA" sz="1000">
+                          <a:effectLst/>
+                        </a:rPr>
+                        <a:t>F2</a:t>
+                      </a:r>
+                      <a:endParaRPr lang="en-CA" sz="1000">
+                        <a:effectLst/>
+                        <a:latin typeface="Calibri" panose="020F0502020204030204" pitchFamily="34" charset="0"/>
+                        <a:ea typeface="Calibri" panose="020F0502020204030204" pitchFamily="34" charset="0"/>
+                        <a:cs typeface="Times New Roman" panose="02020603050405020304" pitchFamily="18" charset="0"/>
+                      </a:endParaRPr>
+                    </a:p>
+                  </a:txBody>
+                  <a:tcPr marL="55065" marR="55065" marT="0" marB="0"/>
+                </a:tc>
+                <a:extLst>
+                  <a:ext uri="{0D108BD9-81ED-4DB2-BD59-A6C34878D82A}">
+                    <a16:rowId xmlns:a16="http://schemas.microsoft.com/office/drawing/2014/main" val="883334356"/>
+                  </a:ext>
+                </a:extLst>
+              </a:tr>
+              <a:tr h="410806">
+                <a:tc>
+                  <a:txBody>
+                    <a:bodyPr/>
+                    <a:lstStyle/>
+                    <a:p>
+                      <a:pPr>
+                        <a:lnSpc>
+                          <a:spcPct val="107000"/>
+                        </a:lnSpc>
+                        <a:spcAft>
+                          <a:spcPts val="0"/>
+                        </a:spcAft>
+                      </a:pPr>
+                      <a:r>
+                        <a:rPr lang="fr-CA" sz="1000" b="0" dirty="0">
+                          <a:solidFill>
+                            <a:schemeClr val="tx1"/>
+                          </a:solidFill>
+                          <a:effectLst/>
+                        </a:rPr>
+                        <a:t>Fsec9</a:t>
+                      </a:r>
+                      <a:endParaRPr lang="en-CA" sz="1000" b="0" dirty="0">
+                        <a:solidFill>
+                          <a:schemeClr val="tx1"/>
+                        </a:solidFill>
+                        <a:effectLst/>
+                        <a:latin typeface="Calibri" panose="020F0502020204030204" pitchFamily="34" charset="0"/>
+                        <a:ea typeface="Calibri" panose="020F0502020204030204" pitchFamily="34" charset="0"/>
+                        <a:cs typeface="Times New Roman" panose="02020603050405020304" pitchFamily="18" charset="0"/>
+                      </a:endParaRPr>
+                    </a:p>
+                  </a:txBody>
+                  <a:tcPr marL="55065" marR="55065" marT="0" marB="0">
+                    <a:solidFill>
+                      <a:srgbClr val="FBEEE8"/>
+                    </a:solidFill>
+                  </a:tcPr>
+                </a:tc>
+                <a:tc>
+                  <a:txBody>
+                    <a:bodyPr/>
+                    <a:lstStyle/>
+                    <a:p>
+                      <a:pPr>
+                        <a:lnSpc>
+                          <a:spcPct val="107000"/>
+                        </a:lnSpc>
+                        <a:spcAft>
+                          <a:spcPts val="0"/>
+                        </a:spcAft>
+                      </a:pPr>
+                      <a:r>
+                        <a:rPr lang="fr-CA" sz="1000" dirty="0">
+                          <a:effectLst/>
+                        </a:rPr>
+                        <a:t>Analyse de certains composés volatiles, tel que la fumée</a:t>
+                      </a:r>
+                      <a:endParaRPr lang="en-CA" sz="1000" dirty="0">
+                        <a:effectLst/>
+                        <a:latin typeface="Calibri" panose="020F0502020204030204" pitchFamily="34" charset="0"/>
+                        <a:ea typeface="Calibri" panose="020F0502020204030204" pitchFamily="34" charset="0"/>
+                        <a:cs typeface="Times New Roman" panose="02020603050405020304" pitchFamily="18" charset="0"/>
+                      </a:endParaRPr>
+                    </a:p>
+                  </a:txBody>
+                  <a:tcPr marL="55065" marR="55065" marT="0" marB="0"/>
+                </a:tc>
+                <a:tc>
+                  <a:txBody>
+                    <a:bodyPr/>
+                    <a:lstStyle/>
+                    <a:p>
+                      <a:pPr>
+                        <a:lnSpc>
+                          <a:spcPct val="107000"/>
+                        </a:lnSpc>
+                        <a:spcAft>
+                          <a:spcPts val="0"/>
+                        </a:spcAft>
+                      </a:pPr>
+                      <a:r>
+                        <a:rPr lang="fr-CA" sz="1000" dirty="0">
+                          <a:effectLst/>
+                        </a:rPr>
+                        <a:t>Affichage de la qualité d’air sur l’interface</a:t>
+                      </a:r>
+                      <a:endParaRPr lang="en-CA" sz="1000" dirty="0">
+                        <a:effectLst/>
+                        <a:latin typeface="Calibri" panose="020F0502020204030204" pitchFamily="34" charset="0"/>
+                        <a:ea typeface="Calibri" panose="020F0502020204030204" pitchFamily="34" charset="0"/>
+                        <a:cs typeface="Times New Roman" panose="02020603050405020304" pitchFamily="18" charset="0"/>
+                      </a:endParaRPr>
+                    </a:p>
+                  </a:txBody>
+                  <a:tcPr marL="55065" marR="55065" marT="0" marB="0"/>
+                </a:tc>
+                <a:tc>
+                  <a:txBody>
+                    <a:bodyPr/>
+                    <a:lstStyle/>
+                    <a:p>
+                      <a:pPr>
+                        <a:lnSpc>
+                          <a:spcPct val="107000"/>
+                        </a:lnSpc>
+                        <a:spcAft>
+                          <a:spcPts val="0"/>
+                        </a:spcAft>
+                      </a:pPr>
+                      <a:r>
+                        <a:rPr lang="fr-CA" sz="1000">
+                          <a:effectLst/>
+                        </a:rPr>
+                        <a:t>Qualité de l’air en % de composés</a:t>
+                      </a:r>
+                      <a:endParaRPr lang="en-CA" sz="1000">
+                        <a:effectLst/>
+                        <a:latin typeface="Calibri" panose="020F0502020204030204" pitchFamily="34" charset="0"/>
+                        <a:ea typeface="Calibri" panose="020F0502020204030204" pitchFamily="34" charset="0"/>
+                        <a:cs typeface="Times New Roman" panose="02020603050405020304" pitchFamily="18" charset="0"/>
+                      </a:endParaRPr>
+                    </a:p>
+                  </a:txBody>
+                  <a:tcPr marL="55065" marR="55065" marT="0" marB="0"/>
+                </a:tc>
+                <a:tc>
+                  <a:txBody>
+                    <a:bodyPr/>
+                    <a:lstStyle/>
+                    <a:p>
+                      <a:pPr>
+                        <a:lnSpc>
+                          <a:spcPct val="107000"/>
+                        </a:lnSpc>
+                        <a:spcAft>
+                          <a:spcPts val="0"/>
+                        </a:spcAft>
+                      </a:pPr>
+                      <a:r>
+                        <a:rPr lang="fr-CA" sz="1000" dirty="0">
+                          <a:effectLst/>
+                        </a:rPr>
+                        <a:t>± 1%</a:t>
+                      </a:r>
+                      <a:endParaRPr lang="en-CA" sz="1000" dirty="0">
+                        <a:effectLst/>
+                        <a:latin typeface="Calibri" panose="020F0502020204030204" pitchFamily="34" charset="0"/>
+                        <a:ea typeface="Calibri" panose="020F0502020204030204" pitchFamily="34" charset="0"/>
+                        <a:cs typeface="Times New Roman" panose="02020603050405020304" pitchFamily="18" charset="0"/>
+                      </a:endParaRPr>
+                    </a:p>
+                  </a:txBody>
+                  <a:tcPr marL="55065" marR="55065" marT="0" marB="0"/>
+                </a:tc>
+                <a:tc>
+                  <a:txBody>
+                    <a:bodyPr/>
+                    <a:lstStyle/>
+                    <a:p>
+                      <a:pPr>
+                        <a:lnSpc>
+                          <a:spcPct val="107000"/>
+                        </a:lnSpc>
+                        <a:spcAft>
+                          <a:spcPts val="0"/>
+                        </a:spcAft>
+                      </a:pPr>
+                      <a:r>
+                        <a:rPr lang="fr-CA" sz="1000" dirty="0">
+                          <a:effectLst/>
+                        </a:rPr>
+                        <a:t>F1</a:t>
+                      </a:r>
+                      <a:endParaRPr lang="en-CA" sz="1000" dirty="0">
+                        <a:effectLst/>
+                        <a:latin typeface="Calibri" panose="020F0502020204030204" pitchFamily="34" charset="0"/>
+                        <a:ea typeface="Calibri" panose="020F0502020204030204" pitchFamily="34" charset="0"/>
+                        <a:cs typeface="Times New Roman" panose="02020603050405020304" pitchFamily="18" charset="0"/>
+                      </a:endParaRPr>
+                    </a:p>
+                  </a:txBody>
+                  <a:tcPr marL="55065" marR="55065" marT="0" marB="0"/>
+                </a:tc>
+                <a:extLst>
+                  <a:ext uri="{0D108BD9-81ED-4DB2-BD59-A6C34878D82A}">
+                    <a16:rowId xmlns:a16="http://schemas.microsoft.com/office/drawing/2014/main" val="1838949927"/>
+                  </a:ext>
+                </a:extLst>
+              </a:tr>
+            </a:tbl>
+          </a:graphicData>
+        </a:graphic>
+      </p:graphicFrame>
+    </p:spTree>
+    <p:extLst>
+      <p:ext uri="{BB962C8B-B14F-4D97-AF65-F5344CB8AC3E}">
+        <p14:creationId xmlns:p14="http://schemas.microsoft.com/office/powerpoint/2010/main" val="1658105963"/>
+      </p:ext>
+    </p:extLst>
+  </p:cSld>
+  <p:clrMapOvr>
+    <a:masterClrMapping/>
+  </p:clrMapOvr>
+</p:sld>
+</file>
+
+<file path=ppt/slides/slide5.xml><?xml version="1.0" encoding="utf-8"?>
 <p:sld xmlns:a="http://schemas.openxmlformats.org/drawingml/2006/main" xmlns:r="http://schemas.openxmlformats.org/officeDocument/2006/relationships" xmlns:p="http://schemas.openxmlformats.org/presentationml/2006/main">
   <p:cSld>
     <p:spTree>
@@ -8754,7 +11787,7 @@
 </p:sld>
 </file>
 
-<file path=ppt/slides/slide5.xml><?xml version="1.0" encoding="utf-8"?>
+<file path=ppt/slides/slide6.xml><?xml version="1.0" encoding="utf-8"?>
 <p:sld xmlns:a="http://schemas.openxmlformats.org/drawingml/2006/main" xmlns:r="http://schemas.openxmlformats.org/officeDocument/2006/relationships" xmlns:p="http://schemas.openxmlformats.org/presentationml/2006/main">
   <p:cSld>
     <p:spTree>
@@ -8858,7 +11891,7 @@
 </p:sld>
 </file>
 
-<file path=ppt/slides/slide6.xml><?xml version="1.0" encoding="utf-8"?>
+<file path=ppt/slides/slide7.xml><?xml version="1.0" encoding="utf-8"?>
 <p:sld xmlns:a="http://schemas.openxmlformats.org/drawingml/2006/main" xmlns:r="http://schemas.openxmlformats.org/officeDocument/2006/relationships" xmlns:p="http://schemas.openxmlformats.org/presentationml/2006/main">
   <p:cSld>
     <p:spTree>
@@ -9083,7 +12116,7 @@
 </p:sld>
 </file>
 
-<file path=ppt/slides/slide7.xml><?xml version="1.0" encoding="utf-8"?>
+<file path=ppt/slides/slide8.xml><?xml version="1.0" encoding="utf-8"?>
 <p:sld xmlns:a="http://schemas.openxmlformats.org/drawingml/2006/main" xmlns:r="http://schemas.openxmlformats.org/officeDocument/2006/relationships" xmlns:p="http://schemas.openxmlformats.org/presentationml/2006/main">
   <p:cSld>
     <p:spTree>
@@ -9515,151 +12548,6 @@
 </p:sld>
 </file>
 
-<file path=ppt/slides/slide8.xml><?xml version="1.0" encoding="utf-8"?>
-<p:sld xmlns:a="http://schemas.openxmlformats.org/drawingml/2006/main" xmlns:r="http://schemas.openxmlformats.org/officeDocument/2006/relationships" xmlns:p="http://schemas.openxmlformats.org/presentationml/2006/main">
-  <p:cSld>
-    <p:spTree>
-      <p:nvGrpSpPr>
-        <p:cNvPr id="1" name=""/>
-        <p:cNvGrpSpPr/>
-        <p:nvPr/>
-      </p:nvGrpSpPr>
-      <p:grpSpPr>
-        <a:xfrm>
-          <a:off x="0" y="0"/>
-          <a:ext cx="0" cy="0"/>
-          <a:chOff x="0" y="0"/>
-          <a:chExt cx="0" cy="0"/>
-        </a:xfrm>
-      </p:grpSpPr>
-      <p:sp>
-        <p:nvSpPr>
-          <p:cNvPr id="2" name="Title 1">
-            <a:extLst>
-              <a:ext uri="{FF2B5EF4-FFF2-40B4-BE49-F238E27FC236}">
-                <a16:creationId xmlns:a16="http://schemas.microsoft.com/office/drawing/2014/main" id="{57AE6C2F-E93C-4A13-BFBF-2291D335938B}"/>
-              </a:ext>
-            </a:extLst>
-          </p:cNvPr>
-          <p:cNvSpPr>
-            <a:spLocks noGrp="1"/>
-          </p:cNvSpPr>
-          <p:nvPr>
-            <p:ph type="title"/>
-          </p:nvPr>
-        </p:nvSpPr>
-        <p:spPr>
-          <a:xfrm>
-            <a:off x="1484309" y="0"/>
-            <a:ext cx="10018713" cy="1752599"/>
-          </a:xfrm>
-        </p:spPr>
-        <p:txBody>
-          <a:bodyPr/>
-          <a:lstStyle/>
-          <a:p>
-            <a:r>
-              <a:rPr lang="en-CA" dirty="0"/>
-              <a:t>Architecture </a:t>
-            </a:r>
-            <a:r>
-              <a:rPr lang="en-CA" dirty="0" err="1"/>
-              <a:t>globale</a:t>
-            </a:r>
-            <a:endParaRPr lang="en-CA" dirty="0"/>
-          </a:p>
-        </p:txBody>
-      </p:sp>
-      <p:sp>
-        <p:nvSpPr>
-          <p:cNvPr id="4" name="Content Placeholder 2">
-            <a:extLst>
-              <a:ext uri="{FF2B5EF4-FFF2-40B4-BE49-F238E27FC236}">
-                <a16:creationId xmlns:a16="http://schemas.microsoft.com/office/drawing/2014/main" id="{0B4A7325-9DB0-46E8-89B3-80B528F4E836}"/>
-              </a:ext>
-            </a:extLst>
-          </p:cNvPr>
-          <p:cNvSpPr>
-            <a:spLocks noGrp="1"/>
-          </p:cNvSpPr>
-          <p:nvPr>
-            <p:ph idx="1"/>
-          </p:nvPr>
-        </p:nvSpPr>
-        <p:spPr>
-          <a:xfrm>
-            <a:off x="1484308" y="1559168"/>
-            <a:ext cx="10018713" cy="3628294"/>
-          </a:xfrm>
-        </p:spPr>
-        <p:txBody>
-          <a:bodyPr/>
-          <a:lstStyle/>
-          <a:p>
-            <a:r>
-              <a:rPr lang="fr-CA" dirty="0"/>
-              <a:t>Ruche alimentée par une batterie, donc gestion de l’énergie importante</a:t>
-            </a:r>
-          </a:p>
-          <a:p>
-            <a:r>
-              <a:rPr lang="fr-CA" dirty="0"/>
-              <a:t>Batterie à 3.6V et 3000 mAh</a:t>
-            </a:r>
-          </a:p>
-          <a:p>
-            <a:r>
-              <a:rPr lang="fr-CA" dirty="0"/>
-              <a:t>Puissance requise d’opération:  </a:t>
-            </a:r>
-          </a:p>
-          <a:p>
-            <a:pPr marL="0" indent="0">
-              <a:buNone/>
-            </a:pPr>
-            <a:r>
-              <a:rPr lang="fr-CA" dirty="0"/>
-              <a:t> 				Temp + </a:t>
-            </a:r>
-            <a:r>
-              <a:rPr lang="fr-CA" dirty="0" err="1"/>
-              <a:t>L.Cell</a:t>
-            </a:r>
-            <a:r>
-              <a:rPr lang="fr-CA" dirty="0"/>
-              <a:t> + GPS + Micro. = Total</a:t>
-            </a:r>
-          </a:p>
-          <a:p>
-            <a:pPr marL="0" indent="0">
-              <a:buNone/>
-            </a:pPr>
-            <a:r>
-              <a:rPr lang="fr-CA" dirty="0"/>
-              <a:t>				0.2mW + 12mW + 12mW + 68.4mW = 92.6mW ≈ 100mW</a:t>
-            </a:r>
-          </a:p>
-          <a:p>
-            <a:r>
-              <a:rPr lang="fr-CA" dirty="0"/>
-              <a:t>Donc avec une seule batterie, le microcontrôleur peut rester actif à pleine capacité pendant environ 115 heures.</a:t>
-            </a:r>
-          </a:p>
-        </p:txBody>
-      </p:sp>
-    </p:spTree>
-    <p:extLst>
-      <p:ext uri="{BB962C8B-B14F-4D97-AF65-F5344CB8AC3E}">
-        <p14:creationId xmlns:p14="http://schemas.microsoft.com/office/powerpoint/2010/main" val="1915502978"/>
-      </p:ext>
-    </p:extLst>
-  </p:cSld>
-  <p:clrMapOvr>
-    <a:masterClrMapping/>
-  </p:clrMapOvr>
-</p:sld>
-</file>
-
 <file path=ppt/slides/slide9.xml><?xml version="1.0" encoding="utf-8"?>
 <p:sld xmlns:a="http://schemas.openxmlformats.org/drawingml/2006/main" xmlns:r="http://schemas.openxmlformats.org/officeDocument/2006/relationships" xmlns:p="http://schemas.openxmlformats.org/presentationml/2006/main">
   <p:cSld>
@@ -9682,7 +12570,7 @@
           <p:cNvPr id="2" name="Title 1">
             <a:extLst>
               <a:ext uri="{FF2B5EF4-FFF2-40B4-BE49-F238E27FC236}">
-                <a16:creationId xmlns:a16="http://schemas.microsoft.com/office/drawing/2014/main" id="{9381268A-48C6-4A90-B60F-BAEE9120674D}"/>
+                <a16:creationId xmlns:a16="http://schemas.microsoft.com/office/drawing/2014/main" id="{57AE6C2F-E93C-4A13-BFBF-2291D335938B}"/>
               </a:ext>
             </a:extLst>
           </p:cNvPr>
@@ -9693,36 +12581,34 @@
             <p:ph type="title"/>
           </p:nvPr>
         </p:nvSpPr>
-        <p:spPr/>
+        <p:spPr>
+          <a:xfrm>
+            <a:off x="1484309" y="0"/>
+            <a:ext cx="10018713" cy="1752599"/>
+          </a:xfrm>
+        </p:spPr>
         <p:txBody>
           <a:bodyPr/>
           <a:lstStyle/>
           <a:p>
             <a:r>
+              <a:rPr lang="en-CA" dirty="0"/>
+              <a:t>Architecture </a:t>
+            </a:r>
+            <a:r>
               <a:rPr lang="en-CA" dirty="0" err="1"/>
-              <a:t>Requis</a:t>
-            </a:r>
-            <a:r>
-              <a:rPr lang="en-CA" dirty="0"/>
-              <a:t> au </a:t>
-            </a:r>
-            <a:r>
-              <a:rPr lang="en-CA" dirty="0" err="1"/>
-              <a:t>niveau</a:t>
-            </a:r>
-            <a:r>
-              <a:rPr lang="en-CA" dirty="0"/>
-              <a:t> RF</a:t>
-            </a:r>
-          </a:p>
-        </p:txBody>
-      </p:sp>
-      <p:sp>
-        <p:nvSpPr>
-          <p:cNvPr id="3" name="Content Placeholder 2">
+              <a:t>globale</a:t>
+            </a:r>
+            <a:endParaRPr lang="en-CA" dirty="0"/>
+          </a:p>
+        </p:txBody>
+      </p:sp>
+      <p:sp>
+        <p:nvSpPr>
+          <p:cNvPr id="4" name="Content Placeholder 2">
             <a:extLst>
               <a:ext uri="{FF2B5EF4-FFF2-40B4-BE49-F238E27FC236}">
-                <a16:creationId xmlns:a16="http://schemas.microsoft.com/office/drawing/2014/main" id="{17427B92-1811-464E-801C-5EE29A5B8D36}"/>
+                <a16:creationId xmlns:a16="http://schemas.microsoft.com/office/drawing/2014/main" id="{0B4A7325-9DB0-46E8-89B3-80B528F4E836}"/>
               </a:ext>
             </a:extLst>
           </p:cNvPr>
@@ -9733,55 +12619,71 @@
             <p:ph idx="1"/>
           </p:nvPr>
         </p:nvSpPr>
-        <p:spPr/>
+        <p:spPr>
+          <a:xfrm>
+            <a:off x="1484308" y="1559168"/>
+            <a:ext cx="10018713" cy="3628294"/>
+          </a:xfrm>
+        </p:spPr>
         <p:txBody>
           <a:bodyPr/>
           <a:lstStyle/>
           <a:p>
             <a:r>
-              <a:rPr lang="fr-CA" b="1" dirty="0"/>
-              <a:t>MAPAQ:</a:t>
-            </a:r>
-            <a:r>
               <a:rPr lang="fr-CA" dirty="0"/>
-              <a:t> Minimum 15 mètres de distances avec les routes publiques</a:t>
-            </a:r>
-          </a:p>
-          <a:p>
-            <a:r>
-              <a:rPr lang="fr-CA" b="1" dirty="0"/>
-              <a:t>Statistique Canada 2006:</a:t>
-            </a:r>
+              <a:t>Ruche alimentée par une batterie, donc gestion de l’énergie importante</a:t>
+            </a:r>
+          </a:p>
+          <a:p>
             <a:r>
               <a:rPr lang="fr-CA" dirty="0"/>
-              <a:t> Taille moyenne fermes canadiennes : 728 acres soit environ 3 km</a:t>
-            </a:r>
-            <a:r>
-              <a:rPr lang="fr-CA" baseline="30000" dirty="0"/>
-              <a:t>2</a:t>
-            </a:r>
+              <a:t>Batterie à 3.6V et 3000 mAh</a:t>
+            </a:r>
+          </a:p>
+          <a:p>
             <a:r>
               <a:rPr lang="fr-CA" dirty="0"/>
-              <a:t> </a:t>
-            </a:r>
-          </a:p>
-          <a:p>
-            <a:r>
-              <a:rPr lang="fr-CA" b="1" dirty="0"/>
-              <a:t>Agriculture Québec:</a:t>
-            </a:r>
+              <a:t>Puissance requise d’opération:  </a:t>
+            </a:r>
+          </a:p>
+          <a:p>
+            <a:pPr marL="0" indent="0">
+              <a:buNone/>
+            </a:pPr>
             <a:r>
               <a:rPr lang="fr-CA" dirty="0"/>
-              <a:t> Distance entre les ruchers 3 à 4 kilomètres</a:t>
-            </a:r>
-            <a:endParaRPr lang="fr-CA" b="1" dirty="0"/>
+              <a:t> 				Temp + </a:t>
+            </a:r>
+            <a:r>
+              <a:rPr lang="fr-CA" dirty="0" err="1"/>
+              <a:t>L.Cell</a:t>
+            </a:r>
+            <a:r>
+              <a:rPr lang="fr-CA" dirty="0"/>
+              <a:t> + GPS + Micro. = Total</a:t>
+            </a:r>
+          </a:p>
+          <a:p>
+            <a:pPr marL="0" indent="0">
+              <a:buNone/>
+            </a:pPr>
+            <a:r>
+              <a:rPr lang="fr-CA" dirty="0"/>
+              <a:t>				0.2mW + 12mW + 12mW + 68.4mW = 92.6mW ≈ 100mW</a:t>
+            </a:r>
+          </a:p>
+          <a:p>
+            <a:r>
+              <a:rPr lang="fr-CA" dirty="0"/>
+              <a:t>Donc avec une seule batterie, le microcontrôleur peut rester actif à pleine capacité pendant environ 115 heures.</a:t>
+            </a:r>
           </a:p>
         </p:txBody>
       </p:sp>
     </p:spTree>
     <p:extLst>
       <p:ext uri="{BB962C8B-B14F-4D97-AF65-F5344CB8AC3E}">
-        <p14:creationId xmlns:p14="http://schemas.microsoft.com/office/powerpoint/2010/main" val="4212196005"/>
+        <p14:creationId xmlns:p14="http://schemas.microsoft.com/office/powerpoint/2010/main" val="1915502978"/>
       </p:ext>
     </p:extLst>
   </p:cSld>

</xml_diff>

<commit_message>
PT-25 Correction fautes de français
</commit_message>
<xml_diff>
--- a/Dossier de Conception.pptx
+++ b/Dossier de Conception.pptx
@@ -631,7 +631,7 @@
           <a:p>
             <a:fld id="{F81637C0-94AD-483C-A163-E4595C514589}" type="datetimeFigureOut">
               <a:rPr lang="en-CA" smtClean="0"/>
-              <a:t>2018-09-19</a:t>
+              <a:t>2018-09-20</a:t>
             </a:fld>
             <a:endParaRPr lang="en-CA"/>
           </a:p>
@@ -932,7 +932,7 @@
           <a:p>
             <a:fld id="{F81637C0-94AD-483C-A163-E4595C514589}" type="datetimeFigureOut">
               <a:rPr lang="en-CA" smtClean="0"/>
-              <a:t>2018-09-19</a:t>
+              <a:t>2018-09-20</a:t>
             </a:fld>
             <a:endParaRPr lang="en-CA"/>
           </a:p>
@@ -1180,7 +1180,7 @@
           <a:p>
             <a:fld id="{F81637C0-94AD-483C-A163-E4595C514589}" type="datetimeFigureOut">
               <a:rPr lang="en-CA" smtClean="0"/>
-              <a:t>2018-09-19</a:t>
+              <a:t>2018-09-20</a:t>
             </a:fld>
             <a:endParaRPr lang="en-CA"/>
           </a:p>
@@ -1720,7 +1720,7 @@
           <a:p>
             <a:fld id="{F81637C0-94AD-483C-A163-E4595C514589}" type="datetimeFigureOut">
               <a:rPr lang="en-CA" smtClean="0"/>
-              <a:t>2018-09-19</a:t>
+              <a:t>2018-09-20</a:t>
             </a:fld>
             <a:endParaRPr lang="en-CA"/>
           </a:p>
@@ -1968,7 +1968,7 @@
           <a:p>
             <a:fld id="{F81637C0-94AD-483C-A163-E4595C514589}" type="datetimeFigureOut">
               <a:rPr lang="en-CA" smtClean="0"/>
-              <a:t>2018-09-19</a:t>
+              <a:t>2018-09-20</a:t>
             </a:fld>
             <a:endParaRPr lang="en-CA"/>
           </a:p>
@@ -2500,7 +2500,7 @@
           <a:p>
             <a:fld id="{F81637C0-94AD-483C-A163-E4595C514589}" type="datetimeFigureOut">
               <a:rPr lang="en-CA" smtClean="0"/>
-              <a:t>2018-09-19</a:t>
+              <a:t>2018-09-20</a:t>
             </a:fld>
             <a:endParaRPr lang="en-CA"/>
           </a:p>
@@ -2797,7 +2797,7 @@
           <a:p>
             <a:fld id="{F81637C0-94AD-483C-A163-E4595C514589}" type="datetimeFigureOut">
               <a:rPr lang="en-CA" smtClean="0"/>
-              <a:t>2018-09-19</a:t>
+              <a:t>2018-09-20</a:t>
             </a:fld>
             <a:endParaRPr lang="en-CA"/>
           </a:p>
@@ -2971,7 +2971,7 @@
           <a:p>
             <a:fld id="{F81637C0-94AD-483C-A163-E4595C514589}" type="datetimeFigureOut">
               <a:rPr lang="en-CA" smtClean="0"/>
-              <a:t>2018-09-19</a:t>
+              <a:t>2018-09-20</a:t>
             </a:fld>
             <a:endParaRPr lang="en-CA"/>
           </a:p>
@@ -3151,7 +3151,7 @@
           <a:p>
             <a:fld id="{F81637C0-94AD-483C-A163-E4595C514589}" type="datetimeFigureOut">
               <a:rPr lang="en-CA" smtClean="0"/>
-              <a:t>2018-09-19</a:t>
+              <a:t>2018-09-20</a:t>
             </a:fld>
             <a:endParaRPr lang="en-CA"/>
           </a:p>
@@ -3367,7 +3367,7 @@
           <a:p>
             <a:fld id="{F81637C0-94AD-483C-A163-E4595C514589}" type="datetimeFigureOut">
               <a:rPr lang="en-CA" smtClean="0"/>
-              <a:t>2018-09-19</a:t>
+              <a:t>2018-09-20</a:t>
             </a:fld>
             <a:endParaRPr lang="en-CA"/>
           </a:p>
@@ -3618,7 +3618,7 @@
           <a:p>
             <a:fld id="{F81637C0-94AD-483C-A163-E4595C514589}" type="datetimeFigureOut">
               <a:rPr lang="en-CA" smtClean="0"/>
-              <a:t>2018-09-19</a:t>
+              <a:t>2018-09-20</a:t>
             </a:fld>
             <a:endParaRPr lang="en-CA"/>
           </a:p>
@@ -3970,7 +3970,7 @@
           <a:p>
             <a:fld id="{F81637C0-94AD-483C-A163-E4595C514589}" type="datetimeFigureOut">
               <a:rPr lang="en-CA" smtClean="0"/>
-              <a:t>2018-09-19</a:t>
+              <a:t>2018-09-20</a:t>
             </a:fld>
             <a:endParaRPr lang="en-CA"/>
           </a:p>
@@ -4462,7 +4462,7 @@
           <a:p>
             <a:fld id="{F81637C0-94AD-483C-A163-E4595C514589}" type="datetimeFigureOut">
               <a:rPr lang="en-CA" smtClean="0"/>
-              <a:t>2018-09-19</a:t>
+              <a:t>2018-09-20</a:t>
             </a:fld>
             <a:endParaRPr lang="en-CA"/>
           </a:p>
@@ -4580,7 +4580,7 @@
           <a:p>
             <a:fld id="{F81637C0-94AD-483C-A163-E4595C514589}" type="datetimeFigureOut">
               <a:rPr lang="en-CA" smtClean="0"/>
-              <a:t>2018-09-19</a:t>
+              <a:t>2018-09-20</a:t>
             </a:fld>
             <a:endParaRPr lang="en-CA"/>
           </a:p>
@@ -4675,7 +4675,7 @@
           <a:p>
             <a:fld id="{F81637C0-94AD-483C-A163-E4595C514589}" type="datetimeFigureOut">
               <a:rPr lang="en-CA" smtClean="0"/>
-              <a:t>2018-09-19</a:t>
+              <a:t>2018-09-20</a:t>
             </a:fld>
             <a:endParaRPr lang="en-CA"/>
           </a:p>
@@ -4958,7 +4958,7 @@
           <a:p>
             <a:fld id="{F81637C0-94AD-483C-A163-E4595C514589}" type="datetimeFigureOut">
               <a:rPr lang="en-CA" smtClean="0"/>
-              <a:t>2018-09-19</a:t>
+              <a:t>2018-09-20</a:t>
             </a:fld>
             <a:endParaRPr lang="en-CA"/>
           </a:p>
@@ -5249,7 +5249,7 @@
           <a:p>
             <a:fld id="{F81637C0-94AD-483C-A163-E4595C514589}" type="datetimeFigureOut">
               <a:rPr lang="en-CA" smtClean="0"/>
-              <a:t>2018-09-19</a:t>
+              <a:t>2018-09-20</a:t>
             </a:fld>
             <a:endParaRPr lang="en-CA"/>
           </a:p>
@@ -5779,7 +5779,7 @@
           <a:p>
             <a:fld id="{F81637C0-94AD-483C-A163-E4595C514589}" type="datetimeFigureOut">
               <a:rPr lang="en-CA" smtClean="0"/>
-              <a:t>2018-09-19</a:t>
+              <a:t>2018-09-20</a:t>
             </a:fld>
             <a:endParaRPr lang="en-CA"/>
           </a:p>
@@ -6485,7 +6485,7 @@
             </a:r>
             <a:r>
               <a:rPr lang="fr-CA" dirty="0"/>
-              <a:t> Minimum 15 mètres de distances avec les routes publiques</a:t>
+              <a:t> Minimum 15 mètres de distance avec les routes publiques</a:t>
             </a:r>
           </a:p>
           <a:p>
@@ -6495,7 +6495,7 @@
             </a:r>
             <a:r>
               <a:rPr lang="fr-CA" dirty="0"/>
-              <a:t> Taille moyenne fermes canadiennes : 728 acres soit environ 3 km</a:t>
+              <a:t> Taille moyenne fermes canadiennes : 728 acres, soit environ 3 km</a:t>
             </a:r>
             <a:r>
               <a:rPr lang="fr-CA" baseline="30000" dirty="0"/>
@@ -6612,15 +6612,7 @@
           <a:p>
             <a:r>
               <a:rPr lang="fr-CA" dirty="0"/>
-              <a:t>Demande de données température/</a:t>
-            </a:r>
-            <a:r>
-              <a:rPr lang="fr-CA" dirty="0" err="1"/>
-              <a:t>poid</a:t>
-            </a:r>
-            <a:r>
-              <a:rPr lang="fr-CA" dirty="0"/>
-              <a:t>: À chaque minute</a:t>
+              <a:t>Demande de données température/poids: À chaque minute</a:t>
             </a:r>
           </a:p>
           <a:p>
@@ -6632,7 +6624,7 @@
           <a:p>
             <a:r>
               <a:rPr lang="fr-CA" dirty="0"/>
-              <a:t>Demandes manuelles de tout les capteurs</a:t>
+              <a:t>Demandes manuelles de tous les capteurs</a:t>
             </a:r>
           </a:p>
           <a:p>
@@ -6769,7 +6761,7 @@
           <a:p>
             <a:r>
               <a:rPr lang="en-CA" dirty="0" err="1"/>
-              <a:t>Poid</a:t>
+              <a:t>Poids</a:t>
             </a:r>
             <a:r>
               <a:rPr lang="en-CA" dirty="0"/>
@@ -6851,7 +6843,15 @@
           <a:p>
             <a:r>
               <a:rPr lang="en-CA" dirty="0"/>
-              <a:t>Prototype/prevue de concept de S6</a:t>
+              <a:t>Prototype/</a:t>
+            </a:r>
+            <a:r>
+              <a:rPr lang="en-CA" dirty="0" err="1"/>
+              <a:t>preuve</a:t>
+            </a:r>
+            <a:r>
+              <a:rPr lang="en-CA" dirty="0"/>
+              <a:t> de concept de S6</a:t>
             </a:r>
           </a:p>
         </p:txBody>
@@ -7412,7 +7412,15 @@
           <a:p>
             <a:r>
               <a:rPr lang="en-CA" dirty="0"/>
-              <a:t>Prototype/prevue de concept de S6</a:t>
+              <a:t>Prototype/</a:t>
+            </a:r>
+            <a:r>
+              <a:rPr lang="en-CA" dirty="0" err="1"/>
+              <a:t>preuve</a:t>
+            </a:r>
+            <a:r>
+              <a:rPr lang="en-CA" dirty="0"/>
+              <a:t> de concept de S6</a:t>
             </a:r>
           </a:p>
         </p:txBody>
@@ -7763,7 +7771,15 @@
           <a:p>
             <a:r>
               <a:rPr lang="en-CA" dirty="0"/>
-              <a:t>Prototype/prevue de concept de S6</a:t>
+              <a:t>Prototype/</a:t>
+            </a:r>
+            <a:r>
+              <a:rPr lang="en-CA" dirty="0" err="1"/>
+              <a:t>preuve</a:t>
+            </a:r>
+            <a:r>
+              <a:rPr lang="en-CA" dirty="0"/>
+              <a:t> de concept de S6</a:t>
             </a:r>
           </a:p>
         </p:txBody>
@@ -12004,7 +12020,7 @@
             </a:r>
             <a:r>
               <a:rPr lang="en-CA" dirty="0" err="1"/>
-              <a:t>permettent</a:t>
+              <a:t>permettant</a:t>
             </a:r>
             <a:r>
               <a:rPr lang="en-CA" dirty="0"/>
@@ -12042,7 +12058,7 @@
             </a:r>
             <a:r>
               <a:rPr lang="en-CA" dirty="0"/>
-              <a:t> central analyse </a:t>
+              <a:t> central qui analyse </a:t>
             </a:r>
             <a:r>
               <a:rPr lang="en-CA" dirty="0" err="1"/>
@@ -12184,7 +12200,11 @@
             <a:graphicFrameLocks noGrp="1"/>
           </p:cNvGraphicFramePr>
           <p:nvPr>
-            <p:extLst/>
+            <p:extLst>
+              <p:ext uri="{D42A27DB-BD31-4B8C-83A1-F6EECF244321}">
+                <p14:modId xmlns:p14="http://schemas.microsoft.com/office/powerpoint/2010/main" val="2856155542"/>
+              </p:ext>
+            </p:extLst>
           </p:nvPr>
         </p:nvGraphicFramePr>
         <p:xfrm>
@@ -12519,7 +12539,7 @@
                     <a:p>
                       <a:r>
                         <a:rPr lang="en-CA" dirty="0"/>
-                        <a:t>-Alimentation entre 2.75 et 3.6V</a:t>
+                        <a:t>-Alimentation entre 2,75 et 3,6V</a:t>
                       </a:r>
                     </a:p>
                   </a:txBody>
@@ -12637,7 +12657,7 @@
           <a:p>
             <a:r>
               <a:rPr lang="fr-CA" dirty="0"/>
-              <a:t>Batterie à 3.6V et 3000 mAh</a:t>
+              <a:t>Batterie à 3,6V et 3000 mAh</a:t>
             </a:r>
           </a:p>
           <a:p>
@@ -12669,7 +12689,7 @@
             </a:pPr>
             <a:r>
               <a:rPr lang="fr-CA" dirty="0"/>
-              <a:t>				0.2mW + 12mW + 12mW + 68.4mW = 92.6mW ≈ 100mW</a:t>
+              <a:t>				0,2mW + 12mW + 12mW + 68,4mW = 92,6mW ≈ 100mW</a:t>
             </a:r>
           </a:p>
           <a:p>

</xml_diff>

<commit_message>
PT-25 Ajout de la section mise en contexte
</commit_message>
<xml_diff>
--- a/Dossier de Conception.pptx
+++ b/Dossier de Conception.pptx
@@ -6,23 +6,25 @@
   </p:sldMasterIdLst>
   <p:sldIdLst>
     <p:sldId id="256" r:id="rId2"/>
-    <p:sldId id="257" r:id="rId3"/>
-    <p:sldId id="274" r:id="rId4"/>
-    <p:sldId id="275" r:id="rId5"/>
-    <p:sldId id="265" r:id="rId6"/>
-    <p:sldId id="266" r:id="rId7"/>
-    <p:sldId id="267" r:id="rId8"/>
-    <p:sldId id="268" r:id="rId9"/>
-    <p:sldId id="269" r:id="rId10"/>
-    <p:sldId id="270" r:id="rId11"/>
-    <p:sldId id="271" r:id="rId12"/>
-    <p:sldId id="260" r:id="rId13"/>
-    <p:sldId id="263" r:id="rId14"/>
-    <p:sldId id="261" r:id="rId15"/>
-    <p:sldId id="264" r:id="rId16"/>
-    <p:sldId id="262" r:id="rId17"/>
-    <p:sldId id="272" r:id="rId18"/>
-    <p:sldId id="273" r:id="rId19"/>
+    <p:sldId id="276" r:id="rId3"/>
+    <p:sldId id="277" r:id="rId4"/>
+    <p:sldId id="278" r:id="rId5"/>
+    <p:sldId id="274" r:id="rId6"/>
+    <p:sldId id="275" r:id="rId7"/>
+    <p:sldId id="265" r:id="rId8"/>
+    <p:sldId id="266" r:id="rId9"/>
+    <p:sldId id="267" r:id="rId10"/>
+    <p:sldId id="268" r:id="rId11"/>
+    <p:sldId id="269" r:id="rId12"/>
+    <p:sldId id="270" r:id="rId13"/>
+    <p:sldId id="271" r:id="rId14"/>
+    <p:sldId id="260" r:id="rId15"/>
+    <p:sldId id="263" r:id="rId16"/>
+    <p:sldId id="261" r:id="rId17"/>
+    <p:sldId id="264" r:id="rId18"/>
+    <p:sldId id="262" r:id="rId19"/>
+    <p:sldId id="272" r:id="rId20"/>
+    <p:sldId id="273" r:id="rId21"/>
   </p:sldIdLst>
   <p:sldSz cx="12192000" cy="6858000"/>
   <p:notesSz cx="6858000" cy="9144000"/>
@@ -678,7 +680,7 @@
           <a:p>
             <a:fld id="{5651D7FC-DF07-4DDA-A65D-263378C9ADA7}" type="slidenum">
               <a:rPr lang="en-CA" smtClean="0"/>
-              <a:t>‹#›</a:t>
+              <a:t>‹N°›</a:t>
             </a:fld>
             <a:endParaRPr lang="en-CA"/>
           </a:p>
@@ -974,7 +976,7 @@
           <a:p>
             <a:fld id="{5651D7FC-DF07-4DDA-A65D-263378C9ADA7}" type="slidenum">
               <a:rPr lang="en-CA" smtClean="0"/>
-              <a:t>‹#›</a:t>
+              <a:t>‹N°›</a:t>
             </a:fld>
             <a:endParaRPr lang="en-CA"/>
           </a:p>
@@ -1222,7 +1224,7 @@
           <a:p>
             <a:fld id="{5651D7FC-DF07-4DDA-A65D-263378C9ADA7}" type="slidenum">
               <a:rPr lang="en-CA" smtClean="0"/>
-              <a:t>‹#›</a:t>
+              <a:t>‹N°›</a:t>
             </a:fld>
             <a:endParaRPr lang="en-CA"/>
           </a:p>
@@ -1762,7 +1764,7 @@
           <a:p>
             <a:fld id="{5651D7FC-DF07-4DDA-A65D-263378C9ADA7}" type="slidenum">
               <a:rPr lang="en-CA" smtClean="0"/>
-              <a:t>‹#›</a:t>
+              <a:t>‹N°›</a:t>
             </a:fld>
             <a:endParaRPr lang="en-CA"/>
           </a:p>
@@ -2010,7 +2012,7 @@
           <a:p>
             <a:fld id="{5651D7FC-DF07-4DDA-A65D-263378C9ADA7}" type="slidenum">
               <a:rPr lang="en-CA" smtClean="0"/>
-              <a:t>‹#›</a:t>
+              <a:t>‹N°›</a:t>
             </a:fld>
             <a:endParaRPr lang="en-CA"/>
           </a:p>
@@ -2542,7 +2544,7 @@
           <a:p>
             <a:fld id="{5651D7FC-DF07-4DDA-A65D-263378C9ADA7}" type="slidenum">
               <a:rPr lang="en-CA" smtClean="0"/>
-              <a:t>‹#›</a:t>
+              <a:t>‹N°›</a:t>
             </a:fld>
             <a:endParaRPr lang="en-CA"/>
           </a:p>
@@ -2839,7 +2841,7 @@
           <a:p>
             <a:fld id="{5651D7FC-DF07-4DDA-A65D-263378C9ADA7}" type="slidenum">
               <a:rPr lang="en-CA" smtClean="0"/>
-              <a:t>‹#›</a:t>
+              <a:t>‹N°›</a:t>
             </a:fld>
             <a:endParaRPr lang="en-CA"/>
           </a:p>
@@ -3013,7 +3015,7 @@
           <a:p>
             <a:fld id="{5651D7FC-DF07-4DDA-A65D-263378C9ADA7}" type="slidenum">
               <a:rPr lang="en-CA" smtClean="0"/>
-              <a:t>‹#›</a:t>
+              <a:t>‹N°›</a:t>
             </a:fld>
             <a:endParaRPr lang="en-CA"/>
           </a:p>
@@ -3193,7 +3195,7 @@
           <a:p>
             <a:fld id="{5651D7FC-DF07-4DDA-A65D-263378C9ADA7}" type="slidenum">
               <a:rPr lang="en-CA" smtClean="0"/>
-              <a:t>‹#›</a:t>
+              <a:t>‹N°›</a:t>
             </a:fld>
             <a:endParaRPr lang="en-CA"/>
           </a:p>
@@ -3414,7 +3416,7 @@
           <a:p>
             <a:fld id="{5651D7FC-DF07-4DDA-A65D-263378C9ADA7}" type="slidenum">
               <a:rPr lang="en-CA" smtClean="0"/>
-              <a:t>‹#›</a:t>
+              <a:t>‹N°›</a:t>
             </a:fld>
             <a:endParaRPr lang="en-CA"/>
           </a:p>
@@ -3660,7 +3662,7 @@
           <a:p>
             <a:fld id="{5651D7FC-DF07-4DDA-A65D-263378C9ADA7}" type="slidenum">
               <a:rPr lang="en-CA" smtClean="0"/>
-              <a:t>‹#›</a:t>
+              <a:t>‹N°›</a:t>
             </a:fld>
             <a:endParaRPr lang="en-CA"/>
           </a:p>
@@ -4012,7 +4014,7 @@
           <a:p>
             <a:fld id="{5651D7FC-DF07-4DDA-A65D-263378C9ADA7}" type="slidenum">
               <a:rPr lang="en-CA" smtClean="0"/>
-              <a:t>‹#›</a:t>
+              <a:t>‹N°›</a:t>
             </a:fld>
             <a:endParaRPr lang="en-CA"/>
           </a:p>
@@ -4504,7 +4506,7 @@
           <a:p>
             <a:fld id="{5651D7FC-DF07-4DDA-A65D-263378C9ADA7}" type="slidenum">
               <a:rPr lang="en-CA" smtClean="0"/>
-              <a:t>‹#›</a:t>
+              <a:t>‹N°›</a:t>
             </a:fld>
             <a:endParaRPr lang="en-CA"/>
           </a:p>
@@ -4622,7 +4624,7 @@
           <a:p>
             <a:fld id="{5651D7FC-DF07-4DDA-A65D-263378C9ADA7}" type="slidenum">
               <a:rPr lang="en-CA" smtClean="0"/>
-              <a:t>‹#›</a:t>
+              <a:t>‹N°›</a:t>
             </a:fld>
             <a:endParaRPr lang="en-CA"/>
           </a:p>
@@ -4717,7 +4719,7 @@
           <a:p>
             <a:fld id="{5651D7FC-DF07-4DDA-A65D-263378C9ADA7}" type="slidenum">
               <a:rPr lang="en-CA" smtClean="0"/>
-              <a:t>‹#›</a:t>
+              <a:t>‹N°›</a:t>
             </a:fld>
             <a:endParaRPr lang="en-CA"/>
           </a:p>
@@ -5000,7 +5002,7 @@
           <a:p>
             <a:fld id="{5651D7FC-DF07-4DDA-A65D-263378C9ADA7}" type="slidenum">
               <a:rPr lang="en-CA" smtClean="0"/>
-              <a:t>‹#›</a:t>
+              <a:t>‹N°›</a:t>
             </a:fld>
             <a:endParaRPr lang="en-CA"/>
           </a:p>
@@ -5291,7 +5293,7 @@
           <a:p>
             <a:fld id="{5651D7FC-DF07-4DDA-A65D-263378C9ADA7}" type="slidenum">
               <a:rPr lang="en-CA" smtClean="0"/>
-              <a:t>‹#›</a:t>
+              <a:t>‹N°›</a:t>
             </a:fld>
             <a:endParaRPr lang="en-CA"/>
           </a:p>
@@ -5857,7 +5859,7 @@
           <a:p>
             <a:fld id="{5651D7FC-DF07-4DDA-A65D-263378C9ADA7}" type="slidenum">
               <a:rPr lang="en-CA" smtClean="0"/>
-              <a:t>‹#›</a:t>
+              <a:t>‹N°›</a:t>
             </a:fld>
             <a:endParaRPr lang="en-CA"/>
           </a:p>
@@ -6423,7 +6425,7 @@
           <p:cNvPr id="2" name="Title 1">
             <a:extLst>
               <a:ext uri="{FF2B5EF4-FFF2-40B4-BE49-F238E27FC236}">
-                <a16:creationId xmlns:a16="http://schemas.microsoft.com/office/drawing/2014/main" id="{9381268A-48C6-4A90-B60F-BAEE9120674D}"/>
+                <a16:creationId xmlns:a16="http://schemas.microsoft.com/office/drawing/2014/main" id="{57AE6C2F-E93C-4A13-BFBF-2291D335938B}"/>
               </a:ext>
             </a:extLst>
           </p:cNvPr>
@@ -6434,95 +6436,400 @@
             <p:ph type="title"/>
           </p:nvPr>
         </p:nvSpPr>
-        <p:spPr/>
+        <p:spPr>
+          <a:xfrm>
+            <a:off x="1484309" y="0"/>
+            <a:ext cx="10018713" cy="1752599"/>
+          </a:xfrm>
+        </p:spPr>
         <p:txBody>
           <a:bodyPr/>
           <a:lstStyle/>
           <a:p>
             <a:r>
+              <a:rPr lang="en-CA" dirty="0"/>
+              <a:t>Architecture </a:t>
+            </a:r>
+            <a:r>
               <a:rPr lang="en-CA" dirty="0" err="1"/>
-              <a:t>Requis</a:t>
-            </a:r>
-            <a:r>
-              <a:rPr lang="en-CA" dirty="0"/>
-              <a:t> au </a:t>
-            </a:r>
-            <a:r>
-              <a:rPr lang="en-CA" dirty="0" err="1"/>
-              <a:t>niveau</a:t>
-            </a:r>
-            <a:r>
-              <a:rPr lang="en-CA" dirty="0"/>
-              <a:t> RF</a:t>
-            </a:r>
+              <a:t>globale</a:t>
+            </a:r>
+            <a:endParaRPr lang="en-CA" dirty="0"/>
           </a:p>
         </p:txBody>
       </p:sp>
-      <p:sp>
-        <p:nvSpPr>
-          <p:cNvPr id="3" name="Content Placeholder 2">
+      <p:graphicFrame>
+        <p:nvGraphicFramePr>
+          <p:cNvPr id="5" name="Table 4">
             <a:extLst>
               <a:ext uri="{FF2B5EF4-FFF2-40B4-BE49-F238E27FC236}">
-                <a16:creationId xmlns:a16="http://schemas.microsoft.com/office/drawing/2014/main" id="{17427B92-1811-464E-801C-5EE29A5B8D36}"/>
+                <a16:creationId xmlns:a16="http://schemas.microsoft.com/office/drawing/2014/main" id="{DA087B87-A4E2-424C-A303-D175DDBD92E0}"/>
               </a:ext>
             </a:extLst>
           </p:cNvPr>
-          <p:cNvSpPr>
-            <a:spLocks noGrp="1"/>
-          </p:cNvSpPr>
+          <p:cNvGraphicFramePr>
+            <a:graphicFrameLocks noGrp="1"/>
+          </p:cNvGraphicFramePr>
           <p:nvPr>
-            <p:ph idx="1"/>
+            <p:extLst>
+              <p:ext uri="{D42A27DB-BD31-4B8C-83A1-F6EECF244321}">
+                <p14:modId xmlns:p14="http://schemas.microsoft.com/office/powerpoint/2010/main" val="2856155542"/>
+              </p:ext>
+            </p:extLst>
           </p:nvPr>
-        </p:nvSpPr>
-        <p:spPr/>
-        <p:txBody>
-          <a:bodyPr/>
-          <a:lstStyle/>
-          <a:p>
-            <a:r>
-              <a:rPr lang="fr-CA" b="1" dirty="0"/>
-              <a:t>MAPAQ:</a:t>
-            </a:r>
-            <a:r>
-              <a:rPr lang="fr-CA" dirty="0"/>
-              <a:t> Minimum 15 mètres de distance avec les routes publiques</a:t>
-            </a:r>
-          </a:p>
-          <a:p>
-            <a:r>
-              <a:rPr lang="fr-CA" b="1" dirty="0"/>
-              <a:t>Statistique Canada 2006:</a:t>
-            </a:r>
-            <a:r>
-              <a:rPr lang="fr-CA" dirty="0"/>
-              <a:t> Taille moyenne fermes canadiennes : 728 acres, soit environ 3 km</a:t>
-            </a:r>
-            <a:r>
-              <a:rPr lang="fr-CA" baseline="30000" dirty="0"/>
-              <a:t>2</a:t>
-            </a:r>
-            <a:r>
-              <a:rPr lang="fr-CA" dirty="0"/>
-              <a:t> </a:t>
-            </a:r>
-          </a:p>
-          <a:p>
-            <a:r>
-              <a:rPr lang="fr-CA" b="1" dirty="0"/>
-              <a:t>Agriculture Québec:</a:t>
-            </a:r>
-            <a:r>
-              <a:rPr lang="fr-CA" dirty="0"/>
-              <a:t> Distance entre les ruchers 3 à 4 kilomètres</a:t>
-            </a:r>
-            <a:endParaRPr lang="fr-CA" b="1" dirty="0"/>
-          </a:p>
-        </p:txBody>
-      </p:sp>
+        </p:nvGraphicFramePr>
+        <p:xfrm>
+          <a:off x="1653442" y="1452685"/>
+          <a:ext cx="8885116" cy="3601355"/>
+        </p:xfrm>
+        <a:graphic>
+          <a:graphicData uri="http://schemas.openxmlformats.org/drawingml/2006/table">
+            <a:tbl>
+              <a:tblPr firstRow="1" bandRow="1">
+                <a:tableStyleId>{5C22544A-7EE6-4342-B048-85BDC9FD1C3A}</a:tableStyleId>
+              </a:tblPr>
+              <a:tblGrid>
+                <a:gridCol w="4442558">
+                  <a:extLst>
+                    <a:ext uri="{9D8B030D-6E8A-4147-A177-3AD203B41FA5}">
+                      <a16:colId xmlns:a16="http://schemas.microsoft.com/office/drawing/2014/main" val="2474516255"/>
+                    </a:ext>
+                  </a:extLst>
+                </a:gridCol>
+                <a:gridCol w="4442558">
+                  <a:extLst>
+                    <a:ext uri="{9D8B030D-6E8A-4147-A177-3AD203B41FA5}">
+                      <a16:colId xmlns:a16="http://schemas.microsoft.com/office/drawing/2014/main" val="2917661861"/>
+                    </a:ext>
+                  </a:extLst>
+                </a:gridCol>
+              </a:tblGrid>
+              <a:tr h="549604">
+                <a:tc>
+                  <a:txBody>
+                    <a:bodyPr/>
+                    <a:lstStyle/>
+                    <a:p>
+                      <a:r>
+                        <a:rPr lang="en-CA" dirty="0" err="1"/>
+                        <a:t>Capteur</a:t>
+                      </a:r>
+                      <a:endParaRPr lang="en-CA" dirty="0"/>
+                    </a:p>
+                  </a:txBody>
+                  <a:tcPr/>
+                </a:tc>
+                <a:tc>
+                  <a:txBody>
+                    <a:bodyPr/>
+                    <a:lstStyle/>
+                    <a:p>
+                      <a:r>
+                        <a:rPr lang="en-CA" dirty="0" err="1"/>
+                        <a:t>Caractéristiques</a:t>
+                      </a:r>
+                      <a:endParaRPr lang="en-CA" dirty="0"/>
+                    </a:p>
+                  </a:txBody>
+                  <a:tcPr/>
+                </a:tc>
+                <a:extLst>
+                  <a:ext uri="{0D108BD9-81ED-4DB2-BD59-A6C34878D82A}">
+                    <a16:rowId xmlns:a16="http://schemas.microsoft.com/office/drawing/2014/main" val="2317750631"/>
+                  </a:ext>
+                </a:extLst>
+              </a:tr>
+              <a:tr h="948631">
+                <a:tc>
+                  <a:txBody>
+                    <a:bodyPr/>
+                    <a:lstStyle/>
+                    <a:p>
+                      <a:r>
+                        <a:rPr lang="en-CA" dirty="0" err="1"/>
+                        <a:t>Température</a:t>
+                      </a:r>
+                      <a:r>
+                        <a:rPr lang="en-CA" dirty="0"/>
+                        <a:t> (</a:t>
+                      </a:r>
+                      <a:r>
+                        <a:rPr lang="en-CA" dirty="0" err="1"/>
+                        <a:t>série</a:t>
+                      </a:r>
+                      <a:r>
+                        <a:rPr lang="en-CA" dirty="0"/>
+                        <a:t> S5855A_E)</a:t>
+                      </a:r>
+                    </a:p>
+                  </a:txBody>
+                  <a:tcPr/>
+                </a:tc>
+                <a:tc>
+                  <a:txBody>
+                    <a:bodyPr/>
+                    <a:lstStyle/>
+                    <a:p>
+                      <a:r>
+                        <a:rPr lang="en-CA" dirty="0"/>
+                        <a:t>-</a:t>
+                      </a:r>
+                      <a:r>
+                        <a:rPr lang="en-CA" dirty="0" err="1"/>
+                        <a:t>Couvre</a:t>
+                      </a:r>
+                      <a:r>
+                        <a:rPr lang="en-CA" dirty="0"/>
+                        <a:t> les </a:t>
+                      </a:r>
+                      <a:r>
+                        <a:rPr lang="en-CA" dirty="0" err="1"/>
+                        <a:t>températures</a:t>
+                      </a:r>
+                      <a:r>
+                        <a:rPr lang="en-CA" dirty="0"/>
+                        <a:t> du Québec</a:t>
+                      </a:r>
+                    </a:p>
+                    <a:p>
+                      <a:r>
+                        <a:rPr lang="en-CA" dirty="0"/>
+                        <a:t>-</a:t>
+                      </a:r>
+                      <a:r>
+                        <a:rPr lang="en-CA" dirty="0" err="1"/>
+                        <a:t>Consomme</a:t>
+                      </a:r>
+                      <a:r>
+                        <a:rPr lang="en-CA" dirty="0"/>
+                        <a:t> </a:t>
+                      </a:r>
+                      <a:r>
+                        <a:rPr lang="en-CA" dirty="0" err="1"/>
+                        <a:t>peu</a:t>
+                      </a:r>
+                      <a:r>
+                        <a:rPr lang="en-CA" dirty="0"/>
+                        <a:t> pour </a:t>
+                      </a:r>
+                      <a:r>
+                        <a:rPr lang="en-CA" dirty="0" err="1"/>
+                        <a:t>opération</a:t>
+                      </a:r>
+                      <a:endParaRPr lang="en-CA" dirty="0"/>
+                    </a:p>
+                    <a:p>
+                      <a:r>
+                        <a:rPr lang="en-CA" dirty="0"/>
+                        <a:t>-Sortie PWM</a:t>
+                      </a:r>
+                    </a:p>
+                  </a:txBody>
+                  <a:tcPr/>
+                </a:tc>
+                <a:extLst>
+                  <a:ext uri="{0D108BD9-81ED-4DB2-BD59-A6C34878D82A}">
+                    <a16:rowId xmlns:a16="http://schemas.microsoft.com/office/drawing/2014/main" val="1527509176"/>
+                  </a:ext>
+                </a:extLst>
+              </a:tr>
+              <a:tr h="1355187">
+                <a:tc>
+                  <a:txBody>
+                    <a:bodyPr/>
+                    <a:lstStyle/>
+                    <a:p>
+                      <a:r>
+                        <a:rPr lang="en-CA" dirty="0"/>
+                        <a:t>Force (</a:t>
+                      </a:r>
+                      <a:r>
+                        <a:rPr lang="en-CA" dirty="0" err="1"/>
+                        <a:t>série</a:t>
+                      </a:r>
+                      <a:r>
+                        <a:rPr lang="en-CA" dirty="0"/>
+                        <a:t> FC22)</a:t>
+                      </a:r>
+                    </a:p>
+                  </a:txBody>
+                  <a:tcPr/>
+                </a:tc>
+                <a:tc>
+                  <a:txBody>
+                    <a:bodyPr/>
+                    <a:lstStyle/>
+                    <a:p>
+                      <a:r>
+                        <a:rPr lang="en-CA" dirty="0"/>
+                        <a:t>-</a:t>
+                      </a:r>
+                      <a:r>
+                        <a:rPr lang="en-CA" dirty="0" err="1"/>
+                        <a:t>Couvre</a:t>
+                      </a:r>
+                      <a:r>
+                        <a:rPr lang="en-CA" dirty="0"/>
+                        <a:t> le </a:t>
+                      </a:r>
+                      <a:r>
+                        <a:rPr lang="en-CA" dirty="0" err="1"/>
+                        <a:t>poids</a:t>
+                      </a:r>
+                      <a:r>
+                        <a:rPr lang="en-CA" dirty="0"/>
+                        <a:t> </a:t>
+                      </a:r>
+                      <a:r>
+                        <a:rPr lang="en-CA" dirty="0" err="1"/>
+                        <a:t>d’une</a:t>
+                      </a:r>
+                      <a:r>
+                        <a:rPr lang="en-CA" dirty="0"/>
+                        <a:t> </a:t>
+                      </a:r>
+                      <a:r>
+                        <a:rPr lang="en-CA" dirty="0" err="1"/>
+                        <a:t>ruche</a:t>
+                      </a:r>
+                      <a:endParaRPr lang="en-CA" dirty="0"/>
+                    </a:p>
+                    <a:p>
+                      <a:r>
+                        <a:rPr lang="en-CA" dirty="0"/>
+                        <a:t>-</a:t>
+                      </a:r>
+                      <a:r>
+                        <a:rPr lang="en-CA" dirty="0" err="1"/>
+                        <a:t>Fonctionne</a:t>
+                      </a:r>
+                      <a:r>
+                        <a:rPr lang="en-CA" dirty="0"/>
+                        <a:t> </a:t>
+                      </a:r>
+                      <a:r>
+                        <a:rPr lang="en-CA" dirty="0" err="1"/>
+                        <a:t>dans</a:t>
+                      </a:r>
+                      <a:r>
+                        <a:rPr lang="en-CA" dirty="0"/>
+                        <a:t> les temperatures du Québec</a:t>
+                      </a:r>
+                    </a:p>
+                    <a:p>
+                      <a:r>
+                        <a:rPr lang="en-CA" dirty="0"/>
+                        <a:t>-Sortie </a:t>
+                      </a:r>
+                      <a:r>
+                        <a:rPr lang="en-CA" dirty="0" err="1"/>
+                        <a:t>analogique</a:t>
+                      </a:r>
+                      <a:r>
+                        <a:rPr lang="en-CA" dirty="0"/>
+                        <a:t> avec </a:t>
+                      </a:r>
+                      <a:r>
+                        <a:rPr lang="en-CA" dirty="0" err="1"/>
+                        <a:t>pont</a:t>
+                      </a:r>
+                      <a:r>
+                        <a:rPr lang="en-CA" dirty="0"/>
+                        <a:t> de </a:t>
+                      </a:r>
+                      <a:r>
+                        <a:rPr lang="en-CA" dirty="0" err="1"/>
+                        <a:t>wheatstone</a:t>
+                      </a:r>
+                      <a:r>
+                        <a:rPr lang="en-CA" dirty="0"/>
+                        <a:t> (4 ports </a:t>
+                      </a:r>
+                      <a:r>
+                        <a:rPr lang="en-CA" dirty="0" err="1"/>
+                        <a:t>nécessaires</a:t>
+                      </a:r>
+                      <a:r>
+                        <a:rPr lang="en-CA" dirty="0"/>
+                        <a:t>)</a:t>
+                      </a:r>
+                    </a:p>
+                  </a:txBody>
+                  <a:tcPr/>
+                </a:tc>
+                <a:extLst>
+                  <a:ext uri="{0D108BD9-81ED-4DB2-BD59-A6C34878D82A}">
+                    <a16:rowId xmlns:a16="http://schemas.microsoft.com/office/drawing/2014/main" val="3165022307"/>
+                  </a:ext>
+                </a:extLst>
+              </a:tr>
+              <a:tr h="549604">
+                <a:tc>
+                  <a:txBody>
+                    <a:bodyPr/>
+                    <a:lstStyle/>
+                    <a:p>
+                      <a:r>
+                        <a:rPr lang="en-CA" dirty="0"/>
+                        <a:t>Position </a:t>
+                      </a:r>
+                      <a:r>
+                        <a:rPr lang="en-CA" b="0" dirty="0"/>
+                        <a:t>(</a:t>
+                      </a:r>
+                      <a:r>
+                        <a:rPr lang="en-CA" sz="1800" b="0" i="0" kern="1200" dirty="0">
+                          <a:solidFill>
+                            <a:schemeClr val="dk1"/>
+                          </a:solidFill>
+                          <a:effectLst/>
+                          <a:latin typeface="+mn-lt"/>
+                          <a:ea typeface="+mn-ea"/>
+                          <a:cs typeface="+mn-cs"/>
+                        </a:rPr>
+                        <a:t>RB-Fee-67</a:t>
+                      </a:r>
+                      <a:r>
+                        <a:rPr lang="en-CA" b="0" dirty="0"/>
+                        <a:t>)</a:t>
+                      </a:r>
+                    </a:p>
+                  </a:txBody>
+                  <a:tcPr/>
+                </a:tc>
+                <a:tc>
+                  <a:txBody>
+                    <a:bodyPr/>
+                    <a:lstStyle/>
+                    <a:p>
+                      <a:r>
+                        <a:rPr lang="en-CA" dirty="0"/>
+                        <a:t>-Communique via UART </a:t>
+                      </a:r>
+                    </a:p>
+                    <a:p>
+                      <a:r>
+                        <a:rPr lang="en-CA" dirty="0"/>
+                        <a:t>-Alimentation entre 2,75 et 3,6V</a:t>
+                      </a:r>
+                    </a:p>
+                  </a:txBody>
+                  <a:tcPr/>
+                </a:tc>
+                <a:extLst>
+                  <a:ext uri="{0D108BD9-81ED-4DB2-BD59-A6C34878D82A}">
+                    <a16:rowId xmlns:a16="http://schemas.microsoft.com/office/drawing/2014/main" val="1334639137"/>
+                  </a:ext>
+                </a:extLst>
+              </a:tr>
+            </a:tbl>
+          </a:graphicData>
+        </a:graphic>
+      </p:graphicFrame>
     </p:spTree>
     <p:extLst>
       <p:ext uri="{BB962C8B-B14F-4D97-AF65-F5344CB8AC3E}">
-        <p14:creationId xmlns:p14="http://schemas.microsoft.com/office/powerpoint/2010/main" val="4212196005"/>
+        <p14:creationId xmlns:p14="http://schemas.microsoft.com/office/powerpoint/2010/main" val="1776989636"/>
       </p:ext>
     </p:extLst>
   </p:cSld>
@@ -6554,7 +6861,7 @@
           <p:cNvPr id="2" name="Title 1">
             <a:extLst>
               <a:ext uri="{FF2B5EF4-FFF2-40B4-BE49-F238E27FC236}">
-                <a16:creationId xmlns:a16="http://schemas.microsoft.com/office/drawing/2014/main" id="{9381268A-48C6-4A90-B60F-BAEE9120674D}"/>
+                <a16:creationId xmlns:a16="http://schemas.microsoft.com/office/drawing/2014/main" id="{57AE6C2F-E93C-4A13-BFBF-2291D335938B}"/>
               </a:ext>
             </a:extLst>
           </p:cNvPr>
@@ -6565,36 +6872,34 @@
             <p:ph type="title"/>
           </p:nvPr>
         </p:nvSpPr>
-        <p:spPr/>
+        <p:spPr>
+          <a:xfrm>
+            <a:off x="1484309" y="0"/>
+            <a:ext cx="10018713" cy="1752599"/>
+          </a:xfrm>
+        </p:spPr>
         <p:txBody>
           <a:bodyPr/>
           <a:lstStyle/>
           <a:p>
             <a:r>
+              <a:rPr lang="en-CA" dirty="0"/>
+              <a:t>Architecture </a:t>
+            </a:r>
+            <a:r>
               <a:rPr lang="en-CA" dirty="0" err="1"/>
-              <a:t>Requis</a:t>
-            </a:r>
-            <a:r>
-              <a:rPr lang="en-CA" dirty="0"/>
-              <a:t> au </a:t>
-            </a:r>
-            <a:r>
-              <a:rPr lang="en-CA" dirty="0" err="1"/>
-              <a:t>niveau</a:t>
-            </a:r>
-            <a:r>
-              <a:rPr lang="en-CA" dirty="0"/>
-              <a:t> RF</a:t>
-            </a:r>
+              <a:t>globale</a:t>
+            </a:r>
+            <a:endParaRPr lang="en-CA" dirty="0"/>
           </a:p>
         </p:txBody>
       </p:sp>
       <p:sp>
         <p:nvSpPr>
-          <p:cNvPr id="3" name="Content Placeholder 2">
+          <p:cNvPr id="4" name="Content Placeholder 2">
             <a:extLst>
               <a:ext uri="{FF2B5EF4-FFF2-40B4-BE49-F238E27FC236}">
-                <a16:creationId xmlns:a16="http://schemas.microsoft.com/office/drawing/2014/main" id="{17427B92-1811-464E-801C-5EE29A5B8D36}"/>
+                <a16:creationId xmlns:a16="http://schemas.microsoft.com/office/drawing/2014/main" id="{0B4A7325-9DB0-46E8-89B3-80B528F4E836}"/>
               </a:ext>
             </a:extLst>
           </p:cNvPr>
@@ -6605,32 +6910,63 @@
             <p:ph idx="1"/>
           </p:nvPr>
         </p:nvSpPr>
-        <p:spPr/>
+        <p:spPr>
+          <a:xfrm>
+            <a:off x="1484308" y="1559168"/>
+            <a:ext cx="10018713" cy="3628294"/>
+          </a:xfrm>
+        </p:spPr>
         <p:txBody>
           <a:bodyPr/>
           <a:lstStyle/>
           <a:p>
             <a:r>
               <a:rPr lang="fr-CA" dirty="0"/>
-              <a:t>Demande de données température/poids: À chaque minute</a:t>
+              <a:t>Ruche alimentée par une batterie, donc gestion de l’énergie importante</a:t>
             </a:r>
           </a:p>
           <a:p>
             <a:r>
               <a:rPr lang="fr-CA" dirty="0"/>
-              <a:t>Demande de données GPS: Une fois par jour</a:t>
+              <a:t>Batterie à 3,6V et 3000 mAh</a:t>
             </a:r>
           </a:p>
           <a:p>
             <a:r>
               <a:rPr lang="fr-CA" dirty="0"/>
-              <a:t>Demandes manuelles de tous les capteurs</a:t>
-            </a:r>
-          </a:p>
-          <a:p>
+              <a:t>Puissance requise d’opération:  </a:t>
+            </a:r>
+          </a:p>
+          <a:p>
+            <a:pPr marL="0" indent="0">
+              <a:buNone/>
+            </a:pPr>
             <a:r>
               <a:rPr lang="fr-CA" dirty="0"/>
-              <a:t>Bande de fréquence utilisée: 2,4GHz</a:t>
+              <a:t> 				Temp + </a:t>
+            </a:r>
+            <a:r>
+              <a:rPr lang="fr-CA" dirty="0" err="1"/>
+              <a:t>L.Cell</a:t>
+            </a:r>
+            <a:r>
+              <a:rPr lang="fr-CA" dirty="0"/>
+              <a:t> + GPS + Micro. = Total</a:t>
+            </a:r>
+          </a:p>
+          <a:p>
+            <a:pPr marL="0" indent="0">
+              <a:buNone/>
+            </a:pPr>
+            <a:r>
+              <a:rPr lang="fr-CA" dirty="0"/>
+              <a:t>				0,2mW + 12mW + 12mW + 68,4mW = 92,6mW ≈ 100mW</a:t>
+            </a:r>
+          </a:p>
+          <a:p>
+            <a:r>
+              <a:rPr lang="fr-CA" dirty="0"/>
+              <a:t>Donc avec une seule batterie, le microcontrôleur peut rester actif à pleine capacité pendant environ 115 heures.</a:t>
             </a:r>
           </a:p>
         </p:txBody>
@@ -6638,7 +6974,7 @@
     </p:spTree>
     <p:extLst>
       <p:ext uri="{BB962C8B-B14F-4D97-AF65-F5344CB8AC3E}">
-        <p14:creationId xmlns:p14="http://schemas.microsoft.com/office/powerpoint/2010/main" val="1401981087"/>
+        <p14:creationId xmlns:p14="http://schemas.microsoft.com/office/powerpoint/2010/main" val="1915502978"/>
       </p:ext>
     </p:extLst>
   </p:cSld>
@@ -6726,6 +7062,253 @@
           <a:bodyPr/>
           <a:lstStyle/>
           <a:p>
+            <a:r>
+              <a:rPr lang="fr-CA" b="1" dirty="0"/>
+              <a:t>MAPAQ:</a:t>
+            </a:r>
+            <a:r>
+              <a:rPr lang="fr-CA" dirty="0"/>
+              <a:t> Minimum 15 mètres de distance avec les routes publiques</a:t>
+            </a:r>
+          </a:p>
+          <a:p>
+            <a:r>
+              <a:rPr lang="fr-CA" b="1" dirty="0"/>
+              <a:t>Statistique Canada 2006:</a:t>
+            </a:r>
+            <a:r>
+              <a:rPr lang="fr-CA" dirty="0"/>
+              <a:t> Taille moyenne fermes canadiennes : 728 acres, soit environ 3 km</a:t>
+            </a:r>
+            <a:r>
+              <a:rPr lang="fr-CA" baseline="30000" dirty="0"/>
+              <a:t>2</a:t>
+            </a:r>
+            <a:r>
+              <a:rPr lang="fr-CA" dirty="0"/>
+              <a:t> </a:t>
+            </a:r>
+          </a:p>
+          <a:p>
+            <a:r>
+              <a:rPr lang="fr-CA" b="1" dirty="0"/>
+              <a:t>Agriculture Québec:</a:t>
+            </a:r>
+            <a:r>
+              <a:rPr lang="fr-CA" dirty="0"/>
+              <a:t> Distance entre les ruchers 3 à 4 kilomètres</a:t>
+            </a:r>
+            <a:endParaRPr lang="fr-CA" b="1" dirty="0"/>
+          </a:p>
+        </p:txBody>
+      </p:sp>
+    </p:spTree>
+    <p:extLst>
+      <p:ext uri="{BB962C8B-B14F-4D97-AF65-F5344CB8AC3E}">
+        <p14:creationId xmlns:p14="http://schemas.microsoft.com/office/powerpoint/2010/main" val="4212196005"/>
+      </p:ext>
+    </p:extLst>
+  </p:cSld>
+  <p:clrMapOvr>
+    <a:masterClrMapping/>
+  </p:clrMapOvr>
+</p:sld>
+</file>
+
+<file path=ppt/slides/slide13.xml><?xml version="1.0" encoding="utf-8"?>
+<p:sld xmlns:a="http://schemas.openxmlformats.org/drawingml/2006/main" xmlns:r="http://schemas.openxmlformats.org/officeDocument/2006/relationships" xmlns:p="http://schemas.openxmlformats.org/presentationml/2006/main">
+  <p:cSld>
+    <p:spTree>
+      <p:nvGrpSpPr>
+        <p:cNvPr id="1" name=""/>
+        <p:cNvGrpSpPr/>
+        <p:nvPr/>
+      </p:nvGrpSpPr>
+      <p:grpSpPr>
+        <a:xfrm>
+          <a:off x="0" y="0"/>
+          <a:ext cx="0" cy="0"/>
+          <a:chOff x="0" y="0"/>
+          <a:chExt cx="0" cy="0"/>
+        </a:xfrm>
+      </p:grpSpPr>
+      <p:sp>
+        <p:nvSpPr>
+          <p:cNvPr id="2" name="Title 1">
+            <a:extLst>
+              <a:ext uri="{FF2B5EF4-FFF2-40B4-BE49-F238E27FC236}">
+                <a16:creationId xmlns:a16="http://schemas.microsoft.com/office/drawing/2014/main" id="{9381268A-48C6-4A90-B60F-BAEE9120674D}"/>
+              </a:ext>
+            </a:extLst>
+          </p:cNvPr>
+          <p:cNvSpPr>
+            <a:spLocks noGrp="1"/>
+          </p:cNvSpPr>
+          <p:nvPr>
+            <p:ph type="title"/>
+          </p:nvPr>
+        </p:nvSpPr>
+        <p:spPr/>
+        <p:txBody>
+          <a:bodyPr/>
+          <a:lstStyle/>
+          <a:p>
+            <a:r>
+              <a:rPr lang="en-CA" dirty="0" err="1"/>
+              <a:t>Requis</a:t>
+            </a:r>
+            <a:r>
+              <a:rPr lang="en-CA" dirty="0"/>
+              <a:t> au </a:t>
+            </a:r>
+            <a:r>
+              <a:rPr lang="en-CA" dirty="0" err="1"/>
+              <a:t>niveau</a:t>
+            </a:r>
+            <a:r>
+              <a:rPr lang="en-CA" dirty="0"/>
+              <a:t> RF</a:t>
+            </a:r>
+          </a:p>
+        </p:txBody>
+      </p:sp>
+      <p:sp>
+        <p:nvSpPr>
+          <p:cNvPr id="3" name="Content Placeholder 2">
+            <a:extLst>
+              <a:ext uri="{FF2B5EF4-FFF2-40B4-BE49-F238E27FC236}">
+                <a16:creationId xmlns:a16="http://schemas.microsoft.com/office/drawing/2014/main" id="{17427B92-1811-464E-801C-5EE29A5B8D36}"/>
+              </a:ext>
+            </a:extLst>
+          </p:cNvPr>
+          <p:cNvSpPr>
+            <a:spLocks noGrp="1"/>
+          </p:cNvSpPr>
+          <p:nvPr>
+            <p:ph idx="1"/>
+          </p:nvPr>
+        </p:nvSpPr>
+        <p:spPr/>
+        <p:txBody>
+          <a:bodyPr/>
+          <a:lstStyle/>
+          <a:p>
+            <a:r>
+              <a:rPr lang="fr-CA" dirty="0"/>
+              <a:t>Demande de données température/poids: À chaque minute</a:t>
+            </a:r>
+          </a:p>
+          <a:p>
+            <a:r>
+              <a:rPr lang="fr-CA" dirty="0"/>
+              <a:t>Demande de données GPS: Une fois par jour</a:t>
+            </a:r>
+          </a:p>
+          <a:p>
+            <a:r>
+              <a:rPr lang="fr-CA" dirty="0"/>
+              <a:t>Demandes manuelles de tous les capteurs</a:t>
+            </a:r>
+          </a:p>
+          <a:p>
+            <a:r>
+              <a:rPr lang="fr-CA" dirty="0"/>
+              <a:t>Bande de fréquence utilisée: 2,4GHz</a:t>
+            </a:r>
+          </a:p>
+        </p:txBody>
+      </p:sp>
+    </p:spTree>
+    <p:extLst>
+      <p:ext uri="{BB962C8B-B14F-4D97-AF65-F5344CB8AC3E}">
+        <p14:creationId xmlns:p14="http://schemas.microsoft.com/office/powerpoint/2010/main" val="1401981087"/>
+      </p:ext>
+    </p:extLst>
+  </p:cSld>
+  <p:clrMapOvr>
+    <a:masterClrMapping/>
+  </p:clrMapOvr>
+</p:sld>
+</file>
+
+<file path=ppt/slides/slide14.xml><?xml version="1.0" encoding="utf-8"?>
+<p:sld xmlns:a="http://schemas.openxmlformats.org/drawingml/2006/main" xmlns:r="http://schemas.openxmlformats.org/officeDocument/2006/relationships" xmlns:p="http://schemas.openxmlformats.org/presentationml/2006/main">
+  <p:cSld>
+    <p:spTree>
+      <p:nvGrpSpPr>
+        <p:cNvPr id="1" name=""/>
+        <p:cNvGrpSpPr/>
+        <p:nvPr/>
+      </p:nvGrpSpPr>
+      <p:grpSpPr>
+        <a:xfrm>
+          <a:off x="0" y="0"/>
+          <a:ext cx="0" cy="0"/>
+          <a:chOff x="0" y="0"/>
+          <a:chExt cx="0" cy="0"/>
+        </a:xfrm>
+      </p:grpSpPr>
+      <p:sp>
+        <p:nvSpPr>
+          <p:cNvPr id="2" name="Title 1">
+            <a:extLst>
+              <a:ext uri="{FF2B5EF4-FFF2-40B4-BE49-F238E27FC236}">
+                <a16:creationId xmlns:a16="http://schemas.microsoft.com/office/drawing/2014/main" id="{9381268A-48C6-4A90-B60F-BAEE9120674D}"/>
+              </a:ext>
+            </a:extLst>
+          </p:cNvPr>
+          <p:cNvSpPr>
+            <a:spLocks noGrp="1"/>
+          </p:cNvSpPr>
+          <p:nvPr>
+            <p:ph type="title"/>
+          </p:nvPr>
+        </p:nvSpPr>
+        <p:spPr/>
+        <p:txBody>
+          <a:bodyPr/>
+          <a:lstStyle/>
+          <a:p>
+            <a:r>
+              <a:rPr lang="en-CA" dirty="0" err="1"/>
+              <a:t>Requis</a:t>
+            </a:r>
+            <a:r>
+              <a:rPr lang="en-CA" dirty="0"/>
+              <a:t> au </a:t>
+            </a:r>
+            <a:r>
+              <a:rPr lang="en-CA" dirty="0" err="1"/>
+              <a:t>niveau</a:t>
+            </a:r>
+            <a:r>
+              <a:rPr lang="en-CA" dirty="0"/>
+              <a:t> RF</a:t>
+            </a:r>
+          </a:p>
+        </p:txBody>
+      </p:sp>
+      <p:sp>
+        <p:nvSpPr>
+          <p:cNvPr id="3" name="Content Placeholder 2">
+            <a:extLst>
+              <a:ext uri="{FF2B5EF4-FFF2-40B4-BE49-F238E27FC236}">
+                <a16:creationId xmlns:a16="http://schemas.microsoft.com/office/drawing/2014/main" id="{17427B92-1811-464E-801C-5EE29A5B8D36}"/>
+              </a:ext>
+            </a:extLst>
+          </p:cNvPr>
+          <p:cNvSpPr>
+            <a:spLocks noGrp="1"/>
+          </p:cNvSpPr>
+          <p:nvPr>
+            <p:ph idx="1"/>
+          </p:nvPr>
+        </p:nvSpPr>
+        <p:spPr/>
+        <p:txBody>
+          <a:bodyPr/>
+          <a:lstStyle/>
+          <a:p>
             <a:pPr marL="0" indent="0">
               <a:buNone/>
             </a:pPr>
@@ -6803,7 +7386,7 @@
 </p:sld>
 </file>
 
-<file path=ppt/slides/slide13.xml><?xml version="1.0" encoding="utf-8"?>
+<file path=ppt/slides/slide15.xml><?xml version="1.0" encoding="utf-8"?>
 <p:sld xmlns:a="http://schemas.openxmlformats.org/drawingml/2006/main" xmlns:r="http://schemas.openxmlformats.org/officeDocument/2006/relationships" xmlns:p="http://schemas.openxmlformats.org/presentationml/2006/main">
   <p:cSld>
     <p:spTree>
@@ -7372,7 +7955,7 @@
 </p:sld>
 </file>
 
-<file path=ppt/slides/slide14.xml><?xml version="1.0" encoding="utf-8"?>
+<file path=ppt/slides/slide16.xml><?xml version="1.0" encoding="utf-8"?>
 <p:sld xmlns:a="http://schemas.openxmlformats.org/drawingml/2006/main" xmlns:r="http://schemas.openxmlformats.org/officeDocument/2006/relationships" xmlns:p="http://schemas.openxmlformats.org/presentationml/2006/main">
   <p:cSld>
     <p:spTree>
@@ -7731,7 +8314,7 @@
 </p:sld>
 </file>
 
-<file path=ppt/slides/slide15.xml><?xml version="1.0" encoding="utf-8"?>
+<file path=ppt/slides/slide17.xml><?xml version="1.0" encoding="utf-8"?>
 <p:sld xmlns:a="http://schemas.openxmlformats.org/drawingml/2006/main" xmlns:r="http://schemas.openxmlformats.org/officeDocument/2006/relationships" xmlns:p="http://schemas.openxmlformats.org/presentationml/2006/main">
   <p:cSld>
     <p:spTree>
@@ -7923,7 +8506,7 @@
 </p:sld>
 </file>
 
-<file path=ppt/slides/slide16.xml><?xml version="1.0" encoding="utf-8"?>
+<file path=ppt/slides/slide18.xml><?xml version="1.0" encoding="utf-8"?>
 <p:sld xmlns:a="http://schemas.openxmlformats.org/drawingml/2006/main" xmlns:r="http://schemas.openxmlformats.org/officeDocument/2006/relationships" xmlns:p="http://schemas.openxmlformats.org/presentationml/2006/main">
   <p:cSld>
     <p:spTree>
@@ -8205,7 +8788,7 @@
 </p:sld>
 </file>
 
-<file path=ppt/slides/slide17.xml><?xml version="1.0" encoding="utf-8"?>
+<file path=ppt/slides/slide19.xml><?xml version="1.0" encoding="utf-8"?>
 <p:sld xmlns:a="http://schemas.openxmlformats.org/drawingml/2006/main" xmlns:r="http://schemas.openxmlformats.org/officeDocument/2006/relationships" xmlns:p="http://schemas.openxmlformats.org/presentationml/2006/main">
   <p:cSld>
     <p:spTree>
@@ -8407,7 +8990,238 @@
 </p:sld>
 </file>
 
-<file path=ppt/slides/slide18.xml><?xml version="1.0" encoding="utf-8"?>
+<file path=ppt/slides/slide2.xml><?xml version="1.0" encoding="utf-8"?>
+<p:sld xmlns:a="http://schemas.openxmlformats.org/drawingml/2006/main" xmlns:r="http://schemas.openxmlformats.org/officeDocument/2006/relationships" xmlns:p="http://schemas.openxmlformats.org/presentationml/2006/main">
+  <p:cSld>
+    <p:spTree>
+      <p:nvGrpSpPr>
+        <p:cNvPr id="1" name=""/>
+        <p:cNvGrpSpPr/>
+        <p:nvPr/>
+      </p:nvGrpSpPr>
+      <p:grpSpPr>
+        <a:xfrm>
+          <a:off x="0" y="0"/>
+          <a:ext cx="0" cy="0"/>
+          <a:chOff x="0" y="0"/>
+          <a:chExt cx="0" cy="0"/>
+        </a:xfrm>
+      </p:grpSpPr>
+      <p:sp>
+        <p:nvSpPr>
+          <p:cNvPr id="2" name="Title 1">
+            <a:extLst>
+              <a:ext uri="{FF2B5EF4-FFF2-40B4-BE49-F238E27FC236}">
+                <a16:creationId xmlns:a16="http://schemas.microsoft.com/office/drawing/2014/main" id="{95A4B020-4078-42AE-9D8B-DD88078B584A}"/>
+              </a:ext>
+            </a:extLst>
+          </p:cNvPr>
+          <p:cNvSpPr>
+            <a:spLocks noGrp="1"/>
+          </p:cNvSpPr>
+          <p:nvPr>
+            <p:ph type="title"/>
+          </p:nvPr>
+        </p:nvSpPr>
+        <p:spPr/>
+        <p:txBody>
+          <a:bodyPr/>
+          <a:lstStyle/>
+          <a:p>
+            <a:r>
+              <a:rPr lang="en-CA" dirty="0"/>
+              <a:t>Justification du </a:t>
+            </a:r>
+            <a:r>
+              <a:rPr lang="en-CA" dirty="0" err="1"/>
+              <a:t>besoin</a:t>
+            </a:r>
+            <a:r>
+              <a:rPr lang="en-CA" dirty="0"/>
+              <a:t>, </a:t>
+            </a:r>
+            <a:r>
+              <a:rPr lang="en-CA" dirty="0" err="1"/>
+              <a:t>contexte</a:t>
+            </a:r>
+            <a:r>
+              <a:rPr lang="en-CA" dirty="0"/>
+              <a:t> du </a:t>
+            </a:r>
+            <a:r>
+              <a:rPr lang="en-CA" dirty="0" err="1"/>
+              <a:t>projet</a:t>
+            </a:r>
+            <a:r>
+              <a:rPr lang="en-CA" dirty="0"/>
+              <a:t> et du </a:t>
+            </a:r>
+            <a:r>
+              <a:rPr lang="en-CA" dirty="0" err="1"/>
+              <a:t>marché</a:t>
+            </a:r>
+            <a:endParaRPr lang="en-CA" dirty="0"/>
+          </a:p>
+        </p:txBody>
+      </p:sp>
+      <p:sp>
+        <p:nvSpPr>
+          <p:cNvPr id="3" name="Content Placeholder 2">
+            <a:extLst>
+              <a:ext uri="{FF2B5EF4-FFF2-40B4-BE49-F238E27FC236}">
+                <a16:creationId xmlns:a16="http://schemas.microsoft.com/office/drawing/2014/main" id="{163954D6-EF9A-4BE0-8664-F71C1CE7E468}"/>
+              </a:ext>
+            </a:extLst>
+          </p:cNvPr>
+          <p:cNvSpPr>
+            <a:spLocks noGrp="1"/>
+          </p:cNvSpPr>
+          <p:nvPr>
+            <p:ph idx="1"/>
+          </p:nvPr>
+        </p:nvSpPr>
+        <p:spPr/>
+        <p:txBody>
+          <a:bodyPr/>
+          <a:lstStyle/>
+          <a:p>
+            <a:r>
+              <a:rPr lang="en-CA" dirty="0"/>
+              <a:t>Population des </a:t>
+            </a:r>
+            <a:r>
+              <a:rPr lang="en-CA" dirty="0" err="1"/>
+              <a:t>abeilles</a:t>
+            </a:r>
+            <a:r>
+              <a:rPr lang="en-CA" dirty="0"/>
+              <a:t> </a:t>
+            </a:r>
+            <a:r>
+              <a:rPr lang="en-CA" dirty="0" err="1"/>
+              <a:t>en</a:t>
+            </a:r>
+            <a:r>
+              <a:rPr lang="en-CA" dirty="0"/>
+              <a:t> </a:t>
+            </a:r>
+            <a:r>
+              <a:rPr lang="en-CA" dirty="0" err="1"/>
+              <a:t>déclin</a:t>
+            </a:r>
+            <a:endParaRPr lang="en-CA" dirty="0"/>
+          </a:p>
+          <a:p>
+            <a:pPr lvl="1"/>
+            <a:r>
+              <a:rPr lang="en-CA" dirty="0" err="1"/>
+              <a:t>Inventaire</a:t>
+            </a:r>
+            <a:r>
+              <a:rPr lang="en-CA" dirty="0"/>
+              <a:t> de 48000 </a:t>
+            </a:r>
+            <a:r>
+              <a:rPr lang="en-CA" dirty="0" err="1"/>
+              <a:t>ruches</a:t>
+            </a:r>
+            <a:r>
+              <a:rPr lang="en-CA" dirty="0"/>
+              <a:t> au Québec </a:t>
+            </a:r>
+            <a:r>
+              <a:rPr lang="en-CA" dirty="0" err="1"/>
+              <a:t>en</a:t>
+            </a:r>
+            <a:r>
+              <a:rPr lang="en-CA" dirty="0"/>
+              <a:t> 2016</a:t>
+            </a:r>
+          </a:p>
+          <a:p>
+            <a:pPr lvl="1"/>
+            <a:r>
+              <a:rPr lang="en-CA" dirty="0"/>
+              <a:t>Estimation des </a:t>
+            </a:r>
+            <a:r>
+              <a:rPr lang="en-CA" dirty="0" err="1"/>
+              <a:t>pertes</a:t>
+            </a:r>
+            <a:r>
+              <a:rPr lang="en-CA" dirty="0"/>
+              <a:t> </a:t>
+            </a:r>
+            <a:r>
+              <a:rPr lang="en-CA" dirty="0" err="1"/>
+              <a:t>annuelles</a:t>
+            </a:r>
+            <a:r>
+              <a:rPr lang="en-CA" dirty="0"/>
+              <a:t>: 16% </a:t>
+            </a:r>
+            <a:r>
+              <a:rPr lang="en-CA" dirty="0" err="1"/>
+              <a:t>en</a:t>
+            </a:r>
+            <a:r>
+              <a:rPr lang="en-CA" dirty="0"/>
+              <a:t> 2016, 21% </a:t>
+            </a:r>
+            <a:r>
+              <a:rPr lang="en-CA" dirty="0" err="1"/>
+              <a:t>en</a:t>
+            </a:r>
+            <a:r>
+              <a:rPr lang="en-CA" dirty="0"/>
+              <a:t> 2017, 50% </a:t>
+            </a:r>
+            <a:r>
+              <a:rPr lang="en-CA" dirty="0" err="1"/>
+              <a:t>en</a:t>
+            </a:r>
+            <a:r>
+              <a:rPr lang="en-CA" dirty="0"/>
+              <a:t> 2018</a:t>
+            </a:r>
+          </a:p>
+          <a:p>
+            <a:pPr lvl="1"/>
+            <a:endParaRPr lang="en-CA" dirty="0"/>
+          </a:p>
+          <a:p>
+            <a:r>
+              <a:rPr lang="en-CA" dirty="0"/>
+              <a:t>Point B.7 du rapport perspectives STS</a:t>
+            </a:r>
+          </a:p>
+          <a:p>
+            <a:pPr lvl="1"/>
+            <a:r>
+              <a:rPr lang="fr-CA" dirty="0"/>
+              <a:t>Environnement et ressources (exploiter plus efficacement les ressources naturelles)</a:t>
+            </a:r>
+            <a:endParaRPr lang="en-CA" dirty="0"/>
+          </a:p>
+          <a:p>
+            <a:endParaRPr lang="en-CA" dirty="0"/>
+          </a:p>
+        </p:txBody>
+      </p:sp>
+    </p:spTree>
+    <p:extLst>
+      <p:ext uri="{BB962C8B-B14F-4D97-AF65-F5344CB8AC3E}">
+        <p14:creationId xmlns:p14="http://schemas.microsoft.com/office/powerpoint/2010/main" val="2308399550"/>
+      </p:ext>
+    </p:extLst>
+  </p:cSld>
+  <p:clrMapOvr>
+    <a:masterClrMapping/>
+  </p:clrMapOvr>
+</p:sld>
+</file>
+
+<file path=ppt/slides/slide20.xml><?xml version="1.0" encoding="utf-8"?>
 <p:sld xmlns:a="http://schemas.openxmlformats.org/drawingml/2006/main" xmlns:r="http://schemas.openxmlformats.org/officeDocument/2006/relationships" xmlns:p="http://schemas.openxmlformats.org/presentationml/2006/main">
   <p:cSld>
     <p:spTree>
@@ -8598,7 +9412,7 @@
 </p:sld>
 </file>
 
-<file path=ppt/slides/slide2.xml><?xml version="1.0" encoding="utf-8"?>
+<file path=ppt/slides/slide3.xml><?xml version="1.0" encoding="utf-8"?>
 <p:sld xmlns:a="http://schemas.openxmlformats.org/drawingml/2006/main" xmlns:r="http://schemas.openxmlformats.org/officeDocument/2006/relationships" xmlns:p="http://schemas.openxmlformats.org/presentationml/2006/main">
   <p:cSld>
     <p:spTree>
@@ -8620,7 +9434,7 @@
           <p:cNvPr id="2" name="Title 1">
             <a:extLst>
               <a:ext uri="{FF2B5EF4-FFF2-40B4-BE49-F238E27FC236}">
-                <a16:creationId xmlns:a16="http://schemas.microsoft.com/office/drawing/2014/main" id="{95A4B020-4078-42AE-9D8B-DD88078B584A}"/>
+                <a16:creationId xmlns:a16="http://schemas.microsoft.com/office/drawing/2014/main" id="{AC488235-21A7-4394-B423-8B73E3180FD2}"/>
               </a:ext>
             </a:extLst>
           </p:cNvPr>
@@ -8668,7 +9482,7 @@
               <a:rPr lang="en-CA" dirty="0" err="1"/>
               <a:t>marché</a:t>
             </a:r>
-            <a:endParaRPr lang="en-CA" dirty="0"/>
+            <a:endParaRPr lang="fr-CA" dirty="0"/>
           </a:p>
         </p:txBody>
       </p:sp>
@@ -8677,7 +9491,7 @@
           <p:cNvPr id="3" name="Content Placeholder 2">
             <a:extLst>
               <a:ext uri="{FF2B5EF4-FFF2-40B4-BE49-F238E27FC236}">
-                <a16:creationId xmlns:a16="http://schemas.microsoft.com/office/drawing/2014/main" id="{163954D6-EF9A-4BE0-8664-F71C1CE7E468}"/>
+                <a16:creationId xmlns:a16="http://schemas.microsoft.com/office/drawing/2014/main" id="{C91FBEB4-069D-4904-A523-5B4E122DE42C}"/>
               </a:ext>
             </a:extLst>
           </p:cNvPr>
@@ -8690,17 +9504,222 @@
         </p:nvSpPr>
         <p:spPr/>
         <p:txBody>
-          <a:bodyPr/>
+          <a:bodyPr>
+            <a:normAutofit fontScale="92500" lnSpcReduction="20000"/>
+          </a:bodyPr>
           <a:lstStyle/>
           <a:p>
-            <a:endParaRPr lang="en-CA"/>
+            <a:r>
+              <a:rPr lang="en-CA" dirty="0"/>
+              <a:t>Poid</a:t>
+            </a:r>
+            <a:r>
+              <a:rPr lang="en-CA" dirty="0" err="1"/>
+              <a:t>s</a:t>
+            </a:r>
+            <a:endParaRPr lang="en-CA" dirty="0"/>
+          </a:p>
+          <a:p>
+            <a:pPr lvl="1"/>
+            <a:r>
+              <a:rPr lang="en-CA" dirty="0"/>
+              <a:t>Indication de </a:t>
+            </a:r>
+            <a:r>
+              <a:rPr lang="en-CA" dirty="0" err="1"/>
+              <a:t>l’état</a:t>
+            </a:r>
+            <a:r>
+              <a:rPr lang="en-CA" dirty="0"/>
+              <a:t> de santé </a:t>
+            </a:r>
+            <a:r>
+              <a:rPr lang="en-CA" dirty="0" err="1"/>
+              <a:t>général</a:t>
+            </a:r>
+            <a:r>
+              <a:rPr lang="en-CA" dirty="0"/>
+              <a:t> de la </a:t>
+            </a:r>
+            <a:r>
+              <a:rPr lang="en-CA" dirty="0" err="1"/>
+              <a:t>colonie</a:t>
+            </a:r>
+            <a:endParaRPr lang="en-CA" dirty="0"/>
+          </a:p>
+          <a:p>
+            <a:r>
+              <a:rPr lang="en-CA" dirty="0" err="1"/>
+              <a:t>Géolocation</a:t>
+            </a:r>
+            <a:endParaRPr lang="en-CA" dirty="0"/>
+          </a:p>
+          <a:p>
+            <a:pPr lvl="1"/>
+            <a:r>
+              <a:rPr lang="en-CA" dirty="0"/>
+              <a:t>Utile pour les </a:t>
+            </a:r>
+            <a:r>
+              <a:rPr lang="en-CA" dirty="0" err="1"/>
+              <a:t>fermes</a:t>
+            </a:r>
+            <a:r>
+              <a:rPr lang="en-CA" dirty="0"/>
+              <a:t> </a:t>
+            </a:r>
+            <a:r>
+              <a:rPr lang="en-CA" dirty="0" err="1"/>
+              <a:t>apicoles</a:t>
+            </a:r>
+            <a:endParaRPr lang="en-CA" dirty="0"/>
+          </a:p>
+          <a:p>
+            <a:pPr lvl="1"/>
+            <a:r>
+              <a:rPr lang="en-CA" dirty="0" err="1"/>
+              <a:t>Organismes</a:t>
+            </a:r>
+            <a:r>
+              <a:rPr lang="en-CA" dirty="0"/>
+              <a:t> </a:t>
+            </a:r>
+            <a:r>
+              <a:rPr lang="en-CA" dirty="0" err="1"/>
+              <a:t>comme</a:t>
+            </a:r>
+            <a:r>
+              <a:rPr lang="en-CA" dirty="0"/>
+              <a:t> le MAPAQ qui font </a:t>
+            </a:r>
+            <a:r>
+              <a:rPr lang="en-CA" dirty="0" err="1"/>
+              <a:t>l’inventaire</a:t>
+            </a:r>
+            <a:r>
+              <a:rPr lang="en-CA" dirty="0"/>
+              <a:t> du </a:t>
+            </a:r>
+            <a:r>
+              <a:rPr lang="en-CA" dirty="0" err="1"/>
+              <a:t>cheptel</a:t>
+            </a:r>
+            <a:r>
+              <a:rPr lang="en-CA" dirty="0"/>
+              <a:t> </a:t>
+            </a:r>
+            <a:r>
+              <a:rPr lang="en-CA" dirty="0" err="1"/>
+              <a:t>apicol</a:t>
+            </a:r>
+            <a:endParaRPr lang="en-CA" dirty="0"/>
+          </a:p>
+          <a:p>
+            <a:r>
+              <a:rPr lang="en-CA" dirty="0" err="1"/>
+              <a:t>Température</a:t>
+            </a:r>
+            <a:endParaRPr lang="en-CA" dirty="0"/>
+          </a:p>
+          <a:p>
+            <a:pPr lvl="1"/>
+            <a:r>
+              <a:rPr lang="en-CA" dirty="0" err="1"/>
+              <a:t>Larves</a:t>
+            </a:r>
+            <a:r>
+              <a:rPr lang="en-CA" dirty="0"/>
+              <a:t> se </a:t>
+            </a:r>
+            <a:r>
+              <a:rPr lang="en-CA" dirty="0" err="1"/>
+              <a:t>développent</a:t>
+            </a:r>
+            <a:r>
+              <a:rPr lang="en-CA" dirty="0"/>
+              <a:t> à </a:t>
+            </a:r>
+            <a:r>
+              <a:rPr lang="en-CA" dirty="0" err="1"/>
+              <a:t>une</a:t>
+            </a:r>
+            <a:r>
+              <a:rPr lang="en-CA" dirty="0"/>
+              <a:t> temperature </a:t>
+            </a:r>
+            <a:r>
+              <a:rPr lang="en-CA" dirty="0" err="1"/>
+              <a:t>maximale</a:t>
+            </a:r>
+            <a:r>
+              <a:rPr lang="en-CA" dirty="0"/>
+              <a:t> de 35˚C</a:t>
+            </a:r>
+          </a:p>
+          <a:p>
+            <a:pPr lvl="1"/>
+            <a:r>
+              <a:rPr lang="en-CA" dirty="0" err="1"/>
+              <a:t>Température</a:t>
+            </a:r>
+            <a:r>
+              <a:rPr lang="en-CA" dirty="0"/>
+              <a:t> </a:t>
+            </a:r>
+            <a:r>
+              <a:rPr lang="en-CA" dirty="0" err="1"/>
+              <a:t>peut</a:t>
+            </a:r>
+            <a:r>
+              <a:rPr lang="en-CA" dirty="0"/>
+              <a:t> </a:t>
+            </a:r>
+            <a:r>
+              <a:rPr lang="en-CA" dirty="0" err="1"/>
+              <a:t>être</a:t>
+            </a:r>
+            <a:r>
+              <a:rPr lang="en-CA" dirty="0"/>
+              <a:t> </a:t>
+            </a:r>
+            <a:r>
+              <a:rPr lang="en-CA" dirty="0" err="1"/>
+              <a:t>utilisée</a:t>
+            </a:r>
+            <a:r>
+              <a:rPr lang="en-CA" dirty="0"/>
+              <a:t> pour </a:t>
+            </a:r>
+            <a:r>
+              <a:rPr lang="en-CA" dirty="0" err="1"/>
+              <a:t>purger</a:t>
+            </a:r>
+            <a:r>
+              <a:rPr lang="en-CA" dirty="0"/>
+              <a:t> la </a:t>
+            </a:r>
+            <a:r>
+              <a:rPr lang="en-CA" dirty="0" err="1"/>
+              <a:t>ruche</a:t>
+            </a:r>
+            <a:r>
+              <a:rPr lang="en-CA" dirty="0"/>
+              <a:t> de parasites (varroas)</a:t>
+            </a:r>
+          </a:p>
+          <a:p>
+            <a:pPr lvl="1"/>
+            <a:endParaRPr lang="en-CA" dirty="0"/>
+          </a:p>
+          <a:p>
+            <a:endParaRPr lang="fr-CA" dirty="0"/>
           </a:p>
         </p:txBody>
       </p:sp>
     </p:spTree>
     <p:extLst>
       <p:ext uri="{BB962C8B-B14F-4D97-AF65-F5344CB8AC3E}">
-        <p14:creationId xmlns:p14="http://schemas.microsoft.com/office/powerpoint/2010/main" val="3338256800"/>
+        <p14:creationId xmlns:p14="http://schemas.microsoft.com/office/powerpoint/2010/main" val="1425721085"/>
       </p:ext>
     </p:extLst>
   </p:cSld>
@@ -8710,7 +9729,222 @@
 </p:sld>
 </file>
 
-<file path=ppt/slides/slide3.xml><?xml version="1.0" encoding="utf-8"?>
+<file path=ppt/slides/slide4.xml><?xml version="1.0" encoding="utf-8"?>
+<p:sld xmlns:a="http://schemas.openxmlformats.org/drawingml/2006/main" xmlns:r="http://schemas.openxmlformats.org/officeDocument/2006/relationships" xmlns:p="http://schemas.openxmlformats.org/presentationml/2006/main">
+  <p:cSld>
+    <p:spTree>
+      <p:nvGrpSpPr>
+        <p:cNvPr id="1" name=""/>
+        <p:cNvGrpSpPr/>
+        <p:nvPr/>
+      </p:nvGrpSpPr>
+      <p:grpSpPr>
+        <a:xfrm>
+          <a:off x="0" y="0"/>
+          <a:ext cx="0" cy="0"/>
+          <a:chOff x="0" y="0"/>
+          <a:chExt cx="0" cy="0"/>
+        </a:xfrm>
+      </p:grpSpPr>
+      <p:sp>
+        <p:nvSpPr>
+          <p:cNvPr id="2" name="Title 1">
+            <a:extLst>
+              <a:ext uri="{FF2B5EF4-FFF2-40B4-BE49-F238E27FC236}">
+                <a16:creationId xmlns:a16="http://schemas.microsoft.com/office/drawing/2014/main" id="{AC488235-21A7-4394-B423-8B73E3180FD2}"/>
+              </a:ext>
+            </a:extLst>
+          </p:cNvPr>
+          <p:cNvSpPr>
+            <a:spLocks noGrp="1"/>
+          </p:cNvSpPr>
+          <p:nvPr>
+            <p:ph type="title"/>
+          </p:nvPr>
+        </p:nvSpPr>
+        <p:spPr/>
+        <p:txBody>
+          <a:bodyPr/>
+          <a:lstStyle/>
+          <a:p>
+            <a:r>
+              <a:rPr lang="en-CA" dirty="0"/>
+              <a:t>Justification du </a:t>
+            </a:r>
+            <a:r>
+              <a:rPr lang="en-CA" dirty="0" err="1"/>
+              <a:t>besoin</a:t>
+            </a:r>
+            <a:r>
+              <a:rPr lang="en-CA" dirty="0"/>
+              <a:t>, </a:t>
+            </a:r>
+            <a:r>
+              <a:rPr lang="en-CA" dirty="0" err="1"/>
+              <a:t>contexte</a:t>
+            </a:r>
+            <a:r>
+              <a:rPr lang="en-CA" dirty="0"/>
+              <a:t> du </a:t>
+            </a:r>
+            <a:r>
+              <a:rPr lang="en-CA" dirty="0" err="1"/>
+              <a:t>projet</a:t>
+            </a:r>
+            <a:r>
+              <a:rPr lang="en-CA" dirty="0"/>
+              <a:t> et du </a:t>
+            </a:r>
+            <a:r>
+              <a:rPr lang="en-CA" dirty="0" err="1"/>
+              <a:t>marché</a:t>
+            </a:r>
+            <a:endParaRPr lang="fr-CA" dirty="0"/>
+          </a:p>
+        </p:txBody>
+      </p:sp>
+      <p:sp>
+        <p:nvSpPr>
+          <p:cNvPr id="3" name="Content Placeholder 2">
+            <a:extLst>
+              <a:ext uri="{FF2B5EF4-FFF2-40B4-BE49-F238E27FC236}">
+                <a16:creationId xmlns:a16="http://schemas.microsoft.com/office/drawing/2014/main" id="{C91FBEB4-069D-4904-A523-5B4E122DE42C}"/>
+              </a:ext>
+            </a:extLst>
+          </p:cNvPr>
+          <p:cNvSpPr>
+            <a:spLocks noGrp="1"/>
+          </p:cNvSpPr>
+          <p:nvPr>
+            <p:ph idx="1"/>
+          </p:nvPr>
+        </p:nvSpPr>
+        <p:spPr/>
+        <p:txBody>
+          <a:bodyPr>
+            <a:normAutofit/>
+          </a:bodyPr>
+          <a:lstStyle/>
+          <a:p>
+            <a:r>
+              <a:rPr lang="en-CA" dirty="0" err="1"/>
+              <a:t>Compétiteurs</a:t>
+            </a:r>
+            <a:endParaRPr lang="en-CA" dirty="0"/>
+          </a:p>
+          <a:p>
+            <a:pPr lvl="1"/>
+            <a:r>
+              <a:rPr lang="en-CA" dirty="0"/>
+              <a:t>Hive-Tech, Nectar, </a:t>
+            </a:r>
+            <a:r>
+              <a:rPr lang="en-CA" dirty="0" err="1"/>
+              <a:t>BuzzBox</a:t>
+            </a:r>
+            <a:endParaRPr lang="en-CA" dirty="0"/>
+          </a:p>
+          <a:p>
+            <a:pPr lvl="1"/>
+            <a:r>
+              <a:rPr lang="en-CA" dirty="0" err="1"/>
+              <a:t>Offrent</a:t>
+            </a:r>
+            <a:r>
+              <a:rPr lang="en-CA" dirty="0"/>
+              <a:t> </a:t>
+            </a:r>
+            <a:r>
+              <a:rPr lang="en-CA" dirty="0" err="1"/>
+              <a:t>certaines</a:t>
+            </a:r>
+            <a:r>
+              <a:rPr lang="en-CA" dirty="0"/>
+              <a:t> </a:t>
+            </a:r>
+            <a:r>
+              <a:rPr lang="en-CA" dirty="0" err="1"/>
+              <a:t>fonctionnalités</a:t>
+            </a:r>
+            <a:r>
+              <a:rPr lang="en-CA" dirty="0"/>
+              <a:t> </a:t>
+            </a:r>
+            <a:r>
+              <a:rPr lang="en-CA" dirty="0" err="1"/>
+              <a:t>supplémentaires</a:t>
+            </a:r>
+            <a:r>
+              <a:rPr lang="en-CA" dirty="0"/>
+              <a:t> (</a:t>
+            </a:r>
+            <a:r>
+              <a:rPr lang="en-CA" dirty="0" err="1"/>
+              <a:t>radiomètre</a:t>
+            </a:r>
+            <a:r>
+              <a:rPr lang="en-CA" dirty="0"/>
+              <a:t>, </a:t>
+            </a:r>
+            <a:r>
+              <a:rPr lang="en-CA" dirty="0" err="1"/>
+              <a:t>système</a:t>
+            </a:r>
+            <a:r>
+              <a:rPr lang="en-CA" dirty="0"/>
+              <a:t> </a:t>
+            </a:r>
+            <a:r>
+              <a:rPr lang="en-CA" dirty="0" err="1"/>
+              <a:t>centralisé</a:t>
+            </a:r>
+            <a:r>
+              <a:rPr lang="en-CA" dirty="0"/>
+              <a:t>)</a:t>
+            </a:r>
+          </a:p>
+          <a:p>
+            <a:r>
+              <a:rPr lang="en-CA" dirty="0" err="1"/>
+              <a:t>BeeWatch</a:t>
+            </a:r>
+            <a:endParaRPr lang="en-CA" dirty="0"/>
+          </a:p>
+          <a:p>
+            <a:pPr lvl="1"/>
+            <a:r>
+              <a:rPr lang="en-CA" dirty="0" err="1"/>
+              <a:t>Robustesse</a:t>
+            </a:r>
+            <a:r>
+              <a:rPr lang="en-CA" dirty="0"/>
+              <a:t> et </a:t>
+            </a:r>
+            <a:r>
+              <a:rPr lang="en-CA" dirty="0" err="1"/>
+              <a:t>abordabilité</a:t>
+            </a:r>
+            <a:endParaRPr lang="en-CA" dirty="0"/>
+          </a:p>
+          <a:p>
+            <a:endParaRPr lang="fr-CA" dirty="0"/>
+          </a:p>
+        </p:txBody>
+      </p:sp>
+    </p:spTree>
+    <p:extLst>
+      <p:ext uri="{BB962C8B-B14F-4D97-AF65-F5344CB8AC3E}">
+        <p14:creationId xmlns:p14="http://schemas.microsoft.com/office/powerpoint/2010/main" val="204444881"/>
+      </p:ext>
+    </p:extLst>
+  </p:cSld>
+  <p:clrMapOvr>
+    <a:masterClrMapping/>
+  </p:clrMapOvr>
+</p:sld>
+</file>
+
+<file path=ppt/slides/slide5.xml><?xml version="1.0" encoding="utf-8"?>
 <p:sld xmlns:a="http://schemas.openxmlformats.org/drawingml/2006/main" xmlns:r="http://schemas.openxmlformats.org/officeDocument/2006/relationships" xmlns:p="http://schemas.openxmlformats.org/presentationml/2006/main">
   <p:cSld>
     <p:spTree>
@@ -10210,7 +11444,7 @@
 </p:sld>
 </file>
 
-<file path=ppt/slides/slide4.xml><?xml version="1.0" encoding="utf-8"?>
+<file path=ppt/slides/slide6.xml><?xml version="1.0" encoding="utf-8"?>
 <p:sld xmlns:a="http://schemas.openxmlformats.org/drawingml/2006/main" xmlns:r="http://schemas.openxmlformats.org/officeDocument/2006/relationships" xmlns:p="http://schemas.openxmlformats.org/presentationml/2006/main">
   <p:cSld>
     <p:spTree>
@@ -11699,7 +12933,7 @@
 </p:sld>
 </file>
 
-<file path=ppt/slides/slide5.xml><?xml version="1.0" encoding="utf-8"?>
+<file path=ppt/slides/slide7.xml><?xml version="1.0" encoding="utf-8"?>
 <p:sld xmlns:a="http://schemas.openxmlformats.org/drawingml/2006/main" xmlns:r="http://schemas.openxmlformats.org/officeDocument/2006/relationships" xmlns:p="http://schemas.openxmlformats.org/presentationml/2006/main">
   <p:cSld>
     <p:spTree>
@@ -11803,7 +13037,7 @@
 </p:sld>
 </file>
 
-<file path=ppt/slides/slide6.xml><?xml version="1.0" encoding="utf-8"?>
+<file path=ppt/slides/slide8.xml><?xml version="1.0" encoding="utf-8"?>
 <p:sld xmlns:a="http://schemas.openxmlformats.org/drawingml/2006/main" xmlns:r="http://schemas.openxmlformats.org/officeDocument/2006/relationships" xmlns:p="http://schemas.openxmlformats.org/presentationml/2006/main">
   <p:cSld>
     <p:spTree>
@@ -11907,667 +13141,6 @@
 </p:sld>
 </file>
 
-<file path=ppt/slides/slide7.xml><?xml version="1.0" encoding="utf-8"?>
-<p:sld xmlns:a="http://schemas.openxmlformats.org/drawingml/2006/main" xmlns:r="http://schemas.openxmlformats.org/officeDocument/2006/relationships" xmlns:p="http://schemas.openxmlformats.org/presentationml/2006/main">
-  <p:cSld>
-    <p:spTree>
-      <p:nvGrpSpPr>
-        <p:cNvPr id="1" name=""/>
-        <p:cNvGrpSpPr/>
-        <p:nvPr/>
-      </p:nvGrpSpPr>
-      <p:grpSpPr>
-        <a:xfrm>
-          <a:off x="0" y="0"/>
-          <a:ext cx="0" cy="0"/>
-          <a:chOff x="0" y="0"/>
-          <a:chExt cx="0" cy="0"/>
-        </a:xfrm>
-      </p:grpSpPr>
-      <p:sp>
-        <p:nvSpPr>
-          <p:cNvPr id="2" name="Title 1">
-            <a:extLst>
-              <a:ext uri="{FF2B5EF4-FFF2-40B4-BE49-F238E27FC236}">
-                <a16:creationId xmlns:a16="http://schemas.microsoft.com/office/drawing/2014/main" id="{57AE6C2F-E93C-4A13-BFBF-2291D335938B}"/>
-              </a:ext>
-            </a:extLst>
-          </p:cNvPr>
-          <p:cNvSpPr>
-            <a:spLocks noGrp="1"/>
-          </p:cNvSpPr>
-          <p:nvPr>
-            <p:ph type="title"/>
-          </p:nvPr>
-        </p:nvSpPr>
-        <p:spPr>
-          <a:xfrm>
-            <a:off x="1484309" y="0"/>
-            <a:ext cx="10018713" cy="1752599"/>
-          </a:xfrm>
-        </p:spPr>
-        <p:txBody>
-          <a:bodyPr/>
-          <a:lstStyle/>
-          <a:p>
-            <a:r>
-              <a:rPr lang="en-CA" dirty="0"/>
-              <a:t>Architecture </a:t>
-            </a:r>
-            <a:r>
-              <a:rPr lang="en-CA" dirty="0" err="1"/>
-              <a:t>globale</a:t>
-            </a:r>
-            <a:endParaRPr lang="en-CA" dirty="0"/>
-          </a:p>
-        </p:txBody>
-      </p:sp>
-      <p:sp>
-        <p:nvSpPr>
-          <p:cNvPr id="4" name="Content Placeholder 2">
-            <a:extLst>
-              <a:ext uri="{FF2B5EF4-FFF2-40B4-BE49-F238E27FC236}">
-                <a16:creationId xmlns:a16="http://schemas.microsoft.com/office/drawing/2014/main" id="{0B4A7325-9DB0-46E8-89B3-80B528F4E836}"/>
-              </a:ext>
-            </a:extLst>
-          </p:cNvPr>
-          <p:cNvSpPr>
-            <a:spLocks noGrp="1"/>
-          </p:cNvSpPr>
-          <p:nvPr>
-            <p:ph idx="1"/>
-          </p:nvPr>
-        </p:nvSpPr>
-        <p:spPr>
-          <a:xfrm>
-            <a:off x="1484310" y="1752599"/>
-            <a:ext cx="10018713" cy="4038601"/>
-          </a:xfrm>
-        </p:spPr>
-        <p:txBody>
-          <a:bodyPr/>
-          <a:lstStyle/>
-          <a:p>
-            <a:r>
-              <a:rPr lang="en-CA" dirty="0"/>
-              <a:t>Communication sans-fil entre le </a:t>
-            </a:r>
-            <a:r>
-              <a:rPr lang="en-CA" dirty="0" err="1"/>
-              <a:t>système</a:t>
-            </a:r>
-            <a:r>
-              <a:rPr lang="en-CA" dirty="0"/>
-              <a:t> central et la </a:t>
-            </a:r>
-            <a:r>
-              <a:rPr lang="en-CA" dirty="0" err="1"/>
-              <a:t>ruche</a:t>
-            </a:r>
-            <a:endParaRPr lang="en-CA" dirty="0"/>
-          </a:p>
-          <a:p>
-            <a:endParaRPr lang="en-CA" dirty="0"/>
-          </a:p>
-          <a:p>
-            <a:r>
-              <a:rPr lang="en-CA" dirty="0" err="1"/>
-              <a:t>Capteurs</a:t>
-            </a:r>
-            <a:r>
-              <a:rPr lang="en-CA" dirty="0"/>
-              <a:t> </a:t>
-            </a:r>
-            <a:r>
-              <a:rPr lang="en-CA" dirty="0" err="1"/>
-              <a:t>permettant</a:t>
-            </a:r>
-            <a:r>
-              <a:rPr lang="en-CA" dirty="0"/>
-              <a:t> de </a:t>
-            </a:r>
-            <a:r>
-              <a:rPr lang="en-CA" dirty="0" err="1"/>
-              <a:t>connaître</a:t>
-            </a:r>
-            <a:r>
-              <a:rPr lang="en-CA" dirty="0"/>
-              <a:t> </a:t>
-            </a:r>
-            <a:r>
-              <a:rPr lang="en-CA" dirty="0" err="1"/>
-              <a:t>l’état</a:t>
-            </a:r>
-            <a:r>
-              <a:rPr lang="en-CA" dirty="0"/>
-              <a:t> de la </a:t>
-            </a:r>
-            <a:r>
-              <a:rPr lang="en-CA" dirty="0" err="1"/>
-              <a:t>ruche</a:t>
-            </a:r>
-            <a:endParaRPr lang="en-CA" dirty="0"/>
-          </a:p>
-          <a:p>
-            <a:endParaRPr lang="en-CA" dirty="0"/>
-          </a:p>
-          <a:p>
-            <a:r>
-              <a:rPr lang="en-CA" dirty="0" err="1"/>
-              <a:t>Système</a:t>
-            </a:r>
-            <a:r>
-              <a:rPr lang="en-CA" dirty="0"/>
-              <a:t> central qui analyse </a:t>
-            </a:r>
-            <a:r>
-              <a:rPr lang="en-CA" dirty="0" err="1"/>
-              <a:t>l’information</a:t>
-            </a:r>
-            <a:r>
-              <a:rPr lang="en-CA" dirty="0"/>
-              <a:t> des </a:t>
-            </a:r>
-            <a:r>
-              <a:rPr lang="en-CA" dirty="0" err="1"/>
-              <a:t>capteurs</a:t>
-            </a:r>
-            <a:r>
-              <a:rPr lang="en-CA" dirty="0"/>
-              <a:t> et </a:t>
-            </a:r>
-            <a:r>
-              <a:rPr lang="en-CA" dirty="0" err="1"/>
-              <a:t>envoie</a:t>
-            </a:r>
-            <a:r>
-              <a:rPr lang="en-CA" dirty="0"/>
-              <a:t> </a:t>
-            </a:r>
-            <a:r>
-              <a:rPr lang="en-CA" dirty="0" err="1"/>
-              <a:t>une</a:t>
-            </a:r>
-            <a:r>
-              <a:rPr lang="en-CA" dirty="0"/>
-              <a:t> </a:t>
-            </a:r>
-            <a:r>
-              <a:rPr lang="en-CA" dirty="0" err="1"/>
-              <a:t>commande</a:t>
-            </a:r>
-            <a:r>
-              <a:rPr lang="en-CA" dirty="0"/>
-              <a:t> </a:t>
-            </a:r>
-            <a:r>
-              <a:rPr lang="en-CA" dirty="0" err="1"/>
-              <a:t>si</a:t>
-            </a:r>
-            <a:r>
-              <a:rPr lang="en-CA" dirty="0"/>
-              <a:t> </a:t>
-            </a:r>
-            <a:r>
-              <a:rPr lang="en-CA" dirty="0" err="1"/>
-              <a:t>nécessaire</a:t>
-            </a:r>
-            <a:endParaRPr lang="en-CA" dirty="0"/>
-          </a:p>
-          <a:p>
-            <a:endParaRPr lang="en-CA" dirty="0"/>
-          </a:p>
-        </p:txBody>
-      </p:sp>
-    </p:spTree>
-    <p:extLst>
-      <p:ext uri="{BB962C8B-B14F-4D97-AF65-F5344CB8AC3E}">
-        <p14:creationId xmlns:p14="http://schemas.microsoft.com/office/powerpoint/2010/main" val="986008905"/>
-      </p:ext>
-    </p:extLst>
-  </p:cSld>
-  <p:clrMapOvr>
-    <a:masterClrMapping/>
-  </p:clrMapOvr>
-</p:sld>
-</file>
-
-<file path=ppt/slides/slide8.xml><?xml version="1.0" encoding="utf-8"?>
-<p:sld xmlns:a="http://schemas.openxmlformats.org/drawingml/2006/main" xmlns:r="http://schemas.openxmlformats.org/officeDocument/2006/relationships" xmlns:p="http://schemas.openxmlformats.org/presentationml/2006/main">
-  <p:cSld>
-    <p:spTree>
-      <p:nvGrpSpPr>
-        <p:cNvPr id="1" name=""/>
-        <p:cNvGrpSpPr/>
-        <p:nvPr/>
-      </p:nvGrpSpPr>
-      <p:grpSpPr>
-        <a:xfrm>
-          <a:off x="0" y="0"/>
-          <a:ext cx="0" cy="0"/>
-          <a:chOff x="0" y="0"/>
-          <a:chExt cx="0" cy="0"/>
-        </a:xfrm>
-      </p:grpSpPr>
-      <p:sp>
-        <p:nvSpPr>
-          <p:cNvPr id="2" name="Title 1">
-            <a:extLst>
-              <a:ext uri="{FF2B5EF4-FFF2-40B4-BE49-F238E27FC236}">
-                <a16:creationId xmlns:a16="http://schemas.microsoft.com/office/drawing/2014/main" id="{57AE6C2F-E93C-4A13-BFBF-2291D335938B}"/>
-              </a:ext>
-            </a:extLst>
-          </p:cNvPr>
-          <p:cNvSpPr>
-            <a:spLocks noGrp="1"/>
-          </p:cNvSpPr>
-          <p:nvPr>
-            <p:ph type="title"/>
-          </p:nvPr>
-        </p:nvSpPr>
-        <p:spPr>
-          <a:xfrm>
-            <a:off x="1484309" y="0"/>
-            <a:ext cx="10018713" cy="1752599"/>
-          </a:xfrm>
-        </p:spPr>
-        <p:txBody>
-          <a:bodyPr/>
-          <a:lstStyle/>
-          <a:p>
-            <a:r>
-              <a:rPr lang="en-CA" dirty="0"/>
-              <a:t>Architecture </a:t>
-            </a:r>
-            <a:r>
-              <a:rPr lang="en-CA" dirty="0" err="1"/>
-              <a:t>globale</a:t>
-            </a:r>
-            <a:endParaRPr lang="en-CA" dirty="0"/>
-          </a:p>
-        </p:txBody>
-      </p:sp>
-      <p:graphicFrame>
-        <p:nvGraphicFramePr>
-          <p:cNvPr id="5" name="Table 4">
-            <a:extLst>
-              <a:ext uri="{FF2B5EF4-FFF2-40B4-BE49-F238E27FC236}">
-                <a16:creationId xmlns:a16="http://schemas.microsoft.com/office/drawing/2014/main" id="{DA087B87-A4E2-424C-A303-D175DDBD92E0}"/>
-              </a:ext>
-            </a:extLst>
-          </p:cNvPr>
-          <p:cNvGraphicFramePr>
-            <a:graphicFrameLocks noGrp="1"/>
-          </p:cNvGraphicFramePr>
-          <p:nvPr>
-            <p:extLst>
-              <p:ext uri="{D42A27DB-BD31-4B8C-83A1-F6EECF244321}">
-                <p14:modId xmlns:p14="http://schemas.microsoft.com/office/powerpoint/2010/main" val="2856155542"/>
-              </p:ext>
-            </p:extLst>
-          </p:nvPr>
-        </p:nvGraphicFramePr>
-        <p:xfrm>
-          <a:off x="1653442" y="1452685"/>
-          <a:ext cx="8885116" cy="3601355"/>
-        </p:xfrm>
-        <a:graphic>
-          <a:graphicData uri="http://schemas.openxmlformats.org/drawingml/2006/table">
-            <a:tbl>
-              <a:tblPr firstRow="1" bandRow="1">
-                <a:tableStyleId>{5C22544A-7EE6-4342-B048-85BDC9FD1C3A}</a:tableStyleId>
-              </a:tblPr>
-              <a:tblGrid>
-                <a:gridCol w="4442558">
-                  <a:extLst>
-                    <a:ext uri="{9D8B030D-6E8A-4147-A177-3AD203B41FA5}">
-                      <a16:colId xmlns:a16="http://schemas.microsoft.com/office/drawing/2014/main" val="2474516255"/>
-                    </a:ext>
-                  </a:extLst>
-                </a:gridCol>
-                <a:gridCol w="4442558">
-                  <a:extLst>
-                    <a:ext uri="{9D8B030D-6E8A-4147-A177-3AD203B41FA5}">
-                      <a16:colId xmlns:a16="http://schemas.microsoft.com/office/drawing/2014/main" val="2917661861"/>
-                    </a:ext>
-                  </a:extLst>
-                </a:gridCol>
-              </a:tblGrid>
-              <a:tr h="549604">
-                <a:tc>
-                  <a:txBody>
-                    <a:bodyPr/>
-                    <a:lstStyle/>
-                    <a:p>
-                      <a:r>
-                        <a:rPr lang="en-CA" dirty="0" err="1"/>
-                        <a:t>Capteur</a:t>
-                      </a:r>
-                      <a:endParaRPr lang="en-CA" dirty="0"/>
-                    </a:p>
-                  </a:txBody>
-                  <a:tcPr/>
-                </a:tc>
-                <a:tc>
-                  <a:txBody>
-                    <a:bodyPr/>
-                    <a:lstStyle/>
-                    <a:p>
-                      <a:r>
-                        <a:rPr lang="en-CA" dirty="0" err="1"/>
-                        <a:t>Caractéristiques</a:t>
-                      </a:r>
-                      <a:endParaRPr lang="en-CA" dirty="0"/>
-                    </a:p>
-                  </a:txBody>
-                  <a:tcPr/>
-                </a:tc>
-                <a:extLst>
-                  <a:ext uri="{0D108BD9-81ED-4DB2-BD59-A6C34878D82A}">
-                    <a16:rowId xmlns:a16="http://schemas.microsoft.com/office/drawing/2014/main" val="2317750631"/>
-                  </a:ext>
-                </a:extLst>
-              </a:tr>
-              <a:tr h="948631">
-                <a:tc>
-                  <a:txBody>
-                    <a:bodyPr/>
-                    <a:lstStyle/>
-                    <a:p>
-                      <a:r>
-                        <a:rPr lang="en-CA" dirty="0" err="1"/>
-                        <a:t>Température</a:t>
-                      </a:r>
-                      <a:r>
-                        <a:rPr lang="en-CA" dirty="0"/>
-                        <a:t> (</a:t>
-                      </a:r>
-                      <a:r>
-                        <a:rPr lang="en-CA" dirty="0" err="1"/>
-                        <a:t>série</a:t>
-                      </a:r>
-                      <a:r>
-                        <a:rPr lang="en-CA" dirty="0"/>
-                        <a:t> S5855A_E)</a:t>
-                      </a:r>
-                    </a:p>
-                  </a:txBody>
-                  <a:tcPr/>
-                </a:tc>
-                <a:tc>
-                  <a:txBody>
-                    <a:bodyPr/>
-                    <a:lstStyle/>
-                    <a:p>
-                      <a:r>
-                        <a:rPr lang="en-CA" dirty="0"/>
-                        <a:t>-</a:t>
-                      </a:r>
-                      <a:r>
-                        <a:rPr lang="en-CA" dirty="0" err="1"/>
-                        <a:t>Couvre</a:t>
-                      </a:r>
-                      <a:r>
-                        <a:rPr lang="en-CA" dirty="0"/>
-                        <a:t> les </a:t>
-                      </a:r>
-                      <a:r>
-                        <a:rPr lang="en-CA" dirty="0" err="1"/>
-                        <a:t>températures</a:t>
-                      </a:r>
-                      <a:r>
-                        <a:rPr lang="en-CA" dirty="0"/>
-                        <a:t> du Québec</a:t>
-                      </a:r>
-                    </a:p>
-                    <a:p>
-                      <a:r>
-                        <a:rPr lang="en-CA" dirty="0"/>
-                        <a:t>-</a:t>
-                      </a:r>
-                      <a:r>
-                        <a:rPr lang="en-CA" dirty="0" err="1"/>
-                        <a:t>Consomme</a:t>
-                      </a:r>
-                      <a:r>
-                        <a:rPr lang="en-CA" dirty="0"/>
-                        <a:t> </a:t>
-                      </a:r>
-                      <a:r>
-                        <a:rPr lang="en-CA" dirty="0" err="1"/>
-                        <a:t>peu</a:t>
-                      </a:r>
-                      <a:r>
-                        <a:rPr lang="en-CA" dirty="0"/>
-                        <a:t> pour </a:t>
-                      </a:r>
-                      <a:r>
-                        <a:rPr lang="en-CA" dirty="0" err="1"/>
-                        <a:t>opération</a:t>
-                      </a:r>
-                      <a:endParaRPr lang="en-CA" dirty="0"/>
-                    </a:p>
-                    <a:p>
-                      <a:r>
-                        <a:rPr lang="en-CA" dirty="0"/>
-                        <a:t>-Sortie PWM</a:t>
-                      </a:r>
-                    </a:p>
-                  </a:txBody>
-                  <a:tcPr/>
-                </a:tc>
-                <a:extLst>
-                  <a:ext uri="{0D108BD9-81ED-4DB2-BD59-A6C34878D82A}">
-                    <a16:rowId xmlns:a16="http://schemas.microsoft.com/office/drawing/2014/main" val="1527509176"/>
-                  </a:ext>
-                </a:extLst>
-              </a:tr>
-              <a:tr h="1355187">
-                <a:tc>
-                  <a:txBody>
-                    <a:bodyPr/>
-                    <a:lstStyle/>
-                    <a:p>
-                      <a:r>
-                        <a:rPr lang="en-CA" dirty="0"/>
-                        <a:t>Force (</a:t>
-                      </a:r>
-                      <a:r>
-                        <a:rPr lang="en-CA" dirty="0" err="1"/>
-                        <a:t>série</a:t>
-                      </a:r>
-                      <a:r>
-                        <a:rPr lang="en-CA" dirty="0"/>
-                        <a:t> FC22)</a:t>
-                      </a:r>
-                    </a:p>
-                  </a:txBody>
-                  <a:tcPr/>
-                </a:tc>
-                <a:tc>
-                  <a:txBody>
-                    <a:bodyPr/>
-                    <a:lstStyle/>
-                    <a:p>
-                      <a:r>
-                        <a:rPr lang="en-CA" dirty="0"/>
-                        <a:t>-</a:t>
-                      </a:r>
-                      <a:r>
-                        <a:rPr lang="en-CA" dirty="0" err="1"/>
-                        <a:t>Couvre</a:t>
-                      </a:r>
-                      <a:r>
-                        <a:rPr lang="en-CA" dirty="0"/>
-                        <a:t> le </a:t>
-                      </a:r>
-                      <a:r>
-                        <a:rPr lang="en-CA" dirty="0" err="1"/>
-                        <a:t>poids</a:t>
-                      </a:r>
-                      <a:r>
-                        <a:rPr lang="en-CA" dirty="0"/>
-                        <a:t> </a:t>
-                      </a:r>
-                      <a:r>
-                        <a:rPr lang="en-CA" dirty="0" err="1"/>
-                        <a:t>d’une</a:t>
-                      </a:r>
-                      <a:r>
-                        <a:rPr lang="en-CA" dirty="0"/>
-                        <a:t> </a:t>
-                      </a:r>
-                      <a:r>
-                        <a:rPr lang="en-CA" dirty="0" err="1"/>
-                        <a:t>ruche</a:t>
-                      </a:r>
-                      <a:endParaRPr lang="en-CA" dirty="0"/>
-                    </a:p>
-                    <a:p>
-                      <a:r>
-                        <a:rPr lang="en-CA" dirty="0"/>
-                        <a:t>-</a:t>
-                      </a:r>
-                      <a:r>
-                        <a:rPr lang="en-CA" dirty="0" err="1"/>
-                        <a:t>Fonctionne</a:t>
-                      </a:r>
-                      <a:r>
-                        <a:rPr lang="en-CA" dirty="0"/>
-                        <a:t> </a:t>
-                      </a:r>
-                      <a:r>
-                        <a:rPr lang="en-CA" dirty="0" err="1"/>
-                        <a:t>dans</a:t>
-                      </a:r>
-                      <a:r>
-                        <a:rPr lang="en-CA" dirty="0"/>
-                        <a:t> les temperatures du Québec</a:t>
-                      </a:r>
-                    </a:p>
-                    <a:p>
-                      <a:r>
-                        <a:rPr lang="en-CA" dirty="0"/>
-                        <a:t>-Sortie </a:t>
-                      </a:r>
-                      <a:r>
-                        <a:rPr lang="en-CA" dirty="0" err="1"/>
-                        <a:t>analogique</a:t>
-                      </a:r>
-                      <a:r>
-                        <a:rPr lang="en-CA" dirty="0"/>
-                        <a:t> avec </a:t>
-                      </a:r>
-                      <a:r>
-                        <a:rPr lang="en-CA" dirty="0" err="1"/>
-                        <a:t>pont</a:t>
-                      </a:r>
-                      <a:r>
-                        <a:rPr lang="en-CA" dirty="0"/>
-                        <a:t> de </a:t>
-                      </a:r>
-                      <a:r>
-                        <a:rPr lang="en-CA" dirty="0" err="1"/>
-                        <a:t>wheatstone</a:t>
-                      </a:r>
-                      <a:r>
-                        <a:rPr lang="en-CA" dirty="0"/>
-                        <a:t> (4 ports </a:t>
-                      </a:r>
-                      <a:r>
-                        <a:rPr lang="en-CA" dirty="0" err="1"/>
-                        <a:t>nécessaires</a:t>
-                      </a:r>
-                      <a:r>
-                        <a:rPr lang="en-CA" dirty="0"/>
-                        <a:t>)</a:t>
-                      </a:r>
-                    </a:p>
-                  </a:txBody>
-                  <a:tcPr/>
-                </a:tc>
-                <a:extLst>
-                  <a:ext uri="{0D108BD9-81ED-4DB2-BD59-A6C34878D82A}">
-                    <a16:rowId xmlns:a16="http://schemas.microsoft.com/office/drawing/2014/main" val="3165022307"/>
-                  </a:ext>
-                </a:extLst>
-              </a:tr>
-              <a:tr h="549604">
-                <a:tc>
-                  <a:txBody>
-                    <a:bodyPr/>
-                    <a:lstStyle/>
-                    <a:p>
-                      <a:r>
-                        <a:rPr lang="en-CA" dirty="0"/>
-                        <a:t>Position </a:t>
-                      </a:r>
-                      <a:r>
-                        <a:rPr lang="en-CA" b="0" dirty="0"/>
-                        <a:t>(</a:t>
-                      </a:r>
-                      <a:r>
-                        <a:rPr lang="en-CA" sz="1800" b="0" i="0" kern="1200" dirty="0">
-                          <a:solidFill>
-                            <a:schemeClr val="dk1"/>
-                          </a:solidFill>
-                          <a:effectLst/>
-                          <a:latin typeface="+mn-lt"/>
-                          <a:ea typeface="+mn-ea"/>
-                          <a:cs typeface="+mn-cs"/>
-                        </a:rPr>
-                        <a:t>RB-Fee-67</a:t>
-                      </a:r>
-                      <a:r>
-                        <a:rPr lang="en-CA" b="0" dirty="0"/>
-                        <a:t>)</a:t>
-                      </a:r>
-                    </a:p>
-                  </a:txBody>
-                  <a:tcPr/>
-                </a:tc>
-                <a:tc>
-                  <a:txBody>
-                    <a:bodyPr/>
-                    <a:lstStyle/>
-                    <a:p>
-                      <a:r>
-                        <a:rPr lang="en-CA" dirty="0"/>
-                        <a:t>-Communique via UART </a:t>
-                      </a:r>
-                    </a:p>
-                    <a:p>
-                      <a:r>
-                        <a:rPr lang="en-CA" dirty="0"/>
-                        <a:t>-Alimentation entre 2,75 et 3,6V</a:t>
-                      </a:r>
-                    </a:p>
-                  </a:txBody>
-                  <a:tcPr/>
-                </a:tc>
-                <a:extLst>
-                  <a:ext uri="{0D108BD9-81ED-4DB2-BD59-A6C34878D82A}">
-                    <a16:rowId xmlns:a16="http://schemas.microsoft.com/office/drawing/2014/main" val="1334639137"/>
-                  </a:ext>
-                </a:extLst>
-              </a:tr>
-            </a:tbl>
-          </a:graphicData>
-        </a:graphic>
-      </p:graphicFrame>
-    </p:spTree>
-    <p:extLst>
-      <p:ext uri="{BB962C8B-B14F-4D97-AF65-F5344CB8AC3E}">
-        <p14:creationId xmlns:p14="http://schemas.microsoft.com/office/powerpoint/2010/main" val="1776989636"/>
-      </p:ext>
-    </p:extLst>
-  </p:cSld>
-  <p:clrMapOvr>
-    <a:masterClrMapping/>
-  </p:clrMapOvr>
-</p:sld>
-</file>
-
 <file path=ppt/slides/slide9.xml><?xml version="1.0" encoding="utf-8"?>
 <p:sld xmlns:a="http://schemas.openxmlformats.org/drawingml/2006/main" xmlns:r="http://schemas.openxmlformats.org/officeDocument/2006/relationships" xmlns:p="http://schemas.openxmlformats.org/presentationml/2006/main">
   <p:cSld>
@@ -12641,8 +13214,8 @@
         </p:nvSpPr>
         <p:spPr>
           <a:xfrm>
-            <a:off x="1484308" y="1559168"/>
-            <a:ext cx="10018713" cy="3628294"/>
+            <a:off x="1484310" y="1752599"/>
+            <a:ext cx="10018713" cy="4038601"/>
           </a:xfrm>
         </p:spPr>
         <p:txBody>
@@ -12650,60 +13223,140 @@
           <a:lstStyle/>
           <a:p>
             <a:r>
-              <a:rPr lang="fr-CA" dirty="0"/>
-              <a:t>Ruche alimentée par une batterie, donc gestion de l’énergie importante</a:t>
-            </a:r>
-          </a:p>
-          <a:p>
-            <a:r>
-              <a:rPr lang="fr-CA" dirty="0"/>
-              <a:t>Batterie à 3,6V et 3000 mAh</a:t>
-            </a:r>
-          </a:p>
-          <a:p>
-            <a:r>
-              <a:rPr lang="fr-CA" dirty="0"/>
-              <a:t>Puissance requise d’opération:  </a:t>
-            </a:r>
-          </a:p>
-          <a:p>
-            <a:pPr marL="0" indent="0">
-              <a:buNone/>
-            </a:pPr>
-            <a:r>
-              <a:rPr lang="fr-CA" dirty="0"/>
-              <a:t> 				Temp + </a:t>
-            </a:r>
-            <a:r>
-              <a:rPr lang="fr-CA" dirty="0" err="1"/>
-              <a:t>L.Cell</a:t>
-            </a:r>
-            <a:r>
-              <a:rPr lang="fr-CA" dirty="0"/>
-              <a:t> + GPS + Micro. = Total</a:t>
-            </a:r>
-          </a:p>
-          <a:p>
-            <a:pPr marL="0" indent="0">
-              <a:buNone/>
-            </a:pPr>
-            <a:r>
-              <a:rPr lang="fr-CA" dirty="0"/>
-              <a:t>				0,2mW + 12mW + 12mW + 68,4mW = 92,6mW ≈ 100mW</a:t>
-            </a:r>
-          </a:p>
-          <a:p>
-            <a:r>
-              <a:rPr lang="fr-CA" dirty="0"/>
-              <a:t>Donc avec une seule batterie, le microcontrôleur peut rester actif à pleine capacité pendant environ 115 heures.</a:t>
-            </a:r>
+              <a:rPr lang="en-CA" dirty="0"/>
+              <a:t>Communication sans-fil entre le </a:t>
+            </a:r>
+            <a:r>
+              <a:rPr lang="en-CA" dirty="0" err="1"/>
+              <a:t>système</a:t>
+            </a:r>
+            <a:r>
+              <a:rPr lang="en-CA" dirty="0"/>
+              <a:t> central et la </a:t>
+            </a:r>
+            <a:r>
+              <a:rPr lang="en-CA" dirty="0" err="1"/>
+              <a:t>ruche</a:t>
+            </a:r>
+            <a:endParaRPr lang="en-CA" dirty="0"/>
+          </a:p>
+          <a:p>
+            <a:endParaRPr lang="en-CA" dirty="0"/>
+          </a:p>
+          <a:p>
+            <a:r>
+              <a:rPr lang="en-CA" dirty="0" err="1"/>
+              <a:t>Capteurs</a:t>
+            </a:r>
+            <a:r>
+              <a:rPr lang="en-CA" dirty="0"/>
+              <a:t> </a:t>
+            </a:r>
+            <a:r>
+              <a:rPr lang="en-CA" dirty="0" err="1"/>
+              <a:t>permettant</a:t>
+            </a:r>
+            <a:r>
+              <a:rPr lang="en-CA" dirty="0"/>
+              <a:t> de </a:t>
+            </a:r>
+            <a:r>
+              <a:rPr lang="en-CA" dirty="0" err="1"/>
+              <a:t>connaître</a:t>
+            </a:r>
+            <a:r>
+              <a:rPr lang="en-CA" dirty="0"/>
+              <a:t> </a:t>
+            </a:r>
+            <a:r>
+              <a:rPr lang="en-CA" dirty="0" err="1"/>
+              <a:t>l’état</a:t>
+            </a:r>
+            <a:r>
+              <a:rPr lang="en-CA" dirty="0"/>
+              <a:t> de la </a:t>
+            </a:r>
+            <a:r>
+              <a:rPr lang="en-CA" dirty="0" err="1"/>
+              <a:t>ruche</a:t>
+            </a:r>
+            <a:endParaRPr lang="en-CA" dirty="0"/>
+          </a:p>
+          <a:p>
+            <a:endParaRPr lang="en-CA" dirty="0"/>
+          </a:p>
+          <a:p>
+            <a:r>
+              <a:rPr lang="en-CA" dirty="0" err="1"/>
+              <a:t>Système</a:t>
+            </a:r>
+            <a:r>
+              <a:rPr lang="en-CA" dirty="0"/>
+              <a:t> central qui analyse </a:t>
+            </a:r>
+            <a:r>
+              <a:rPr lang="en-CA" dirty="0" err="1"/>
+              <a:t>l’information</a:t>
+            </a:r>
+            <a:r>
+              <a:rPr lang="en-CA" dirty="0"/>
+              <a:t> des </a:t>
+            </a:r>
+            <a:r>
+              <a:rPr lang="en-CA" dirty="0" err="1"/>
+              <a:t>capteurs</a:t>
+            </a:r>
+            <a:r>
+              <a:rPr lang="en-CA" dirty="0"/>
+              <a:t> et </a:t>
+            </a:r>
+            <a:r>
+              <a:rPr lang="en-CA" dirty="0" err="1"/>
+              <a:t>envoie</a:t>
+            </a:r>
+            <a:r>
+              <a:rPr lang="en-CA" dirty="0"/>
+              <a:t> </a:t>
+            </a:r>
+            <a:r>
+              <a:rPr lang="en-CA" dirty="0" err="1"/>
+              <a:t>une</a:t>
+            </a:r>
+            <a:r>
+              <a:rPr lang="en-CA" dirty="0"/>
+              <a:t> </a:t>
+            </a:r>
+            <a:r>
+              <a:rPr lang="en-CA" dirty="0" err="1"/>
+              <a:t>commande</a:t>
+            </a:r>
+            <a:r>
+              <a:rPr lang="en-CA" dirty="0"/>
+              <a:t> </a:t>
+            </a:r>
+            <a:r>
+              <a:rPr lang="en-CA" dirty="0" err="1"/>
+              <a:t>si</a:t>
+            </a:r>
+            <a:r>
+              <a:rPr lang="en-CA" dirty="0"/>
+              <a:t> </a:t>
+            </a:r>
+            <a:r>
+              <a:rPr lang="en-CA" dirty="0" err="1"/>
+              <a:t>nécessaire</a:t>
+            </a:r>
+            <a:endParaRPr lang="en-CA" dirty="0"/>
+          </a:p>
+          <a:p>
+            <a:endParaRPr lang="en-CA" dirty="0"/>
           </a:p>
         </p:txBody>
       </p:sp>
     </p:spTree>
     <p:extLst>
       <p:ext uri="{BB962C8B-B14F-4D97-AF65-F5344CB8AC3E}">
-        <p14:creationId xmlns:p14="http://schemas.microsoft.com/office/powerpoint/2010/main" val="1915502978"/>
+        <p14:creationId xmlns:p14="http://schemas.microsoft.com/office/powerpoint/2010/main" val="986008905"/>
       </p:ext>
     </p:extLst>
   </p:cSld>

</xml_diff>